<commit_message>
added IR system architecture, data explanation and Elasticsearch configuration
</commit_message>
<xml_diff>
--- a/report/report.pptx
+++ b/report/report.pptx
@@ -5,14 +5,20 @@
     <p:sldMasterId id="2147483750" r:id="rId1"/>
     <p:sldMasterId id="2147483660" r:id="rId2"/>
     <p:sldMasterId id="2147483665" r:id="rId3"/>
+    <p:sldMasterId id="2147483663" r:id="rId4"/>
   </p:sldMasterIdLst>
   <p:sldIdLst>
-    <p:sldId id="257" r:id="rId4"/>
-    <p:sldId id="258" r:id="rId5"/>
-    <p:sldId id="259" r:id="rId6"/>
-    <p:sldId id="260" r:id="rId7"/>
-    <p:sldId id="261" r:id="rId8"/>
-    <p:sldId id="262" r:id="rId9"/>
+    <p:sldId id="257" r:id="rId5"/>
+    <p:sldId id="258" r:id="rId6"/>
+    <p:sldId id="259" r:id="rId7"/>
+    <p:sldId id="260" r:id="rId8"/>
+    <p:sldId id="261" r:id="rId9"/>
+    <p:sldId id="262" r:id="rId10"/>
+    <p:sldId id="265" r:id="rId11"/>
+    <p:sldId id="266" r:id="rId12"/>
+    <p:sldId id="267" r:id="rId13"/>
+    <p:sldId id="268" r:id="rId14"/>
+    <p:sldId id="269" r:id="rId15"/>
   </p:sldIdLst>
   <p:sldSz cx="12192000" cy="6858000"/>
   <p:notesSz cx="6858000" cy="9144000"/>
@@ -268,7 +274,7 @@
           <a:p>
             <a:fld id="{3C2B07E4-CDF9-4C88-A2F3-04620E58224D}" type="datetimeFigureOut">
               <a:rPr lang="en-US" smtClean="0"/>
-              <a:t>11/10/2021</a:t>
+              <a:t>11/12/2021</a:t>
             </a:fld>
             <a:endParaRPr lang="en-US"/>
           </a:p>
@@ -558,7 +564,7 @@
           <a:p>
             <a:fld id="{3C2B07E4-CDF9-4C88-A2F3-04620E58224D}" type="datetimeFigureOut">
               <a:rPr lang="en-US" smtClean="0"/>
-              <a:t>11/10/2021</a:t>
+              <a:t>11/12/2021</a:t>
             </a:fld>
             <a:endParaRPr lang="en-US"/>
           </a:p>
@@ -810,7 +816,7 @@
           <a:p>
             <a:fld id="{3C2B07E4-CDF9-4C88-A2F3-04620E58224D}" type="datetimeFigureOut">
               <a:rPr lang="en-US" smtClean="0"/>
-              <a:t>11/10/2021</a:t>
+              <a:t>11/12/2021</a:t>
             </a:fld>
             <a:endParaRPr lang="en-US"/>
           </a:p>
@@ -998,7 +1004,7 @@
           <a:p>
             <a:fld id="{AA302EFC-ED59-4B4D-993E-400BC651A785}" type="datetime1">
               <a:rPr lang="en-US" smtClean="0"/>
-              <a:t>11/10/2021</a:t>
+              <a:t>11/12/2021</a:t>
             </a:fld>
             <a:endParaRPr lang="en-US" dirty="0"/>
           </a:p>
@@ -1190,7 +1196,199 @@
           <a:p>
             <a:fld id="{1067E7C5-37BF-4B94-8AB4-87E727052233}" type="datetime1">
               <a:rPr lang="en-US" smtClean="0"/>
-              <a:t>11/10/2021</a:t>
+              <a:t>11/12/2021</a:t>
+            </a:fld>
+            <a:endParaRPr lang="en-US" dirty="0"/>
+          </a:p>
+        </p:txBody>
+      </p:sp>
+      <p:sp>
+        <p:nvSpPr>
+          <p:cNvPr id="8" name="Footer Placeholder 7">
+            <a:extLst>
+              <a:ext uri="{FF2B5EF4-FFF2-40B4-BE49-F238E27FC236}">
+                <a16:creationId xmlns:a16="http://schemas.microsoft.com/office/drawing/2014/main" id="{062CA021-2578-47CB-822C-BDDFF7223B28}"/>
+              </a:ext>
+            </a:extLst>
+          </p:cNvPr>
+          <p:cNvSpPr>
+            <a:spLocks noGrp="1"/>
+          </p:cNvSpPr>
+          <p:nvPr>
+            <p:ph type="ftr" sz="quarter" idx="11"/>
+          </p:nvPr>
+        </p:nvSpPr>
+        <p:spPr/>
+        <p:txBody>
+          <a:bodyPr/>
+          <a:lstStyle/>
+          <a:p>
+            <a:r>
+              <a:rPr lang="en-US"/>
+              <a:t>Lampros Lountzis</a:t>
+            </a:r>
+            <a:endParaRPr lang="en-US" dirty="0"/>
+          </a:p>
+        </p:txBody>
+      </p:sp>
+      <p:sp>
+        <p:nvSpPr>
+          <p:cNvPr id="9" name="Slide Number Placeholder 8">
+            <a:extLst>
+              <a:ext uri="{FF2B5EF4-FFF2-40B4-BE49-F238E27FC236}">
+                <a16:creationId xmlns:a16="http://schemas.microsoft.com/office/drawing/2014/main" id="{C4AAB51D-4141-4682-9375-DAFD5FB9DD10}"/>
+              </a:ext>
+            </a:extLst>
+          </p:cNvPr>
+          <p:cNvSpPr>
+            <a:spLocks noGrp="1"/>
+          </p:cNvSpPr>
+          <p:nvPr>
+            <p:ph type="sldNum" sz="quarter" idx="12"/>
+          </p:nvPr>
+        </p:nvSpPr>
+        <p:spPr/>
+        <p:txBody>
+          <a:bodyPr/>
+          <a:lstStyle/>
+          <a:p>
+            <a:fld id="{3A98EE3D-8CD1-4C3F-BD1C-C98C9596463C}" type="slidenum">
+              <a:rPr lang="en-US" smtClean="0"/>
+              <a:t>‹#›</a:t>
+            </a:fld>
+            <a:endParaRPr lang="en-US" dirty="0"/>
+          </a:p>
+        </p:txBody>
+      </p:sp>
+    </p:spTree>
+    <p:extLst>
+      <p:ext uri="{BB962C8B-B14F-4D97-AF65-F5344CB8AC3E}">
+        <p14:creationId xmlns:p14="http://schemas.microsoft.com/office/powerpoint/2010/main" val="1238980780"/>
+      </p:ext>
+    </p:extLst>
+  </p:cSld>
+  <p:clrMapOvr>
+    <a:masterClrMapping/>
+  </p:clrMapOvr>
+</p:sldLayout>
+</file>
+
+<file path=ppt/slideLayouts/slideLayout14.xml><?xml version="1.0" encoding="utf-8"?>
+<p:sldLayout xmlns:a="http://schemas.openxmlformats.org/drawingml/2006/main" xmlns:r="http://schemas.openxmlformats.org/officeDocument/2006/relationships" xmlns:p="http://schemas.openxmlformats.org/presentationml/2006/main" type="obj" preserve="1">
+  <p:cSld name="Title and Content">
+    <p:spTree>
+      <p:nvGrpSpPr>
+        <p:cNvPr id="1" name=""/>
+        <p:cNvGrpSpPr/>
+        <p:nvPr/>
+      </p:nvGrpSpPr>
+      <p:grpSpPr>
+        <a:xfrm>
+          <a:off x="0" y="0"/>
+          <a:ext cx="0" cy="0"/>
+          <a:chOff x="0" y="0"/>
+          <a:chExt cx="0" cy="0"/>
+        </a:xfrm>
+      </p:grpSpPr>
+      <p:sp>
+        <p:nvSpPr>
+          <p:cNvPr id="2" name="Title 1"/>
+          <p:cNvSpPr>
+            <a:spLocks noGrp="1"/>
+          </p:cNvSpPr>
+          <p:nvPr>
+            <p:ph type="title"/>
+          </p:nvPr>
+        </p:nvSpPr>
+        <p:spPr/>
+        <p:txBody>
+          <a:bodyPr/>
+          <a:lstStyle/>
+          <a:p>
+            <a:r>
+              <a:rPr lang="en-US"/>
+              <a:t>Click to edit Master title style</a:t>
+            </a:r>
+            <a:endParaRPr lang="en-US" dirty="0"/>
+          </a:p>
+        </p:txBody>
+      </p:sp>
+      <p:sp>
+        <p:nvSpPr>
+          <p:cNvPr id="3" name="Content Placeholder 2"/>
+          <p:cNvSpPr>
+            <a:spLocks noGrp="1"/>
+          </p:cNvSpPr>
+          <p:nvPr>
+            <p:ph idx="1"/>
+          </p:nvPr>
+        </p:nvSpPr>
+        <p:spPr/>
+        <p:txBody>
+          <a:bodyPr/>
+          <a:lstStyle/>
+          <a:p>
+            <a:pPr lvl="0"/>
+            <a:r>
+              <a:rPr lang="en-US"/>
+              <a:t>Click to edit Master text styles</a:t>
+            </a:r>
+          </a:p>
+          <a:p>
+            <a:pPr lvl="1"/>
+            <a:r>
+              <a:rPr lang="en-US"/>
+              <a:t>Second level</a:t>
+            </a:r>
+          </a:p>
+          <a:p>
+            <a:pPr lvl="2"/>
+            <a:r>
+              <a:rPr lang="en-US"/>
+              <a:t>Third level</a:t>
+            </a:r>
+          </a:p>
+          <a:p>
+            <a:pPr lvl="3"/>
+            <a:r>
+              <a:rPr lang="en-US"/>
+              <a:t>Fourth level</a:t>
+            </a:r>
+          </a:p>
+          <a:p>
+            <a:pPr lvl="4"/>
+            <a:r>
+              <a:rPr lang="en-US"/>
+              <a:t>Fifth level</a:t>
+            </a:r>
+            <a:endParaRPr lang="en-US" dirty="0"/>
+          </a:p>
+        </p:txBody>
+      </p:sp>
+      <p:sp>
+        <p:nvSpPr>
+          <p:cNvPr id="7" name="Date Placeholder 6">
+            <a:extLst>
+              <a:ext uri="{FF2B5EF4-FFF2-40B4-BE49-F238E27FC236}">
+                <a16:creationId xmlns:a16="http://schemas.microsoft.com/office/drawing/2014/main" id="{354D8B55-9EA8-4B81-8E84-9B93B0A27559}"/>
+              </a:ext>
+            </a:extLst>
+          </p:cNvPr>
+          <p:cNvSpPr>
+            <a:spLocks noGrp="1"/>
+          </p:cNvSpPr>
+          <p:nvPr>
+            <p:ph type="dt" sz="half" idx="10"/>
+          </p:nvPr>
+        </p:nvSpPr>
+        <p:spPr/>
+        <p:txBody>
+          <a:bodyPr/>
+          <a:lstStyle/>
+          <a:p>
+            <a:fld id="{7B3F78A3-FD76-4F63-AF81-1396C1841E9C}" type="datetime1">
+              <a:rPr lang="en-US" smtClean="0"/>
+              <a:t>11/12/2021</a:t>
             </a:fld>
             <a:endParaRPr lang="en-US" dirty="0"/>
           </a:p>
@@ -1446,7 +1644,7 @@
           <a:p>
             <a:fld id="{3C2B07E4-CDF9-4C88-A2F3-04620E58224D}" type="datetimeFigureOut">
               <a:rPr lang="en-US" smtClean="0"/>
-              <a:t>11/10/2021</a:t>
+              <a:t>11/12/2021</a:t>
             </a:fld>
             <a:endParaRPr lang="en-US"/>
           </a:p>
@@ -1775,7 +1973,7 @@
           <a:p>
             <a:fld id="{3C2B07E4-CDF9-4C88-A2F3-04620E58224D}" type="datetimeFigureOut">
               <a:rPr lang="en-US" smtClean="0"/>
-              <a:t>11/10/2021</a:t>
+              <a:t>11/12/2021</a:t>
             </a:fld>
             <a:endParaRPr lang="en-US"/>
           </a:p>
@@ -2125,7 +2323,7 @@
           <a:p>
             <a:fld id="{3C2B07E4-CDF9-4C88-A2F3-04620E58224D}" type="datetimeFigureOut">
               <a:rPr lang="en-US" smtClean="0"/>
-              <a:t>11/10/2021</a:t>
+              <a:t>11/12/2021</a:t>
             </a:fld>
             <a:endParaRPr lang="en-US"/>
           </a:p>
@@ -2637,7 +2835,7 @@
           <a:p>
             <a:fld id="{3C2B07E4-CDF9-4C88-A2F3-04620E58224D}" type="datetimeFigureOut">
               <a:rPr lang="en-US" smtClean="0"/>
-              <a:t>11/10/2021</a:t>
+              <a:t>11/12/2021</a:t>
             </a:fld>
             <a:endParaRPr lang="en-US"/>
           </a:p>
@@ -2965,7 +3163,7 @@
           <a:p>
             <a:fld id="{3C2B07E4-CDF9-4C88-A2F3-04620E58224D}" type="datetimeFigureOut">
               <a:rPr lang="en-US" smtClean="0"/>
-              <a:t>11/10/2021</a:t>
+              <a:t>11/12/2021</a:t>
             </a:fld>
             <a:endParaRPr lang="en-US"/>
           </a:p>
@@ -3078,7 +3276,7 @@
           <a:p>
             <a:fld id="{3C2B07E4-CDF9-4C88-A2F3-04620E58224D}" type="datetimeFigureOut">
               <a:rPr lang="en-US" smtClean="0"/>
-              <a:t>11/10/2021</a:t>
+              <a:t>11/12/2021</a:t>
             </a:fld>
             <a:endParaRPr lang="en-US"/>
           </a:p>
@@ -3419,7 +3617,7 @@
           <a:p>
             <a:fld id="{3C2B07E4-CDF9-4C88-A2F3-04620E58224D}" type="datetimeFigureOut">
               <a:rPr lang="en-US" smtClean="0"/>
-              <a:t>11/10/2021</a:t>
+              <a:t>11/12/2021</a:t>
             </a:fld>
             <a:endParaRPr lang="en-US"/>
           </a:p>
@@ -3719,7 +3917,7 @@
           <a:p>
             <a:fld id="{3C2B07E4-CDF9-4C88-A2F3-04620E58224D}" type="datetimeFigureOut">
               <a:rPr lang="en-US" smtClean="0"/>
-              <a:t>11/10/2021</a:t>
+              <a:t>11/12/2021</a:t>
             </a:fld>
             <a:endParaRPr lang="en-US"/>
           </a:p>
@@ -3959,7 +4157,7 @@
             <a:fld id="{3C2B07E4-CDF9-4C88-A2F3-04620E58224D}" type="datetimeFigureOut">
               <a:rPr lang="en-US" smtClean="0"/>
               <a:pPr/>
-              <a:t>11/10/2021</a:t>
+              <a:t>11/12/2021</a:t>
             </a:fld>
             <a:endParaRPr lang="en-US" dirty="0"/>
           </a:p>
@@ -4558,7 +4756,7 @@
           <a:p>
             <a:fld id="{30B9AB43-16D5-496C-92E2-DD88A4837C90}" type="datetime1">
               <a:rPr lang="en-US" smtClean="0"/>
-              <a:t>11/10/2021</a:t>
+              <a:t>11/12/2021</a:t>
             </a:fld>
             <a:endParaRPr lang="en-US" dirty="0"/>
           </a:p>
@@ -5252,7 +5450,7 @@
           <a:p>
             <a:fld id="{2983D189-BC30-430F-BBBC-47FE85CCFEB3}" type="datetime1">
               <a:rPr lang="en-US" smtClean="0"/>
-              <a:t>11/10/2021</a:t>
+              <a:t>11/12/2021</a:t>
             </a:fld>
             <a:endParaRPr lang="en-US" dirty="0"/>
           </a:p>
@@ -5752,6 +5950,700 @@
 </p:sldMaster>
 </file>
 
+<file path=ppt/slideMasters/slideMaster4.xml><?xml version="1.0" encoding="utf-8"?>
+<p:sldMaster xmlns:a="http://schemas.openxmlformats.org/drawingml/2006/main" xmlns:r="http://schemas.openxmlformats.org/officeDocument/2006/relationships" xmlns:p="http://schemas.openxmlformats.org/presentationml/2006/main">
+  <p:cSld>
+    <p:bg>
+      <p:bgRef idx="1001">
+        <a:schemeClr val="bg1"/>
+      </p:bgRef>
+    </p:bg>
+    <p:spTree>
+      <p:nvGrpSpPr>
+        <p:cNvPr id="1" name=""/>
+        <p:cNvGrpSpPr/>
+        <p:nvPr/>
+      </p:nvGrpSpPr>
+      <p:grpSpPr>
+        <a:xfrm>
+          <a:off x="0" y="0"/>
+          <a:ext cx="0" cy="0"/>
+          <a:chOff x="0" y="0"/>
+          <a:chExt cx="0" cy="0"/>
+        </a:xfrm>
+      </p:grpSpPr>
+      <p:sp>
+        <p:nvSpPr>
+          <p:cNvPr id="7" name="Rectangle 6">
+            <a:extLst>
+              <a:ext uri="{FF2B5EF4-FFF2-40B4-BE49-F238E27FC236}">
+                <a16:creationId xmlns:a16="http://schemas.microsoft.com/office/drawing/2014/main" id="{416A0E3C-60E6-4F39-BC55-5F7C224E1F7C}"/>
+              </a:ext>
+            </a:extLst>
+          </p:cNvPr>
+          <p:cNvSpPr/>
+          <p:nvPr/>
+        </p:nvSpPr>
+        <p:spPr>
+          <a:xfrm>
+            <a:off x="3175" y="6400800"/>
+            <a:ext cx="12188825" cy="457200"/>
+          </a:xfrm>
+          <a:prstGeom prst="rect">
+            <a:avLst/>
+          </a:prstGeom>
+          <a:solidFill>
+            <a:srgbClr val="262626"/>
+          </a:solidFill>
+          <a:ln>
+            <a:noFill/>
+          </a:ln>
+        </p:spPr>
+        <p:style>
+          <a:lnRef idx="2">
+            <a:schemeClr val="accent1">
+              <a:shade val="50000"/>
+            </a:schemeClr>
+          </a:lnRef>
+          <a:fillRef idx="1">
+            <a:schemeClr val="accent1"/>
+          </a:fillRef>
+          <a:effectRef idx="0">
+            <a:schemeClr val="accent1"/>
+          </a:effectRef>
+          <a:fontRef idx="minor">
+            <a:schemeClr val="lt1"/>
+          </a:fontRef>
+        </p:style>
+      </p:sp>
+      <p:sp>
+        <p:nvSpPr>
+          <p:cNvPr id="2" name="Title Placeholder 1"/>
+          <p:cNvSpPr>
+            <a:spLocks noGrp="1"/>
+          </p:cNvSpPr>
+          <p:nvPr>
+            <p:ph type="title"/>
+          </p:nvPr>
+        </p:nvSpPr>
+        <p:spPr>
+          <a:xfrm>
+            <a:off x="1097280" y="286603"/>
+            <a:ext cx="10058400" cy="1450757"/>
+          </a:xfrm>
+          <a:prstGeom prst="rect">
+            <a:avLst/>
+          </a:prstGeom>
+        </p:spPr>
+        <p:txBody>
+          <a:bodyPr vert="horz" lIns="91440" tIns="45720" rIns="91440" bIns="45720" rtlCol="0" anchor="b">
+            <a:normAutofit/>
+          </a:bodyPr>
+          <a:lstStyle/>
+          <a:p>
+            <a:r>
+              <a:rPr lang="en-US"/>
+              <a:t>Click to edit Master title style</a:t>
+            </a:r>
+            <a:endParaRPr lang="en-US" dirty="0"/>
+          </a:p>
+        </p:txBody>
+      </p:sp>
+      <p:sp>
+        <p:nvSpPr>
+          <p:cNvPr id="3" name="Text Placeholder 2"/>
+          <p:cNvSpPr>
+            <a:spLocks noGrp="1"/>
+          </p:cNvSpPr>
+          <p:nvPr>
+            <p:ph type="body" idx="1"/>
+          </p:nvPr>
+        </p:nvSpPr>
+        <p:spPr>
+          <a:xfrm>
+            <a:off x="1097280" y="2108201"/>
+            <a:ext cx="10058400" cy="3760891"/>
+          </a:xfrm>
+          <a:prstGeom prst="rect">
+            <a:avLst/>
+          </a:prstGeom>
+        </p:spPr>
+        <p:txBody>
+          <a:bodyPr vert="horz" lIns="0" tIns="45720" rIns="0" bIns="45720" rtlCol="0">
+            <a:normAutofit/>
+          </a:bodyPr>
+          <a:lstStyle/>
+          <a:p>
+            <a:pPr lvl="0"/>
+            <a:r>
+              <a:rPr lang="en-US"/>
+              <a:t>Click to edit Master text styles</a:t>
+            </a:r>
+          </a:p>
+          <a:p>
+            <a:pPr lvl="1"/>
+            <a:r>
+              <a:rPr lang="en-US"/>
+              <a:t>Second level</a:t>
+            </a:r>
+          </a:p>
+          <a:p>
+            <a:pPr lvl="2"/>
+            <a:r>
+              <a:rPr lang="en-US"/>
+              <a:t>Third level</a:t>
+            </a:r>
+          </a:p>
+          <a:p>
+            <a:pPr lvl="3"/>
+            <a:r>
+              <a:rPr lang="en-US"/>
+              <a:t>Fourth level</a:t>
+            </a:r>
+          </a:p>
+          <a:p>
+            <a:pPr lvl="4"/>
+            <a:r>
+              <a:rPr lang="en-US"/>
+              <a:t>Fifth level</a:t>
+            </a:r>
+            <a:endParaRPr lang="en-US" dirty="0"/>
+          </a:p>
+        </p:txBody>
+      </p:sp>
+      <p:sp>
+        <p:nvSpPr>
+          <p:cNvPr id="4" name="Date Placeholder 3"/>
+          <p:cNvSpPr>
+            <a:spLocks noGrp="1"/>
+          </p:cNvSpPr>
+          <p:nvPr>
+            <p:ph type="dt" sz="half" idx="2"/>
+          </p:nvPr>
+        </p:nvSpPr>
+        <p:spPr>
+          <a:xfrm>
+            <a:off x="8218426" y="6446838"/>
+            <a:ext cx="2584850" cy="365125"/>
+          </a:xfrm>
+          <a:prstGeom prst="rect">
+            <a:avLst/>
+          </a:prstGeom>
+        </p:spPr>
+        <p:txBody>
+          <a:bodyPr vert="horz" lIns="91440" tIns="45720" rIns="91440" bIns="45720" rtlCol="0" anchor="ctr"/>
+          <a:lstStyle>
+            <a:lvl1pPr algn="r">
+              <a:defRPr sz="900">
+                <a:solidFill>
+                  <a:srgbClr val="FFFFFF"/>
+                </a:solidFill>
+              </a:defRPr>
+            </a:lvl1pPr>
+          </a:lstStyle>
+          <a:p>
+            <a:fld id="{E5E1D892-C2A9-4E2A-B7C0-5932B657ED52}" type="datetime1">
+              <a:rPr lang="en-US" smtClean="0"/>
+              <a:t>11/12/2021</a:t>
+            </a:fld>
+            <a:endParaRPr lang="en-US" dirty="0"/>
+          </a:p>
+        </p:txBody>
+      </p:sp>
+      <p:sp>
+        <p:nvSpPr>
+          <p:cNvPr id="5" name="Footer Placeholder 4"/>
+          <p:cNvSpPr>
+            <a:spLocks noGrp="1"/>
+          </p:cNvSpPr>
+          <p:nvPr>
+            <p:ph type="ftr" sz="quarter" idx="3"/>
+          </p:nvPr>
+        </p:nvSpPr>
+        <p:spPr>
+          <a:xfrm>
+            <a:off x="1097279" y="6446838"/>
+            <a:ext cx="6818262" cy="365125"/>
+          </a:xfrm>
+          <a:prstGeom prst="rect">
+            <a:avLst/>
+          </a:prstGeom>
+        </p:spPr>
+        <p:txBody>
+          <a:bodyPr vert="horz" lIns="91440" tIns="45720" rIns="91440" bIns="45720" rtlCol="0" anchor="ctr"/>
+          <a:lstStyle>
+            <a:lvl1pPr algn="l">
+              <a:defRPr sz="900" cap="all" baseline="0">
+                <a:solidFill>
+                  <a:srgbClr val="FFFFFF"/>
+                </a:solidFill>
+              </a:defRPr>
+            </a:lvl1pPr>
+          </a:lstStyle>
+          <a:p>
+            <a:r>
+              <a:rPr lang="en-US"/>
+              <a:t>Lampros Lountzis</a:t>
+            </a:r>
+            <a:endParaRPr lang="en-US" dirty="0"/>
+          </a:p>
+        </p:txBody>
+      </p:sp>
+      <p:sp>
+        <p:nvSpPr>
+          <p:cNvPr id="6" name="Slide Number Placeholder 5"/>
+          <p:cNvSpPr>
+            <a:spLocks noGrp="1"/>
+          </p:cNvSpPr>
+          <p:nvPr>
+            <p:ph type="sldNum" sz="quarter" idx="4"/>
+          </p:nvPr>
+        </p:nvSpPr>
+        <p:spPr>
+          <a:xfrm>
+            <a:off x="10993582" y="6446838"/>
+            <a:ext cx="780010" cy="365125"/>
+          </a:xfrm>
+          <a:prstGeom prst="rect">
+            <a:avLst/>
+          </a:prstGeom>
+        </p:spPr>
+        <p:txBody>
+          <a:bodyPr vert="horz" lIns="91440" tIns="45720" rIns="91440" bIns="45720" rtlCol="0" anchor="ctr"/>
+          <a:lstStyle>
+            <a:lvl1pPr algn="l">
+              <a:defRPr sz="900">
+                <a:solidFill>
+                  <a:srgbClr val="FFFFFF"/>
+                </a:solidFill>
+              </a:defRPr>
+            </a:lvl1pPr>
+          </a:lstStyle>
+          <a:p>
+            <a:fld id="{3A98EE3D-8CD1-4C3F-BD1C-C98C9596463C}" type="slidenum">
+              <a:rPr lang="en-US" smtClean="0"/>
+              <a:t>‹#›</a:t>
+            </a:fld>
+            <a:endParaRPr lang="en-US" dirty="0"/>
+          </a:p>
+        </p:txBody>
+      </p:sp>
+      <p:cxnSp>
+        <p:nvCxnSpPr>
+          <p:cNvPr id="10" name="Straight Connector 9">
+            <a:extLst>
+              <a:ext uri="{FF2B5EF4-FFF2-40B4-BE49-F238E27FC236}">
+                <a16:creationId xmlns:a16="http://schemas.microsoft.com/office/drawing/2014/main" id="{C5025DAC-8B93-4160-B017-3A274A5828C0}"/>
+              </a:ext>
+            </a:extLst>
+          </p:cNvPr>
+          <p:cNvCxnSpPr/>
+          <p:nvPr/>
+        </p:nvCxnSpPr>
+        <p:spPr>
+          <a:xfrm>
+            <a:off x="1193532" y="1897380"/>
+            <a:ext cx="9966960" cy="0"/>
+          </a:xfrm>
+          <a:prstGeom prst="line">
+            <a:avLst/>
+          </a:prstGeom>
+          <a:ln w="12700">
+            <a:solidFill>
+              <a:schemeClr val="tx1">
+                <a:lumMod val="75000"/>
+                <a:lumOff val="25000"/>
+              </a:schemeClr>
+            </a:solidFill>
+          </a:ln>
+        </p:spPr>
+        <p:style>
+          <a:lnRef idx="1">
+            <a:schemeClr val="accent1"/>
+          </a:lnRef>
+          <a:fillRef idx="0">
+            <a:schemeClr val="accent1"/>
+          </a:fillRef>
+          <a:effectRef idx="0">
+            <a:schemeClr val="accent1"/>
+          </a:effectRef>
+          <a:fontRef idx="minor">
+            <a:schemeClr val="tx1"/>
+          </a:fontRef>
+        </p:style>
+      </p:cxnSp>
+    </p:spTree>
+    <p:extLst>
+      <p:ext uri="{BB962C8B-B14F-4D97-AF65-F5344CB8AC3E}">
+        <p14:creationId xmlns:p14="http://schemas.microsoft.com/office/powerpoint/2010/main" val="2216014749"/>
+      </p:ext>
+    </p:extLst>
+  </p:cSld>
+  <p:clrMap bg1="lt1" tx1="dk1" bg2="lt2" tx2="dk2" accent1="accent1" accent2="accent2" accent3="accent3" accent4="accent4" accent5="accent5" accent6="accent6" hlink="hlink" folHlink="folHlink"/>
+  <p:sldLayoutIdLst>
+    <p:sldLayoutId id="2147483664" r:id="rId1"/>
+  </p:sldLayoutIdLst>
+  <p:hf hdr="0" dt="0"/>
+  <p:txStyles>
+    <p:titleStyle>
+      <a:lvl1pPr algn="l" defTabSz="914400" rtl="0" eaLnBrk="1" latinLnBrk="0" hangingPunct="1">
+        <a:lnSpc>
+          <a:spcPct val="90000"/>
+        </a:lnSpc>
+        <a:spcBef>
+          <a:spcPct val="0"/>
+        </a:spcBef>
+        <a:buNone/>
+        <a:defRPr sz="4600" kern="1200" spc="-50" baseline="0">
+          <a:solidFill>
+            <a:schemeClr val="tx1">
+              <a:lumMod val="75000"/>
+              <a:lumOff val="25000"/>
+            </a:schemeClr>
+          </a:solidFill>
+          <a:latin typeface="+mj-lt"/>
+          <a:ea typeface="+mj-ea"/>
+          <a:cs typeface="+mj-cs"/>
+        </a:defRPr>
+      </a:lvl1pPr>
+    </p:titleStyle>
+    <p:bodyStyle>
+      <a:lvl1pPr marL="91440" indent="-91440" algn="l" defTabSz="914400" rtl="0" eaLnBrk="1" latinLnBrk="0" hangingPunct="1">
+        <a:lnSpc>
+          <a:spcPct val="110000"/>
+        </a:lnSpc>
+        <a:spcBef>
+          <a:spcPts val="1200"/>
+        </a:spcBef>
+        <a:spcAft>
+          <a:spcPts val="200"/>
+        </a:spcAft>
+        <a:buClr>
+          <a:schemeClr val="accent1"/>
+        </a:buClr>
+        <a:buSzPct val="100000"/>
+        <a:buFont typeface="Calibri" panose="020F0502020204030204" pitchFamily="34" charset="0"/>
+        <a:buChar char=" "/>
+        <a:defRPr sz="2000" kern="1200">
+          <a:solidFill>
+            <a:schemeClr val="tx1">
+              <a:lumMod val="75000"/>
+              <a:lumOff val="25000"/>
+            </a:schemeClr>
+          </a:solidFill>
+          <a:latin typeface="+mn-lt"/>
+          <a:ea typeface="+mn-ea"/>
+          <a:cs typeface="+mn-cs"/>
+        </a:defRPr>
+      </a:lvl1pPr>
+      <a:lvl2pPr marL="384048" indent="-182880" algn="l" defTabSz="914400" rtl="0" eaLnBrk="1" latinLnBrk="0" hangingPunct="1">
+        <a:lnSpc>
+          <a:spcPct val="100000"/>
+        </a:lnSpc>
+        <a:spcBef>
+          <a:spcPts val="200"/>
+        </a:spcBef>
+        <a:spcAft>
+          <a:spcPts val="400"/>
+        </a:spcAft>
+        <a:buClrTx/>
+        <a:buFont typeface="Calibri" pitchFamily="34" charset="0"/>
+        <a:buChar char="◦"/>
+        <a:defRPr sz="1800" kern="1200">
+          <a:solidFill>
+            <a:schemeClr val="tx1">
+              <a:lumMod val="75000"/>
+              <a:lumOff val="25000"/>
+            </a:schemeClr>
+          </a:solidFill>
+          <a:latin typeface="+mn-lt"/>
+          <a:ea typeface="+mn-ea"/>
+          <a:cs typeface="+mn-cs"/>
+        </a:defRPr>
+      </a:lvl2pPr>
+      <a:lvl3pPr marL="566928" indent="-182880" algn="l" defTabSz="914400" rtl="0" eaLnBrk="1" latinLnBrk="0" hangingPunct="1">
+        <a:lnSpc>
+          <a:spcPct val="100000"/>
+        </a:lnSpc>
+        <a:spcBef>
+          <a:spcPts val="200"/>
+        </a:spcBef>
+        <a:spcAft>
+          <a:spcPts val="400"/>
+        </a:spcAft>
+        <a:buClrTx/>
+        <a:buFont typeface="Calibri" pitchFamily="34" charset="0"/>
+        <a:buChar char="◦"/>
+        <a:defRPr sz="1400" kern="1200">
+          <a:solidFill>
+            <a:schemeClr val="tx1">
+              <a:lumMod val="75000"/>
+              <a:lumOff val="25000"/>
+            </a:schemeClr>
+          </a:solidFill>
+          <a:latin typeface="+mn-lt"/>
+          <a:ea typeface="+mn-ea"/>
+          <a:cs typeface="+mn-cs"/>
+        </a:defRPr>
+      </a:lvl3pPr>
+      <a:lvl4pPr marL="749808" indent="-182880" algn="l" defTabSz="914400" rtl="0" eaLnBrk="1" latinLnBrk="0" hangingPunct="1">
+        <a:lnSpc>
+          <a:spcPct val="100000"/>
+        </a:lnSpc>
+        <a:spcBef>
+          <a:spcPts val="200"/>
+        </a:spcBef>
+        <a:spcAft>
+          <a:spcPts val="400"/>
+        </a:spcAft>
+        <a:buClrTx/>
+        <a:buFont typeface="Calibri" pitchFamily="34" charset="0"/>
+        <a:buChar char="◦"/>
+        <a:defRPr sz="1400" kern="1200">
+          <a:solidFill>
+            <a:schemeClr val="tx1">
+              <a:lumMod val="75000"/>
+              <a:lumOff val="25000"/>
+            </a:schemeClr>
+          </a:solidFill>
+          <a:latin typeface="+mn-lt"/>
+          <a:ea typeface="+mn-ea"/>
+          <a:cs typeface="+mn-cs"/>
+        </a:defRPr>
+      </a:lvl4pPr>
+      <a:lvl5pPr marL="932688" indent="-182880" algn="l" defTabSz="914400" rtl="0" eaLnBrk="1" latinLnBrk="0" hangingPunct="1">
+        <a:lnSpc>
+          <a:spcPct val="100000"/>
+        </a:lnSpc>
+        <a:spcBef>
+          <a:spcPts val="200"/>
+        </a:spcBef>
+        <a:spcAft>
+          <a:spcPts val="400"/>
+        </a:spcAft>
+        <a:buClrTx/>
+        <a:buFont typeface="Calibri" pitchFamily="34" charset="0"/>
+        <a:buChar char="◦"/>
+        <a:defRPr sz="1400" kern="1200">
+          <a:solidFill>
+            <a:schemeClr val="tx1">
+              <a:lumMod val="75000"/>
+              <a:lumOff val="25000"/>
+            </a:schemeClr>
+          </a:solidFill>
+          <a:latin typeface="+mn-lt"/>
+          <a:ea typeface="+mn-ea"/>
+          <a:cs typeface="+mn-cs"/>
+        </a:defRPr>
+      </a:lvl5pPr>
+      <a:lvl6pPr marL="1100000" indent="-228600" algn="l" defTabSz="914400" rtl="0" eaLnBrk="1" latinLnBrk="0" hangingPunct="1">
+        <a:lnSpc>
+          <a:spcPct val="90000"/>
+        </a:lnSpc>
+        <a:spcBef>
+          <a:spcPts val="200"/>
+        </a:spcBef>
+        <a:spcAft>
+          <a:spcPts val="400"/>
+        </a:spcAft>
+        <a:buClr>
+          <a:schemeClr val="accent1"/>
+        </a:buClr>
+        <a:buFont typeface="Calibri" pitchFamily="34" charset="0"/>
+        <a:buChar char="◦"/>
+        <a:defRPr sz="1400" kern="1200">
+          <a:solidFill>
+            <a:schemeClr val="tx1">
+              <a:lumMod val="75000"/>
+              <a:lumOff val="25000"/>
+            </a:schemeClr>
+          </a:solidFill>
+          <a:latin typeface="+mn-lt"/>
+          <a:ea typeface="+mn-ea"/>
+          <a:cs typeface="+mn-cs"/>
+        </a:defRPr>
+      </a:lvl6pPr>
+      <a:lvl7pPr marL="1300000" indent="-228600" algn="l" defTabSz="914400" rtl="0" eaLnBrk="1" latinLnBrk="0" hangingPunct="1">
+        <a:lnSpc>
+          <a:spcPct val="90000"/>
+        </a:lnSpc>
+        <a:spcBef>
+          <a:spcPts val="200"/>
+        </a:spcBef>
+        <a:spcAft>
+          <a:spcPts val="400"/>
+        </a:spcAft>
+        <a:buClr>
+          <a:schemeClr val="accent1"/>
+        </a:buClr>
+        <a:buFont typeface="Calibri" pitchFamily="34" charset="0"/>
+        <a:buChar char="◦"/>
+        <a:defRPr sz="1400" kern="1200">
+          <a:solidFill>
+            <a:schemeClr val="tx1">
+              <a:lumMod val="75000"/>
+              <a:lumOff val="25000"/>
+            </a:schemeClr>
+          </a:solidFill>
+          <a:latin typeface="+mn-lt"/>
+          <a:ea typeface="+mn-ea"/>
+          <a:cs typeface="+mn-cs"/>
+        </a:defRPr>
+      </a:lvl7pPr>
+      <a:lvl8pPr marL="1500000" indent="-228600" algn="l" defTabSz="914400" rtl="0" eaLnBrk="1" latinLnBrk="0" hangingPunct="1">
+        <a:lnSpc>
+          <a:spcPct val="90000"/>
+        </a:lnSpc>
+        <a:spcBef>
+          <a:spcPts val="200"/>
+        </a:spcBef>
+        <a:spcAft>
+          <a:spcPts val="400"/>
+        </a:spcAft>
+        <a:buClr>
+          <a:schemeClr val="accent1"/>
+        </a:buClr>
+        <a:buFont typeface="Calibri" pitchFamily="34" charset="0"/>
+        <a:buChar char="◦"/>
+        <a:defRPr sz="1400" kern="1200">
+          <a:solidFill>
+            <a:schemeClr val="tx1">
+              <a:lumMod val="75000"/>
+              <a:lumOff val="25000"/>
+            </a:schemeClr>
+          </a:solidFill>
+          <a:latin typeface="+mn-lt"/>
+          <a:ea typeface="+mn-ea"/>
+          <a:cs typeface="+mn-cs"/>
+        </a:defRPr>
+      </a:lvl8pPr>
+      <a:lvl9pPr marL="1700000" indent="-228600" algn="l" defTabSz="914400" rtl="0" eaLnBrk="1" latinLnBrk="0" hangingPunct="1">
+        <a:lnSpc>
+          <a:spcPct val="90000"/>
+        </a:lnSpc>
+        <a:spcBef>
+          <a:spcPts val="200"/>
+        </a:spcBef>
+        <a:spcAft>
+          <a:spcPts val="400"/>
+        </a:spcAft>
+        <a:buClr>
+          <a:schemeClr val="accent1"/>
+        </a:buClr>
+        <a:buFont typeface="Calibri" pitchFamily="34" charset="0"/>
+        <a:buChar char="◦"/>
+        <a:defRPr sz="1400" kern="1200">
+          <a:solidFill>
+            <a:schemeClr val="tx1">
+              <a:lumMod val="75000"/>
+              <a:lumOff val="25000"/>
+            </a:schemeClr>
+          </a:solidFill>
+          <a:latin typeface="+mn-lt"/>
+          <a:ea typeface="+mn-ea"/>
+          <a:cs typeface="+mn-cs"/>
+        </a:defRPr>
+      </a:lvl9pPr>
+    </p:bodyStyle>
+    <p:otherStyle>
+      <a:defPPr>
+        <a:defRPr lang="en-US"/>
+      </a:defPPr>
+      <a:lvl1pPr marL="0" algn="l" defTabSz="914400" rtl="0" eaLnBrk="1" latinLnBrk="0" hangingPunct="1">
+        <a:defRPr sz="1800" kern="1200">
+          <a:solidFill>
+            <a:schemeClr val="tx1"/>
+          </a:solidFill>
+          <a:latin typeface="+mn-lt"/>
+          <a:ea typeface="+mn-ea"/>
+          <a:cs typeface="+mn-cs"/>
+        </a:defRPr>
+      </a:lvl1pPr>
+      <a:lvl2pPr marL="457200" algn="l" defTabSz="914400" rtl="0" eaLnBrk="1" latinLnBrk="0" hangingPunct="1">
+        <a:defRPr sz="1800" kern="1200">
+          <a:solidFill>
+            <a:schemeClr val="tx1"/>
+          </a:solidFill>
+          <a:latin typeface="+mn-lt"/>
+          <a:ea typeface="+mn-ea"/>
+          <a:cs typeface="+mn-cs"/>
+        </a:defRPr>
+      </a:lvl2pPr>
+      <a:lvl3pPr marL="914400" algn="l" defTabSz="914400" rtl="0" eaLnBrk="1" latinLnBrk="0" hangingPunct="1">
+        <a:defRPr sz="1800" kern="1200">
+          <a:solidFill>
+            <a:schemeClr val="tx1"/>
+          </a:solidFill>
+          <a:latin typeface="+mn-lt"/>
+          <a:ea typeface="+mn-ea"/>
+          <a:cs typeface="+mn-cs"/>
+        </a:defRPr>
+      </a:lvl3pPr>
+      <a:lvl4pPr marL="1371600" algn="l" defTabSz="914400" rtl="0" eaLnBrk="1" latinLnBrk="0" hangingPunct="1">
+        <a:defRPr sz="1800" kern="1200">
+          <a:solidFill>
+            <a:schemeClr val="tx1"/>
+          </a:solidFill>
+          <a:latin typeface="+mn-lt"/>
+          <a:ea typeface="+mn-ea"/>
+          <a:cs typeface="+mn-cs"/>
+        </a:defRPr>
+      </a:lvl4pPr>
+      <a:lvl5pPr marL="1828800" algn="l" defTabSz="914400" rtl="0" eaLnBrk="1" latinLnBrk="0" hangingPunct="1">
+        <a:defRPr sz="1800" kern="1200">
+          <a:solidFill>
+            <a:schemeClr val="tx1"/>
+          </a:solidFill>
+          <a:latin typeface="+mn-lt"/>
+          <a:ea typeface="+mn-ea"/>
+          <a:cs typeface="+mn-cs"/>
+        </a:defRPr>
+      </a:lvl5pPr>
+      <a:lvl6pPr marL="2286000" algn="l" defTabSz="914400" rtl="0" eaLnBrk="1" latinLnBrk="0" hangingPunct="1">
+        <a:defRPr sz="1800" kern="1200">
+          <a:solidFill>
+            <a:schemeClr val="tx1"/>
+          </a:solidFill>
+          <a:latin typeface="+mn-lt"/>
+          <a:ea typeface="+mn-ea"/>
+          <a:cs typeface="+mn-cs"/>
+        </a:defRPr>
+      </a:lvl6pPr>
+      <a:lvl7pPr marL="2743200" algn="l" defTabSz="914400" rtl="0" eaLnBrk="1" latinLnBrk="0" hangingPunct="1">
+        <a:defRPr sz="1800" kern="1200">
+          <a:solidFill>
+            <a:schemeClr val="tx1"/>
+          </a:solidFill>
+          <a:latin typeface="+mn-lt"/>
+          <a:ea typeface="+mn-ea"/>
+          <a:cs typeface="+mn-cs"/>
+        </a:defRPr>
+      </a:lvl7pPr>
+      <a:lvl8pPr marL="3200400" algn="l" defTabSz="914400" rtl="0" eaLnBrk="1" latinLnBrk="0" hangingPunct="1">
+        <a:defRPr sz="1800" kern="1200">
+          <a:solidFill>
+            <a:schemeClr val="tx1"/>
+          </a:solidFill>
+          <a:latin typeface="+mn-lt"/>
+          <a:ea typeface="+mn-ea"/>
+          <a:cs typeface="+mn-cs"/>
+        </a:defRPr>
+      </a:lvl8pPr>
+      <a:lvl9pPr marL="3657600" algn="l" defTabSz="914400" rtl="0" eaLnBrk="1" latinLnBrk="0" hangingPunct="1">
+        <a:defRPr sz="1800" kern="1200">
+          <a:solidFill>
+            <a:schemeClr val="tx1"/>
+          </a:solidFill>
+          <a:latin typeface="+mn-lt"/>
+          <a:ea typeface="+mn-ea"/>
+          <a:cs typeface="+mn-cs"/>
+        </a:defRPr>
+      </a:lvl9pPr>
+    </p:otherStyle>
+  </p:txStyles>
+</p:sldMaster>
+</file>
+
 <file path=ppt/slides/slide1.xml><?xml version="1.0" encoding="utf-8"?>
 <p:sld xmlns:a="http://schemas.openxmlformats.org/drawingml/2006/main" xmlns:r="http://schemas.openxmlformats.org/officeDocument/2006/relationships" xmlns:p="http://schemas.openxmlformats.org/presentationml/2006/main">
   <p:cSld>
@@ -6159,7 +7051,7 @@
 </p:sld>
 </file>
 
-<file path=ppt/slides/slide2.xml><?xml version="1.0" encoding="utf-8"?>
+<file path=ppt/slides/slide10.xml><?xml version="1.0" encoding="utf-8"?>
 <p:sld xmlns:a="http://schemas.openxmlformats.org/drawingml/2006/main" xmlns:r="http://schemas.openxmlformats.org/officeDocument/2006/relationships" xmlns:p="http://schemas.openxmlformats.org/presentationml/2006/main">
   <p:cSld>
     <p:bg>
@@ -6274,7 +7166,7 @@
           <a:p>
             <a:r>
               <a:rPr lang="en-US" sz="4400" b="1" dirty="0"/>
-              <a:t>Table of Contents</a:t>
+              <a:t>Elasticsearch search engine</a:t>
             </a:r>
           </a:p>
         </p:txBody>
@@ -6391,6 +7283,914 @@
       </p:sp>
       <p:sp>
         <p:nvSpPr>
+          <p:cNvPr id="3" name="Slide Number Placeholder 2">
+            <a:extLst>
+              <a:ext uri="{FF2B5EF4-FFF2-40B4-BE49-F238E27FC236}">
+                <a16:creationId xmlns:a16="http://schemas.microsoft.com/office/drawing/2014/main" id="{D13223F0-DCB9-40DE-A93C-DFE6DFEB1DD6}"/>
+              </a:ext>
+            </a:extLst>
+          </p:cNvPr>
+          <p:cNvSpPr>
+            <a:spLocks noGrp="1"/>
+          </p:cNvSpPr>
+          <p:nvPr>
+            <p:ph type="sldNum" sz="quarter" idx="12"/>
+          </p:nvPr>
+        </p:nvSpPr>
+        <p:spPr/>
+        <p:txBody>
+          <a:bodyPr/>
+          <a:lstStyle/>
+          <a:p>
+            <a:fld id="{3A98EE3D-8CD1-4C3F-BD1C-C98C9596463C}" type="slidenum">
+              <a:rPr lang="en-US" smtClean="0"/>
+              <a:t>10</a:t>
+            </a:fld>
+            <a:endParaRPr lang="en-US" dirty="0"/>
+          </a:p>
+        </p:txBody>
+      </p:sp>
+      <p:sp>
+        <p:nvSpPr>
+          <p:cNvPr id="12" name="Footer Placeholder 11">
+            <a:extLst>
+              <a:ext uri="{FF2B5EF4-FFF2-40B4-BE49-F238E27FC236}">
+                <a16:creationId xmlns:a16="http://schemas.microsoft.com/office/drawing/2014/main" id="{3B79F701-2D61-49B8-9C82-C92A2BA7225F}"/>
+              </a:ext>
+            </a:extLst>
+          </p:cNvPr>
+          <p:cNvSpPr>
+            <a:spLocks noGrp="1"/>
+          </p:cNvSpPr>
+          <p:nvPr>
+            <p:ph type="ftr" sz="quarter" idx="11"/>
+          </p:nvPr>
+        </p:nvSpPr>
+        <p:spPr/>
+        <p:txBody>
+          <a:bodyPr/>
+          <a:lstStyle/>
+          <a:p>
+            <a:r>
+              <a:rPr lang="en-US"/>
+              <a:t>Lampros Lountzis</a:t>
+            </a:r>
+            <a:endParaRPr lang="en-US" dirty="0"/>
+          </a:p>
+        </p:txBody>
+      </p:sp>
+      <p:sp>
+        <p:nvSpPr>
+          <p:cNvPr id="5" name="Content Placeholder 4">
+            <a:extLst>
+              <a:ext uri="{FF2B5EF4-FFF2-40B4-BE49-F238E27FC236}">
+                <a16:creationId xmlns:a16="http://schemas.microsoft.com/office/drawing/2014/main" id="{F63ADAC2-C7EE-4972-818F-5C0326ACBE1D}"/>
+              </a:ext>
+            </a:extLst>
+          </p:cNvPr>
+          <p:cNvSpPr>
+            <a:spLocks noGrp="1"/>
+          </p:cNvSpPr>
+          <p:nvPr>
+            <p:ph idx="1"/>
+          </p:nvPr>
+        </p:nvSpPr>
+        <p:spPr/>
+        <p:txBody>
+          <a:bodyPr>
+            <a:normAutofit lnSpcReduction="10000"/>
+          </a:bodyPr>
+          <a:lstStyle/>
+          <a:p>
+            <a:pPr lvl="1">
+              <a:buFont typeface="Arial" panose="020B0604020202020204" pitchFamily="34" charset="0"/>
+              <a:buChar char="•"/>
+            </a:pPr>
+            <a:r>
+              <a:rPr lang="en-US" sz="1600" dirty="0"/>
+              <a:t>We have decided to </a:t>
+            </a:r>
+            <a:r>
+              <a:rPr lang="en-US" sz="1600" b="1" dirty="0"/>
+              <a:t>not create any replicas </a:t>
+            </a:r>
+            <a:r>
+              <a:rPr lang="en-US" sz="1600" dirty="0"/>
+              <a:t>for the indexes, since this is a demo application.</a:t>
+            </a:r>
+          </a:p>
+          <a:p>
+            <a:pPr lvl="1">
+              <a:buFont typeface="Arial" panose="020B0604020202020204" pitchFamily="34" charset="0"/>
+              <a:buChar char="•"/>
+            </a:pPr>
+            <a:r>
+              <a:rPr lang="en-US" sz="1600" dirty="0"/>
+              <a:t>Each index is </a:t>
+            </a:r>
+            <a:r>
+              <a:rPr lang="en-US" sz="1600" b="1" dirty="0"/>
+              <a:t>distributed in 30 shards </a:t>
+            </a:r>
+            <a:r>
+              <a:rPr lang="en-US" sz="1600" dirty="0"/>
+              <a:t>(each shard is an instance of a Lucene index, that indexes and handles queries for a subset of the data in an Elasticsearch cluster) so that we can handle the big volume of the CIFAR-10 data.</a:t>
+            </a:r>
+          </a:p>
+          <a:p>
+            <a:pPr lvl="2">
+              <a:buFont typeface="Arial" panose="020B0604020202020204" pitchFamily="34" charset="0"/>
+              <a:buChar char="•"/>
+            </a:pPr>
+            <a:r>
+              <a:rPr lang="en-US" dirty="0"/>
+              <a:t>We gain better performance in indexing and searching operations.</a:t>
+            </a:r>
+          </a:p>
+          <a:p>
+            <a:pPr lvl="1">
+              <a:buFont typeface="Arial" panose="020B0604020202020204" pitchFamily="34" charset="0"/>
+              <a:buChar char="•"/>
+            </a:pPr>
+            <a:r>
+              <a:rPr lang="en-US" sz="1600" dirty="0"/>
+              <a:t>The </a:t>
+            </a:r>
+            <a:r>
+              <a:rPr lang="en-US" sz="1600" b="1" dirty="0"/>
+              <a:t>mapping</a:t>
+            </a:r>
+            <a:r>
+              <a:rPr lang="en-US" sz="1600" dirty="0"/>
+              <a:t> for the image-documents that the indexes can handle, consists of the fields of the documents and queries that we have described before. The only </a:t>
+            </a:r>
+            <a:r>
+              <a:rPr lang="en-US" sz="1600" b="1" dirty="0"/>
+              <a:t>field that can be used for retrieval is “features” </a:t>
+            </a:r>
+            <a:r>
+              <a:rPr lang="en-US" sz="1600" dirty="0"/>
+              <a:t>which is of </a:t>
+            </a:r>
+            <a:r>
+              <a:rPr lang="en-US" sz="1600" b="1" dirty="0"/>
+              <a:t>dense</a:t>
+            </a:r>
+            <a:r>
+              <a:rPr lang="en-US" sz="1600" dirty="0"/>
+              <a:t> </a:t>
+            </a:r>
+            <a:r>
+              <a:rPr lang="en-US" sz="1600" b="1" dirty="0"/>
+              <a:t>vector</a:t>
+            </a:r>
+            <a:r>
+              <a:rPr lang="en-US" sz="1600" dirty="0"/>
+              <a:t> type and the dimensions are dependent on the CV method. </a:t>
+            </a:r>
+            <a:r>
+              <a:rPr lang="en-US" sz="1600" b="1" dirty="0">
+                <a:solidFill>
+                  <a:srgbClr val="FF0000"/>
+                </a:solidFill>
+              </a:rPr>
+              <a:t>However, the size of the dense vector is always smaller than 2048 since this is the maximum size Elasticsearch can handle.</a:t>
+            </a:r>
+          </a:p>
+          <a:p>
+            <a:pPr marL="201168" lvl="1" indent="0">
+              <a:buNone/>
+            </a:pPr>
+            <a:endParaRPr lang="en-US" sz="1600" dirty="0"/>
+          </a:p>
+          <a:p>
+            <a:pPr marL="201168" lvl="1" indent="0">
+              <a:buNone/>
+            </a:pPr>
+            <a:r>
+              <a:rPr lang="en-US" sz="1600" b="1" u="sng" dirty="0"/>
+              <a:t>Evaluation</a:t>
+            </a:r>
+          </a:p>
+          <a:p>
+            <a:pPr lvl="1">
+              <a:buFont typeface="Arial" panose="020B0604020202020204" pitchFamily="34" charset="0"/>
+              <a:buChar char="•"/>
+            </a:pPr>
+            <a:r>
+              <a:rPr lang="en-US" sz="1600" dirty="0"/>
+              <a:t>To evaluate our IR system, we have used the </a:t>
+            </a:r>
+            <a:r>
+              <a:rPr lang="en-US" sz="1600" b="1" dirty="0"/>
+              <a:t>trec_eval </a:t>
+            </a:r>
+            <a:r>
+              <a:rPr lang="en-US" sz="1600" dirty="0"/>
+              <a:t>tool and its metrics.</a:t>
+            </a:r>
+          </a:p>
+          <a:p>
+            <a:pPr lvl="1">
+              <a:buFont typeface="Arial" panose="020B0604020202020204" pitchFamily="34" charset="0"/>
+              <a:buChar char="•"/>
+            </a:pPr>
+            <a:r>
+              <a:rPr lang="en-US" sz="1600" dirty="0"/>
+              <a:t>Specifically, the search engine is evaluated on </a:t>
+            </a:r>
+            <a:r>
+              <a:rPr lang="en-US" sz="1600" b="1" dirty="0"/>
+              <a:t>the top 100 retrieved image documents</a:t>
+            </a:r>
+            <a:r>
+              <a:rPr lang="en-US" sz="1600" dirty="0"/>
+              <a:t>, and we consider the </a:t>
+            </a:r>
+            <a:r>
+              <a:rPr lang="en-US" sz="1600" b="1" dirty="0">
+                <a:solidFill>
+                  <a:schemeClr val="tx1"/>
+                </a:solidFill>
+              </a:rPr>
+              <a:t>mean average precision (MAP)</a:t>
+            </a:r>
+            <a:r>
+              <a:rPr lang="en-US" sz="1600" dirty="0">
+                <a:solidFill>
+                  <a:schemeClr val="tx1"/>
+                </a:solidFill>
+              </a:rPr>
+              <a:t>.</a:t>
+            </a:r>
+            <a:endParaRPr lang="en-US" dirty="0"/>
+          </a:p>
+        </p:txBody>
+      </p:sp>
+    </p:spTree>
+    <p:extLst>
+      <p:ext uri="{BB962C8B-B14F-4D97-AF65-F5344CB8AC3E}">
+        <p14:creationId xmlns:p14="http://schemas.microsoft.com/office/powerpoint/2010/main" val="950119423"/>
+      </p:ext>
+    </p:extLst>
+  </p:cSld>
+  <p:clrMapOvr>
+    <a:masterClrMapping/>
+  </p:clrMapOvr>
+</p:sld>
+</file>
+
+<file path=ppt/slides/slide11.xml><?xml version="1.0" encoding="utf-8"?>
+<p:sld xmlns:a="http://schemas.openxmlformats.org/drawingml/2006/main" xmlns:r="http://schemas.openxmlformats.org/officeDocument/2006/relationships" xmlns:p="http://schemas.openxmlformats.org/presentationml/2006/main">
+  <p:cSld>
+    <p:bg>
+      <p:bgPr>
+        <a:solidFill>
+          <a:schemeClr val="bg1"/>
+        </a:solidFill>
+        <a:effectLst/>
+      </p:bgPr>
+    </p:bg>
+    <p:spTree>
+      <p:nvGrpSpPr>
+        <p:cNvPr id="1" name=""/>
+        <p:cNvGrpSpPr/>
+        <p:nvPr/>
+      </p:nvGrpSpPr>
+      <p:grpSpPr>
+        <a:xfrm>
+          <a:off x="0" y="0"/>
+          <a:ext cx="0" cy="0"/>
+          <a:chOff x="0" y="0"/>
+          <a:chExt cx="0" cy="0"/>
+        </a:xfrm>
+      </p:grpSpPr>
+      <p:sp>
+        <p:nvSpPr>
+          <p:cNvPr id="54" name="Rectangle 53">
+            <a:extLst>
+              <a:ext uri="{FF2B5EF4-FFF2-40B4-BE49-F238E27FC236}">
+                <a16:creationId xmlns:a16="http://schemas.microsoft.com/office/drawing/2014/main" id="{39E3965E-AC41-4711-9D10-E25ABB132D86}"/>
+              </a:ext>
+              <a:ext uri="{C183D7F6-B498-43B3-948B-1728B52AA6E4}">
+                <adec:decorative xmlns:adec="http://schemas.microsoft.com/office/drawing/2017/decorative" val="1"/>
+              </a:ext>
+            </a:extLst>
+          </p:cNvPr>
+          <p:cNvSpPr>
+            <a:spLocks noGrp="1" noRot="1" noChangeAspect="1" noMove="1" noResize="1" noEditPoints="1" noAdjustHandles="1" noChangeArrowheads="1" noChangeShapeType="1" noTextEdit="1"/>
+          </p:cNvSpPr>
+          <p:nvPr>
+            <p:extLst>
+              <p:ext uri="{386F3935-93C4-4BCD-93E2-E3B085C9AB24}">
+                <p16:designElem xmlns:p16="http://schemas.microsoft.com/office/powerpoint/2015/main" val="1"/>
+              </p:ext>
+            </p:extLst>
+          </p:nvPr>
+        </p:nvSpPr>
+        <p:spPr>
+          <a:xfrm>
+            <a:off x="3175" y="6400800"/>
+            <a:ext cx="12188825" cy="457200"/>
+          </a:xfrm>
+          <a:prstGeom prst="rect">
+            <a:avLst/>
+          </a:prstGeom>
+          <a:solidFill>
+            <a:srgbClr val="262626"/>
+          </a:solidFill>
+          <a:ln>
+            <a:noFill/>
+          </a:ln>
+        </p:spPr>
+        <p:style>
+          <a:lnRef idx="2">
+            <a:schemeClr val="accent1">
+              <a:shade val="50000"/>
+            </a:schemeClr>
+          </a:lnRef>
+          <a:fillRef idx="1">
+            <a:schemeClr val="accent1"/>
+          </a:fillRef>
+          <a:effectRef idx="0">
+            <a:schemeClr val="accent1"/>
+          </a:effectRef>
+          <a:fontRef idx="minor">
+            <a:schemeClr val="lt1"/>
+          </a:fontRef>
+        </p:style>
+      </p:sp>
+      <p:cxnSp>
+        <p:nvCxnSpPr>
+          <p:cNvPr id="56" name="Straight Connector 55">
+            <a:extLst>
+              <a:ext uri="{FF2B5EF4-FFF2-40B4-BE49-F238E27FC236}">
+                <a16:creationId xmlns:a16="http://schemas.microsoft.com/office/drawing/2014/main" id="{1F5DC8C3-BA5F-4EED-BB9A-A14272BD82A1}"/>
+              </a:ext>
+              <a:ext uri="{C183D7F6-B498-43B3-948B-1728B52AA6E4}">
+                <adec:decorative xmlns:adec="http://schemas.microsoft.com/office/drawing/2017/decorative" val="1"/>
+              </a:ext>
+            </a:extLst>
+          </p:cNvPr>
+          <p:cNvCxnSpPr>
+            <a:cxnSpLocks noGrp="1" noRot="1" noChangeAspect="1" noMove="1" noResize="1" noEditPoints="1" noAdjustHandles="1" noChangeArrowheads="1" noChangeShapeType="1"/>
+          </p:cNvCxnSpPr>
+          <p:nvPr>
+            <p:extLst>
+              <p:ext uri="{386F3935-93C4-4BCD-93E2-E3B085C9AB24}">
+                <p16:designElem xmlns:p16="http://schemas.microsoft.com/office/powerpoint/2015/main" val="1"/>
+              </p:ext>
+            </p:extLst>
+          </p:nvPr>
+        </p:nvCxnSpPr>
+        <p:spPr>
+          <a:xfrm>
+            <a:off x="1207658" y="4474741"/>
+            <a:ext cx="9875520" cy="0"/>
+          </a:xfrm>
+          <a:prstGeom prst="line">
+            <a:avLst/>
+          </a:prstGeom>
+          <a:ln w="12700">
+            <a:solidFill>
+              <a:schemeClr val="tx1">
+                <a:lumMod val="75000"/>
+                <a:lumOff val="25000"/>
+              </a:schemeClr>
+            </a:solidFill>
+          </a:ln>
+        </p:spPr>
+        <p:style>
+          <a:lnRef idx="1">
+            <a:schemeClr val="accent1"/>
+          </a:lnRef>
+          <a:fillRef idx="0">
+            <a:schemeClr val="accent1"/>
+          </a:fillRef>
+          <a:effectRef idx="0">
+            <a:schemeClr val="accent1"/>
+          </a:effectRef>
+          <a:fontRef idx="minor">
+            <a:schemeClr val="tx1"/>
+          </a:fontRef>
+        </p:style>
+      </p:cxnSp>
+      <p:sp useBgFill="1">
+        <p:nvSpPr>
+          <p:cNvPr id="58" name="Rectangle 57">
+            <a:extLst>
+              <a:ext uri="{FF2B5EF4-FFF2-40B4-BE49-F238E27FC236}">
+                <a16:creationId xmlns:a16="http://schemas.microsoft.com/office/drawing/2014/main" id="{8C6E698C-8155-4B8B-BDC9-B7299772B509}"/>
+              </a:ext>
+              <a:ext uri="{C183D7F6-B498-43B3-948B-1728B52AA6E4}">
+                <adec:decorative xmlns:adec="http://schemas.microsoft.com/office/drawing/2017/decorative" val="1"/>
+              </a:ext>
+            </a:extLst>
+          </p:cNvPr>
+          <p:cNvSpPr>
+            <a:spLocks noGrp="1" noRot="1" noChangeAspect="1" noMove="1" noResize="1" noEditPoints="1" noAdjustHandles="1" noChangeArrowheads="1" noChangeShapeType="1" noTextEdit="1"/>
+          </p:cNvSpPr>
+          <p:nvPr>
+            <p:extLst>
+              <p:ext uri="{386F3935-93C4-4BCD-93E2-E3B085C9AB24}">
+                <p16:designElem xmlns:p16="http://schemas.microsoft.com/office/powerpoint/2015/main" val="1"/>
+              </p:ext>
+            </p:extLst>
+          </p:nvPr>
+        </p:nvSpPr>
+        <p:spPr>
+          <a:xfrm>
+            <a:off x="0" y="0"/>
+            <a:ext cx="12188952" cy="6858000"/>
+          </a:xfrm>
+          <a:prstGeom prst="rect">
+            <a:avLst/>
+          </a:prstGeom>
+          <a:ln>
+            <a:noFill/>
+          </a:ln>
+        </p:spPr>
+        <p:style>
+          <a:lnRef idx="2">
+            <a:schemeClr val="accent1">
+              <a:shade val="50000"/>
+            </a:schemeClr>
+          </a:lnRef>
+          <a:fillRef idx="1">
+            <a:schemeClr val="accent1"/>
+          </a:fillRef>
+          <a:effectRef idx="0">
+            <a:schemeClr val="accent1"/>
+          </a:effectRef>
+          <a:fontRef idx="minor">
+            <a:schemeClr val="lt1"/>
+          </a:fontRef>
+        </p:style>
+        <p:txBody>
+          <a:bodyPr rtlCol="0" anchor="ctr"/>
+          <a:lstStyle/>
+          <a:p>
+            <a:pPr algn="ctr"/>
+            <a:endParaRPr lang="en-US"/>
+          </a:p>
+        </p:txBody>
+      </p:sp>
+      <p:sp>
+        <p:nvSpPr>
+          <p:cNvPr id="2" name="Title 1">
+            <a:extLst>
+              <a:ext uri="{FF2B5EF4-FFF2-40B4-BE49-F238E27FC236}">
+                <a16:creationId xmlns:a16="http://schemas.microsoft.com/office/drawing/2014/main" id="{66A47F5C-50EC-416A-AE8C-6F6BB4225673}"/>
+              </a:ext>
+            </a:extLst>
+          </p:cNvPr>
+          <p:cNvSpPr>
+            <a:spLocks noGrp="1"/>
+          </p:cNvSpPr>
+          <p:nvPr>
+            <p:ph type="title"/>
+          </p:nvPr>
+        </p:nvSpPr>
+        <p:spPr>
+          <a:xfrm>
+            <a:off x="965201" y="772731"/>
+            <a:ext cx="6255026" cy="5054008"/>
+          </a:xfrm>
+        </p:spPr>
+        <p:txBody>
+          <a:bodyPr vert="horz" lIns="91440" tIns="45720" rIns="91440" bIns="45720" rtlCol="0" anchor="ctr">
+            <a:normAutofit/>
+          </a:bodyPr>
+          <a:lstStyle/>
+          <a:p>
+            <a:pPr algn="r"/>
+            <a:r>
+              <a:rPr lang="en-US" sz="6000" dirty="0">
+                <a:solidFill>
+                  <a:schemeClr val="tx1">
+                    <a:lumMod val="85000"/>
+                    <a:lumOff val="15000"/>
+                  </a:schemeClr>
+                </a:solidFill>
+              </a:rPr>
+              <a:t>BAG OF VISUAL WORDS</a:t>
+            </a:r>
+          </a:p>
+        </p:txBody>
+      </p:sp>
+      <p:cxnSp>
+        <p:nvCxnSpPr>
+          <p:cNvPr id="60" name="Straight Connector 59">
+            <a:extLst>
+              <a:ext uri="{FF2B5EF4-FFF2-40B4-BE49-F238E27FC236}">
+                <a16:creationId xmlns:a16="http://schemas.microsoft.com/office/drawing/2014/main" id="{09525C9A-1972-4836-BA7A-706C946EF4DA}"/>
+              </a:ext>
+              <a:ext uri="{C183D7F6-B498-43B3-948B-1728B52AA6E4}">
+                <adec:decorative xmlns:adec="http://schemas.microsoft.com/office/drawing/2017/decorative" val="1"/>
+              </a:ext>
+            </a:extLst>
+          </p:cNvPr>
+          <p:cNvCxnSpPr>
+            <a:cxnSpLocks noGrp="1" noRot="1" noChangeAspect="1" noMove="1" noResize="1" noEditPoints="1" noAdjustHandles="1" noChangeArrowheads="1" noChangeShapeType="1"/>
+          </p:cNvCxnSpPr>
+          <p:nvPr>
+            <p:extLst>
+              <p:ext uri="{386F3935-93C4-4BCD-93E2-E3B085C9AB24}">
+                <p16:designElem xmlns:p16="http://schemas.microsoft.com/office/powerpoint/2015/main" val="1"/>
+              </p:ext>
+            </p:extLst>
+          </p:nvPr>
+        </p:nvCxnSpPr>
+        <p:spPr>
+          <a:xfrm>
+            <a:off x="7534656" y="1520631"/>
+            <a:ext cx="0" cy="3558208"/>
+          </a:xfrm>
+          <a:prstGeom prst="line">
+            <a:avLst/>
+          </a:prstGeom>
+          <a:ln>
+            <a:solidFill>
+              <a:schemeClr val="tx1">
+                <a:lumMod val="75000"/>
+                <a:lumOff val="25000"/>
+              </a:schemeClr>
+            </a:solidFill>
+          </a:ln>
+        </p:spPr>
+        <p:style>
+          <a:lnRef idx="1">
+            <a:schemeClr val="accent1"/>
+          </a:lnRef>
+          <a:fillRef idx="0">
+            <a:schemeClr val="accent1"/>
+          </a:fillRef>
+          <a:effectRef idx="0">
+            <a:schemeClr val="accent1"/>
+          </a:effectRef>
+          <a:fontRef idx="minor">
+            <a:schemeClr val="tx1"/>
+          </a:fontRef>
+        </p:style>
+      </p:cxnSp>
+      <p:sp>
+        <p:nvSpPr>
+          <p:cNvPr id="62" name="Rectangle 61">
+            <a:extLst>
+              <a:ext uri="{FF2B5EF4-FFF2-40B4-BE49-F238E27FC236}">
+                <a16:creationId xmlns:a16="http://schemas.microsoft.com/office/drawing/2014/main" id="{8D60EC1B-554F-47EF-839A-BAAD858F6666}"/>
+              </a:ext>
+              <a:ext uri="{C183D7F6-B498-43B3-948B-1728B52AA6E4}">
+                <adec:decorative xmlns:adec="http://schemas.microsoft.com/office/drawing/2017/decorative" val="1"/>
+              </a:ext>
+            </a:extLst>
+          </p:cNvPr>
+          <p:cNvSpPr>
+            <a:spLocks noGrp="1" noRot="1" noChangeAspect="1" noMove="1" noResize="1" noEditPoints="1" noAdjustHandles="1" noChangeArrowheads="1" noChangeShapeType="1" noTextEdit="1"/>
+          </p:cNvSpPr>
+          <p:nvPr>
+            <p:extLst>
+              <p:ext uri="{386F3935-93C4-4BCD-93E2-E3B085C9AB24}">
+                <p16:designElem xmlns:p16="http://schemas.microsoft.com/office/powerpoint/2015/main" val="1"/>
+              </p:ext>
+            </p:extLst>
+          </p:nvPr>
+        </p:nvSpPr>
+        <p:spPr>
+          <a:xfrm>
+            <a:off x="0" y="6400800"/>
+            <a:ext cx="12192000" cy="457200"/>
+          </a:xfrm>
+          <a:prstGeom prst="rect">
+            <a:avLst/>
+          </a:prstGeom>
+          <a:solidFill>
+            <a:srgbClr val="262626"/>
+          </a:solidFill>
+          <a:ln>
+            <a:noFill/>
+          </a:ln>
+        </p:spPr>
+        <p:style>
+          <a:lnRef idx="2">
+            <a:schemeClr val="accent1">
+              <a:shade val="50000"/>
+            </a:schemeClr>
+          </a:lnRef>
+          <a:fillRef idx="1">
+            <a:schemeClr val="accent1"/>
+          </a:fillRef>
+          <a:effectRef idx="0">
+            <a:schemeClr val="accent1"/>
+          </a:effectRef>
+          <a:fontRef idx="minor">
+            <a:schemeClr val="lt1"/>
+          </a:fontRef>
+        </p:style>
+      </p:sp>
+      <p:sp>
+        <p:nvSpPr>
+          <p:cNvPr id="3" name="Slide Number Placeholder 2">
+            <a:extLst>
+              <a:ext uri="{FF2B5EF4-FFF2-40B4-BE49-F238E27FC236}">
+                <a16:creationId xmlns:a16="http://schemas.microsoft.com/office/drawing/2014/main" id="{D5318DF9-6CD7-4F76-9F67-1A91D459F5FD}"/>
+              </a:ext>
+            </a:extLst>
+          </p:cNvPr>
+          <p:cNvSpPr>
+            <a:spLocks noGrp="1"/>
+          </p:cNvSpPr>
+          <p:nvPr>
+            <p:ph type="sldNum" sz="quarter" idx="12"/>
+          </p:nvPr>
+        </p:nvSpPr>
+        <p:spPr/>
+        <p:txBody>
+          <a:bodyPr/>
+          <a:lstStyle/>
+          <a:p>
+            <a:fld id="{3A98EE3D-8CD1-4C3F-BD1C-C98C9596463C}" type="slidenum">
+              <a:rPr lang="en-US" smtClean="0"/>
+              <a:t>11</a:t>
+            </a:fld>
+            <a:endParaRPr lang="en-US" dirty="0"/>
+          </a:p>
+        </p:txBody>
+      </p:sp>
+      <p:sp>
+        <p:nvSpPr>
+          <p:cNvPr id="4" name="Footer Placeholder 3">
+            <a:extLst>
+              <a:ext uri="{FF2B5EF4-FFF2-40B4-BE49-F238E27FC236}">
+                <a16:creationId xmlns:a16="http://schemas.microsoft.com/office/drawing/2014/main" id="{DDA22EAD-E2F0-45B9-951B-756FF177C4EC}"/>
+              </a:ext>
+            </a:extLst>
+          </p:cNvPr>
+          <p:cNvSpPr>
+            <a:spLocks noGrp="1"/>
+          </p:cNvSpPr>
+          <p:nvPr>
+            <p:ph type="ftr" sz="quarter" idx="11"/>
+          </p:nvPr>
+        </p:nvSpPr>
+        <p:spPr/>
+        <p:txBody>
+          <a:bodyPr/>
+          <a:lstStyle/>
+          <a:p>
+            <a:r>
+              <a:rPr lang="en-US"/>
+              <a:t>Lampros Lountzis</a:t>
+            </a:r>
+            <a:endParaRPr lang="en-US" dirty="0"/>
+          </a:p>
+        </p:txBody>
+      </p:sp>
+    </p:spTree>
+    <p:extLst>
+      <p:ext uri="{BB962C8B-B14F-4D97-AF65-F5344CB8AC3E}">
+        <p14:creationId xmlns:p14="http://schemas.microsoft.com/office/powerpoint/2010/main" val="3587430740"/>
+      </p:ext>
+    </p:extLst>
+  </p:cSld>
+  <p:clrMapOvr>
+    <a:masterClrMapping/>
+  </p:clrMapOvr>
+</p:sld>
+</file>
+
+<file path=ppt/slides/slide2.xml><?xml version="1.0" encoding="utf-8"?>
+<p:sld xmlns:a="http://schemas.openxmlformats.org/drawingml/2006/main" xmlns:r="http://schemas.openxmlformats.org/officeDocument/2006/relationships" xmlns:p="http://schemas.openxmlformats.org/presentationml/2006/main">
+  <p:cSld>
+    <p:bg>
+      <p:bgPr>
+        <a:solidFill>
+          <a:schemeClr val="bg1"/>
+        </a:solidFill>
+        <a:effectLst/>
+      </p:bgPr>
+    </p:bg>
+    <p:spTree>
+      <p:nvGrpSpPr>
+        <p:cNvPr id="1" name=""/>
+        <p:cNvGrpSpPr/>
+        <p:nvPr/>
+      </p:nvGrpSpPr>
+      <p:grpSpPr>
+        <a:xfrm>
+          <a:off x="0" y="0"/>
+          <a:ext cx="0" cy="0"/>
+          <a:chOff x="0" y="0"/>
+          <a:chExt cx="0" cy="0"/>
+        </a:xfrm>
+      </p:grpSpPr>
+      <p:sp useBgFill="1">
+        <p:nvSpPr>
+          <p:cNvPr id="20" name="Rectangle 19">
+            <a:extLst>
+              <a:ext uri="{FF2B5EF4-FFF2-40B4-BE49-F238E27FC236}">
+                <a16:creationId xmlns:a16="http://schemas.microsoft.com/office/drawing/2014/main" id="{13BCCAE5-A35B-4B66-A4A7-E23C34A403A4}"/>
+              </a:ext>
+              <a:ext uri="{C183D7F6-B498-43B3-948B-1728B52AA6E4}">
+                <adec:decorative xmlns:adec="http://schemas.microsoft.com/office/drawing/2017/decorative" val="1"/>
+              </a:ext>
+            </a:extLst>
+          </p:cNvPr>
+          <p:cNvSpPr>
+            <a:spLocks noGrp="1" noRot="1" noChangeAspect="1" noMove="1" noResize="1" noEditPoints="1" noAdjustHandles="1" noChangeArrowheads="1" noChangeShapeType="1" noTextEdit="1"/>
+          </p:cNvSpPr>
+          <p:nvPr>
+            <p:extLst>
+              <p:ext uri="{386F3935-93C4-4BCD-93E2-E3B085C9AB24}">
+                <p16:designElem xmlns:p16="http://schemas.microsoft.com/office/powerpoint/2015/main" val="1"/>
+              </p:ext>
+            </p:extLst>
+          </p:nvPr>
+        </p:nvSpPr>
+        <p:spPr>
+          <a:xfrm>
+            <a:off x="0" y="0"/>
+            <a:ext cx="12192000" cy="6858000"/>
+          </a:xfrm>
+          <a:prstGeom prst="rect">
+            <a:avLst/>
+          </a:prstGeom>
+          <a:ln>
+            <a:noFill/>
+          </a:ln>
+        </p:spPr>
+        <p:style>
+          <a:lnRef idx="2">
+            <a:schemeClr val="accent1">
+              <a:shade val="50000"/>
+            </a:schemeClr>
+          </a:lnRef>
+          <a:fillRef idx="1">
+            <a:schemeClr val="accent1"/>
+          </a:fillRef>
+          <a:effectRef idx="0">
+            <a:schemeClr val="accent1"/>
+          </a:effectRef>
+          <a:fontRef idx="minor">
+            <a:schemeClr val="lt1"/>
+          </a:fontRef>
+        </p:style>
+        <p:txBody>
+          <a:bodyPr rtlCol="0" anchor="ctr"/>
+          <a:lstStyle/>
+          <a:p>
+            <a:pPr algn="ctr"/>
+            <a:endParaRPr lang="en-US"/>
+          </a:p>
+        </p:txBody>
+      </p:sp>
+      <p:sp>
+        <p:nvSpPr>
+          <p:cNvPr id="2" name="Title 1">
+            <a:extLst>
+              <a:ext uri="{FF2B5EF4-FFF2-40B4-BE49-F238E27FC236}">
+                <a16:creationId xmlns:a16="http://schemas.microsoft.com/office/drawing/2014/main" id="{66A47F5C-50EC-416A-AE8C-6F6BB4225673}"/>
+              </a:ext>
+            </a:extLst>
+          </p:cNvPr>
+          <p:cNvSpPr>
+            <a:spLocks noGrp="1"/>
+          </p:cNvSpPr>
+          <p:nvPr>
+            <p:ph type="title"/>
+          </p:nvPr>
+        </p:nvSpPr>
+        <p:spPr>
+          <a:xfrm>
+            <a:off x="1097280" y="286603"/>
+            <a:ext cx="10058400" cy="1450757"/>
+          </a:xfrm>
+        </p:spPr>
+        <p:txBody>
+          <a:bodyPr>
+            <a:normAutofit/>
+          </a:bodyPr>
+          <a:lstStyle/>
+          <a:p>
+            <a:r>
+              <a:rPr lang="en-US" sz="4400" b="1" dirty="0"/>
+              <a:t>Table of Contents</a:t>
+            </a:r>
+          </a:p>
+        </p:txBody>
+      </p:sp>
+      <p:cxnSp>
+        <p:nvCxnSpPr>
+          <p:cNvPr id="22" name="Straight Connector 21">
+            <a:extLst>
+              <a:ext uri="{FF2B5EF4-FFF2-40B4-BE49-F238E27FC236}">
+                <a16:creationId xmlns:a16="http://schemas.microsoft.com/office/drawing/2014/main" id="{6987BDFB-DE64-4B56-B44F-45FAE19FA94E}"/>
+              </a:ext>
+              <a:ext uri="{C183D7F6-B498-43B3-948B-1728B52AA6E4}">
+                <adec:decorative xmlns:adec="http://schemas.microsoft.com/office/drawing/2017/decorative" val="1"/>
+              </a:ext>
+            </a:extLst>
+          </p:cNvPr>
+          <p:cNvCxnSpPr>
+            <a:cxnSpLocks noGrp="1" noRot="1" noChangeAspect="1" noMove="1" noResize="1" noEditPoints="1" noAdjustHandles="1" noChangeArrowheads="1" noChangeShapeType="1"/>
+          </p:cNvCxnSpPr>
+          <p:nvPr>
+            <p:extLst>
+              <p:ext uri="{386F3935-93C4-4BCD-93E2-E3B085C9AB24}">
+                <p16:designElem xmlns:p16="http://schemas.microsoft.com/office/powerpoint/2015/main" val="1"/>
+              </p:ext>
+            </p:extLst>
+          </p:nvPr>
+        </p:nvCxnSpPr>
+        <p:spPr>
+          <a:xfrm>
+            <a:off x="1193532" y="1895846"/>
+            <a:ext cx="9966960" cy="0"/>
+          </a:xfrm>
+          <a:prstGeom prst="line">
+            <a:avLst/>
+          </a:prstGeom>
+          <a:ln w="12700">
+            <a:solidFill>
+              <a:schemeClr val="tx1">
+                <a:lumMod val="75000"/>
+                <a:lumOff val="25000"/>
+              </a:schemeClr>
+            </a:solidFill>
+          </a:ln>
+        </p:spPr>
+        <p:style>
+          <a:lnRef idx="1">
+            <a:schemeClr val="accent1"/>
+          </a:lnRef>
+          <a:fillRef idx="0">
+            <a:schemeClr val="accent1"/>
+          </a:fillRef>
+          <a:effectRef idx="0">
+            <a:schemeClr val="accent1"/>
+          </a:effectRef>
+          <a:fontRef idx="minor">
+            <a:schemeClr val="tx1"/>
+          </a:fontRef>
+        </p:style>
+      </p:cxnSp>
+      <p:sp>
+        <p:nvSpPr>
+          <p:cNvPr id="24" name="Rectangle 23">
+            <a:extLst>
+              <a:ext uri="{FF2B5EF4-FFF2-40B4-BE49-F238E27FC236}">
+                <a16:creationId xmlns:a16="http://schemas.microsoft.com/office/drawing/2014/main" id="{CB06839E-D8C3-4A74-BA2B-3B97E7B2CDB5}"/>
+              </a:ext>
+              <a:ext uri="{C183D7F6-B498-43B3-948B-1728B52AA6E4}">
+                <adec:decorative xmlns:adec="http://schemas.microsoft.com/office/drawing/2017/decorative" val="1"/>
+              </a:ext>
+            </a:extLst>
+          </p:cNvPr>
+          <p:cNvSpPr>
+            <a:spLocks noGrp="1" noRot="1" noChangeAspect="1" noMove="1" noResize="1" noEditPoints="1" noAdjustHandles="1" noChangeArrowheads="1" noChangeShapeType="1" noTextEdit="1"/>
+          </p:cNvSpPr>
+          <p:nvPr>
+            <p:extLst>
+              <p:ext uri="{386F3935-93C4-4BCD-93E2-E3B085C9AB24}">
+                <p16:designElem xmlns:p16="http://schemas.microsoft.com/office/powerpoint/2015/main" val="1"/>
+              </p:ext>
+            </p:extLst>
+          </p:nvPr>
+        </p:nvSpPr>
+        <p:spPr>
+          <a:xfrm>
+            <a:off x="0" y="6400800"/>
+            <a:ext cx="12192000" cy="457200"/>
+          </a:xfrm>
+          <a:prstGeom prst="rect">
+            <a:avLst/>
+          </a:prstGeom>
+          <a:solidFill>
+            <a:srgbClr val="262626"/>
+          </a:solidFill>
+          <a:ln>
+            <a:noFill/>
+          </a:ln>
+        </p:spPr>
+        <p:style>
+          <a:lnRef idx="2">
+            <a:schemeClr val="accent1">
+              <a:shade val="50000"/>
+            </a:schemeClr>
+          </a:lnRef>
+          <a:fillRef idx="1">
+            <a:schemeClr val="accent1"/>
+          </a:fillRef>
+          <a:effectRef idx="0">
+            <a:schemeClr val="accent1"/>
+          </a:effectRef>
+          <a:fontRef idx="minor">
+            <a:schemeClr val="lt1"/>
+          </a:fontRef>
+        </p:style>
+      </p:sp>
+      <p:sp>
+        <p:nvSpPr>
           <p:cNvPr id="6" name="Content Placeholder 5">
             <a:extLst>
               <a:ext uri="{FF2B5EF4-FFF2-40B4-BE49-F238E27FC236}">
@@ -6465,6 +8265,70 @@
                 </a:solidFill>
               </a:rPr>
               <a:t>SEARCH ENGINE</a:t>
+            </a:r>
+          </a:p>
+          <a:p>
+            <a:pPr marL="726948" lvl="2" indent="-342900">
+              <a:buFont typeface="+mj-lt"/>
+              <a:buAutoNum type="arabicPeriod"/>
+            </a:pPr>
+            <a:r>
+              <a:rPr lang="en-US" sz="1600" dirty="0">
+                <a:solidFill>
+                  <a:schemeClr val="tx1"/>
+                </a:solidFill>
+              </a:rPr>
+              <a:t>IR system architecture</a:t>
+            </a:r>
+          </a:p>
+          <a:p>
+            <a:pPr marL="726948" lvl="2" indent="-342900">
+              <a:buFont typeface="+mj-lt"/>
+              <a:buAutoNum type="arabicPeriod"/>
+            </a:pPr>
+            <a:r>
+              <a:rPr lang="en-US" sz="1600" dirty="0">
+                <a:solidFill>
+                  <a:schemeClr val="tx1"/>
+                </a:solidFill>
+              </a:rPr>
+              <a:t>CIFAR-10 data</a:t>
+            </a:r>
+          </a:p>
+          <a:p>
+            <a:pPr marL="726948" lvl="2" indent="-342900">
+              <a:buFont typeface="+mj-lt"/>
+              <a:buAutoNum type="arabicPeriod"/>
+            </a:pPr>
+            <a:r>
+              <a:rPr lang="en-US" sz="1600" dirty="0">
+                <a:solidFill>
+                  <a:schemeClr val="tx1"/>
+                </a:solidFill>
+              </a:rPr>
+              <a:t>Elasticsearch search engine</a:t>
+            </a:r>
+          </a:p>
+          <a:p>
+            <a:pPr marL="544068" lvl="1" indent="-342900">
+              <a:buFont typeface="+mj-lt"/>
+              <a:buAutoNum type="arabicPeriod"/>
+            </a:pPr>
+            <a:r>
+              <a:rPr lang="en-US" sz="1600" b="1">
+                <a:solidFill>
+                  <a:schemeClr val="tx1"/>
+                </a:solidFill>
+              </a:rPr>
+              <a:t>Bag </a:t>
+            </a:r>
+            <a:r>
+              <a:rPr lang="en-US" sz="1600" b="1" dirty="0">
+                <a:solidFill>
+                  <a:schemeClr val="tx1"/>
+                </a:solidFill>
+              </a:rPr>
+              <a:t>of Visual Words</a:t>
             </a:r>
           </a:p>
         </p:txBody>
@@ -9554,6 +11418,1351 @@
     <p:extLst>
       <p:ext uri="{BB962C8B-B14F-4D97-AF65-F5344CB8AC3E}">
         <p14:creationId xmlns:p14="http://schemas.microsoft.com/office/powerpoint/2010/main" val="4282751464"/>
+      </p:ext>
+    </p:extLst>
+  </p:cSld>
+  <p:clrMapOvr>
+    <a:masterClrMapping/>
+  </p:clrMapOvr>
+</p:sld>
+</file>
+
+<file path=ppt/slides/slide7.xml><?xml version="1.0" encoding="utf-8"?>
+<p:sld xmlns:a="http://schemas.openxmlformats.org/drawingml/2006/main" xmlns:r="http://schemas.openxmlformats.org/officeDocument/2006/relationships" xmlns:p="http://schemas.openxmlformats.org/presentationml/2006/main">
+  <p:cSld>
+    <p:bg>
+      <p:bgPr>
+        <a:solidFill>
+          <a:schemeClr val="bg1"/>
+        </a:solidFill>
+        <a:effectLst/>
+      </p:bgPr>
+    </p:bg>
+    <p:spTree>
+      <p:nvGrpSpPr>
+        <p:cNvPr id="1" name=""/>
+        <p:cNvGrpSpPr/>
+        <p:nvPr/>
+      </p:nvGrpSpPr>
+      <p:grpSpPr>
+        <a:xfrm>
+          <a:off x="0" y="0"/>
+          <a:ext cx="0" cy="0"/>
+          <a:chOff x="0" y="0"/>
+          <a:chExt cx="0" cy="0"/>
+        </a:xfrm>
+      </p:grpSpPr>
+      <p:sp useBgFill="1">
+        <p:nvSpPr>
+          <p:cNvPr id="20" name="Rectangle 19">
+            <a:extLst>
+              <a:ext uri="{FF2B5EF4-FFF2-40B4-BE49-F238E27FC236}">
+                <a16:creationId xmlns:a16="http://schemas.microsoft.com/office/drawing/2014/main" id="{13BCCAE5-A35B-4B66-A4A7-E23C34A403A4}"/>
+              </a:ext>
+              <a:ext uri="{C183D7F6-B498-43B3-948B-1728B52AA6E4}">
+                <adec:decorative xmlns:adec="http://schemas.microsoft.com/office/drawing/2017/decorative" val="1"/>
+              </a:ext>
+            </a:extLst>
+          </p:cNvPr>
+          <p:cNvSpPr>
+            <a:spLocks noGrp="1" noRot="1" noChangeAspect="1" noMove="1" noResize="1" noEditPoints="1" noAdjustHandles="1" noChangeArrowheads="1" noChangeShapeType="1" noTextEdit="1"/>
+          </p:cNvSpPr>
+          <p:nvPr>
+            <p:extLst>
+              <p:ext uri="{386F3935-93C4-4BCD-93E2-E3B085C9AB24}">
+                <p16:designElem xmlns:p16="http://schemas.microsoft.com/office/powerpoint/2015/main" val="1"/>
+              </p:ext>
+            </p:extLst>
+          </p:nvPr>
+        </p:nvSpPr>
+        <p:spPr>
+          <a:xfrm>
+            <a:off x="0" y="0"/>
+            <a:ext cx="12192000" cy="6858000"/>
+          </a:xfrm>
+          <a:prstGeom prst="rect">
+            <a:avLst/>
+          </a:prstGeom>
+          <a:ln>
+            <a:noFill/>
+          </a:ln>
+        </p:spPr>
+        <p:style>
+          <a:lnRef idx="2">
+            <a:schemeClr val="accent1">
+              <a:shade val="50000"/>
+            </a:schemeClr>
+          </a:lnRef>
+          <a:fillRef idx="1">
+            <a:schemeClr val="accent1"/>
+          </a:fillRef>
+          <a:effectRef idx="0">
+            <a:schemeClr val="accent1"/>
+          </a:effectRef>
+          <a:fontRef idx="minor">
+            <a:schemeClr val="lt1"/>
+          </a:fontRef>
+        </p:style>
+        <p:txBody>
+          <a:bodyPr rtlCol="0" anchor="ctr"/>
+          <a:lstStyle/>
+          <a:p>
+            <a:pPr algn="ctr"/>
+            <a:endParaRPr lang="en-US"/>
+          </a:p>
+        </p:txBody>
+      </p:sp>
+      <p:sp>
+        <p:nvSpPr>
+          <p:cNvPr id="2" name="Title 1">
+            <a:extLst>
+              <a:ext uri="{FF2B5EF4-FFF2-40B4-BE49-F238E27FC236}">
+                <a16:creationId xmlns:a16="http://schemas.microsoft.com/office/drawing/2014/main" id="{66A47F5C-50EC-416A-AE8C-6F6BB4225673}"/>
+              </a:ext>
+            </a:extLst>
+          </p:cNvPr>
+          <p:cNvSpPr>
+            <a:spLocks noGrp="1"/>
+          </p:cNvSpPr>
+          <p:nvPr>
+            <p:ph type="title"/>
+          </p:nvPr>
+        </p:nvSpPr>
+        <p:spPr>
+          <a:xfrm>
+            <a:off x="1097280" y="286603"/>
+            <a:ext cx="10058400" cy="1450757"/>
+          </a:xfrm>
+        </p:spPr>
+        <p:txBody>
+          <a:bodyPr>
+            <a:normAutofit/>
+          </a:bodyPr>
+          <a:lstStyle/>
+          <a:p>
+            <a:r>
+              <a:rPr lang="en-US" sz="4400" b="1" dirty="0"/>
+              <a:t>IR system architecture</a:t>
+            </a:r>
+          </a:p>
+        </p:txBody>
+      </p:sp>
+      <p:cxnSp>
+        <p:nvCxnSpPr>
+          <p:cNvPr id="22" name="Straight Connector 21">
+            <a:extLst>
+              <a:ext uri="{FF2B5EF4-FFF2-40B4-BE49-F238E27FC236}">
+                <a16:creationId xmlns:a16="http://schemas.microsoft.com/office/drawing/2014/main" id="{6987BDFB-DE64-4B56-B44F-45FAE19FA94E}"/>
+              </a:ext>
+              <a:ext uri="{C183D7F6-B498-43B3-948B-1728B52AA6E4}">
+                <adec:decorative xmlns:adec="http://schemas.microsoft.com/office/drawing/2017/decorative" val="1"/>
+              </a:ext>
+            </a:extLst>
+          </p:cNvPr>
+          <p:cNvCxnSpPr>
+            <a:cxnSpLocks noGrp="1" noRot="1" noChangeAspect="1" noMove="1" noResize="1" noEditPoints="1" noAdjustHandles="1" noChangeArrowheads="1" noChangeShapeType="1"/>
+          </p:cNvCxnSpPr>
+          <p:nvPr>
+            <p:extLst>
+              <p:ext uri="{386F3935-93C4-4BCD-93E2-E3B085C9AB24}">
+                <p16:designElem xmlns:p16="http://schemas.microsoft.com/office/powerpoint/2015/main" val="1"/>
+              </p:ext>
+            </p:extLst>
+          </p:nvPr>
+        </p:nvCxnSpPr>
+        <p:spPr>
+          <a:xfrm>
+            <a:off x="1193532" y="1895846"/>
+            <a:ext cx="9966960" cy="0"/>
+          </a:xfrm>
+          <a:prstGeom prst="line">
+            <a:avLst/>
+          </a:prstGeom>
+          <a:ln w="12700">
+            <a:solidFill>
+              <a:schemeClr val="tx1">
+                <a:lumMod val="75000"/>
+                <a:lumOff val="25000"/>
+              </a:schemeClr>
+            </a:solidFill>
+          </a:ln>
+        </p:spPr>
+        <p:style>
+          <a:lnRef idx="1">
+            <a:schemeClr val="accent1"/>
+          </a:lnRef>
+          <a:fillRef idx="0">
+            <a:schemeClr val="accent1"/>
+          </a:fillRef>
+          <a:effectRef idx="0">
+            <a:schemeClr val="accent1"/>
+          </a:effectRef>
+          <a:fontRef idx="minor">
+            <a:schemeClr val="tx1"/>
+          </a:fontRef>
+        </p:style>
+      </p:cxnSp>
+      <p:sp>
+        <p:nvSpPr>
+          <p:cNvPr id="24" name="Rectangle 23">
+            <a:extLst>
+              <a:ext uri="{FF2B5EF4-FFF2-40B4-BE49-F238E27FC236}">
+                <a16:creationId xmlns:a16="http://schemas.microsoft.com/office/drawing/2014/main" id="{CB06839E-D8C3-4A74-BA2B-3B97E7B2CDB5}"/>
+              </a:ext>
+              <a:ext uri="{C183D7F6-B498-43B3-948B-1728B52AA6E4}">
+                <adec:decorative xmlns:adec="http://schemas.microsoft.com/office/drawing/2017/decorative" val="1"/>
+              </a:ext>
+            </a:extLst>
+          </p:cNvPr>
+          <p:cNvSpPr>
+            <a:spLocks noGrp="1" noRot="1" noChangeAspect="1" noMove="1" noResize="1" noEditPoints="1" noAdjustHandles="1" noChangeArrowheads="1" noChangeShapeType="1" noTextEdit="1"/>
+          </p:cNvSpPr>
+          <p:nvPr>
+            <p:extLst>
+              <p:ext uri="{386F3935-93C4-4BCD-93E2-E3B085C9AB24}">
+                <p16:designElem xmlns:p16="http://schemas.microsoft.com/office/powerpoint/2015/main" val="1"/>
+              </p:ext>
+            </p:extLst>
+          </p:nvPr>
+        </p:nvSpPr>
+        <p:spPr>
+          <a:xfrm>
+            <a:off x="0" y="6400800"/>
+            <a:ext cx="12192000" cy="457200"/>
+          </a:xfrm>
+          <a:prstGeom prst="rect">
+            <a:avLst/>
+          </a:prstGeom>
+          <a:solidFill>
+            <a:srgbClr val="262626"/>
+          </a:solidFill>
+          <a:ln>
+            <a:noFill/>
+          </a:ln>
+        </p:spPr>
+        <p:style>
+          <a:lnRef idx="2">
+            <a:schemeClr val="accent1">
+              <a:shade val="50000"/>
+            </a:schemeClr>
+          </a:lnRef>
+          <a:fillRef idx="1">
+            <a:schemeClr val="accent1"/>
+          </a:fillRef>
+          <a:effectRef idx="0">
+            <a:schemeClr val="accent1"/>
+          </a:effectRef>
+          <a:fontRef idx="minor">
+            <a:schemeClr val="lt1"/>
+          </a:fontRef>
+        </p:style>
+      </p:sp>
+      <p:sp>
+        <p:nvSpPr>
+          <p:cNvPr id="3" name="Slide Number Placeholder 2">
+            <a:extLst>
+              <a:ext uri="{FF2B5EF4-FFF2-40B4-BE49-F238E27FC236}">
+                <a16:creationId xmlns:a16="http://schemas.microsoft.com/office/drawing/2014/main" id="{D13223F0-DCB9-40DE-A93C-DFE6DFEB1DD6}"/>
+              </a:ext>
+            </a:extLst>
+          </p:cNvPr>
+          <p:cNvSpPr>
+            <a:spLocks noGrp="1"/>
+          </p:cNvSpPr>
+          <p:nvPr>
+            <p:ph type="sldNum" sz="quarter" idx="12"/>
+          </p:nvPr>
+        </p:nvSpPr>
+        <p:spPr/>
+        <p:txBody>
+          <a:bodyPr/>
+          <a:lstStyle/>
+          <a:p>
+            <a:fld id="{3A98EE3D-8CD1-4C3F-BD1C-C98C9596463C}" type="slidenum">
+              <a:rPr lang="en-US" smtClean="0"/>
+              <a:t>7</a:t>
+            </a:fld>
+            <a:endParaRPr lang="en-US" dirty="0"/>
+          </a:p>
+        </p:txBody>
+      </p:sp>
+      <p:sp>
+        <p:nvSpPr>
+          <p:cNvPr id="12" name="Footer Placeholder 11">
+            <a:extLst>
+              <a:ext uri="{FF2B5EF4-FFF2-40B4-BE49-F238E27FC236}">
+                <a16:creationId xmlns:a16="http://schemas.microsoft.com/office/drawing/2014/main" id="{3B79F701-2D61-49B8-9C82-C92A2BA7225F}"/>
+              </a:ext>
+            </a:extLst>
+          </p:cNvPr>
+          <p:cNvSpPr>
+            <a:spLocks noGrp="1"/>
+          </p:cNvSpPr>
+          <p:nvPr>
+            <p:ph type="ftr" sz="quarter" idx="11"/>
+          </p:nvPr>
+        </p:nvSpPr>
+        <p:spPr/>
+        <p:txBody>
+          <a:bodyPr/>
+          <a:lstStyle/>
+          <a:p>
+            <a:r>
+              <a:rPr lang="en-US"/>
+              <a:t>Lampros Lountzis</a:t>
+            </a:r>
+            <a:endParaRPr lang="en-US" dirty="0"/>
+          </a:p>
+        </p:txBody>
+      </p:sp>
+      <p:pic>
+        <p:nvPicPr>
+          <p:cNvPr id="7" name="Content Placeholder 6" descr="Diagram&#10;&#10;Description automatically generated">
+            <a:extLst>
+              <a:ext uri="{FF2B5EF4-FFF2-40B4-BE49-F238E27FC236}">
+                <a16:creationId xmlns:a16="http://schemas.microsoft.com/office/drawing/2014/main" id="{58F941B5-2A9D-464F-9AC7-AE41AEDE611D}"/>
+              </a:ext>
+            </a:extLst>
+          </p:cNvPr>
+          <p:cNvPicPr>
+            <a:picLocks noGrp="1" noChangeAspect="1"/>
+          </p:cNvPicPr>
+          <p:nvPr>
+            <p:ph idx="1"/>
+          </p:nvPr>
+        </p:nvPicPr>
+        <p:blipFill>
+          <a:blip r:embed="rId3">
+            <a:extLst>
+              <a:ext uri="{28A0092B-C50C-407E-A947-70E740481C1C}">
+                <a14:useLocalDpi xmlns:a14="http://schemas.microsoft.com/office/drawing/2010/main" val="0"/>
+              </a:ext>
+            </a:extLst>
+          </a:blip>
+          <a:stretch>
+            <a:fillRect/>
+          </a:stretch>
+        </p:blipFill>
+        <p:spPr>
+          <a:xfrm>
+            <a:off x="1624868" y="2411476"/>
+            <a:ext cx="9248775" cy="3438525"/>
+          </a:xfrm>
+        </p:spPr>
+      </p:pic>
+    </p:spTree>
+    <p:extLst>
+      <p:ext uri="{BB962C8B-B14F-4D97-AF65-F5344CB8AC3E}">
+        <p14:creationId xmlns:p14="http://schemas.microsoft.com/office/powerpoint/2010/main" val="3651155315"/>
+      </p:ext>
+    </p:extLst>
+  </p:cSld>
+  <p:clrMapOvr>
+    <a:masterClrMapping/>
+  </p:clrMapOvr>
+</p:sld>
+</file>
+
+<file path=ppt/slides/slide8.xml><?xml version="1.0" encoding="utf-8"?>
+<p:sld xmlns:a="http://schemas.openxmlformats.org/drawingml/2006/main" xmlns:r="http://schemas.openxmlformats.org/officeDocument/2006/relationships" xmlns:p="http://schemas.openxmlformats.org/presentationml/2006/main">
+  <p:cSld>
+    <p:bg>
+      <p:bgPr>
+        <a:solidFill>
+          <a:schemeClr val="bg1"/>
+        </a:solidFill>
+        <a:effectLst/>
+      </p:bgPr>
+    </p:bg>
+    <p:spTree>
+      <p:nvGrpSpPr>
+        <p:cNvPr id="1" name=""/>
+        <p:cNvGrpSpPr/>
+        <p:nvPr/>
+      </p:nvGrpSpPr>
+      <p:grpSpPr>
+        <a:xfrm>
+          <a:off x="0" y="0"/>
+          <a:ext cx="0" cy="0"/>
+          <a:chOff x="0" y="0"/>
+          <a:chExt cx="0" cy="0"/>
+        </a:xfrm>
+      </p:grpSpPr>
+      <p:sp useBgFill="1">
+        <p:nvSpPr>
+          <p:cNvPr id="20" name="Rectangle 19">
+            <a:extLst>
+              <a:ext uri="{FF2B5EF4-FFF2-40B4-BE49-F238E27FC236}">
+                <a16:creationId xmlns:a16="http://schemas.microsoft.com/office/drawing/2014/main" id="{13BCCAE5-A35B-4B66-A4A7-E23C34A403A4}"/>
+              </a:ext>
+              <a:ext uri="{C183D7F6-B498-43B3-948B-1728B52AA6E4}">
+                <adec:decorative xmlns:adec="http://schemas.microsoft.com/office/drawing/2017/decorative" val="1"/>
+              </a:ext>
+            </a:extLst>
+          </p:cNvPr>
+          <p:cNvSpPr>
+            <a:spLocks noGrp="1" noRot="1" noChangeAspect="1" noMove="1" noResize="1" noEditPoints="1" noAdjustHandles="1" noChangeArrowheads="1" noChangeShapeType="1" noTextEdit="1"/>
+          </p:cNvSpPr>
+          <p:nvPr>
+            <p:extLst>
+              <p:ext uri="{386F3935-93C4-4BCD-93E2-E3B085C9AB24}">
+                <p16:designElem xmlns:p16="http://schemas.microsoft.com/office/powerpoint/2015/main" val="1"/>
+              </p:ext>
+            </p:extLst>
+          </p:nvPr>
+        </p:nvSpPr>
+        <p:spPr>
+          <a:xfrm>
+            <a:off x="0" y="0"/>
+            <a:ext cx="12192000" cy="6858000"/>
+          </a:xfrm>
+          <a:prstGeom prst="rect">
+            <a:avLst/>
+          </a:prstGeom>
+          <a:ln>
+            <a:noFill/>
+          </a:ln>
+        </p:spPr>
+        <p:style>
+          <a:lnRef idx="2">
+            <a:schemeClr val="accent1">
+              <a:shade val="50000"/>
+            </a:schemeClr>
+          </a:lnRef>
+          <a:fillRef idx="1">
+            <a:schemeClr val="accent1"/>
+          </a:fillRef>
+          <a:effectRef idx="0">
+            <a:schemeClr val="accent1"/>
+          </a:effectRef>
+          <a:fontRef idx="minor">
+            <a:schemeClr val="lt1"/>
+          </a:fontRef>
+        </p:style>
+        <p:txBody>
+          <a:bodyPr rtlCol="0" anchor="ctr"/>
+          <a:lstStyle/>
+          <a:p>
+            <a:pPr algn="ctr"/>
+            <a:endParaRPr lang="en-US"/>
+          </a:p>
+        </p:txBody>
+      </p:sp>
+      <p:sp>
+        <p:nvSpPr>
+          <p:cNvPr id="2" name="Title 1">
+            <a:extLst>
+              <a:ext uri="{FF2B5EF4-FFF2-40B4-BE49-F238E27FC236}">
+                <a16:creationId xmlns:a16="http://schemas.microsoft.com/office/drawing/2014/main" id="{66A47F5C-50EC-416A-AE8C-6F6BB4225673}"/>
+              </a:ext>
+            </a:extLst>
+          </p:cNvPr>
+          <p:cNvSpPr>
+            <a:spLocks noGrp="1"/>
+          </p:cNvSpPr>
+          <p:nvPr>
+            <p:ph type="title"/>
+          </p:nvPr>
+        </p:nvSpPr>
+        <p:spPr>
+          <a:xfrm>
+            <a:off x="1097280" y="286603"/>
+            <a:ext cx="10058400" cy="1450757"/>
+          </a:xfrm>
+        </p:spPr>
+        <p:txBody>
+          <a:bodyPr>
+            <a:normAutofit/>
+          </a:bodyPr>
+          <a:lstStyle/>
+          <a:p>
+            <a:r>
+              <a:rPr lang="en-US" sz="4400" b="1" dirty="0"/>
+              <a:t>CIFAR-10 data</a:t>
+            </a:r>
+          </a:p>
+        </p:txBody>
+      </p:sp>
+      <p:cxnSp>
+        <p:nvCxnSpPr>
+          <p:cNvPr id="22" name="Straight Connector 21">
+            <a:extLst>
+              <a:ext uri="{FF2B5EF4-FFF2-40B4-BE49-F238E27FC236}">
+                <a16:creationId xmlns:a16="http://schemas.microsoft.com/office/drawing/2014/main" id="{6987BDFB-DE64-4B56-B44F-45FAE19FA94E}"/>
+              </a:ext>
+              <a:ext uri="{C183D7F6-B498-43B3-948B-1728B52AA6E4}">
+                <adec:decorative xmlns:adec="http://schemas.microsoft.com/office/drawing/2017/decorative" val="1"/>
+              </a:ext>
+            </a:extLst>
+          </p:cNvPr>
+          <p:cNvCxnSpPr>
+            <a:cxnSpLocks noGrp="1" noRot="1" noChangeAspect="1" noMove="1" noResize="1" noEditPoints="1" noAdjustHandles="1" noChangeArrowheads="1" noChangeShapeType="1"/>
+          </p:cNvCxnSpPr>
+          <p:nvPr>
+            <p:extLst>
+              <p:ext uri="{386F3935-93C4-4BCD-93E2-E3B085C9AB24}">
+                <p16:designElem xmlns:p16="http://schemas.microsoft.com/office/powerpoint/2015/main" val="1"/>
+              </p:ext>
+            </p:extLst>
+          </p:nvPr>
+        </p:nvCxnSpPr>
+        <p:spPr>
+          <a:xfrm>
+            <a:off x="1193532" y="1895846"/>
+            <a:ext cx="9966960" cy="0"/>
+          </a:xfrm>
+          <a:prstGeom prst="line">
+            <a:avLst/>
+          </a:prstGeom>
+          <a:ln w="12700">
+            <a:solidFill>
+              <a:schemeClr val="tx1">
+                <a:lumMod val="75000"/>
+                <a:lumOff val="25000"/>
+              </a:schemeClr>
+            </a:solidFill>
+          </a:ln>
+        </p:spPr>
+        <p:style>
+          <a:lnRef idx="1">
+            <a:schemeClr val="accent1"/>
+          </a:lnRef>
+          <a:fillRef idx="0">
+            <a:schemeClr val="accent1"/>
+          </a:fillRef>
+          <a:effectRef idx="0">
+            <a:schemeClr val="accent1"/>
+          </a:effectRef>
+          <a:fontRef idx="minor">
+            <a:schemeClr val="tx1"/>
+          </a:fontRef>
+        </p:style>
+      </p:cxnSp>
+      <p:sp>
+        <p:nvSpPr>
+          <p:cNvPr id="24" name="Rectangle 23">
+            <a:extLst>
+              <a:ext uri="{FF2B5EF4-FFF2-40B4-BE49-F238E27FC236}">
+                <a16:creationId xmlns:a16="http://schemas.microsoft.com/office/drawing/2014/main" id="{CB06839E-D8C3-4A74-BA2B-3B97E7B2CDB5}"/>
+              </a:ext>
+              <a:ext uri="{C183D7F6-B498-43B3-948B-1728B52AA6E4}">
+                <adec:decorative xmlns:adec="http://schemas.microsoft.com/office/drawing/2017/decorative" val="1"/>
+              </a:ext>
+            </a:extLst>
+          </p:cNvPr>
+          <p:cNvSpPr>
+            <a:spLocks noGrp="1" noRot="1" noChangeAspect="1" noMove="1" noResize="1" noEditPoints="1" noAdjustHandles="1" noChangeArrowheads="1" noChangeShapeType="1" noTextEdit="1"/>
+          </p:cNvSpPr>
+          <p:nvPr>
+            <p:extLst>
+              <p:ext uri="{386F3935-93C4-4BCD-93E2-E3B085C9AB24}">
+                <p16:designElem xmlns:p16="http://schemas.microsoft.com/office/powerpoint/2015/main" val="1"/>
+              </p:ext>
+            </p:extLst>
+          </p:nvPr>
+        </p:nvSpPr>
+        <p:spPr>
+          <a:xfrm>
+            <a:off x="0" y="6400800"/>
+            <a:ext cx="12192000" cy="457200"/>
+          </a:xfrm>
+          <a:prstGeom prst="rect">
+            <a:avLst/>
+          </a:prstGeom>
+          <a:solidFill>
+            <a:srgbClr val="262626"/>
+          </a:solidFill>
+          <a:ln>
+            <a:noFill/>
+          </a:ln>
+        </p:spPr>
+        <p:style>
+          <a:lnRef idx="2">
+            <a:schemeClr val="accent1">
+              <a:shade val="50000"/>
+            </a:schemeClr>
+          </a:lnRef>
+          <a:fillRef idx="1">
+            <a:schemeClr val="accent1"/>
+          </a:fillRef>
+          <a:effectRef idx="0">
+            <a:schemeClr val="accent1"/>
+          </a:effectRef>
+          <a:fontRef idx="minor">
+            <a:schemeClr val="lt1"/>
+          </a:fontRef>
+        </p:style>
+      </p:sp>
+      <p:sp>
+        <p:nvSpPr>
+          <p:cNvPr id="3" name="Slide Number Placeholder 2">
+            <a:extLst>
+              <a:ext uri="{FF2B5EF4-FFF2-40B4-BE49-F238E27FC236}">
+                <a16:creationId xmlns:a16="http://schemas.microsoft.com/office/drawing/2014/main" id="{D13223F0-DCB9-40DE-A93C-DFE6DFEB1DD6}"/>
+              </a:ext>
+            </a:extLst>
+          </p:cNvPr>
+          <p:cNvSpPr>
+            <a:spLocks noGrp="1"/>
+          </p:cNvSpPr>
+          <p:nvPr>
+            <p:ph type="sldNum" sz="quarter" idx="12"/>
+          </p:nvPr>
+        </p:nvSpPr>
+        <p:spPr/>
+        <p:txBody>
+          <a:bodyPr/>
+          <a:lstStyle/>
+          <a:p>
+            <a:fld id="{3A98EE3D-8CD1-4C3F-BD1C-C98C9596463C}" type="slidenum">
+              <a:rPr lang="en-US" smtClean="0"/>
+              <a:t>8</a:t>
+            </a:fld>
+            <a:endParaRPr lang="en-US" dirty="0"/>
+          </a:p>
+        </p:txBody>
+      </p:sp>
+      <p:sp>
+        <p:nvSpPr>
+          <p:cNvPr id="12" name="Footer Placeholder 11">
+            <a:extLst>
+              <a:ext uri="{FF2B5EF4-FFF2-40B4-BE49-F238E27FC236}">
+                <a16:creationId xmlns:a16="http://schemas.microsoft.com/office/drawing/2014/main" id="{3B79F701-2D61-49B8-9C82-C92A2BA7225F}"/>
+              </a:ext>
+            </a:extLst>
+          </p:cNvPr>
+          <p:cNvSpPr>
+            <a:spLocks noGrp="1"/>
+          </p:cNvSpPr>
+          <p:nvPr>
+            <p:ph type="ftr" sz="quarter" idx="11"/>
+          </p:nvPr>
+        </p:nvSpPr>
+        <p:spPr/>
+        <p:txBody>
+          <a:bodyPr/>
+          <a:lstStyle/>
+          <a:p>
+            <a:r>
+              <a:rPr lang="en-US"/>
+              <a:t>Lampros Lountzis</a:t>
+            </a:r>
+            <a:endParaRPr lang="en-US" dirty="0"/>
+          </a:p>
+        </p:txBody>
+      </p:sp>
+      <p:sp>
+        <p:nvSpPr>
+          <p:cNvPr id="5" name="Content Placeholder 4">
+            <a:extLst>
+              <a:ext uri="{FF2B5EF4-FFF2-40B4-BE49-F238E27FC236}">
+                <a16:creationId xmlns:a16="http://schemas.microsoft.com/office/drawing/2014/main" id="{9CC83DC5-A0A7-4CAB-8BA9-19DB2FF95FAA}"/>
+              </a:ext>
+            </a:extLst>
+          </p:cNvPr>
+          <p:cNvSpPr>
+            <a:spLocks noGrp="1"/>
+          </p:cNvSpPr>
+          <p:nvPr>
+            <p:ph idx="1"/>
+          </p:nvPr>
+        </p:nvSpPr>
+        <p:spPr/>
+        <p:txBody>
+          <a:bodyPr>
+            <a:normAutofit fontScale="92500" lnSpcReduction="20000"/>
+          </a:bodyPr>
+          <a:lstStyle/>
+          <a:p>
+            <a:pPr lvl="1">
+              <a:buFont typeface="Arial" panose="020B0604020202020204" pitchFamily="34" charset="0"/>
+              <a:buChar char="•"/>
+            </a:pPr>
+            <a:r>
+              <a:rPr lang="en-US" sz="1700" dirty="0"/>
+              <a:t>We’re using the </a:t>
+            </a:r>
+            <a:r>
+              <a:rPr lang="en-US" sz="1700" b="1" dirty="0"/>
+              <a:t>CIFAR-10</a:t>
+            </a:r>
+            <a:r>
+              <a:rPr lang="en-US" sz="1700" dirty="0"/>
+              <a:t> corpus (by Alex </a:t>
+            </a:r>
+            <a:r>
+              <a:rPr lang="en-US" sz="1700" dirty="0" err="1"/>
+              <a:t>Krizhevsky</a:t>
+            </a:r>
+            <a:r>
+              <a:rPr lang="en-US" sz="1700" dirty="0"/>
+              <a:t>, Vinod Nair, and Geoffrey Hinton) which consists of image data, about 50000 training images and 10000 test images.</a:t>
+            </a:r>
+          </a:p>
+          <a:p>
+            <a:pPr lvl="1">
+              <a:buFont typeface="Arial" panose="020B0604020202020204" pitchFamily="34" charset="0"/>
+              <a:buChar char="•"/>
+            </a:pPr>
+            <a:endParaRPr lang="en-US" sz="1700" dirty="0"/>
+          </a:p>
+          <a:p>
+            <a:pPr lvl="1">
+              <a:buFont typeface="Arial" panose="020B0604020202020204" pitchFamily="34" charset="0"/>
+              <a:buChar char="•"/>
+            </a:pPr>
+            <a:r>
+              <a:rPr lang="en-US" sz="1700" dirty="0"/>
+              <a:t>Each image is a </a:t>
+            </a:r>
+            <a:r>
+              <a:rPr lang="en-US" sz="1700" b="1" dirty="0"/>
+              <a:t>32x32 color image</a:t>
+            </a:r>
+            <a:r>
+              <a:rPr lang="en-US" sz="1700" dirty="0"/>
+              <a:t>.</a:t>
+            </a:r>
+          </a:p>
+          <a:p>
+            <a:pPr lvl="1">
+              <a:buFont typeface="Arial" panose="020B0604020202020204" pitchFamily="34" charset="0"/>
+              <a:buChar char="•"/>
+            </a:pPr>
+            <a:endParaRPr lang="en-US" sz="1700" dirty="0"/>
+          </a:p>
+          <a:p>
+            <a:pPr lvl="1">
+              <a:buFont typeface="Arial" panose="020B0604020202020204" pitchFamily="34" charset="0"/>
+              <a:buChar char="•"/>
+            </a:pPr>
+            <a:r>
+              <a:rPr lang="en-US" sz="1700" dirty="0"/>
+              <a:t>The dataset contains </a:t>
+            </a:r>
+            <a:r>
+              <a:rPr lang="en-US" sz="1700" b="1" dirty="0"/>
+              <a:t>10 classes</a:t>
+            </a:r>
+            <a:r>
+              <a:rPr lang="en-US" sz="1700" dirty="0"/>
+              <a:t>, namely airplane, automobile, bird, cat, deer, dog, frog, horse, ship, truck.</a:t>
+            </a:r>
+          </a:p>
+          <a:p>
+            <a:pPr lvl="2">
+              <a:buFont typeface="Arial" panose="020B0604020202020204" pitchFamily="34" charset="0"/>
+              <a:buChar char="•"/>
+            </a:pPr>
+            <a:r>
+              <a:rPr lang="en-US" sz="1500" dirty="0"/>
+              <a:t>The classes are completely mutually exclusive (e.g. there is no overlap).</a:t>
+            </a:r>
+          </a:p>
+          <a:p>
+            <a:pPr lvl="1">
+              <a:buFont typeface="Arial" panose="020B0604020202020204" pitchFamily="34" charset="0"/>
+              <a:buChar char="•"/>
+            </a:pPr>
+            <a:endParaRPr lang="en-US" sz="1700" dirty="0"/>
+          </a:p>
+          <a:p>
+            <a:pPr lvl="1">
+              <a:buFont typeface="Arial" panose="020B0604020202020204" pitchFamily="34" charset="0"/>
+              <a:buChar char="•"/>
+            </a:pPr>
+            <a:r>
+              <a:rPr lang="en-US" sz="1700" dirty="0"/>
+              <a:t>We consider the training images as </a:t>
+            </a:r>
+            <a:r>
+              <a:rPr lang="en-US" sz="1700" b="1" dirty="0"/>
+              <a:t>index images</a:t>
+            </a:r>
+            <a:r>
+              <a:rPr lang="en-US" sz="1700" dirty="0"/>
+              <a:t>, meaning that these will be indexed in our IR system. In the same manner, we consider the test images as </a:t>
+            </a:r>
+            <a:r>
+              <a:rPr lang="en-US" sz="1700" b="1" dirty="0"/>
+              <a:t>query images</a:t>
+            </a:r>
+            <a:r>
+              <a:rPr lang="en-US" sz="1700" dirty="0"/>
+              <a:t>.</a:t>
+            </a:r>
+          </a:p>
+          <a:p>
+            <a:pPr lvl="1">
+              <a:buFont typeface="Arial" panose="020B0604020202020204" pitchFamily="34" charset="0"/>
+              <a:buChar char="•"/>
+            </a:pPr>
+            <a:endParaRPr lang="en-US" sz="1700" dirty="0"/>
+          </a:p>
+          <a:p>
+            <a:pPr lvl="1">
+              <a:buFont typeface="Arial" panose="020B0604020202020204" pitchFamily="34" charset="0"/>
+              <a:buChar char="•"/>
+            </a:pPr>
+            <a:r>
+              <a:rPr lang="en-US" sz="1700" dirty="0"/>
+              <a:t>The </a:t>
+            </a:r>
+            <a:r>
+              <a:rPr lang="en-US" sz="1700" b="1" dirty="0"/>
+              <a:t>query relevance </a:t>
+            </a:r>
+            <a:r>
+              <a:rPr lang="en-US" sz="1700" dirty="0"/>
+              <a:t>is</a:t>
+            </a:r>
+            <a:r>
+              <a:rPr lang="el-GR" sz="1700" dirty="0"/>
+              <a:t> </a:t>
+            </a:r>
+            <a:r>
+              <a:rPr lang="en-US" sz="1700" dirty="0"/>
+              <a:t>defined as follows: </a:t>
+            </a:r>
+            <a:r>
+              <a:rPr lang="en-US" sz="1700" b="1" dirty="0"/>
+              <a:t>each query image (test image) is related with a set of indexed images (training images) where the relevance relationship depends on the class label.</a:t>
+            </a:r>
+          </a:p>
+          <a:p>
+            <a:pPr lvl="2">
+              <a:buFont typeface="Arial" panose="020B0604020202020204" pitchFamily="34" charset="0"/>
+              <a:buChar char="•"/>
+            </a:pPr>
+            <a:r>
+              <a:rPr lang="en-US" sz="1500" dirty="0"/>
+              <a:t>For example, a query image that is a car is associated with indexed images that belong to the car class.</a:t>
+            </a:r>
+          </a:p>
+        </p:txBody>
+      </p:sp>
+    </p:spTree>
+    <p:extLst>
+      <p:ext uri="{BB962C8B-B14F-4D97-AF65-F5344CB8AC3E}">
+        <p14:creationId xmlns:p14="http://schemas.microsoft.com/office/powerpoint/2010/main" val="2945491196"/>
+      </p:ext>
+    </p:extLst>
+  </p:cSld>
+  <p:clrMapOvr>
+    <a:masterClrMapping/>
+  </p:clrMapOvr>
+</p:sld>
+</file>
+
+<file path=ppt/slides/slide9.xml><?xml version="1.0" encoding="utf-8"?>
+<p:sld xmlns:a="http://schemas.openxmlformats.org/drawingml/2006/main" xmlns:r="http://schemas.openxmlformats.org/officeDocument/2006/relationships" xmlns:p="http://schemas.openxmlformats.org/presentationml/2006/main">
+  <p:cSld>
+    <p:bg>
+      <p:bgPr>
+        <a:solidFill>
+          <a:schemeClr val="bg1"/>
+        </a:solidFill>
+        <a:effectLst/>
+      </p:bgPr>
+    </p:bg>
+    <p:spTree>
+      <p:nvGrpSpPr>
+        <p:cNvPr id="1" name=""/>
+        <p:cNvGrpSpPr/>
+        <p:nvPr/>
+      </p:nvGrpSpPr>
+      <p:grpSpPr>
+        <a:xfrm>
+          <a:off x="0" y="0"/>
+          <a:ext cx="0" cy="0"/>
+          <a:chOff x="0" y="0"/>
+          <a:chExt cx="0" cy="0"/>
+        </a:xfrm>
+      </p:grpSpPr>
+      <p:sp useBgFill="1">
+        <p:nvSpPr>
+          <p:cNvPr id="20" name="Rectangle 19">
+            <a:extLst>
+              <a:ext uri="{FF2B5EF4-FFF2-40B4-BE49-F238E27FC236}">
+                <a16:creationId xmlns:a16="http://schemas.microsoft.com/office/drawing/2014/main" id="{13BCCAE5-A35B-4B66-A4A7-E23C34A403A4}"/>
+              </a:ext>
+              <a:ext uri="{C183D7F6-B498-43B3-948B-1728B52AA6E4}">
+                <adec:decorative xmlns:adec="http://schemas.microsoft.com/office/drawing/2017/decorative" val="1"/>
+              </a:ext>
+            </a:extLst>
+          </p:cNvPr>
+          <p:cNvSpPr>
+            <a:spLocks noGrp="1" noRot="1" noChangeAspect="1" noMove="1" noResize="1" noEditPoints="1" noAdjustHandles="1" noChangeArrowheads="1" noChangeShapeType="1" noTextEdit="1"/>
+          </p:cNvSpPr>
+          <p:nvPr>
+            <p:extLst>
+              <p:ext uri="{386F3935-93C4-4BCD-93E2-E3B085C9AB24}">
+                <p16:designElem xmlns:p16="http://schemas.microsoft.com/office/powerpoint/2015/main" val="1"/>
+              </p:ext>
+            </p:extLst>
+          </p:nvPr>
+        </p:nvSpPr>
+        <p:spPr>
+          <a:xfrm>
+            <a:off x="0" y="0"/>
+            <a:ext cx="12192000" cy="6858000"/>
+          </a:xfrm>
+          <a:prstGeom prst="rect">
+            <a:avLst/>
+          </a:prstGeom>
+          <a:ln>
+            <a:noFill/>
+          </a:ln>
+        </p:spPr>
+        <p:style>
+          <a:lnRef idx="2">
+            <a:schemeClr val="accent1">
+              <a:shade val="50000"/>
+            </a:schemeClr>
+          </a:lnRef>
+          <a:fillRef idx="1">
+            <a:schemeClr val="accent1"/>
+          </a:fillRef>
+          <a:effectRef idx="0">
+            <a:schemeClr val="accent1"/>
+          </a:effectRef>
+          <a:fontRef idx="minor">
+            <a:schemeClr val="lt1"/>
+          </a:fontRef>
+        </p:style>
+        <p:txBody>
+          <a:bodyPr rtlCol="0" anchor="ctr"/>
+          <a:lstStyle/>
+          <a:p>
+            <a:pPr algn="ctr"/>
+            <a:endParaRPr lang="en-US"/>
+          </a:p>
+        </p:txBody>
+      </p:sp>
+      <p:sp>
+        <p:nvSpPr>
+          <p:cNvPr id="2" name="Title 1">
+            <a:extLst>
+              <a:ext uri="{FF2B5EF4-FFF2-40B4-BE49-F238E27FC236}">
+                <a16:creationId xmlns:a16="http://schemas.microsoft.com/office/drawing/2014/main" id="{66A47F5C-50EC-416A-AE8C-6F6BB4225673}"/>
+              </a:ext>
+            </a:extLst>
+          </p:cNvPr>
+          <p:cNvSpPr>
+            <a:spLocks noGrp="1"/>
+          </p:cNvSpPr>
+          <p:nvPr>
+            <p:ph type="title"/>
+          </p:nvPr>
+        </p:nvSpPr>
+        <p:spPr>
+          <a:xfrm>
+            <a:off x="1097280" y="286603"/>
+            <a:ext cx="10058400" cy="1450757"/>
+          </a:xfrm>
+        </p:spPr>
+        <p:txBody>
+          <a:bodyPr>
+            <a:normAutofit/>
+          </a:bodyPr>
+          <a:lstStyle/>
+          <a:p>
+            <a:r>
+              <a:rPr lang="en-US" sz="4400" b="1" dirty="0"/>
+              <a:t>Elasticsearch search engine</a:t>
+            </a:r>
+          </a:p>
+        </p:txBody>
+      </p:sp>
+      <p:cxnSp>
+        <p:nvCxnSpPr>
+          <p:cNvPr id="22" name="Straight Connector 21">
+            <a:extLst>
+              <a:ext uri="{FF2B5EF4-FFF2-40B4-BE49-F238E27FC236}">
+                <a16:creationId xmlns:a16="http://schemas.microsoft.com/office/drawing/2014/main" id="{6987BDFB-DE64-4B56-B44F-45FAE19FA94E}"/>
+              </a:ext>
+              <a:ext uri="{C183D7F6-B498-43B3-948B-1728B52AA6E4}">
+                <adec:decorative xmlns:adec="http://schemas.microsoft.com/office/drawing/2017/decorative" val="1"/>
+              </a:ext>
+            </a:extLst>
+          </p:cNvPr>
+          <p:cNvCxnSpPr>
+            <a:cxnSpLocks noGrp="1" noRot="1" noChangeAspect="1" noMove="1" noResize="1" noEditPoints="1" noAdjustHandles="1" noChangeArrowheads="1" noChangeShapeType="1"/>
+          </p:cNvCxnSpPr>
+          <p:nvPr>
+            <p:extLst>
+              <p:ext uri="{386F3935-93C4-4BCD-93E2-E3B085C9AB24}">
+                <p16:designElem xmlns:p16="http://schemas.microsoft.com/office/powerpoint/2015/main" val="1"/>
+              </p:ext>
+            </p:extLst>
+          </p:nvPr>
+        </p:nvCxnSpPr>
+        <p:spPr>
+          <a:xfrm>
+            <a:off x="1193532" y="1895846"/>
+            <a:ext cx="9966960" cy="0"/>
+          </a:xfrm>
+          <a:prstGeom prst="line">
+            <a:avLst/>
+          </a:prstGeom>
+          <a:ln w="12700">
+            <a:solidFill>
+              <a:schemeClr val="tx1">
+                <a:lumMod val="75000"/>
+                <a:lumOff val="25000"/>
+              </a:schemeClr>
+            </a:solidFill>
+          </a:ln>
+        </p:spPr>
+        <p:style>
+          <a:lnRef idx="1">
+            <a:schemeClr val="accent1"/>
+          </a:lnRef>
+          <a:fillRef idx="0">
+            <a:schemeClr val="accent1"/>
+          </a:fillRef>
+          <a:effectRef idx="0">
+            <a:schemeClr val="accent1"/>
+          </a:effectRef>
+          <a:fontRef idx="minor">
+            <a:schemeClr val="tx1"/>
+          </a:fontRef>
+        </p:style>
+      </p:cxnSp>
+      <p:sp>
+        <p:nvSpPr>
+          <p:cNvPr id="24" name="Rectangle 23">
+            <a:extLst>
+              <a:ext uri="{FF2B5EF4-FFF2-40B4-BE49-F238E27FC236}">
+                <a16:creationId xmlns:a16="http://schemas.microsoft.com/office/drawing/2014/main" id="{CB06839E-D8C3-4A74-BA2B-3B97E7B2CDB5}"/>
+              </a:ext>
+              <a:ext uri="{C183D7F6-B498-43B3-948B-1728B52AA6E4}">
+                <adec:decorative xmlns:adec="http://schemas.microsoft.com/office/drawing/2017/decorative" val="1"/>
+              </a:ext>
+            </a:extLst>
+          </p:cNvPr>
+          <p:cNvSpPr>
+            <a:spLocks noGrp="1" noRot="1" noChangeAspect="1" noMove="1" noResize="1" noEditPoints="1" noAdjustHandles="1" noChangeArrowheads="1" noChangeShapeType="1" noTextEdit="1"/>
+          </p:cNvSpPr>
+          <p:nvPr>
+            <p:extLst>
+              <p:ext uri="{386F3935-93C4-4BCD-93E2-E3B085C9AB24}">
+                <p16:designElem xmlns:p16="http://schemas.microsoft.com/office/powerpoint/2015/main" val="1"/>
+              </p:ext>
+            </p:extLst>
+          </p:nvPr>
+        </p:nvSpPr>
+        <p:spPr>
+          <a:xfrm>
+            <a:off x="0" y="6400800"/>
+            <a:ext cx="12192000" cy="457200"/>
+          </a:xfrm>
+          <a:prstGeom prst="rect">
+            <a:avLst/>
+          </a:prstGeom>
+          <a:solidFill>
+            <a:srgbClr val="262626"/>
+          </a:solidFill>
+          <a:ln>
+            <a:noFill/>
+          </a:ln>
+        </p:spPr>
+        <p:style>
+          <a:lnRef idx="2">
+            <a:schemeClr val="accent1">
+              <a:shade val="50000"/>
+            </a:schemeClr>
+          </a:lnRef>
+          <a:fillRef idx="1">
+            <a:schemeClr val="accent1"/>
+          </a:fillRef>
+          <a:effectRef idx="0">
+            <a:schemeClr val="accent1"/>
+          </a:effectRef>
+          <a:fontRef idx="minor">
+            <a:schemeClr val="lt1"/>
+          </a:fontRef>
+        </p:style>
+      </p:sp>
+      <p:sp>
+        <p:nvSpPr>
+          <p:cNvPr id="3" name="Slide Number Placeholder 2">
+            <a:extLst>
+              <a:ext uri="{FF2B5EF4-FFF2-40B4-BE49-F238E27FC236}">
+                <a16:creationId xmlns:a16="http://schemas.microsoft.com/office/drawing/2014/main" id="{D13223F0-DCB9-40DE-A93C-DFE6DFEB1DD6}"/>
+              </a:ext>
+            </a:extLst>
+          </p:cNvPr>
+          <p:cNvSpPr>
+            <a:spLocks noGrp="1"/>
+          </p:cNvSpPr>
+          <p:nvPr>
+            <p:ph type="sldNum" sz="quarter" idx="12"/>
+          </p:nvPr>
+        </p:nvSpPr>
+        <p:spPr/>
+        <p:txBody>
+          <a:bodyPr/>
+          <a:lstStyle/>
+          <a:p>
+            <a:fld id="{3A98EE3D-8CD1-4C3F-BD1C-C98C9596463C}" type="slidenum">
+              <a:rPr lang="en-US" smtClean="0"/>
+              <a:t>9</a:t>
+            </a:fld>
+            <a:endParaRPr lang="en-US" dirty="0"/>
+          </a:p>
+        </p:txBody>
+      </p:sp>
+      <p:sp>
+        <p:nvSpPr>
+          <p:cNvPr id="12" name="Footer Placeholder 11">
+            <a:extLst>
+              <a:ext uri="{FF2B5EF4-FFF2-40B4-BE49-F238E27FC236}">
+                <a16:creationId xmlns:a16="http://schemas.microsoft.com/office/drawing/2014/main" id="{3B79F701-2D61-49B8-9C82-C92A2BA7225F}"/>
+              </a:ext>
+            </a:extLst>
+          </p:cNvPr>
+          <p:cNvSpPr>
+            <a:spLocks noGrp="1"/>
+          </p:cNvSpPr>
+          <p:nvPr>
+            <p:ph type="ftr" sz="quarter" idx="11"/>
+          </p:nvPr>
+        </p:nvSpPr>
+        <p:spPr/>
+        <p:txBody>
+          <a:bodyPr/>
+          <a:lstStyle/>
+          <a:p>
+            <a:r>
+              <a:rPr lang="en-US"/>
+              <a:t>Lampros Lountzis</a:t>
+            </a:r>
+            <a:endParaRPr lang="en-US" dirty="0"/>
+          </a:p>
+        </p:txBody>
+      </p:sp>
+      <p:sp>
+        <p:nvSpPr>
+          <p:cNvPr id="5" name="Content Placeholder 4">
+            <a:extLst>
+              <a:ext uri="{FF2B5EF4-FFF2-40B4-BE49-F238E27FC236}">
+                <a16:creationId xmlns:a16="http://schemas.microsoft.com/office/drawing/2014/main" id="{F63ADAC2-C7EE-4972-818F-5C0326ACBE1D}"/>
+              </a:ext>
+            </a:extLst>
+          </p:cNvPr>
+          <p:cNvSpPr>
+            <a:spLocks noGrp="1"/>
+          </p:cNvSpPr>
+          <p:nvPr>
+            <p:ph idx="1"/>
+          </p:nvPr>
+        </p:nvSpPr>
+        <p:spPr/>
+        <p:txBody>
+          <a:bodyPr>
+            <a:noAutofit/>
+          </a:bodyPr>
+          <a:lstStyle/>
+          <a:p>
+            <a:pPr marL="201168" lvl="1" indent="0">
+              <a:buNone/>
+            </a:pPr>
+            <a:r>
+              <a:rPr lang="en-US" sz="1600" dirty="0"/>
+              <a:t>The Information Retrieval system (search engine) was created using the </a:t>
+            </a:r>
+            <a:r>
+              <a:rPr lang="en-US" sz="1600" b="1" dirty="0"/>
+              <a:t>Elasticsearch </a:t>
+            </a:r>
+            <a:r>
+              <a:rPr lang="en-US" sz="1600" dirty="0"/>
+              <a:t>service, in </a:t>
+            </a:r>
+            <a:r>
+              <a:rPr lang="en-US" sz="1600" b="1" dirty="0"/>
+              <a:t>Python</a:t>
+            </a:r>
+            <a:r>
+              <a:rPr lang="en-US" sz="1600" dirty="0"/>
+              <a:t>.</a:t>
+            </a:r>
+          </a:p>
+          <a:p>
+            <a:pPr marL="201168" lvl="1" indent="0">
+              <a:buNone/>
+            </a:pPr>
+            <a:endParaRPr lang="en-US" sz="800" b="1" u="sng" dirty="0"/>
+          </a:p>
+          <a:p>
+            <a:pPr marL="201168" lvl="1" indent="0">
+              <a:buNone/>
+            </a:pPr>
+            <a:r>
+              <a:rPr lang="en-US" sz="1600" b="1" u="sng" dirty="0"/>
+              <a:t>Queries and Documents</a:t>
+            </a:r>
+          </a:p>
+          <a:p>
+            <a:pPr lvl="1">
+              <a:buFont typeface="Arial" panose="020B0604020202020204" pitchFamily="34" charset="0"/>
+              <a:buChar char="•"/>
+            </a:pPr>
+            <a:r>
+              <a:rPr lang="en-US" sz="1600" dirty="0"/>
+              <a:t>The image document and queries consist of the following fields: </a:t>
+            </a:r>
+            <a:r>
+              <a:rPr lang="en-US" sz="1600" b="1" dirty="0"/>
+              <a:t>id</a:t>
+            </a:r>
+            <a:r>
+              <a:rPr lang="en-US" sz="1600" dirty="0"/>
+              <a:t>, </a:t>
+            </a:r>
+            <a:r>
+              <a:rPr lang="en-US" sz="1600" b="1" dirty="0"/>
+              <a:t>filename</a:t>
+            </a:r>
+            <a:r>
+              <a:rPr lang="en-US" sz="1600" dirty="0"/>
+              <a:t>, </a:t>
+            </a:r>
+            <a:r>
+              <a:rPr lang="en-US" sz="1600" b="1" dirty="0"/>
+              <a:t>path </a:t>
+            </a:r>
+            <a:r>
+              <a:rPr lang="en-US" sz="1600" dirty="0"/>
+              <a:t>(absolute path to file), </a:t>
+            </a:r>
+            <a:r>
+              <a:rPr lang="en-US" sz="1600" b="1" dirty="0"/>
+              <a:t>features </a:t>
+            </a:r>
+            <a:r>
+              <a:rPr lang="en-US" sz="1600" dirty="0"/>
+              <a:t>(dense vector of image features as found by the underlying computer vision model) .</a:t>
+            </a:r>
+          </a:p>
+          <a:p>
+            <a:pPr lvl="1">
+              <a:buFont typeface="Arial" panose="020B0604020202020204" pitchFamily="34" charset="0"/>
+              <a:buChar char="•"/>
+            </a:pPr>
+            <a:r>
+              <a:rPr lang="en-US" sz="1600" b="1" dirty="0"/>
+              <a:t>The image documents are retrieved and ranked using the features vector</a:t>
+            </a:r>
+            <a:r>
+              <a:rPr lang="en-US" sz="1600" dirty="0"/>
+              <a:t>. In order to accomplish this, we compare the image-query feature vector with the image-document feature vector using the </a:t>
+            </a:r>
+            <a:r>
+              <a:rPr lang="en-US" sz="1600" b="1" dirty="0"/>
+              <a:t>cosine similarity. </a:t>
+            </a:r>
+            <a:r>
+              <a:rPr lang="en-US" sz="1600" dirty="0"/>
+              <a:t>Specifically</a:t>
+            </a:r>
+          </a:p>
+          <a:p>
+            <a:pPr marL="201168" lvl="1" indent="0">
+              <a:buNone/>
+            </a:pPr>
+            <a:r>
+              <a:rPr lang="en-US" sz="1600" b="1" dirty="0"/>
+              <a:t>		</a:t>
+            </a:r>
+            <a:r>
+              <a:rPr lang="en-US" sz="1600" b="1" dirty="0" err="1"/>
+              <a:t>cosineSimilarity</a:t>
+            </a:r>
+            <a:r>
+              <a:rPr lang="en-US" sz="1600" b="1" dirty="0"/>
+              <a:t>(</a:t>
+            </a:r>
+            <a:r>
+              <a:rPr lang="en-US" sz="1600" b="1" dirty="0" err="1"/>
+              <a:t>query.features</a:t>
+            </a:r>
+            <a:r>
+              <a:rPr lang="en-US" sz="1600" b="1" dirty="0"/>
+              <a:t>, </a:t>
+            </a:r>
+            <a:r>
+              <a:rPr lang="en-US" sz="1600" b="1" dirty="0" err="1"/>
+              <a:t>doc.features</a:t>
+            </a:r>
+            <a:r>
+              <a:rPr lang="en-US" sz="1600" b="1" dirty="0"/>
+              <a:t>) + 1.0</a:t>
+            </a:r>
+          </a:p>
+          <a:p>
+            <a:pPr lvl="1">
+              <a:buClr>
+                <a:schemeClr val="bg1"/>
+              </a:buClr>
+              <a:buFont typeface="Arial" panose="020B0604020202020204" pitchFamily="34" charset="0"/>
+              <a:buChar char="•"/>
+            </a:pPr>
+            <a:r>
+              <a:rPr lang="en-US" sz="1600" dirty="0"/>
+              <a:t>where we add 1.0 to the cosine similarity to prevent the score from being negative.</a:t>
+            </a:r>
+          </a:p>
+          <a:p>
+            <a:pPr marL="201168" lvl="1" indent="0">
+              <a:buNone/>
+            </a:pPr>
+            <a:endParaRPr lang="en-US" sz="800" b="1" u="sng" dirty="0"/>
+          </a:p>
+          <a:p>
+            <a:pPr marL="201168" lvl="1" indent="0">
+              <a:buNone/>
+            </a:pPr>
+            <a:r>
+              <a:rPr lang="en-US" sz="1600" b="1" u="sng" dirty="0"/>
+              <a:t>Elasticsearch configuration</a:t>
+            </a:r>
+          </a:p>
+          <a:p>
+            <a:pPr lvl="1">
+              <a:buFont typeface="Arial" panose="020B0604020202020204" pitchFamily="34" charset="0"/>
+              <a:buChar char="•"/>
+            </a:pPr>
+            <a:r>
+              <a:rPr lang="en-US" sz="1600" dirty="0"/>
+              <a:t>We configure the Elasticsearch client to run on localhost (port 9200) with a timeout of 60sec and retry on timeout.</a:t>
+            </a:r>
+          </a:p>
+          <a:p>
+            <a:pPr lvl="1">
+              <a:buFont typeface="Arial" panose="020B0604020202020204" pitchFamily="34" charset="0"/>
+              <a:buChar char="•"/>
+            </a:pPr>
+            <a:r>
+              <a:rPr lang="en-US" sz="1600" dirty="0"/>
+              <a:t>We create only </a:t>
+            </a:r>
+            <a:r>
+              <a:rPr lang="en-US" sz="1600" b="1" dirty="0"/>
+              <a:t>one node per cluster</a:t>
+            </a:r>
+            <a:r>
+              <a:rPr lang="en-US" sz="1600" dirty="0"/>
+              <a:t>, since this is not a system ready for production.</a:t>
+            </a:r>
+          </a:p>
+        </p:txBody>
+      </p:sp>
+    </p:spTree>
+    <p:extLst>
+      <p:ext uri="{BB962C8B-B14F-4D97-AF65-F5344CB8AC3E}">
+        <p14:creationId xmlns:p14="http://schemas.microsoft.com/office/powerpoint/2010/main" val="214603510"/>
       </p:ext>
     </p:extLst>
   </p:cSld>
@@ -10330,7 +13539,376 @@
 </a:theme>
 </file>
 
+<file path=ppt/theme/theme4.xml><?xml version="1.0" encoding="utf-8"?>
+<a:theme xmlns:a="http://schemas.openxmlformats.org/drawingml/2006/main" name="RetrospectVTI">
+  <a:themeElements>
+    <a:clrScheme name="">
+      <a:dk1>
+        <a:srgbClr val="000000"/>
+      </a:dk1>
+      <a:lt1>
+        <a:srgbClr val="FFFFFF"/>
+      </a:lt1>
+      <a:dk2>
+        <a:srgbClr val="243541"/>
+      </a:dk2>
+      <a:lt2>
+        <a:srgbClr val="E2E5E8"/>
+      </a:lt2>
+      <a:accent1>
+        <a:srgbClr val="E88B33"/>
+      </a:accent1>
+      <a:accent2>
+        <a:srgbClr val="AEA33A"/>
+      </a:accent2>
+      <a:accent3>
+        <a:srgbClr val="8CAB4A"/>
+      </a:accent3>
+      <a:accent4>
+        <a:srgbClr val="57B636"/>
+      </a:accent4>
+      <a:accent5>
+        <a:srgbClr val="2EBA43"/>
+      </a:accent5>
+      <a:accent6>
+        <a:srgbClr val="33B67D"/>
+      </a:accent6>
+      <a:hlink>
+        <a:srgbClr val="5F84A8"/>
+      </a:hlink>
+      <a:folHlink>
+        <a:srgbClr val="7F7F7F"/>
+      </a:folHlink>
+    </a:clrScheme>
+    <a:fontScheme name="Retrospect">
+      <a:majorFont>
+        <a:latin typeface="Georgia Pro Cond Light" panose="020F0302020204030204"/>
+        <a:ea typeface=""/>
+        <a:cs typeface=""/>
+        <a:font script="Jpan" typeface="ＭＳ Ｐゴシック"/>
+        <a:font script="Hang" typeface="맑은 고딕"/>
+        <a:font script="Hans" typeface="宋体"/>
+        <a:font script="Hant" typeface="新細明體"/>
+        <a:font script="Arab" typeface="Times New Roman"/>
+        <a:font script="Hebr" typeface="Times New Roman"/>
+        <a:font script="Thai" typeface="Angsana New"/>
+        <a:font script="Ethi" typeface="Nyala"/>
+        <a:font script="Beng" typeface="Vrinda"/>
+        <a:font script="Gujr" typeface="Shruti"/>
+        <a:font script="Khmr" typeface="MoolBoran"/>
+        <a:font script="Knda" typeface="Tunga"/>
+        <a:font script="Guru" typeface="Raavi"/>
+        <a:font script="Cans" typeface="Euphemia"/>
+        <a:font script="Cher" typeface="Plantagenet Cherokee"/>
+        <a:font script="Yiii" typeface="Microsoft Yi Baiti"/>
+        <a:font script="Tibt" typeface="Microsoft Himalaya"/>
+        <a:font script="Thaa" typeface="MV Boli"/>
+        <a:font script="Deva" typeface="Mangal"/>
+        <a:font script="Telu" typeface="Gautami"/>
+        <a:font script="Taml" typeface="Latha"/>
+        <a:font script="Syrc" typeface="Estrangelo Edessa"/>
+        <a:font script="Orya" typeface="Kalinga"/>
+        <a:font script="Mlym" typeface="Kartika"/>
+        <a:font script="Laoo" typeface="DokChampa"/>
+        <a:font script="Sinh" typeface="Iskoola Pota"/>
+        <a:font script="Mong" typeface="Mongolian Baiti"/>
+        <a:font script="Viet" typeface="Times New Roman"/>
+        <a:font script="Uigh" typeface="Microsoft Uighur"/>
+        <a:font script="Geor" typeface="Sylfaen"/>
+      </a:majorFont>
+      <a:minorFont>
+        <a:latin typeface="Speak Pro" panose="020F0502020204030204"/>
+        <a:ea typeface=""/>
+        <a:cs typeface=""/>
+        <a:font script="Jpan" typeface="ＭＳ Ｐゴシック"/>
+        <a:font script="Hang" typeface="맑은 고딕"/>
+        <a:font script="Hans" typeface="宋体"/>
+        <a:font script="Hant" typeface="新細明體"/>
+        <a:font script="Arab" typeface="Arial"/>
+        <a:font script="Hebr" typeface="Arial"/>
+        <a:font script="Thai" typeface="Cordia New"/>
+        <a:font script="Ethi" typeface="Nyala"/>
+        <a:font script="Beng" typeface="Vrinda"/>
+        <a:font script="Gujr" typeface="Shruti"/>
+        <a:font script="Khmr" typeface="DaunPenh"/>
+        <a:font script="Knda" typeface="Tunga"/>
+        <a:font script="Guru" typeface="Raavi"/>
+        <a:font script="Cans" typeface="Euphemia"/>
+        <a:font script="Cher" typeface="Plantagenet Cherokee"/>
+        <a:font script="Yiii" typeface="Microsoft Yi Baiti"/>
+        <a:font script="Tibt" typeface="Microsoft Himalaya"/>
+        <a:font script="Thaa" typeface="MV Boli"/>
+        <a:font script="Deva" typeface="Mangal"/>
+        <a:font script="Telu" typeface="Gautami"/>
+        <a:font script="Taml" typeface="Latha"/>
+        <a:font script="Syrc" typeface="Estrangelo Edessa"/>
+        <a:font script="Orya" typeface="Kalinga"/>
+        <a:font script="Mlym" typeface="Kartika"/>
+        <a:font script="Laoo" typeface="DokChampa"/>
+        <a:font script="Sinh" typeface="Iskoola Pota"/>
+        <a:font script="Mong" typeface="Mongolian Baiti"/>
+        <a:font script="Viet" typeface="Arial"/>
+        <a:font script="Uigh" typeface="Microsoft Uighur"/>
+        <a:font script="Geor" typeface="Sylfaen"/>
+      </a:minorFont>
+    </a:fontScheme>
+    <a:fmtScheme name="Retrospect">
+      <a:fillStyleLst>
+        <a:solidFill>
+          <a:schemeClr val="phClr"/>
+        </a:solidFill>
+        <a:gradFill rotWithShape="1">
+          <a:gsLst>
+            <a:gs pos="0">
+              <a:schemeClr val="phClr">
+                <a:tint val="65000"/>
+                <a:shade val="92000"/>
+                <a:satMod val="130000"/>
+              </a:schemeClr>
+            </a:gs>
+            <a:gs pos="45000">
+              <a:schemeClr val="phClr">
+                <a:tint val="60000"/>
+                <a:shade val="99000"/>
+                <a:satMod val="120000"/>
+              </a:schemeClr>
+            </a:gs>
+            <a:gs pos="100000">
+              <a:schemeClr val="phClr">
+                <a:tint val="55000"/>
+                <a:satMod val="140000"/>
+              </a:schemeClr>
+            </a:gs>
+          </a:gsLst>
+          <a:path path="circle">
+            <a:fillToRect l="100000" t="100000" r="100000" b="100000"/>
+          </a:path>
+        </a:gradFill>
+        <a:gradFill rotWithShape="1">
+          <a:gsLst>
+            <a:gs pos="0">
+              <a:schemeClr val="phClr">
+                <a:shade val="85000"/>
+                <a:satMod val="130000"/>
+              </a:schemeClr>
+            </a:gs>
+            <a:gs pos="34000">
+              <a:schemeClr val="phClr">
+                <a:shade val="87000"/>
+                <a:satMod val="125000"/>
+              </a:schemeClr>
+            </a:gs>
+            <a:gs pos="70000">
+              <a:schemeClr val="phClr">
+                <a:tint val="100000"/>
+                <a:shade val="90000"/>
+                <a:satMod val="130000"/>
+              </a:schemeClr>
+            </a:gs>
+            <a:gs pos="100000">
+              <a:schemeClr val="phClr">
+                <a:tint val="100000"/>
+                <a:shade val="100000"/>
+                <a:satMod val="110000"/>
+              </a:schemeClr>
+            </a:gs>
+          </a:gsLst>
+          <a:path path="circle">
+            <a:fillToRect l="100000" t="100000" r="100000" b="100000"/>
+          </a:path>
+        </a:gradFill>
+      </a:fillStyleLst>
+      <a:lnStyleLst>
+        <a:ln w="12700" cap="flat" cmpd="sng" algn="ctr">
+          <a:solidFill>
+            <a:schemeClr val="phClr"/>
+          </a:solidFill>
+          <a:prstDash val="solid"/>
+        </a:ln>
+        <a:ln w="15875" cap="flat" cmpd="sng" algn="ctr">
+          <a:solidFill>
+            <a:schemeClr val="phClr"/>
+          </a:solidFill>
+          <a:prstDash val="solid"/>
+        </a:ln>
+        <a:ln w="25400" cap="flat" cmpd="sng" algn="ctr">
+          <a:solidFill>
+            <a:schemeClr val="phClr"/>
+          </a:solidFill>
+          <a:prstDash val="solid"/>
+        </a:ln>
+      </a:lnStyleLst>
+      <a:effectStyleLst>
+        <a:effectStyle>
+          <a:effectLst/>
+        </a:effectStyle>
+        <a:effectStyle>
+          <a:effectLst>
+            <a:outerShdw blurRad="38100" dist="25400" dir="2700000" algn="br" rotWithShape="0">
+              <a:srgbClr val="000000">
+                <a:alpha val="60000"/>
+              </a:srgbClr>
+            </a:outerShdw>
+          </a:effectLst>
+        </a:effectStyle>
+        <a:effectStyle>
+          <a:effectLst>
+            <a:outerShdw blurRad="44450" dist="25400" dir="2700000" algn="br" rotWithShape="0">
+              <a:srgbClr val="000000">
+                <a:alpha val="60000"/>
+              </a:srgbClr>
+            </a:outerShdw>
+          </a:effectLst>
+          <a:scene3d>
+            <a:camera prst="orthographicFront">
+              <a:rot lat="0" lon="0" rev="0"/>
+            </a:camera>
+            <a:lightRig rig="threePt" dir="t">
+              <a:rot lat="0" lon="0" rev="19800000"/>
+            </a:lightRig>
+          </a:scene3d>
+          <a:sp3d prstMaterial="flat">
+            <a:bevelT w="25400" h="31750"/>
+          </a:sp3d>
+        </a:effectStyle>
+      </a:effectStyleLst>
+      <a:bgFillStyleLst>
+        <a:solidFill>
+          <a:schemeClr val="phClr"/>
+        </a:solidFill>
+        <a:solidFill>
+          <a:schemeClr val="phClr">
+            <a:tint val="90000"/>
+            <a:shade val="97000"/>
+            <a:satMod val="130000"/>
+          </a:schemeClr>
+        </a:solidFill>
+        <a:gradFill rotWithShape="1">
+          <a:gsLst>
+            <a:gs pos="0">
+              <a:schemeClr val="phClr">
+                <a:tint val="96000"/>
+                <a:shade val="99000"/>
+                <a:satMod val="140000"/>
+              </a:schemeClr>
+            </a:gs>
+            <a:gs pos="65000">
+              <a:schemeClr val="phClr">
+                <a:tint val="100000"/>
+                <a:shade val="80000"/>
+                <a:satMod val="130000"/>
+              </a:schemeClr>
+            </a:gs>
+            <a:gs pos="100000">
+              <a:schemeClr val="phClr">
+                <a:tint val="100000"/>
+                <a:shade val="48000"/>
+                <a:satMod val="120000"/>
+              </a:schemeClr>
+            </a:gs>
+          </a:gsLst>
+          <a:lin ang="16200000" scaled="0"/>
+        </a:gradFill>
+      </a:bgFillStyleLst>
+    </a:fmtScheme>
+  </a:themeElements>
+  <a:objectDefaults/>
+  <a:extraClrSchemeLst/>
+  <a:extLst>
+    <a:ext uri="{05A4C25C-085E-4340-85A3-A5531E510DB2}">
+      <thm15:themeFamily xmlns:thm15="http://schemas.microsoft.com/office/thememl/2012/main" name="RetrospectVTI" id="{ABE3C30C-0FC0-4450-828E-52DE70F1BCCB}" vid="{A6E2497D-935A-4CFD-B9FD-6DCB15FA68BF}"/>
+    </a:ext>
+  </a:extLst>
+</a:theme>
+</file>
+
 <file path=ppt/theme/themeOverride1.xml><?xml version="1.0" encoding="utf-8"?>
+<a:themeOverride xmlns:a="http://schemas.openxmlformats.org/drawingml/2006/main">
+  <a:clrScheme name="Custom 40">
+    <a:dk1>
+      <a:sysClr val="windowText" lastClr="000000"/>
+    </a:dk1>
+    <a:lt1>
+      <a:sysClr val="window" lastClr="FFFFFF"/>
+    </a:lt1>
+    <a:dk2>
+      <a:srgbClr val="545D57"/>
+    </a:dk2>
+    <a:lt2>
+      <a:srgbClr val="EBEBE8"/>
+    </a:lt2>
+    <a:accent1>
+      <a:srgbClr val="579858"/>
+    </a:accent1>
+    <a:accent2>
+      <a:srgbClr val="ED583E"/>
+    </a:accent2>
+    <a:accent3>
+      <a:srgbClr val="D3BA59"/>
+    </a:accent3>
+    <a:accent4>
+      <a:srgbClr val="4C94AC"/>
+    </a:accent4>
+    <a:accent5>
+      <a:srgbClr val="A09E84"/>
+    </a:accent5>
+    <a:accent6>
+      <a:srgbClr val="FC7D4A"/>
+    </a:accent6>
+    <a:hlink>
+      <a:srgbClr val="04A2DA"/>
+    </a:hlink>
+    <a:folHlink>
+      <a:srgbClr val="808080"/>
+    </a:folHlink>
+  </a:clrScheme>
+</a:themeOverride>
+</file>
+
+<file path=ppt/theme/themeOverride10.xml><?xml version="1.0" encoding="utf-8"?>
+<a:themeOverride xmlns:a="http://schemas.openxmlformats.org/drawingml/2006/main">
+  <a:clrScheme name="Custom 40">
+    <a:dk1>
+      <a:sysClr val="windowText" lastClr="000000"/>
+    </a:dk1>
+    <a:lt1>
+      <a:sysClr val="window" lastClr="FFFFFF"/>
+    </a:lt1>
+    <a:dk2>
+      <a:srgbClr val="545D57"/>
+    </a:dk2>
+    <a:lt2>
+      <a:srgbClr val="EBEBE8"/>
+    </a:lt2>
+    <a:accent1>
+      <a:srgbClr val="579858"/>
+    </a:accent1>
+    <a:accent2>
+      <a:srgbClr val="ED583E"/>
+    </a:accent2>
+    <a:accent3>
+      <a:srgbClr val="D3BA59"/>
+    </a:accent3>
+    <a:accent4>
+      <a:srgbClr val="4C94AC"/>
+    </a:accent4>
+    <a:accent5>
+      <a:srgbClr val="A09E84"/>
+    </a:accent5>
+    <a:accent6>
+      <a:srgbClr val="FC7D4A"/>
+    </a:accent6>
+    <a:hlink>
+      <a:srgbClr val="04A2DA"/>
+    </a:hlink>
+    <a:folHlink>
+      <a:srgbClr val="808080"/>
+    </a:folHlink>
+  </a:clrScheme>
+</a:themeOverride>
+</file>
+
+<file path=ppt/theme/themeOverride11.xml><?xml version="1.0" encoding="utf-8"?>
 <a:themeOverride xmlns:a="http://schemas.openxmlformats.org/drawingml/2006/main">
   <a:clrScheme name="Custom 40">
     <a:dk1>
@@ -10586,4 +14164,133 @@
     </a:folHlink>
   </a:clrScheme>
 </a:themeOverride>
+</file>
+
+<file path=ppt/theme/themeOverride7.xml><?xml version="1.0" encoding="utf-8"?>
+<a:themeOverride xmlns:a="http://schemas.openxmlformats.org/drawingml/2006/main">
+  <a:clrScheme name="Custom 40">
+    <a:dk1>
+      <a:sysClr val="windowText" lastClr="000000"/>
+    </a:dk1>
+    <a:lt1>
+      <a:sysClr val="window" lastClr="FFFFFF"/>
+    </a:lt1>
+    <a:dk2>
+      <a:srgbClr val="545D57"/>
+    </a:dk2>
+    <a:lt2>
+      <a:srgbClr val="EBEBE8"/>
+    </a:lt2>
+    <a:accent1>
+      <a:srgbClr val="579858"/>
+    </a:accent1>
+    <a:accent2>
+      <a:srgbClr val="ED583E"/>
+    </a:accent2>
+    <a:accent3>
+      <a:srgbClr val="D3BA59"/>
+    </a:accent3>
+    <a:accent4>
+      <a:srgbClr val="4C94AC"/>
+    </a:accent4>
+    <a:accent5>
+      <a:srgbClr val="A09E84"/>
+    </a:accent5>
+    <a:accent6>
+      <a:srgbClr val="FC7D4A"/>
+    </a:accent6>
+    <a:hlink>
+      <a:srgbClr val="04A2DA"/>
+    </a:hlink>
+    <a:folHlink>
+      <a:srgbClr val="808080"/>
+    </a:folHlink>
+  </a:clrScheme>
+</a:themeOverride>
+</file>
+
+<file path=ppt/theme/themeOverride8.xml><?xml version="1.0" encoding="utf-8"?>
+<a:themeOverride xmlns:a="http://schemas.openxmlformats.org/drawingml/2006/main">
+  <a:clrScheme name="Custom 40">
+    <a:dk1>
+      <a:sysClr val="windowText" lastClr="000000"/>
+    </a:dk1>
+    <a:lt1>
+      <a:sysClr val="window" lastClr="FFFFFF"/>
+    </a:lt1>
+    <a:dk2>
+      <a:srgbClr val="545D57"/>
+    </a:dk2>
+    <a:lt2>
+      <a:srgbClr val="EBEBE8"/>
+    </a:lt2>
+    <a:accent1>
+      <a:srgbClr val="579858"/>
+    </a:accent1>
+    <a:accent2>
+      <a:srgbClr val="ED583E"/>
+    </a:accent2>
+    <a:accent3>
+      <a:srgbClr val="D3BA59"/>
+    </a:accent3>
+    <a:accent4>
+      <a:srgbClr val="4C94AC"/>
+    </a:accent4>
+    <a:accent5>
+      <a:srgbClr val="A09E84"/>
+    </a:accent5>
+    <a:accent6>
+      <a:srgbClr val="FC7D4A"/>
+    </a:accent6>
+    <a:hlink>
+      <a:srgbClr val="04A2DA"/>
+    </a:hlink>
+    <a:folHlink>
+      <a:srgbClr val="808080"/>
+    </a:folHlink>
+  </a:clrScheme>
+</a:themeOverride>
+</file>
+
+<file path=ppt/theme/themeOverride9.xml><?xml version="1.0" encoding="utf-8"?>
+<a:themeOverride xmlns:a="http://schemas.openxmlformats.org/drawingml/2006/main">
+  <a:clrScheme name="Custom 40">
+    <a:dk1>
+      <a:sysClr val="windowText" lastClr="000000"/>
+    </a:dk1>
+    <a:lt1>
+      <a:sysClr val="window" lastClr="FFFFFF"/>
+    </a:lt1>
+    <a:dk2>
+      <a:srgbClr val="545D57"/>
+    </a:dk2>
+    <a:lt2>
+      <a:srgbClr val="EBEBE8"/>
+    </a:lt2>
+    <a:accent1>
+      <a:srgbClr val="579858"/>
+    </a:accent1>
+    <a:accent2>
+      <a:srgbClr val="ED583E"/>
+    </a:accent2>
+    <a:accent3>
+      <a:srgbClr val="D3BA59"/>
+    </a:accent3>
+    <a:accent4>
+      <a:srgbClr val="4C94AC"/>
+    </a:accent4>
+    <a:accent5>
+      <a:srgbClr val="A09E84"/>
+    </a:accent5>
+    <a:accent6>
+      <a:srgbClr val="FC7D4A"/>
+    </a:accent6>
+    <a:hlink>
+      <a:srgbClr val="04A2DA"/>
+    </a:hlink>
+    <a:folHlink>
+      <a:srgbClr val="808080"/>
+    </a:folHlink>
+  </a:clrScheme>
+</a:themeOverride>
 </file>
</xml_diff>

<commit_message>
added deap learning to report
</commit_message>
<xml_diff>
--- a/report/report.pptx
+++ b/report/report.pptx
@@ -31,8 +31,13 @@
     <p:sldId id="285" r:id="rId25"/>
     <p:sldId id="273" r:id="rId26"/>
     <p:sldId id="274" r:id="rId27"/>
-    <p:sldId id="286" r:id="rId28"/>
-    <p:sldId id="287" r:id="rId29"/>
+    <p:sldId id="288" r:id="rId28"/>
+    <p:sldId id="289" r:id="rId29"/>
+    <p:sldId id="291" r:id="rId30"/>
+    <p:sldId id="292" r:id="rId31"/>
+    <p:sldId id="290" r:id="rId32"/>
+    <p:sldId id="286" r:id="rId33"/>
+    <p:sldId id="287" r:id="rId34"/>
   </p:sldIdLst>
   <p:sldSz cx="12192000" cy="6858000"/>
   <p:notesSz cx="6858000" cy="9144000"/>
@@ -288,7 +293,7 @@
           <a:p>
             <a:fld id="{3C2B07E4-CDF9-4C88-A2F3-04620E58224D}" type="datetimeFigureOut">
               <a:rPr lang="en-US" smtClean="0"/>
-              <a:t>11/15/2021</a:t>
+              <a:t>11/16/2021</a:t>
             </a:fld>
             <a:endParaRPr lang="en-US"/>
           </a:p>
@@ -578,7 +583,7 @@
           <a:p>
             <a:fld id="{3C2B07E4-CDF9-4C88-A2F3-04620E58224D}" type="datetimeFigureOut">
               <a:rPr lang="en-US" smtClean="0"/>
-              <a:t>11/15/2021</a:t>
+              <a:t>11/16/2021</a:t>
             </a:fld>
             <a:endParaRPr lang="en-US"/>
           </a:p>
@@ -830,7 +835,7 @@
           <a:p>
             <a:fld id="{3C2B07E4-CDF9-4C88-A2F3-04620E58224D}" type="datetimeFigureOut">
               <a:rPr lang="en-US" smtClean="0"/>
-              <a:t>11/15/2021</a:t>
+              <a:t>11/16/2021</a:t>
             </a:fld>
             <a:endParaRPr lang="en-US"/>
           </a:p>
@@ -1018,7 +1023,7 @@
           <a:p>
             <a:fld id="{AA302EFC-ED59-4B4D-993E-400BC651A785}" type="datetime1">
               <a:rPr lang="en-US" smtClean="0"/>
-              <a:t>11/15/2021</a:t>
+              <a:t>11/16/2021</a:t>
             </a:fld>
             <a:endParaRPr lang="en-US" dirty="0"/>
           </a:p>
@@ -1210,7 +1215,7 @@
           <a:p>
             <a:fld id="{1067E7C5-37BF-4B94-8AB4-87E727052233}" type="datetime1">
               <a:rPr lang="en-US" smtClean="0"/>
-              <a:t>11/15/2021</a:t>
+              <a:t>11/16/2021</a:t>
             </a:fld>
             <a:endParaRPr lang="en-US" dirty="0"/>
           </a:p>
@@ -1402,7 +1407,7 @@
           <a:p>
             <a:fld id="{7B3F78A3-FD76-4F63-AF81-1396C1841E9C}" type="datetime1">
               <a:rPr lang="en-US" smtClean="0"/>
-              <a:t>11/15/2021</a:t>
+              <a:t>11/16/2021</a:t>
             </a:fld>
             <a:endParaRPr lang="en-US" dirty="0"/>
           </a:p>
@@ -1658,7 +1663,7 @@
           <a:p>
             <a:fld id="{3C2B07E4-CDF9-4C88-A2F3-04620E58224D}" type="datetimeFigureOut">
               <a:rPr lang="en-US" smtClean="0"/>
-              <a:t>11/15/2021</a:t>
+              <a:t>11/16/2021</a:t>
             </a:fld>
             <a:endParaRPr lang="en-US"/>
           </a:p>
@@ -1987,7 +1992,7 @@
           <a:p>
             <a:fld id="{3C2B07E4-CDF9-4C88-A2F3-04620E58224D}" type="datetimeFigureOut">
               <a:rPr lang="en-US" smtClean="0"/>
-              <a:t>11/15/2021</a:t>
+              <a:t>11/16/2021</a:t>
             </a:fld>
             <a:endParaRPr lang="en-US"/>
           </a:p>
@@ -2337,7 +2342,7 @@
           <a:p>
             <a:fld id="{3C2B07E4-CDF9-4C88-A2F3-04620E58224D}" type="datetimeFigureOut">
               <a:rPr lang="en-US" smtClean="0"/>
-              <a:t>11/15/2021</a:t>
+              <a:t>11/16/2021</a:t>
             </a:fld>
             <a:endParaRPr lang="en-US"/>
           </a:p>
@@ -2849,7 +2854,7 @@
           <a:p>
             <a:fld id="{3C2B07E4-CDF9-4C88-A2F3-04620E58224D}" type="datetimeFigureOut">
               <a:rPr lang="en-US" smtClean="0"/>
-              <a:t>11/15/2021</a:t>
+              <a:t>11/16/2021</a:t>
             </a:fld>
             <a:endParaRPr lang="en-US"/>
           </a:p>
@@ -3177,7 +3182,7 @@
           <a:p>
             <a:fld id="{3C2B07E4-CDF9-4C88-A2F3-04620E58224D}" type="datetimeFigureOut">
               <a:rPr lang="en-US" smtClean="0"/>
-              <a:t>11/15/2021</a:t>
+              <a:t>11/16/2021</a:t>
             </a:fld>
             <a:endParaRPr lang="en-US"/>
           </a:p>
@@ -3290,7 +3295,7 @@
           <a:p>
             <a:fld id="{3C2B07E4-CDF9-4C88-A2F3-04620E58224D}" type="datetimeFigureOut">
               <a:rPr lang="en-US" smtClean="0"/>
-              <a:t>11/15/2021</a:t>
+              <a:t>11/16/2021</a:t>
             </a:fld>
             <a:endParaRPr lang="en-US"/>
           </a:p>
@@ -3631,7 +3636,7 @@
           <a:p>
             <a:fld id="{3C2B07E4-CDF9-4C88-A2F3-04620E58224D}" type="datetimeFigureOut">
               <a:rPr lang="en-US" smtClean="0"/>
-              <a:t>11/15/2021</a:t>
+              <a:t>11/16/2021</a:t>
             </a:fld>
             <a:endParaRPr lang="en-US"/>
           </a:p>
@@ -3931,7 +3936,7 @@
           <a:p>
             <a:fld id="{3C2B07E4-CDF9-4C88-A2F3-04620E58224D}" type="datetimeFigureOut">
               <a:rPr lang="en-US" smtClean="0"/>
-              <a:t>11/15/2021</a:t>
+              <a:t>11/16/2021</a:t>
             </a:fld>
             <a:endParaRPr lang="en-US"/>
           </a:p>
@@ -4171,7 +4176,7 @@
             <a:fld id="{3C2B07E4-CDF9-4C88-A2F3-04620E58224D}" type="datetimeFigureOut">
               <a:rPr lang="en-US" smtClean="0"/>
               <a:pPr/>
-              <a:t>11/15/2021</a:t>
+              <a:t>11/16/2021</a:t>
             </a:fld>
             <a:endParaRPr lang="en-US" dirty="0"/>
           </a:p>
@@ -4770,7 +4775,7 @@
           <a:p>
             <a:fld id="{30B9AB43-16D5-496C-92E2-DD88A4837C90}" type="datetime1">
               <a:rPr lang="en-US" smtClean="0"/>
-              <a:t>11/15/2021</a:t>
+              <a:t>11/16/2021</a:t>
             </a:fld>
             <a:endParaRPr lang="en-US" dirty="0"/>
           </a:p>
@@ -5464,7 +5469,7 @@
           <a:p>
             <a:fld id="{2983D189-BC30-430F-BBBC-47FE85CCFEB3}" type="datetime1">
               <a:rPr lang="en-US" smtClean="0"/>
-              <a:t>11/15/2021</a:t>
+              <a:t>11/16/2021</a:t>
             </a:fld>
             <a:endParaRPr lang="en-US" dirty="0"/>
           </a:p>
@@ -6158,7 +6163,7 @@
           <a:p>
             <a:fld id="{E5E1D892-C2A9-4E2A-B7C0-5932B657ED52}" type="datetime1">
               <a:rPr lang="en-US" smtClean="0"/>
-              <a:t>11/15/2021</a:t>
+              <a:t>11/16/2021</a:t>
             </a:fld>
             <a:endParaRPr lang="en-US" dirty="0"/>
           </a:p>
@@ -15548,12 +15553,12 @@
           <a:chExt cx="0" cy="0"/>
         </a:xfrm>
       </p:grpSpPr>
-      <p:sp>
-        <p:nvSpPr>
-          <p:cNvPr id="54" name="Rectangle 53">
-            <a:extLst>
-              <a:ext uri="{FF2B5EF4-FFF2-40B4-BE49-F238E27FC236}">
-                <a16:creationId xmlns:a16="http://schemas.microsoft.com/office/drawing/2014/main" id="{39E3965E-AC41-4711-9D10-E25ABB132D86}"/>
+      <p:sp useBgFill="1">
+        <p:nvSpPr>
+          <p:cNvPr id="20" name="Rectangle 19">
+            <a:extLst>
+              <a:ext uri="{FF2B5EF4-FFF2-40B4-BE49-F238E27FC236}">
+                <a16:creationId xmlns:a16="http://schemas.microsoft.com/office/drawing/2014/main" id="{13BCCAE5-A35B-4B66-A4A7-E23C34A403A4}"/>
               </a:ext>
               <a:ext uri="{C183D7F6-B498-43B3-948B-1728B52AA6E4}">
                 <adec:decorative xmlns:adec="http://schemas.microsoft.com/office/drawing/2017/decorative" val="1"/>
@@ -15573,15 +15578,12 @@
         </p:nvSpPr>
         <p:spPr>
           <a:xfrm>
-            <a:off x="3175" y="6400800"/>
-            <a:ext cx="12188825" cy="457200"/>
+            <a:off x="0" y="0"/>
+            <a:ext cx="12192000" cy="6858000"/>
           </a:xfrm>
           <a:prstGeom prst="rect">
             <a:avLst/>
           </a:prstGeom>
-          <a:solidFill>
-            <a:srgbClr val="262626"/>
-          </a:solidFill>
           <a:ln>
             <a:noFill/>
           </a:ln>
@@ -15602,13 +15604,56 @@
             <a:schemeClr val="lt1"/>
           </a:fontRef>
         </p:style>
+        <p:txBody>
+          <a:bodyPr rtlCol="0" anchor="ctr"/>
+          <a:lstStyle/>
+          <a:p>
+            <a:pPr algn="ctr"/>
+            <a:endParaRPr lang="en-US"/>
+          </a:p>
+        </p:txBody>
+      </p:sp>
+      <p:sp>
+        <p:nvSpPr>
+          <p:cNvPr id="2" name="Title 1">
+            <a:extLst>
+              <a:ext uri="{FF2B5EF4-FFF2-40B4-BE49-F238E27FC236}">
+                <a16:creationId xmlns:a16="http://schemas.microsoft.com/office/drawing/2014/main" id="{66A47F5C-50EC-416A-AE8C-6F6BB4225673}"/>
+              </a:ext>
+            </a:extLst>
+          </p:cNvPr>
+          <p:cNvSpPr>
+            <a:spLocks noGrp="1"/>
+          </p:cNvSpPr>
+          <p:nvPr>
+            <p:ph type="title"/>
+          </p:nvPr>
+        </p:nvSpPr>
+        <p:spPr>
+          <a:xfrm>
+            <a:off x="1097280" y="286603"/>
+            <a:ext cx="10058400" cy="1450757"/>
+          </a:xfrm>
+        </p:spPr>
+        <p:txBody>
+          <a:bodyPr>
+            <a:normAutofit/>
+          </a:bodyPr>
+          <a:lstStyle/>
+          <a:p>
+            <a:r>
+              <a:rPr lang="en-US" sz="4400" b="1" dirty="0"/>
+              <a:t>Visual embeddings</a:t>
+            </a:r>
+          </a:p>
+        </p:txBody>
       </p:sp>
       <p:cxnSp>
         <p:nvCxnSpPr>
-          <p:cNvPr id="56" name="Straight Connector 55">
-            <a:extLst>
-              <a:ext uri="{FF2B5EF4-FFF2-40B4-BE49-F238E27FC236}">
-                <a16:creationId xmlns:a16="http://schemas.microsoft.com/office/drawing/2014/main" id="{1F5DC8C3-BA5F-4EED-BB9A-A14272BD82A1}"/>
+          <p:cNvPr id="22" name="Straight Connector 21">
+            <a:extLst>
+              <a:ext uri="{FF2B5EF4-FFF2-40B4-BE49-F238E27FC236}">
+                <a16:creationId xmlns:a16="http://schemas.microsoft.com/office/drawing/2014/main" id="{6987BDFB-DE64-4B56-B44F-45FAE19FA94E}"/>
               </a:ext>
               <a:ext uri="{C183D7F6-B498-43B3-948B-1728B52AA6E4}">
                 <adec:decorative xmlns:adec="http://schemas.microsoft.com/office/drawing/2017/decorative" val="1"/>
@@ -15628,8 +15673,8 @@
         </p:nvCxnSpPr>
         <p:spPr>
           <a:xfrm>
-            <a:off x="1207658" y="4474741"/>
-            <a:ext cx="9875520" cy="0"/>
+            <a:off x="1193532" y="1895846"/>
+            <a:ext cx="9966960" cy="0"/>
           </a:xfrm>
           <a:prstGeom prst="line">
             <a:avLst/>
@@ -15658,170 +15703,174 @@
           </a:fontRef>
         </p:style>
       </p:cxnSp>
-      <p:sp useBgFill="1">
-        <p:nvSpPr>
-          <p:cNvPr id="58" name="Rectangle 57">
-            <a:extLst>
-              <a:ext uri="{FF2B5EF4-FFF2-40B4-BE49-F238E27FC236}">
-                <a16:creationId xmlns:a16="http://schemas.microsoft.com/office/drawing/2014/main" id="{8C6E698C-8155-4B8B-BDC9-B7299772B509}"/>
-              </a:ext>
-              <a:ext uri="{C183D7F6-B498-43B3-948B-1728B52AA6E4}">
-                <adec:decorative xmlns:adec="http://schemas.microsoft.com/office/drawing/2017/decorative" val="1"/>
-              </a:ext>
-            </a:extLst>
-          </p:cNvPr>
-          <p:cNvSpPr>
-            <a:spLocks noGrp="1" noRot="1" noChangeAspect="1" noMove="1" noResize="1" noEditPoints="1" noAdjustHandles="1" noChangeArrowheads="1" noChangeShapeType="1" noTextEdit="1"/>
-          </p:cNvSpPr>
-          <p:nvPr>
-            <p:extLst>
-              <p:ext uri="{386F3935-93C4-4BCD-93E2-E3B085C9AB24}">
-                <p16:designElem xmlns:p16="http://schemas.microsoft.com/office/powerpoint/2015/main" val="1"/>
-              </p:ext>
-            </p:extLst>
+      <p:sp>
+        <p:nvSpPr>
+          <p:cNvPr id="4" name="Content Placeholder 3">
+            <a:extLst>
+              <a:ext uri="{FF2B5EF4-FFF2-40B4-BE49-F238E27FC236}">
+                <a16:creationId xmlns:a16="http://schemas.microsoft.com/office/drawing/2014/main" id="{092F726A-2FB9-4103-87F4-2B00BFC07CCB}"/>
+              </a:ext>
+            </a:extLst>
+          </p:cNvPr>
+          <p:cNvSpPr>
+            <a:spLocks noGrp="1"/>
+          </p:cNvSpPr>
+          <p:nvPr>
+            <p:ph idx="1"/>
           </p:nvPr>
         </p:nvSpPr>
         <p:spPr>
           <a:xfrm>
-            <a:off x="0" y="0"/>
-            <a:ext cx="12188952" cy="6858000"/>
-          </a:xfrm>
-          <a:prstGeom prst="rect">
-            <a:avLst/>
-          </a:prstGeom>
-          <a:ln>
-            <a:noFill/>
-          </a:ln>
-        </p:spPr>
-        <p:style>
-          <a:lnRef idx="2">
-            <a:schemeClr val="accent1">
-              <a:shade val="50000"/>
-            </a:schemeClr>
-          </a:lnRef>
-          <a:fillRef idx="1">
-            <a:schemeClr val="accent1"/>
-          </a:fillRef>
-          <a:effectRef idx="0">
-            <a:schemeClr val="accent1"/>
-          </a:effectRef>
-          <a:fontRef idx="minor">
-            <a:schemeClr val="lt1"/>
-          </a:fontRef>
-        </p:style>
-        <p:txBody>
-          <a:bodyPr rtlCol="0" anchor="ctr"/>
-          <a:lstStyle/>
-          <a:p>
-            <a:pPr algn="ctr"/>
-            <a:endParaRPr lang="en-US"/>
-          </a:p>
-        </p:txBody>
-      </p:sp>
-      <p:sp>
-        <p:nvSpPr>
-          <p:cNvPr id="2" name="Title 1">
-            <a:extLst>
-              <a:ext uri="{FF2B5EF4-FFF2-40B4-BE49-F238E27FC236}">
-                <a16:creationId xmlns:a16="http://schemas.microsoft.com/office/drawing/2014/main" id="{66A47F5C-50EC-416A-AE8C-6F6BB4225673}"/>
-              </a:ext>
-            </a:extLst>
-          </p:cNvPr>
-          <p:cNvSpPr>
-            <a:spLocks noGrp="1"/>
-          </p:cNvSpPr>
-          <p:nvPr>
-            <p:ph type="title"/>
-          </p:nvPr>
-        </p:nvSpPr>
-        <p:spPr>
-          <a:xfrm>
-            <a:off x="965201" y="772731"/>
-            <a:ext cx="6255026" cy="5054008"/>
+            <a:off x="1097280" y="2056996"/>
+            <a:ext cx="10058400" cy="4199836"/>
           </a:xfrm>
         </p:spPr>
         <p:txBody>
-          <a:bodyPr vert="horz" lIns="91440" tIns="45720" rIns="91440" bIns="45720" rtlCol="0" anchor="ctr">
-            <a:normAutofit/>
+          <a:bodyPr>
+            <a:noAutofit/>
           </a:bodyPr>
           <a:lstStyle/>
           <a:p>
-            <a:pPr algn="r"/>
-            <a:r>
-              <a:rPr lang="en-US" sz="6000" dirty="0">
-                <a:solidFill>
-                  <a:schemeClr val="tx1">
-                    <a:lumMod val="85000"/>
-                    <a:lumOff val="15000"/>
-                  </a:schemeClr>
-                </a:solidFill>
-              </a:rPr>
-              <a:t>RESULTS</a:t>
+            <a:pPr marL="201168" lvl="1" indent="0">
+              <a:buNone/>
+            </a:pPr>
+            <a:r>
+              <a:rPr lang="en-US" sz="1600" dirty="0"/>
+              <a:t>Contrary to machine learning, in deep learning we don’t have to handcraft features. </a:t>
+            </a:r>
+            <a:r>
+              <a:rPr lang="en-US" sz="1600" b="1" dirty="0"/>
+              <a:t>The feature extraction is performed by the deep learning models</a:t>
+            </a:r>
+            <a:r>
+              <a:rPr lang="en-US" sz="1600" dirty="0"/>
+              <a:t>. Deep neural models learn high-level features in the hidden layers. </a:t>
+            </a:r>
+          </a:p>
+          <a:p>
+            <a:pPr lvl="2">
+              <a:buFont typeface="Arial" panose="020B0604020202020204" pitchFamily="34" charset="0"/>
+              <a:buChar char="•"/>
+            </a:pPr>
+            <a:r>
+              <a:rPr lang="en-US" dirty="0"/>
+              <a:t>First, the image goes through many convolutional layers. </a:t>
+            </a:r>
+          </a:p>
+          <a:p>
+            <a:pPr lvl="2">
+              <a:buFont typeface="Arial" panose="020B0604020202020204" pitchFamily="34" charset="0"/>
+              <a:buChar char="•"/>
+            </a:pPr>
+            <a:r>
+              <a:rPr lang="en-US" dirty="0"/>
+              <a:t>In those convolutional layers, the network learns new and increasingly </a:t>
+            </a:r>
+            <a:r>
+              <a:rPr lang="en-US" b="1" dirty="0"/>
+              <a:t>complex features </a:t>
+            </a:r>
+            <a:r>
+              <a:rPr lang="en-US" dirty="0"/>
+              <a:t>in its layers. </a:t>
+            </a:r>
+          </a:p>
+          <a:p>
+            <a:pPr lvl="2">
+              <a:buFont typeface="Arial" panose="020B0604020202020204" pitchFamily="34" charset="0"/>
+              <a:buChar char="•"/>
+            </a:pPr>
+            <a:r>
+              <a:rPr lang="en-US" dirty="0"/>
+              <a:t>Then the transformed image information goes through the fully connected layers and turns into a classification or prediction. </a:t>
+            </a:r>
+          </a:p>
+          <a:p>
+            <a:pPr marL="201168" lvl="1" indent="0">
+              <a:buNone/>
+            </a:pPr>
+            <a:endParaRPr lang="en-US" sz="800" dirty="0"/>
+          </a:p>
+          <a:p>
+            <a:pPr marL="201168" lvl="1" indent="0">
+              <a:buNone/>
+            </a:pPr>
+            <a:r>
+              <a:rPr lang="en-US" sz="1600" dirty="0"/>
+              <a:t>The extracted features from the deep learning models we have utilized, are the visual embeddings. </a:t>
+            </a:r>
+            <a:r>
+              <a:rPr lang="en-US" sz="1600" b="1" dirty="0"/>
+              <a:t>Visual embeddings</a:t>
+            </a:r>
+            <a:r>
+              <a:rPr lang="en-US" sz="1600" dirty="0"/>
+              <a:t> refers to the collection of features of the last fully connected layer (prior to a loss layer) appended to a CNN. </a:t>
+            </a:r>
+          </a:p>
+          <a:p>
+            <a:pPr lvl="2">
+              <a:buFont typeface="Arial" panose="020B0604020202020204" pitchFamily="34" charset="0"/>
+              <a:buChar char="•"/>
+            </a:pPr>
+            <a:r>
+              <a:rPr lang="en-US" dirty="0"/>
+              <a:t>The size of this fully connected layer determines the dimension of the embedding vector space</a:t>
+            </a:r>
+            <a:r>
+              <a:rPr lang="en-US" sz="1200" dirty="0"/>
+              <a:t>.</a:t>
+            </a:r>
+            <a:endParaRPr lang="en-US" sz="1600" dirty="0"/>
+          </a:p>
+          <a:p>
+            <a:pPr marL="201168" lvl="1" indent="0">
+              <a:buNone/>
+            </a:pPr>
+            <a:r>
+              <a:rPr lang="en-US" sz="1600" dirty="0"/>
+              <a:t>The visual embeddings are learned by jointly training the feature extractor with the embedding layer and the classifier (next slides describe the methods we used to tune and train deep learning models). We register a </a:t>
+            </a:r>
+            <a:r>
+              <a:rPr lang="en-US" sz="1600" b="1" dirty="0"/>
+              <a:t>forward hook </a:t>
+            </a:r>
+            <a:r>
+              <a:rPr lang="en-US" sz="1600" dirty="0"/>
+              <a:t>to our deep learning models, so that we can access this vector space (features) and utilize them for retrieval later.</a:t>
+            </a:r>
+          </a:p>
+          <a:p>
+            <a:pPr marL="201168" lvl="1" indent="0">
+              <a:buNone/>
+            </a:pPr>
+            <a:endParaRPr lang="en-US" sz="800" dirty="0"/>
+          </a:p>
+          <a:p>
+            <a:pPr marL="201168" lvl="1" indent="0">
+              <a:buNone/>
+            </a:pPr>
+            <a:r>
+              <a:rPr lang="en-US" sz="1600" dirty="0"/>
+              <a:t>Finally, since Elasticsearch can only handle vectors with maximum size of 2048, we </a:t>
+            </a:r>
+            <a:r>
+              <a:rPr lang="en-US" sz="1600" b="1" dirty="0"/>
+              <a:t>apply dimensionality reduction with Principal Component Analysis (PCA) and reduce the size of the visual embeddings to 2000 features</a:t>
+            </a:r>
+            <a:r>
+              <a:rPr lang="en-US" sz="1600" dirty="0"/>
+              <a:t>.</a:t>
             </a:r>
           </a:p>
         </p:txBody>
       </p:sp>
-      <p:cxnSp>
-        <p:nvCxnSpPr>
-          <p:cNvPr id="60" name="Straight Connector 59">
-            <a:extLst>
-              <a:ext uri="{FF2B5EF4-FFF2-40B4-BE49-F238E27FC236}">
-                <a16:creationId xmlns:a16="http://schemas.microsoft.com/office/drawing/2014/main" id="{09525C9A-1972-4836-BA7A-706C946EF4DA}"/>
-              </a:ext>
-              <a:ext uri="{C183D7F6-B498-43B3-948B-1728B52AA6E4}">
-                <adec:decorative xmlns:adec="http://schemas.microsoft.com/office/drawing/2017/decorative" val="1"/>
-              </a:ext>
-            </a:extLst>
-          </p:cNvPr>
-          <p:cNvCxnSpPr>
-            <a:cxnSpLocks noGrp="1" noRot="1" noChangeAspect="1" noMove="1" noResize="1" noEditPoints="1" noAdjustHandles="1" noChangeArrowheads="1" noChangeShapeType="1"/>
-          </p:cNvCxnSpPr>
-          <p:nvPr>
-            <p:extLst>
-              <p:ext uri="{386F3935-93C4-4BCD-93E2-E3B085C9AB24}">
-                <p16:designElem xmlns:p16="http://schemas.microsoft.com/office/powerpoint/2015/main" val="1"/>
-              </p:ext>
-            </p:extLst>
-          </p:nvPr>
-        </p:nvCxnSpPr>
-        <p:spPr>
-          <a:xfrm>
-            <a:off x="7534656" y="1520631"/>
-            <a:ext cx="0" cy="3558208"/>
-          </a:xfrm>
-          <a:prstGeom prst="line">
-            <a:avLst/>
-          </a:prstGeom>
-          <a:ln>
-            <a:solidFill>
-              <a:schemeClr val="tx1">
-                <a:lumMod val="75000"/>
-                <a:lumOff val="25000"/>
-              </a:schemeClr>
-            </a:solidFill>
-          </a:ln>
-        </p:spPr>
-        <p:style>
-          <a:lnRef idx="1">
-            <a:schemeClr val="accent1"/>
-          </a:lnRef>
-          <a:fillRef idx="0">
-            <a:schemeClr val="accent1"/>
-          </a:fillRef>
-          <a:effectRef idx="0">
-            <a:schemeClr val="accent1"/>
-          </a:effectRef>
-          <a:fontRef idx="minor">
-            <a:schemeClr val="tx1"/>
-          </a:fontRef>
-        </p:style>
-      </p:cxnSp>
       <p:sp>
         <p:nvSpPr>
-          <p:cNvPr id="62" name="Rectangle 61">
-            <a:extLst>
-              <a:ext uri="{FF2B5EF4-FFF2-40B4-BE49-F238E27FC236}">
-                <a16:creationId xmlns:a16="http://schemas.microsoft.com/office/drawing/2014/main" id="{8D60EC1B-554F-47EF-839A-BAAD858F6666}"/>
+          <p:cNvPr id="24" name="Rectangle 23">
+            <a:extLst>
+              <a:ext uri="{FF2B5EF4-FFF2-40B4-BE49-F238E27FC236}">
+                <a16:creationId xmlns:a16="http://schemas.microsoft.com/office/drawing/2014/main" id="{CB06839E-D8C3-4A74-BA2B-3B97E7B2CDB5}"/>
               </a:ext>
               <a:ext uri="{C183D7F6-B498-43B3-948B-1728B52AA6E4}">
                 <adec:decorative xmlns:adec="http://schemas.microsoft.com/office/drawing/2017/decorative" val="1"/>
@@ -15876,7 +15925,7 @@
           <p:cNvPr id="3" name="Slide Number Placeholder 2">
             <a:extLst>
               <a:ext uri="{FF2B5EF4-FFF2-40B4-BE49-F238E27FC236}">
-                <a16:creationId xmlns:a16="http://schemas.microsoft.com/office/drawing/2014/main" id="{D5318DF9-6CD7-4F76-9F67-1A91D459F5FD}"/>
+                <a16:creationId xmlns:a16="http://schemas.microsoft.com/office/drawing/2014/main" id="{1CA2F287-50CE-458A-9441-96E48DE47F01}"/>
               </a:ext>
             </a:extLst>
           </p:cNvPr>
@@ -15902,10 +15951,10 @@
       </p:sp>
       <p:sp>
         <p:nvSpPr>
-          <p:cNvPr id="4" name="Footer Placeholder 3">
-            <a:extLst>
-              <a:ext uri="{FF2B5EF4-FFF2-40B4-BE49-F238E27FC236}">
-                <a16:creationId xmlns:a16="http://schemas.microsoft.com/office/drawing/2014/main" id="{DDA22EAD-E2F0-45B9-951B-756FF177C4EC}"/>
+          <p:cNvPr id="5" name="Footer Placeholder 4">
+            <a:extLst>
+              <a:ext uri="{FF2B5EF4-FFF2-40B4-BE49-F238E27FC236}">
+                <a16:creationId xmlns:a16="http://schemas.microsoft.com/office/drawing/2014/main" id="{1439A401-9E11-45E1-9C6E-464865B40886}"/>
               </a:ext>
             </a:extLst>
           </p:cNvPr>
@@ -15932,7 +15981,7 @@
     </p:spTree>
     <p:extLst>
       <p:ext uri="{BB962C8B-B14F-4D97-AF65-F5344CB8AC3E}">
-        <p14:creationId xmlns:p14="http://schemas.microsoft.com/office/powerpoint/2010/main" val="2250266801"/>
+        <p14:creationId xmlns:p14="http://schemas.microsoft.com/office/powerpoint/2010/main" val="2890385520"/>
       </p:ext>
     </p:extLst>
   </p:cSld>
@@ -15967,6 +16016,2741 @@
           <a:chExt cx="0" cy="0"/>
         </a:xfrm>
       </p:grpSpPr>
+      <p:sp useBgFill="1">
+        <p:nvSpPr>
+          <p:cNvPr id="20" name="Rectangle 19">
+            <a:extLst>
+              <a:ext uri="{FF2B5EF4-FFF2-40B4-BE49-F238E27FC236}">
+                <a16:creationId xmlns:a16="http://schemas.microsoft.com/office/drawing/2014/main" id="{13BCCAE5-A35B-4B66-A4A7-E23C34A403A4}"/>
+              </a:ext>
+              <a:ext uri="{C183D7F6-B498-43B3-948B-1728B52AA6E4}">
+                <adec:decorative xmlns:adec="http://schemas.microsoft.com/office/drawing/2017/decorative" val="1"/>
+              </a:ext>
+            </a:extLst>
+          </p:cNvPr>
+          <p:cNvSpPr>
+            <a:spLocks noGrp="1" noRot="1" noChangeAspect="1" noMove="1" noResize="1" noEditPoints="1" noAdjustHandles="1" noChangeArrowheads="1" noChangeShapeType="1" noTextEdit="1"/>
+          </p:cNvSpPr>
+          <p:nvPr>
+            <p:extLst>
+              <p:ext uri="{386F3935-93C4-4BCD-93E2-E3B085C9AB24}">
+                <p16:designElem xmlns:p16="http://schemas.microsoft.com/office/powerpoint/2015/main" val="1"/>
+              </p:ext>
+            </p:extLst>
+          </p:nvPr>
+        </p:nvSpPr>
+        <p:spPr>
+          <a:xfrm>
+            <a:off x="0" y="0"/>
+            <a:ext cx="12192000" cy="6858000"/>
+          </a:xfrm>
+          <a:prstGeom prst="rect">
+            <a:avLst/>
+          </a:prstGeom>
+          <a:ln>
+            <a:noFill/>
+          </a:ln>
+        </p:spPr>
+        <p:style>
+          <a:lnRef idx="2">
+            <a:schemeClr val="accent1">
+              <a:shade val="50000"/>
+            </a:schemeClr>
+          </a:lnRef>
+          <a:fillRef idx="1">
+            <a:schemeClr val="accent1"/>
+          </a:fillRef>
+          <a:effectRef idx="0">
+            <a:schemeClr val="accent1"/>
+          </a:effectRef>
+          <a:fontRef idx="minor">
+            <a:schemeClr val="lt1"/>
+          </a:fontRef>
+        </p:style>
+        <p:txBody>
+          <a:bodyPr rtlCol="0" anchor="ctr"/>
+          <a:lstStyle/>
+          <a:p>
+            <a:pPr algn="ctr"/>
+            <a:endParaRPr lang="en-US"/>
+          </a:p>
+        </p:txBody>
+      </p:sp>
+      <p:sp>
+        <p:nvSpPr>
+          <p:cNvPr id="2" name="Title 1">
+            <a:extLst>
+              <a:ext uri="{FF2B5EF4-FFF2-40B4-BE49-F238E27FC236}">
+                <a16:creationId xmlns:a16="http://schemas.microsoft.com/office/drawing/2014/main" id="{66A47F5C-50EC-416A-AE8C-6F6BB4225673}"/>
+              </a:ext>
+            </a:extLst>
+          </p:cNvPr>
+          <p:cNvSpPr>
+            <a:spLocks noGrp="1"/>
+          </p:cNvSpPr>
+          <p:nvPr>
+            <p:ph type="title"/>
+          </p:nvPr>
+        </p:nvSpPr>
+        <p:spPr>
+          <a:xfrm>
+            <a:off x="1097280" y="286603"/>
+            <a:ext cx="10058400" cy="1450757"/>
+          </a:xfrm>
+        </p:spPr>
+        <p:txBody>
+          <a:bodyPr>
+            <a:normAutofit/>
+          </a:bodyPr>
+          <a:lstStyle/>
+          <a:p>
+            <a:r>
+              <a:rPr lang="en-US" sz="4400" b="1" dirty="0"/>
+              <a:t>Deep Learning models</a:t>
+            </a:r>
+          </a:p>
+        </p:txBody>
+      </p:sp>
+      <p:cxnSp>
+        <p:nvCxnSpPr>
+          <p:cNvPr id="22" name="Straight Connector 21">
+            <a:extLst>
+              <a:ext uri="{FF2B5EF4-FFF2-40B4-BE49-F238E27FC236}">
+                <a16:creationId xmlns:a16="http://schemas.microsoft.com/office/drawing/2014/main" id="{6987BDFB-DE64-4B56-B44F-45FAE19FA94E}"/>
+              </a:ext>
+              <a:ext uri="{C183D7F6-B498-43B3-948B-1728B52AA6E4}">
+                <adec:decorative xmlns:adec="http://schemas.microsoft.com/office/drawing/2017/decorative" val="1"/>
+              </a:ext>
+            </a:extLst>
+          </p:cNvPr>
+          <p:cNvCxnSpPr>
+            <a:cxnSpLocks noGrp="1" noRot="1" noChangeAspect="1" noMove="1" noResize="1" noEditPoints="1" noAdjustHandles="1" noChangeArrowheads="1" noChangeShapeType="1"/>
+          </p:cNvCxnSpPr>
+          <p:nvPr>
+            <p:extLst>
+              <p:ext uri="{386F3935-93C4-4BCD-93E2-E3B085C9AB24}">
+                <p16:designElem xmlns:p16="http://schemas.microsoft.com/office/powerpoint/2015/main" val="1"/>
+              </p:ext>
+            </p:extLst>
+          </p:nvPr>
+        </p:nvCxnSpPr>
+        <p:spPr>
+          <a:xfrm>
+            <a:off x="1193532" y="1895846"/>
+            <a:ext cx="9966960" cy="0"/>
+          </a:xfrm>
+          <a:prstGeom prst="line">
+            <a:avLst/>
+          </a:prstGeom>
+          <a:ln w="12700">
+            <a:solidFill>
+              <a:schemeClr val="tx1">
+                <a:lumMod val="75000"/>
+                <a:lumOff val="25000"/>
+              </a:schemeClr>
+            </a:solidFill>
+          </a:ln>
+        </p:spPr>
+        <p:style>
+          <a:lnRef idx="1">
+            <a:schemeClr val="accent1"/>
+          </a:lnRef>
+          <a:fillRef idx="0">
+            <a:schemeClr val="accent1"/>
+          </a:fillRef>
+          <a:effectRef idx="0">
+            <a:schemeClr val="accent1"/>
+          </a:effectRef>
+          <a:fontRef idx="minor">
+            <a:schemeClr val="tx1"/>
+          </a:fontRef>
+        </p:style>
+      </p:cxnSp>
+      <p:sp>
+        <p:nvSpPr>
+          <p:cNvPr id="4" name="Content Placeholder 3">
+            <a:extLst>
+              <a:ext uri="{FF2B5EF4-FFF2-40B4-BE49-F238E27FC236}">
+                <a16:creationId xmlns:a16="http://schemas.microsoft.com/office/drawing/2014/main" id="{092F726A-2FB9-4103-87F4-2B00BFC07CCB}"/>
+              </a:ext>
+            </a:extLst>
+          </p:cNvPr>
+          <p:cNvSpPr>
+            <a:spLocks noGrp="1"/>
+          </p:cNvSpPr>
+          <p:nvPr>
+            <p:ph idx="1"/>
+          </p:nvPr>
+        </p:nvSpPr>
+        <p:spPr>
+          <a:xfrm>
+            <a:off x="1097280" y="2056996"/>
+            <a:ext cx="10058400" cy="4199836"/>
+          </a:xfrm>
+        </p:spPr>
+        <p:txBody>
+          <a:bodyPr>
+            <a:noAutofit/>
+          </a:bodyPr>
+          <a:lstStyle/>
+          <a:p>
+            <a:pPr marL="201168" lvl="1" indent="0">
+              <a:buNone/>
+            </a:pPr>
+            <a:r>
+              <a:rPr lang="en-US" sz="1600" dirty="0"/>
+              <a:t>The idea of this part is that </a:t>
+            </a:r>
+            <a:r>
+              <a:rPr lang="en-US" sz="1600" b="1" dirty="0"/>
+              <a:t>the final feature vector for each image will be a fusion of the visual embedding and the </a:t>
+            </a:r>
+            <a:r>
+              <a:rPr lang="en-US" sz="1600" b="1" u="sng" dirty="0"/>
+              <a:t>predicted</a:t>
+            </a:r>
+            <a:r>
+              <a:rPr lang="en-US" sz="1600" b="1" dirty="0"/>
+              <a:t> class one-hot vector.</a:t>
+            </a:r>
+          </a:p>
+          <a:p>
+            <a:pPr marL="201168" lvl="1" indent="0">
+              <a:buNone/>
+            </a:pPr>
+            <a:endParaRPr lang="en-US" sz="800" dirty="0"/>
+          </a:p>
+          <a:p>
+            <a:pPr marL="201168" lvl="1" indent="0">
+              <a:buNone/>
+            </a:pPr>
+            <a:r>
+              <a:rPr lang="en-US" sz="1600" dirty="0"/>
+              <a:t>Before passing the image data to the deep learning models (batch size 64) we apply some </a:t>
+            </a:r>
+            <a:r>
+              <a:rPr lang="en-US" sz="1600" b="1" dirty="0"/>
+              <a:t>transformations</a:t>
+            </a:r>
+            <a:r>
+              <a:rPr lang="en-US" sz="1600" dirty="0"/>
+              <a:t>: </a:t>
+            </a:r>
+          </a:p>
+          <a:p>
+            <a:pPr lvl="2">
+              <a:buFont typeface="Arial" panose="020B0604020202020204" pitchFamily="34" charset="0"/>
+              <a:buChar char="•"/>
+            </a:pPr>
+            <a:r>
+              <a:rPr lang="en-US" b="1" dirty="0"/>
+              <a:t>resizing</a:t>
+            </a:r>
+            <a:r>
+              <a:rPr lang="en-US" dirty="0"/>
+              <a:t>, </a:t>
+            </a:r>
+          </a:p>
+          <a:p>
+            <a:pPr lvl="2">
+              <a:buFont typeface="Arial" panose="020B0604020202020204" pitchFamily="34" charset="0"/>
+              <a:buChar char="•"/>
+            </a:pPr>
+            <a:r>
+              <a:rPr lang="en-US" b="1" dirty="0"/>
+              <a:t>center cropping </a:t>
+            </a:r>
+            <a:r>
+              <a:rPr lang="en-US" dirty="0"/>
+              <a:t>and </a:t>
+            </a:r>
+          </a:p>
+          <a:p>
+            <a:pPr lvl="2">
+              <a:buFont typeface="Arial" panose="020B0604020202020204" pitchFamily="34" charset="0"/>
+              <a:buChar char="•"/>
+            </a:pPr>
+            <a:r>
+              <a:rPr lang="en-US" b="1" dirty="0"/>
+              <a:t>normalization</a:t>
+            </a:r>
+            <a:r>
+              <a:rPr lang="en-US" dirty="0"/>
+              <a:t> using mean and standard deviation from ImageNet.</a:t>
+            </a:r>
+          </a:p>
+          <a:p>
+            <a:pPr marL="201168" lvl="1" indent="0">
+              <a:buNone/>
+            </a:pPr>
+            <a:endParaRPr lang="en-US" sz="800" dirty="0"/>
+          </a:p>
+          <a:p>
+            <a:pPr marL="201168" lvl="1" indent="0">
+              <a:buNone/>
+            </a:pPr>
+            <a:r>
+              <a:rPr lang="en-US" sz="1600" dirty="0"/>
+              <a:t>The models we have tested are the following:</a:t>
+            </a:r>
+          </a:p>
+          <a:p>
+            <a:pPr lvl="2">
+              <a:buFont typeface="Arial" panose="020B0604020202020204" pitchFamily="34" charset="0"/>
+              <a:buChar char="•"/>
+            </a:pPr>
+            <a:r>
+              <a:rPr lang="en-US" b="1" dirty="0"/>
+              <a:t>Neural Network,</a:t>
+            </a:r>
+          </a:p>
+          <a:p>
+            <a:pPr lvl="2">
+              <a:buFont typeface="Arial" panose="020B0604020202020204" pitchFamily="34" charset="0"/>
+              <a:buChar char="•"/>
+            </a:pPr>
+            <a:r>
+              <a:rPr lang="en-US" b="1" dirty="0"/>
+              <a:t>Convolutional Neural Network (custom),</a:t>
+            </a:r>
+          </a:p>
+          <a:p>
+            <a:pPr lvl="2">
+              <a:buFont typeface="Arial" panose="020B0604020202020204" pitchFamily="34" charset="0"/>
+              <a:buChar char="•"/>
+            </a:pPr>
+            <a:r>
+              <a:rPr lang="en-US" b="1" dirty="0" err="1"/>
+              <a:t>Alexnet</a:t>
+            </a:r>
+            <a:r>
+              <a:rPr lang="en-US" b="1" dirty="0"/>
+              <a:t>,</a:t>
+            </a:r>
+          </a:p>
+          <a:p>
+            <a:pPr lvl="2">
+              <a:buFont typeface="Arial" panose="020B0604020202020204" pitchFamily="34" charset="0"/>
+              <a:buChar char="•"/>
+            </a:pPr>
+            <a:r>
+              <a:rPr lang="en-US" b="1" dirty="0"/>
+              <a:t>VGG-16,</a:t>
+            </a:r>
+          </a:p>
+          <a:p>
+            <a:pPr lvl="2">
+              <a:buFont typeface="Arial" panose="020B0604020202020204" pitchFamily="34" charset="0"/>
+              <a:buChar char="•"/>
+            </a:pPr>
+            <a:r>
+              <a:rPr lang="en-US" b="1" dirty="0"/>
+              <a:t>Inception v1,</a:t>
+            </a:r>
+          </a:p>
+          <a:p>
+            <a:pPr lvl="2">
+              <a:buFont typeface="Arial" panose="020B0604020202020204" pitchFamily="34" charset="0"/>
+              <a:buChar char="•"/>
+            </a:pPr>
+            <a:r>
+              <a:rPr lang="en-US" b="1" dirty="0"/>
+              <a:t>ResNet-50.</a:t>
+            </a:r>
+          </a:p>
+          <a:p>
+            <a:pPr marL="201168" lvl="1" indent="0">
+              <a:buNone/>
+            </a:pPr>
+            <a:endParaRPr lang="en-US" sz="1600" dirty="0"/>
+          </a:p>
+        </p:txBody>
+      </p:sp>
+      <p:sp>
+        <p:nvSpPr>
+          <p:cNvPr id="24" name="Rectangle 23">
+            <a:extLst>
+              <a:ext uri="{FF2B5EF4-FFF2-40B4-BE49-F238E27FC236}">
+                <a16:creationId xmlns:a16="http://schemas.microsoft.com/office/drawing/2014/main" id="{CB06839E-D8C3-4A74-BA2B-3B97E7B2CDB5}"/>
+              </a:ext>
+              <a:ext uri="{C183D7F6-B498-43B3-948B-1728B52AA6E4}">
+                <adec:decorative xmlns:adec="http://schemas.microsoft.com/office/drawing/2017/decorative" val="1"/>
+              </a:ext>
+            </a:extLst>
+          </p:cNvPr>
+          <p:cNvSpPr>
+            <a:spLocks noGrp="1" noRot="1" noChangeAspect="1" noMove="1" noResize="1" noEditPoints="1" noAdjustHandles="1" noChangeArrowheads="1" noChangeShapeType="1" noTextEdit="1"/>
+          </p:cNvSpPr>
+          <p:nvPr>
+            <p:extLst>
+              <p:ext uri="{386F3935-93C4-4BCD-93E2-E3B085C9AB24}">
+                <p16:designElem xmlns:p16="http://schemas.microsoft.com/office/powerpoint/2015/main" val="1"/>
+              </p:ext>
+            </p:extLst>
+          </p:nvPr>
+        </p:nvSpPr>
+        <p:spPr>
+          <a:xfrm>
+            <a:off x="0" y="6400800"/>
+            <a:ext cx="12192000" cy="457200"/>
+          </a:xfrm>
+          <a:prstGeom prst="rect">
+            <a:avLst/>
+          </a:prstGeom>
+          <a:solidFill>
+            <a:srgbClr val="262626"/>
+          </a:solidFill>
+          <a:ln>
+            <a:noFill/>
+          </a:ln>
+        </p:spPr>
+        <p:style>
+          <a:lnRef idx="2">
+            <a:schemeClr val="accent1">
+              <a:shade val="50000"/>
+            </a:schemeClr>
+          </a:lnRef>
+          <a:fillRef idx="1">
+            <a:schemeClr val="accent1"/>
+          </a:fillRef>
+          <a:effectRef idx="0">
+            <a:schemeClr val="accent1"/>
+          </a:effectRef>
+          <a:fontRef idx="minor">
+            <a:schemeClr val="lt1"/>
+          </a:fontRef>
+        </p:style>
+      </p:sp>
+      <p:sp>
+        <p:nvSpPr>
+          <p:cNvPr id="3" name="Slide Number Placeholder 2">
+            <a:extLst>
+              <a:ext uri="{FF2B5EF4-FFF2-40B4-BE49-F238E27FC236}">
+                <a16:creationId xmlns:a16="http://schemas.microsoft.com/office/drawing/2014/main" id="{1CA2F287-50CE-458A-9441-96E48DE47F01}"/>
+              </a:ext>
+            </a:extLst>
+          </p:cNvPr>
+          <p:cNvSpPr>
+            <a:spLocks noGrp="1"/>
+          </p:cNvSpPr>
+          <p:nvPr>
+            <p:ph type="sldNum" sz="quarter" idx="12"/>
+          </p:nvPr>
+        </p:nvSpPr>
+        <p:spPr/>
+        <p:txBody>
+          <a:bodyPr/>
+          <a:lstStyle/>
+          <a:p>
+            <a:fld id="{3A98EE3D-8CD1-4C3F-BD1C-C98C9596463C}" type="slidenum">
+              <a:rPr lang="en-US" smtClean="0"/>
+              <a:t>25</a:t>
+            </a:fld>
+            <a:endParaRPr lang="en-US" dirty="0"/>
+          </a:p>
+        </p:txBody>
+      </p:sp>
+      <p:sp>
+        <p:nvSpPr>
+          <p:cNvPr id="5" name="Footer Placeholder 4">
+            <a:extLst>
+              <a:ext uri="{FF2B5EF4-FFF2-40B4-BE49-F238E27FC236}">
+                <a16:creationId xmlns:a16="http://schemas.microsoft.com/office/drawing/2014/main" id="{1439A401-9E11-45E1-9C6E-464865B40886}"/>
+              </a:ext>
+            </a:extLst>
+          </p:cNvPr>
+          <p:cNvSpPr>
+            <a:spLocks noGrp="1"/>
+          </p:cNvSpPr>
+          <p:nvPr>
+            <p:ph type="ftr" sz="quarter" idx="11"/>
+          </p:nvPr>
+        </p:nvSpPr>
+        <p:spPr/>
+        <p:txBody>
+          <a:bodyPr/>
+          <a:lstStyle/>
+          <a:p>
+            <a:r>
+              <a:rPr lang="en-US"/>
+              <a:t>Lampros Lountzis</a:t>
+            </a:r>
+            <a:endParaRPr lang="en-US" dirty="0"/>
+          </a:p>
+        </p:txBody>
+      </p:sp>
+      <p:pic>
+        <p:nvPicPr>
+          <p:cNvPr id="7" name="Picture 6" descr="Icon&#10;&#10;Description automatically generated">
+            <a:extLst>
+              <a:ext uri="{FF2B5EF4-FFF2-40B4-BE49-F238E27FC236}">
+                <a16:creationId xmlns:a16="http://schemas.microsoft.com/office/drawing/2014/main" id="{E39ADDF2-90A3-492C-837D-5294359B62D7}"/>
+              </a:ext>
+            </a:extLst>
+          </p:cNvPr>
+          <p:cNvPicPr>
+            <a:picLocks noChangeAspect="1"/>
+          </p:cNvPicPr>
+          <p:nvPr/>
+        </p:nvPicPr>
+        <p:blipFill>
+          <a:blip r:embed="rId3">
+            <a:extLst>
+              <a:ext uri="{28A0092B-C50C-407E-A947-70E740481C1C}">
+                <a14:useLocalDpi xmlns:a14="http://schemas.microsoft.com/office/drawing/2010/main" val="0"/>
+              </a:ext>
+            </a:extLst>
+          </a:blip>
+          <a:stretch>
+            <a:fillRect/>
+          </a:stretch>
+        </p:blipFill>
+        <p:spPr>
+          <a:xfrm>
+            <a:off x="9473539" y="4240759"/>
+            <a:ext cx="1910048" cy="1910048"/>
+          </a:xfrm>
+          <a:prstGeom prst="rect">
+            <a:avLst/>
+          </a:prstGeom>
+        </p:spPr>
+      </p:pic>
+    </p:spTree>
+    <p:extLst>
+      <p:ext uri="{BB962C8B-B14F-4D97-AF65-F5344CB8AC3E}">
+        <p14:creationId xmlns:p14="http://schemas.microsoft.com/office/powerpoint/2010/main" val="24452751"/>
+      </p:ext>
+    </p:extLst>
+  </p:cSld>
+  <p:clrMapOvr>
+    <a:masterClrMapping/>
+  </p:clrMapOvr>
+</p:sld>
+</file>
+
+<file path=ppt/slides/slide26.xml><?xml version="1.0" encoding="utf-8"?>
+<p:sld xmlns:a="http://schemas.openxmlformats.org/drawingml/2006/main" xmlns:r="http://schemas.openxmlformats.org/officeDocument/2006/relationships" xmlns:p="http://schemas.openxmlformats.org/presentationml/2006/main">
+  <p:cSld>
+    <p:bg>
+      <p:bgPr>
+        <a:solidFill>
+          <a:schemeClr val="bg1"/>
+        </a:solidFill>
+        <a:effectLst/>
+      </p:bgPr>
+    </p:bg>
+    <p:spTree>
+      <p:nvGrpSpPr>
+        <p:cNvPr id="1" name=""/>
+        <p:cNvGrpSpPr/>
+        <p:nvPr/>
+      </p:nvGrpSpPr>
+      <p:grpSpPr>
+        <a:xfrm>
+          <a:off x="0" y="0"/>
+          <a:ext cx="0" cy="0"/>
+          <a:chOff x="0" y="0"/>
+          <a:chExt cx="0" cy="0"/>
+        </a:xfrm>
+      </p:grpSpPr>
+      <p:sp useBgFill="1">
+        <p:nvSpPr>
+          <p:cNvPr id="20" name="Rectangle 19">
+            <a:extLst>
+              <a:ext uri="{FF2B5EF4-FFF2-40B4-BE49-F238E27FC236}">
+                <a16:creationId xmlns:a16="http://schemas.microsoft.com/office/drawing/2014/main" id="{13BCCAE5-A35B-4B66-A4A7-E23C34A403A4}"/>
+              </a:ext>
+              <a:ext uri="{C183D7F6-B498-43B3-948B-1728B52AA6E4}">
+                <adec:decorative xmlns:adec="http://schemas.microsoft.com/office/drawing/2017/decorative" val="1"/>
+              </a:ext>
+            </a:extLst>
+          </p:cNvPr>
+          <p:cNvSpPr>
+            <a:spLocks noGrp="1" noRot="1" noChangeAspect="1" noMove="1" noResize="1" noEditPoints="1" noAdjustHandles="1" noChangeArrowheads="1" noChangeShapeType="1" noTextEdit="1"/>
+          </p:cNvSpPr>
+          <p:nvPr>
+            <p:extLst>
+              <p:ext uri="{386F3935-93C4-4BCD-93E2-E3B085C9AB24}">
+                <p16:designElem xmlns:p16="http://schemas.microsoft.com/office/powerpoint/2015/main" val="1"/>
+              </p:ext>
+            </p:extLst>
+          </p:nvPr>
+        </p:nvSpPr>
+        <p:spPr>
+          <a:xfrm>
+            <a:off x="0" y="0"/>
+            <a:ext cx="12192000" cy="6858000"/>
+          </a:xfrm>
+          <a:prstGeom prst="rect">
+            <a:avLst/>
+          </a:prstGeom>
+          <a:ln>
+            <a:noFill/>
+          </a:ln>
+        </p:spPr>
+        <p:style>
+          <a:lnRef idx="2">
+            <a:schemeClr val="accent1">
+              <a:shade val="50000"/>
+            </a:schemeClr>
+          </a:lnRef>
+          <a:fillRef idx="1">
+            <a:schemeClr val="accent1"/>
+          </a:fillRef>
+          <a:effectRef idx="0">
+            <a:schemeClr val="accent1"/>
+          </a:effectRef>
+          <a:fontRef idx="minor">
+            <a:schemeClr val="lt1"/>
+          </a:fontRef>
+        </p:style>
+        <p:txBody>
+          <a:bodyPr rtlCol="0" anchor="ctr"/>
+          <a:lstStyle/>
+          <a:p>
+            <a:pPr algn="ctr"/>
+            <a:endParaRPr lang="en-US"/>
+          </a:p>
+        </p:txBody>
+      </p:sp>
+      <p:sp>
+        <p:nvSpPr>
+          <p:cNvPr id="2" name="Title 1">
+            <a:extLst>
+              <a:ext uri="{FF2B5EF4-FFF2-40B4-BE49-F238E27FC236}">
+                <a16:creationId xmlns:a16="http://schemas.microsoft.com/office/drawing/2014/main" id="{66A47F5C-50EC-416A-AE8C-6F6BB4225673}"/>
+              </a:ext>
+            </a:extLst>
+          </p:cNvPr>
+          <p:cNvSpPr>
+            <a:spLocks noGrp="1"/>
+          </p:cNvSpPr>
+          <p:nvPr>
+            <p:ph type="title"/>
+          </p:nvPr>
+        </p:nvSpPr>
+        <p:spPr>
+          <a:xfrm>
+            <a:off x="1097280" y="286603"/>
+            <a:ext cx="10058400" cy="1450757"/>
+          </a:xfrm>
+        </p:spPr>
+        <p:txBody>
+          <a:bodyPr>
+            <a:normAutofit/>
+          </a:bodyPr>
+          <a:lstStyle/>
+          <a:p>
+            <a:r>
+              <a:rPr lang="en-US" sz="4400" b="1" dirty="0"/>
+              <a:t>Deep Learning models</a:t>
+            </a:r>
+          </a:p>
+        </p:txBody>
+      </p:sp>
+      <p:cxnSp>
+        <p:nvCxnSpPr>
+          <p:cNvPr id="22" name="Straight Connector 21">
+            <a:extLst>
+              <a:ext uri="{FF2B5EF4-FFF2-40B4-BE49-F238E27FC236}">
+                <a16:creationId xmlns:a16="http://schemas.microsoft.com/office/drawing/2014/main" id="{6987BDFB-DE64-4B56-B44F-45FAE19FA94E}"/>
+              </a:ext>
+              <a:ext uri="{C183D7F6-B498-43B3-948B-1728B52AA6E4}">
+                <adec:decorative xmlns:adec="http://schemas.microsoft.com/office/drawing/2017/decorative" val="1"/>
+              </a:ext>
+            </a:extLst>
+          </p:cNvPr>
+          <p:cNvCxnSpPr>
+            <a:cxnSpLocks noGrp="1" noRot="1" noChangeAspect="1" noMove="1" noResize="1" noEditPoints="1" noAdjustHandles="1" noChangeArrowheads="1" noChangeShapeType="1"/>
+          </p:cNvCxnSpPr>
+          <p:nvPr>
+            <p:extLst>
+              <p:ext uri="{386F3935-93C4-4BCD-93E2-E3B085C9AB24}">
+                <p16:designElem xmlns:p16="http://schemas.microsoft.com/office/powerpoint/2015/main" val="1"/>
+              </p:ext>
+            </p:extLst>
+          </p:nvPr>
+        </p:nvCxnSpPr>
+        <p:spPr>
+          <a:xfrm>
+            <a:off x="1193532" y="1895846"/>
+            <a:ext cx="9966960" cy="0"/>
+          </a:xfrm>
+          <a:prstGeom prst="line">
+            <a:avLst/>
+          </a:prstGeom>
+          <a:ln w="12700">
+            <a:solidFill>
+              <a:schemeClr val="tx1">
+                <a:lumMod val="75000"/>
+                <a:lumOff val="25000"/>
+              </a:schemeClr>
+            </a:solidFill>
+          </a:ln>
+        </p:spPr>
+        <p:style>
+          <a:lnRef idx="1">
+            <a:schemeClr val="accent1"/>
+          </a:lnRef>
+          <a:fillRef idx="0">
+            <a:schemeClr val="accent1"/>
+          </a:fillRef>
+          <a:effectRef idx="0">
+            <a:schemeClr val="accent1"/>
+          </a:effectRef>
+          <a:fontRef idx="minor">
+            <a:schemeClr val="tx1"/>
+          </a:fontRef>
+        </p:style>
+      </p:cxnSp>
+      <p:sp>
+        <p:nvSpPr>
+          <p:cNvPr id="4" name="Content Placeholder 3">
+            <a:extLst>
+              <a:ext uri="{FF2B5EF4-FFF2-40B4-BE49-F238E27FC236}">
+                <a16:creationId xmlns:a16="http://schemas.microsoft.com/office/drawing/2014/main" id="{092F726A-2FB9-4103-87F4-2B00BFC07CCB}"/>
+              </a:ext>
+            </a:extLst>
+          </p:cNvPr>
+          <p:cNvSpPr>
+            <a:spLocks noGrp="1"/>
+          </p:cNvSpPr>
+          <p:nvPr>
+            <p:ph idx="1"/>
+          </p:nvPr>
+        </p:nvSpPr>
+        <p:spPr>
+          <a:xfrm>
+            <a:off x="1097280" y="2056996"/>
+            <a:ext cx="10058400" cy="4199836"/>
+          </a:xfrm>
+        </p:spPr>
+        <p:txBody>
+          <a:bodyPr>
+            <a:noAutofit/>
+          </a:bodyPr>
+          <a:lstStyle/>
+          <a:p>
+            <a:pPr marL="201168" lvl="1" indent="0">
+              <a:buNone/>
+            </a:pPr>
+            <a:r>
+              <a:rPr lang="en-US" sz="1600" dirty="0"/>
+              <a:t>We jointly train the deep learning models and the visual embedding layer on the </a:t>
+            </a:r>
+            <a:r>
+              <a:rPr lang="en-US" sz="1600" b="1" dirty="0"/>
+              <a:t>classification task</a:t>
+            </a:r>
+            <a:r>
+              <a:rPr lang="en-US" sz="1600" dirty="0"/>
+              <a:t>. Thus, we choose </a:t>
+            </a:r>
+            <a:r>
+              <a:rPr lang="en-US" sz="1600" b="1" dirty="0"/>
+              <a:t>cross-entropy loss </a:t>
+            </a:r>
+            <a:r>
+              <a:rPr lang="en-US" sz="1600" dirty="0"/>
+              <a:t>as the cost function. Moreover, we make use of </a:t>
+            </a:r>
+            <a:r>
+              <a:rPr lang="en-US" sz="1600" b="1" dirty="0"/>
+              <a:t>Adam optimizer </a:t>
+            </a:r>
+            <a:r>
+              <a:rPr lang="en-US" sz="1600" dirty="0"/>
+              <a:t>and </a:t>
+            </a:r>
+            <a:r>
+              <a:rPr lang="en-US" sz="1600" b="1" dirty="0" err="1"/>
+              <a:t>ReduceLROnPlateau</a:t>
+            </a:r>
+            <a:r>
+              <a:rPr lang="en-US" sz="1600" b="1" dirty="0"/>
+              <a:t> scheduler </a:t>
+            </a:r>
+            <a:r>
+              <a:rPr lang="en-US" sz="1600" dirty="0"/>
+              <a:t>(reduces learning rate when accuracy has stopped improving). Finally, we apply additional regularization by optimizing the </a:t>
+            </a:r>
+            <a:r>
+              <a:rPr lang="en-US" sz="1600" b="1" dirty="0"/>
+              <a:t>weight decay</a:t>
+            </a:r>
+            <a:r>
+              <a:rPr lang="en-US" sz="1600" dirty="0"/>
+              <a:t>.</a:t>
+            </a:r>
+          </a:p>
+          <a:p>
+            <a:pPr marL="201168" lvl="1" indent="0">
+              <a:buNone/>
+            </a:pPr>
+            <a:endParaRPr lang="en-US" sz="800" b="1" dirty="0"/>
+          </a:p>
+          <a:p>
+            <a:pPr marL="201168" lvl="1" indent="0">
+              <a:buNone/>
+            </a:pPr>
+            <a:r>
+              <a:rPr lang="en-US" sz="1600" dirty="0"/>
+              <a:t>Considering the pretrained models, we have decided to use </a:t>
+            </a:r>
+            <a:r>
+              <a:rPr lang="en-US" sz="1600" b="1" dirty="0"/>
+              <a:t>transfer learning</a:t>
+            </a:r>
+            <a:r>
+              <a:rPr lang="en-US" sz="1600" dirty="0"/>
+              <a:t>. We believe that the features the pretrained models have acquired, during training on ImageNet, can provide better results than training those networks from scratch. That is because the features learned in the first convolutional layers are quite generic.</a:t>
+            </a:r>
+          </a:p>
+          <a:p>
+            <a:pPr marL="201168" lvl="1" indent="0">
+              <a:buNone/>
+            </a:pPr>
+            <a:r>
+              <a:rPr lang="en-US" sz="1600" dirty="0"/>
+              <a:t>Since CIFAR-10 data are similar to ImageNet, we use the </a:t>
+            </a:r>
+            <a:r>
+              <a:rPr lang="en-US" sz="1600" b="1" dirty="0"/>
+              <a:t>pretrained models as feature extractors</a:t>
+            </a:r>
+            <a:r>
+              <a:rPr lang="en-US" sz="1600" dirty="0"/>
+              <a:t>, meaning that we freeze all the layers of the pretrained model and only train the classifier part.</a:t>
+            </a:r>
+            <a:endParaRPr lang="en-US" sz="800" dirty="0"/>
+          </a:p>
+          <a:p>
+            <a:pPr marL="201168" lvl="1" indent="0">
+              <a:buNone/>
+            </a:pPr>
+            <a:endParaRPr lang="en-US" sz="800" b="1" u="sng" dirty="0">
+              <a:solidFill>
+                <a:srgbClr val="FF0000"/>
+              </a:solidFill>
+            </a:endParaRPr>
+          </a:p>
+          <a:p>
+            <a:pPr marL="201168" lvl="1" indent="0">
+              <a:buNone/>
+            </a:pPr>
+            <a:r>
+              <a:rPr lang="en-US" sz="1600" b="1" u="sng" dirty="0">
+                <a:solidFill>
+                  <a:srgbClr val="FF0000"/>
+                </a:solidFill>
+              </a:rPr>
+              <a:t>Note:</a:t>
+            </a:r>
+            <a:r>
+              <a:rPr lang="en-US" sz="1600" b="1" dirty="0">
+                <a:solidFill>
+                  <a:srgbClr val="FF0000"/>
+                </a:solidFill>
+              </a:rPr>
+              <a:t> Due to lack of computational recourses we only train the classification dense layer (</a:t>
+            </a:r>
+            <a:r>
+              <a:rPr lang="en-US" sz="1600" b="1" dirty="0" err="1">
+                <a:solidFill>
+                  <a:srgbClr val="FF0000"/>
+                </a:solidFill>
+              </a:rPr>
+              <a:t>softmax</a:t>
+            </a:r>
+            <a:r>
+              <a:rPr lang="en-US" sz="1600" b="1" dirty="0">
+                <a:solidFill>
+                  <a:srgbClr val="FF0000"/>
+                </a:solidFill>
+              </a:rPr>
+              <a:t> layer).</a:t>
+            </a:r>
+            <a:endParaRPr lang="en-US" sz="1600" dirty="0"/>
+          </a:p>
+          <a:p>
+            <a:pPr marL="201168" lvl="1" indent="0">
+              <a:buNone/>
+            </a:pPr>
+            <a:endParaRPr lang="en-US" sz="800" dirty="0"/>
+          </a:p>
+          <a:p>
+            <a:pPr marL="201168" lvl="1" indent="0">
+              <a:buNone/>
+            </a:pPr>
+            <a:r>
+              <a:rPr lang="en-US" sz="1600" dirty="0"/>
+              <a:t>The </a:t>
+            </a:r>
+            <a:r>
+              <a:rPr lang="en-US" sz="1600" b="1" dirty="0"/>
+              <a:t>primary metric </a:t>
+            </a:r>
+            <a:r>
+              <a:rPr lang="en-US" sz="1600" dirty="0"/>
+              <a:t>used to access our models is </a:t>
+            </a:r>
+            <a:r>
+              <a:rPr lang="en-US" sz="1600" b="1" dirty="0"/>
+              <a:t>accuracy</a:t>
+            </a:r>
+            <a:r>
+              <a:rPr lang="en-US" sz="1600" dirty="0"/>
+              <a:t>, since CIFAR-10 is a well-balanced dataset. Also, we have considered </a:t>
+            </a:r>
+            <a:r>
+              <a:rPr lang="en-US" sz="1600" b="1" dirty="0"/>
+              <a:t>precision</a:t>
+            </a:r>
+            <a:r>
+              <a:rPr lang="en-US" sz="1600" dirty="0"/>
+              <a:t>, since the models will be used for the image retrieval task.</a:t>
+            </a:r>
+          </a:p>
+        </p:txBody>
+      </p:sp>
+      <p:sp>
+        <p:nvSpPr>
+          <p:cNvPr id="24" name="Rectangle 23">
+            <a:extLst>
+              <a:ext uri="{FF2B5EF4-FFF2-40B4-BE49-F238E27FC236}">
+                <a16:creationId xmlns:a16="http://schemas.microsoft.com/office/drawing/2014/main" id="{CB06839E-D8C3-4A74-BA2B-3B97E7B2CDB5}"/>
+              </a:ext>
+              <a:ext uri="{C183D7F6-B498-43B3-948B-1728B52AA6E4}">
+                <adec:decorative xmlns:adec="http://schemas.microsoft.com/office/drawing/2017/decorative" val="1"/>
+              </a:ext>
+            </a:extLst>
+          </p:cNvPr>
+          <p:cNvSpPr>
+            <a:spLocks noGrp="1" noRot="1" noChangeAspect="1" noMove="1" noResize="1" noEditPoints="1" noAdjustHandles="1" noChangeArrowheads="1" noChangeShapeType="1" noTextEdit="1"/>
+          </p:cNvSpPr>
+          <p:nvPr>
+            <p:extLst>
+              <p:ext uri="{386F3935-93C4-4BCD-93E2-E3B085C9AB24}">
+                <p16:designElem xmlns:p16="http://schemas.microsoft.com/office/powerpoint/2015/main" val="1"/>
+              </p:ext>
+            </p:extLst>
+          </p:nvPr>
+        </p:nvSpPr>
+        <p:spPr>
+          <a:xfrm>
+            <a:off x="0" y="6400800"/>
+            <a:ext cx="12192000" cy="457200"/>
+          </a:xfrm>
+          <a:prstGeom prst="rect">
+            <a:avLst/>
+          </a:prstGeom>
+          <a:solidFill>
+            <a:srgbClr val="262626"/>
+          </a:solidFill>
+          <a:ln>
+            <a:noFill/>
+          </a:ln>
+        </p:spPr>
+        <p:style>
+          <a:lnRef idx="2">
+            <a:schemeClr val="accent1">
+              <a:shade val="50000"/>
+            </a:schemeClr>
+          </a:lnRef>
+          <a:fillRef idx="1">
+            <a:schemeClr val="accent1"/>
+          </a:fillRef>
+          <a:effectRef idx="0">
+            <a:schemeClr val="accent1"/>
+          </a:effectRef>
+          <a:fontRef idx="minor">
+            <a:schemeClr val="lt1"/>
+          </a:fontRef>
+        </p:style>
+      </p:sp>
+      <p:sp>
+        <p:nvSpPr>
+          <p:cNvPr id="3" name="Slide Number Placeholder 2">
+            <a:extLst>
+              <a:ext uri="{FF2B5EF4-FFF2-40B4-BE49-F238E27FC236}">
+                <a16:creationId xmlns:a16="http://schemas.microsoft.com/office/drawing/2014/main" id="{1CA2F287-50CE-458A-9441-96E48DE47F01}"/>
+              </a:ext>
+            </a:extLst>
+          </p:cNvPr>
+          <p:cNvSpPr>
+            <a:spLocks noGrp="1"/>
+          </p:cNvSpPr>
+          <p:nvPr>
+            <p:ph type="sldNum" sz="quarter" idx="12"/>
+          </p:nvPr>
+        </p:nvSpPr>
+        <p:spPr/>
+        <p:txBody>
+          <a:bodyPr/>
+          <a:lstStyle/>
+          <a:p>
+            <a:fld id="{3A98EE3D-8CD1-4C3F-BD1C-C98C9596463C}" type="slidenum">
+              <a:rPr lang="en-US" smtClean="0"/>
+              <a:t>26</a:t>
+            </a:fld>
+            <a:endParaRPr lang="en-US" dirty="0"/>
+          </a:p>
+        </p:txBody>
+      </p:sp>
+      <p:sp>
+        <p:nvSpPr>
+          <p:cNvPr id="5" name="Footer Placeholder 4">
+            <a:extLst>
+              <a:ext uri="{FF2B5EF4-FFF2-40B4-BE49-F238E27FC236}">
+                <a16:creationId xmlns:a16="http://schemas.microsoft.com/office/drawing/2014/main" id="{1439A401-9E11-45E1-9C6E-464865B40886}"/>
+              </a:ext>
+            </a:extLst>
+          </p:cNvPr>
+          <p:cNvSpPr>
+            <a:spLocks noGrp="1"/>
+          </p:cNvSpPr>
+          <p:nvPr>
+            <p:ph type="ftr" sz="quarter" idx="11"/>
+          </p:nvPr>
+        </p:nvSpPr>
+        <p:spPr/>
+        <p:txBody>
+          <a:bodyPr/>
+          <a:lstStyle/>
+          <a:p>
+            <a:r>
+              <a:rPr lang="en-US"/>
+              <a:t>Lampros Lountzis</a:t>
+            </a:r>
+            <a:endParaRPr lang="en-US" dirty="0"/>
+          </a:p>
+        </p:txBody>
+      </p:sp>
+    </p:spTree>
+    <p:extLst>
+      <p:ext uri="{BB962C8B-B14F-4D97-AF65-F5344CB8AC3E}">
+        <p14:creationId xmlns:p14="http://schemas.microsoft.com/office/powerpoint/2010/main" val="2361220843"/>
+      </p:ext>
+    </p:extLst>
+  </p:cSld>
+  <p:clrMapOvr>
+    <a:masterClrMapping/>
+  </p:clrMapOvr>
+</p:sld>
+</file>
+
+<file path=ppt/slides/slide27.xml><?xml version="1.0" encoding="utf-8"?>
+<p:sld xmlns:a="http://schemas.openxmlformats.org/drawingml/2006/main" xmlns:r="http://schemas.openxmlformats.org/officeDocument/2006/relationships" xmlns:p="http://schemas.openxmlformats.org/presentationml/2006/main">
+  <p:cSld>
+    <p:bg>
+      <p:bgPr>
+        <a:solidFill>
+          <a:schemeClr val="bg1"/>
+        </a:solidFill>
+        <a:effectLst/>
+      </p:bgPr>
+    </p:bg>
+    <p:spTree>
+      <p:nvGrpSpPr>
+        <p:cNvPr id="1" name=""/>
+        <p:cNvGrpSpPr/>
+        <p:nvPr/>
+      </p:nvGrpSpPr>
+      <p:grpSpPr>
+        <a:xfrm>
+          <a:off x="0" y="0"/>
+          <a:ext cx="0" cy="0"/>
+          <a:chOff x="0" y="0"/>
+          <a:chExt cx="0" cy="0"/>
+        </a:xfrm>
+      </p:grpSpPr>
+      <p:sp useBgFill="1">
+        <p:nvSpPr>
+          <p:cNvPr id="29" name="Rectangle 28">
+            <a:extLst>
+              <a:ext uri="{FF2B5EF4-FFF2-40B4-BE49-F238E27FC236}">
+                <a16:creationId xmlns:a16="http://schemas.microsoft.com/office/drawing/2014/main" id="{13BCCAE5-A35B-4B66-A4A7-E23C34A403A4}"/>
+              </a:ext>
+              <a:ext uri="{C183D7F6-B498-43B3-948B-1728B52AA6E4}">
+                <adec:decorative xmlns:adec="http://schemas.microsoft.com/office/drawing/2017/decorative" val="1"/>
+              </a:ext>
+            </a:extLst>
+          </p:cNvPr>
+          <p:cNvSpPr>
+            <a:spLocks noGrp="1" noRot="1" noChangeAspect="1" noMove="1" noResize="1" noEditPoints="1" noAdjustHandles="1" noChangeArrowheads="1" noChangeShapeType="1" noTextEdit="1"/>
+          </p:cNvSpPr>
+          <p:nvPr>
+            <p:extLst>
+              <p:ext uri="{386F3935-93C4-4BCD-93E2-E3B085C9AB24}">
+                <p16:designElem xmlns:p16="http://schemas.microsoft.com/office/powerpoint/2015/main" val="1"/>
+              </p:ext>
+            </p:extLst>
+          </p:nvPr>
+        </p:nvSpPr>
+        <p:spPr>
+          <a:xfrm>
+            <a:off x="0" y="0"/>
+            <a:ext cx="12192000" cy="6858000"/>
+          </a:xfrm>
+          <a:prstGeom prst="rect">
+            <a:avLst/>
+          </a:prstGeom>
+          <a:ln>
+            <a:noFill/>
+          </a:ln>
+        </p:spPr>
+        <p:style>
+          <a:lnRef idx="2">
+            <a:schemeClr val="accent1">
+              <a:shade val="50000"/>
+            </a:schemeClr>
+          </a:lnRef>
+          <a:fillRef idx="1">
+            <a:schemeClr val="accent1"/>
+          </a:fillRef>
+          <a:effectRef idx="0">
+            <a:schemeClr val="accent1"/>
+          </a:effectRef>
+          <a:fontRef idx="minor">
+            <a:schemeClr val="lt1"/>
+          </a:fontRef>
+        </p:style>
+        <p:txBody>
+          <a:bodyPr rtlCol="0" anchor="ctr"/>
+          <a:lstStyle/>
+          <a:p>
+            <a:pPr algn="ctr"/>
+            <a:endParaRPr lang="en-US"/>
+          </a:p>
+        </p:txBody>
+      </p:sp>
+      <p:sp>
+        <p:nvSpPr>
+          <p:cNvPr id="2" name="Title 1">
+            <a:extLst>
+              <a:ext uri="{FF2B5EF4-FFF2-40B4-BE49-F238E27FC236}">
+                <a16:creationId xmlns:a16="http://schemas.microsoft.com/office/drawing/2014/main" id="{66A47F5C-50EC-416A-AE8C-6F6BB4225673}"/>
+              </a:ext>
+            </a:extLst>
+          </p:cNvPr>
+          <p:cNvSpPr>
+            <a:spLocks noGrp="1"/>
+          </p:cNvSpPr>
+          <p:nvPr>
+            <p:ph type="title"/>
+          </p:nvPr>
+        </p:nvSpPr>
+        <p:spPr>
+          <a:xfrm>
+            <a:off x="1097280" y="286603"/>
+            <a:ext cx="10058400" cy="1450757"/>
+          </a:xfrm>
+        </p:spPr>
+        <p:txBody>
+          <a:bodyPr>
+            <a:normAutofit/>
+          </a:bodyPr>
+          <a:lstStyle/>
+          <a:p>
+            <a:r>
+              <a:rPr lang="en-US" b="1"/>
+              <a:t>Deep Learning models</a:t>
+            </a:r>
+          </a:p>
+        </p:txBody>
+      </p:sp>
+      <p:cxnSp>
+        <p:nvCxnSpPr>
+          <p:cNvPr id="31" name="Straight Connector 30">
+            <a:extLst>
+              <a:ext uri="{FF2B5EF4-FFF2-40B4-BE49-F238E27FC236}">
+                <a16:creationId xmlns:a16="http://schemas.microsoft.com/office/drawing/2014/main" id="{6987BDFB-DE64-4B56-B44F-45FAE19FA94E}"/>
+              </a:ext>
+              <a:ext uri="{C183D7F6-B498-43B3-948B-1728B52AA6E4}">
+                <adec:decorative xmlns:adec="http://schemas.microsoft.com/office/drawing/2017/decorative" val="1"/>
+              </a:ext>
+            </a:extLst>
+          </p:cNvPr>
+          <p:cNvCxnSpPr>
+            <a:cxnSpLocks noGrp="1" noRot="1" noChangeAspect="1" noMove="1" noResize="1" noEditPoints="1" noAdjustHandles="1" noChangeArrowheads="1" noChangeShapeType="1"/>
+          </p:cNvCxnSpPr>
+          <p:nvPr>
+            <p:extLst>
+              <p:ext uri="{386F3935-93C4-4BCD-93E2-E3B085C9AB24}">
+                <p16:designElem xmlns:p16="http://schemas.microsoft.com/office/powerpoint/2015/main" val="1"/>
+              </p:ext>
+            </p:extLst>
+          </p:nvPr>
+        </p:nvCxnSpPr>
+        <p:spPr>
+          <a:xfrm>
+            <a:off x="1193532" y="1895846"/>
+            <a:ext cx="9966960" cy="0"/>
+          </a:xfrm>
+          <a:prstGeom prst="line">
+            <a:avLst/>
+          </a:prstGeom>
+          <a:ln w="12700">
+            <a:solidFill>
+              <a:schemeClr val="tx1">
+                <a:lumMod val="75000"/>
+                <a:lumOff val="25000"/>
+              </a:schemeClr>
+            </a:solidFill>
+          </a:ln>
+        </p:spPr>
+        <p:style>
+          <a:lnRef idx="1">
+            <a:schemeClr val="accent1"/>
+          </a:lnRef>
+          <a:fillRef idx="0">
+            <a:schemeClr val="accent1"/>
+          </a:fillRef>
+          <a:effectRef idx="0">
+            <a:schemeClr val="accent1"/>
+          </a:effectRef>
+          <a:fontRef idx="minor">
+            <a:schemeClr val="tx1"/>
+          </a:fontRef>
+        </p:style>
+      </p:cxnSp>
+      <p:sp>
+        <p:nvSpPr>
+          <p:cNvPr id="4" name="Content Placeholder 3">
+            <a:extLst>
+              <a:ext uri="{FF2B5EF4-FFF2-40B4-BE49-F238E27FC236}">
+                <a16:creationId xmlns:a16="http://schemas.microsoft.com/office/drawing/2014/main" id="{092F726A-2FB9-4103-87F4-2B00BFC07CCB}"/>
+              </a:ext>
+            </a:extLst>
+          </p:cNvPr>
+          <p:cNvSpPr>
+            <a:spLocks noGrp="1"/>
+          </p:cNvSpPr>
+          <p:nvPr>
+            <p:ph idx="1"/>
+          </p:nvPr>
+        </p:nvSpPr>
+        <p:spPr>
+          <a:xfrm>
+            <a:off x="1097280" y="2108201"/>
+            <a:ext cx="7519182" cy="3967281"/>
+          </a:xfrm>
+        </p:spPr>
+        <p:txBody>
+          <a:bodyPr>
+            <a:normAutofit/>
+          </a:bodyPr>
+          <a:lstStyle/>
+          <a:p>
+            <a:pPr marL="201168" lvl="1" indent="0">
+              <a:lnSpc>
+                <a:spcPct val="90000"/>
+              </a:lnSpc>
+              <a:buNone/>
+            </a:pPr>
+            <a:r>
+              <a:rPr lang="en-US" sz="1500" dirty="0"/>
+              <a:t>Considering hyperparameter tuning, we have used </a:t>
+            </a:r>
+            <a:r>
+              <a:rPr lang="en-US" sz="1500" b="1" dirty="0"/>
+              <a:t>Ray tune </a:t>
+            </a:r>
+            <a:r>
+              <a:rPr lang="en-US" sz="1500" dirty="0"/>
+              <a:t>which is a popular framework for scalable hyperparameter tuning. During tuning we utilize </a:t>
+            </a:r>
+            <a:r>
+              <a:rPr lang="en-US" sz="1500" b="1" dirty="0"/>
+              <a:t>early stopping </a:t>
+            </a:r>
+            <a:r>
+              <a:rPr lang="en-US" sz="1500" dirty="0"/>
+              <a:t>with </a:t>
+            </a:r>
+            <a:r>
+              <a:rPr lang="en-US" sz="1500" b="1" dirty="0" err="1"/>
+              <a:t>ASHAScheduler</a:t>
+            </a:r>
+            <a:r>
+              <a:rPr lang="en-US" sz="1500" dirty="0"/>
+              <a:t> (a better version of </a:t>
+            </a:r>
+            <a:r>
+              <a:rPr lang="en-US" sz="1500" dirty="0" err="1"/>
+              <a:t>HyperBand</a:t>
+            </a:r>
+            <a:r>
+              <a:rPr lang="en-US" sz="1500" dirty="0"/>
+              <a:t> scheduler) for eliminating bad trials based on validation accuracy.</a:t>
+            </a:r>
+          </a:p>
+          <a:p>
+            <a:pPr lvl="2">
+              <a:lnSpc>
+                <a:spcPct val="90000"/>
+              </a:lnSpc>
+              <a:buFont typeface="Arial" panose="020B0604020202020204" pitchFamily="34" charset="0"/>
+              <a:buChar char="•"/>
+            </a:pPr>
+            <a:r>
+              <a:rPr lang="en-US" sz="1500" dirty="0"/>
+              <a:t>The </a:t>
+            </a:r>
+            <a:r>
+              <a:rPr lang="en-US" sz="1500" b="1" dirty="0"/>
+              <a:t>grace period </a:t>
+            </a:r>
+            <a:r>
+              <a:rPr lang="en-US" sz="1500" dirty="0"/>
+              <a:t>is selected in such way that we won’t fall in a local optima.</a:t>
+            </a:r>
+          </a:p>
+          <a:p>
+            <a:pPr lvl="2">
+              <a:lnSpc>
+                <a:spcPct val="90000"/>
+              </a:lnSpc>
+              <a:buFont typeface="Arial" panose="020B0604020202020204" pitchFamily="34" charset="0"/>
+              <a:buChar char="•"/>
+            </a:pPr>
+            <a:r>
+              <a:rPr lang="en-US" sz="1500" dirty="0"/>
+              <a:t>Not only do we tune learning rate and weight decay, but also, we tune the number of layers, nodes and dropout probability in the cases of the Neural Network and the custom CNN.</a:t>
+            </a:r>
+          </a:p>
+          <a:p>
+            <a:pPr marL="201168" lvl="1" indent="0">
+              <a:lnSpc>
+                <a:spcPct val="90000"/>
+              </a:lnSpc>
+              <a:buNone/>
+            </a:pPr>
+            <a:endParaRPr lang="en-US" sz="1500" dirty="0"/>
+          </a:p>
+          <a:p>
+            <a:pPr marL="201168" lvl="1" indent="0">
+              <a:lnSpc>
+                <a:spcPct val="90000"/>
+              </a:lnSpc>
+              <a:buNone/>
+            </a:pPr>
+            <a:r>
+              <a:rPr lang="en-US" sz="1500" dirty="0"/>
+              <a:t>As the results show, </a:t>
+            </a:r>
+            <a:r>
+              <a:rPr lang="en-US" sz="1500" b="1" dirty="0"/>
+              <a:t>VGG-16</a:t>
+            </a:r>
+            <a:r>
+              <a:rPr lang="en-US" sz="1500" dirty="0"/>
+              <a:t> is the top model since it  accomplishes the highest accuracy and precision score and simultaneously doesn’t overfit.</a:t>
+            </a:r>
+          </a:p>
+          <a:p>
+            <a:pPr marL="201168" lvl="1" indent="0">
+              <a:lnSpc>
+                <a:spcPct val="90000"/>
+              </a:lnSpc>
+              <a:buNone/>
+            </a:pPr>
+            <a:endParaRPr lang="en-US" sz="1500" b="1" u="sng" dirty="0"/>
+          </a:p>
+          <a:p>
+            <a:pPr marL="201168" lvl="1" indent="0">
+              <a:lnSpc>
+                <a:spcPct val="90000"/>
+              </a:lnSpc>
+              <a:buNone/>
+            </a:pPr>
+            <a:r>
+              <a:rPr lang="en-US" sz="1500" b="1" u="sng" dirty="0">
+                <a:solidFill>
+                  <a:srgbClr val="FF0000"/>
+                </a:solidFill>
+              </a:rPr>
+              <a:t>Note:</a:t>
+            </a:r>
+            <a:r>
+              <a:rPr lang="en-US" sz="1500" b="1" dirty="0">
+                <a:solidFill>
+                  <a:srgbClr val="FF0000"/>
+                </a:solidFill>
+              </a:rPr>
+              <a:t> Since we were only able to train the </a:t>
+            </a:r>
+            <a:r>
+              <a:rPr lang="en-US" sz="1500" b="1" dirty="0" err="1">
+                <a:solidFill>
+                  <a:srgbClr val="FF0000"/>
+                </a:solidFill>
+              </a:rPr>
+              <a:t>softmax</a:t>
+            </a:r>
+            <a:r>
+              <a:rPr lang="en-US" sz="1500" b="1" dirty="0">
+                <a:solidFill>
+                  <a:srgbClr val="FF0000"/>
+                </a:solidFill>
+              </a:rPr>
+              <a:t> layer we believe that this might had an impact on the results. Normally, we would have expected that the ResNet-50 would be the winner since contrary to the other models it utilizes state-of-the-art techniques.</a:t>
+            </a:r>
+            <a:endParaRPr lang="en-US" sz="1500" dirty="0">
+              <a:solidFill>
+                <a:srgbClr val="FF0000"/>
+              </a:solidFill>
+            </a:endParaRPr>
+          </a:p>
+          <a:p>
+            <a:pPr marL="201168" lvl="1" indent="0">
+              <a:lnSpc>
+                <a:spcPct val="90000"/>
+              </a:lnSpc>
+              <a:buNone/>
+            </a:pPr>
+            <a:endParaRPr lang="en-US" sz="1500" dirty="0"/>
+          </a:p>
+          <a:p>
+            <a:pPr marL="201168" lvl="1" indent="0">
+              <a:lnSpc>
+                <a:spcPct val="90000"/>
+              </a:lnSpc>
+              <a:buNone/>
+            </a:pPr>
+            <a:endParaRPr lang="en-US" sz="1500" dirty="0"/>
+          </a:p>
+        </p:txBody>
+      </p:sp>
+      <p:pic>
+        <p:nvPicPr>
+          <p:cNvPr id="7" name="Picture 6" descr="A picture containing icon&#10;&#10;Description automatically generated">
+            <a:extLst>
+              <a:ext uri="{FF2B5EF4-FFF2-40B4-BE49-F238E27FC236}">
+                <a16:creationId xmlns:a16="http://schemas.microsoft.com/office/drawing/2014/main" id="{6108924F-EABE-4C6C-A2D0-2D63CBDB6F89}"/>
+              </a:ext>
+            </a:extLst>
+          </p:cNvPr>
+          <p:cNvPicPr>
+            <a:picLocks noChangeAspect="1"/>
+          </p:cNvPicPr>
+          <p:nvPr/>
+        </p:nvPicPr>
+        <p:blipFill>
+          <a:blip r:embed="rId3">
+            <a:extLst>
+              <a:ext uri="{28A0092B-C50C-407E-A947-70E740481C1C}">
+                <a14:useLocalDpi xmlns:a14="http://schemas.microsoft.com/office/drawing/2010/main" val="0"/>
+              </a:ext>
+            </a:extLst>
+          </a:blip>
+          <a:stretch>
+            <a:fillRect/>
+          </a:stretch>
+        </p:blipFill>
+        <p:spPr>
+          <a:xfrm>
+            <a:off x="8724681" y="3525187"/>
+            <a:ext cx="2492545" cy="1246272"/>
+          </a:xfrm>
+          <a:prstGeom prst="rect">
+            <a:avLst/>
+          </a:prstGeom>
+        </p:spPr>
+      </p:pic>
+      <p:sp>
+        <p:nvSpPr>
+          <p:cNvPr id="33" name="Rectangle 32">
+            <a:extLst>
+              <a:ext uri="{FF2B5EF4-FFF2-40B4-BE49-F238E27FC236}">
+                <a16:creationId xmlns:a16="http://schemas.microsoft.com/office/drawing/2014/main" id="{CB06839E-D8C3-4A74-BA2B-3B97E7B2CDB5}"/>
+              </a:ext>
+              <a:ext uri="{C183D7F6-B498-43B3-948B-1728B52AA6E4}">
+                <adec:decorative xmlns:adec="http://schemas.microsoft.com/office/drawing/2017/decorative" val="1"/>
+              </a:ext>
+            </a:extLst>
+          </p:cNvPr>
+          <p:cNvSpPr>
+            <a:spLocks noGrp="1" noRot="1" noChangeAspect="1" noMove="1" noResize="1" noEditPoints="1" noAdjustHandles="1" noChangeArrowheads="1" noChangeShapeType="1" noTextEdit="1"/>
+          </p:cNvSpPr>
+          <p:nvPr>
+            <p:extLst>
+              <p:ext uri="{386F3935-93C4-4BCD-93E2-E3B085C9AB24}">
+                <p16:designElem xmlns:p16="http://schemas.microsoft.com/office/powerpoint/2015/main" val="1"/>
+              </p:ext>
+            </p:extLst>
+          </p:nvPr>
+        </p:nvSpPr>
+        <p:spPr>
+          <a:xfrm>
+            <a:off x="0" y="6400800"/>
+            <a:ext cx="12192000" cy="457200"/>
+          </a:xfrm>
+          <a:prstGeom prst="rect">
+            <a:avLst/>
+          </a:prstGeom>
+          <a:solidFill>
+            <a:srgbClr val="262626"/>
+          </a:solidFill>
+          <a:ln>
+            <a:noFill/>
+          </a:ln>
+        </p:spPr>
+        <p:style>
+          <a:lnRef idx="2">
+            <a:schemeClr val="accent1">
+              <a:shade val="50000"/>
+            </a:schemeClr>
+          </a:lnRef>
+          <a:fillRef idx="1">
+            <a:schemeClr val="accent1"/>
+          </a:fillRef>
+          <a:effectRef idx="0">
+            <a:schemeClr val="accent1"/>
+          </a:effectRef>
+          <a:fontRef idx="minor">
+            <a:schemeClr val="lt1"/>
+          </a:fontRef>
+        </p:style>
+      </p:sp>
+      <p:sp>
+        <p:nvSpPr>
+          <p:cNvPr id="5" name="Footer Placeholder 4">
+            <a:extLst>
+              <a:ext uri="{FF2B5EF4-FFF2-40B4-BE49-F238E27FC236}">
+                <a16:creationId xmlns:a16="http://schemas.microsoft.com/office/drawing/2014/main" id="{1439A401-9E11-45E1-9C6E-464865B40886}"/>
+              </a:ext>
+            </a:extLst>
+          </p:cNvPr>
+          <p:cNvSpPr>
+            <a:spLocks noGrp="1"/>
+          </p:cNvSpPr>
+          <p:nvPr>
+            <p:ph type="ftr" sz="quarter" idx="11"/>
+          </p:nvPr>
+        </p:nvSpPr>
+        <p:spPr>
+          <a:xfrm>
+            <a:off x="1097279" y="6446838"/>
+            <a:ext cx="6818262" cy="365125"/>
+          </a:xfrm>
+        </p:spPr>
+        <p:txBody>
+          <a:bodyPr>
+            <a:normAutofit/>
+          </a:bodyPr>
+          <a:lstStyle/>
+          <a:p>
+            <a:pPr>
+              <a:spcAft>
+                <a:spcPts val="600"/>
+              </a:spcAft>
+            </a:pPr>
+            <a:r>
+              <a:rPr lang="en-US"/>
+              <a:t>Lampros Lountzis</a:t>
+            </a:r>
+          </a:p>
+        </p:txBody>
+      </p:sp>
+      <p:sp>
+        <p:nvSpPr>
+          <p:cNvPr id="3" name="Slide Number Placeholder 2">
+            <a:extLst>
+              <a:ext uri="{FF2B5EF4-FFF2-40B4-BE49-F238E27FC236}">
+                <a16:creationId xmlns:a16="http://schemas.microsoft.com/office/drawing/2014/main" id="{1CA2F287-50CE-458A-9441-96E48DE47F01}"/>
+              </a:ext>
+            </a:extLst>
+          </p:cNvPr>
+          <p:cNvSpPr>
+            <a:spLocks noGrp="1"/>
+          </p:cNvSpPr>
+          <p:nvPr>
+            <p:ph type="sldNum" sz="quarter" idx="12"/>
+          </p:nvPr>
+        </p:nvSpPr>
+        <p:spPr>
+          <a:xfrm>
+            <a:off x="10993582" y="6446838"/>
+            <a:ext cx="780010" cy="365125"/>
+          </a:xfrm>
+        </p:spPr>
+        <p:txBody>
+          <a:bodyPr>
+            <a:normAutofit/>
+          </a:bodyPr>
+          <a:lstStyle/>
+          <a:p>
+            <a:pPr>
+              <a:spcAft>
+                <a:spcPts val="600"/>
+              </a:spcAft>
+            </a:pPr>
+            <a:fld id="{3A98EE3D-8CD1-4C3F-BD1C-C98C9596463C}" type="slidenum">
+              <a:rPr lang="en-US" smtClean="0"/>
+              <a:pPr>
+                <a:spcAft>
+                  <a:spcPts val="600"/>
+                </a:spcAft>
+              </a:pPr>
+              <a:t>27</a:t>
+            </a:fld>
+            <a:endParaRPr lang="en-US"/>
+          </a:p>
+        </p:txBody>
+      </p:sp>
+    </p:spTree>
+    <p:extLst>
+      <p:ext uri="{BB962C8B-B14F-4D97-AF65-F5344CB8AC3E}">
+        <p14:creationId xmlns:p14="http://schemas.microsoft.com/office/powerpoint/2010/main" val="3343689853"/>
+      </p:ext>
+    </p:extLst>
+  </p:cSld>
+  <p:clrMapOvr>
+    <a:masterClrMapping/>
+  </p:clrMapOvr>
+</p:sld>
+</file>
+
+<file path=ppt/slides/slide28.xml><?xml version="1.0" encoding="utf-8"?>
+<p:sld xmlns:a="http://schemas.openxmlformats.org/drawingml/2006/main" xmlns:r="http://schemas.openxmlformats.org/officeDocument/2006/relationships" xmlns:p="http://schemas.openxmlformats.org/presentationml/2006/main">
+  <p:cSld>
+    <p:bg>
+      <p:bgPr>
+        <a:solidFill>
+          <a:schemeClr val="bg1"/>
+        </a:solidFill>
+        <a:effectLst/>
+      </p:bgPr>
+    </p:bg>
+    <p:spTree>
+      <p:nvGrpSpPr>
+        <p:cNvPr id="1" name=""/>
+        <p:cNvGrpSpPr/>
+        <p:nvPr/>
+      </p:nvGrpSpPr>
+      <p:grpSpPr>
+        <a:xfrm>
+          <a:off x="0" y="0"/>
+          <a:ext cx="0" cy="0"/>
+          <a:chOff x="0" y="0"/>
+          <a:chExt cx="0" cy="0"/>
+        </a:xfrm>
+      </p:grpSpPr>
+      <p:sp useBgFill="1">
+        <p:nvSpPr>
+          <p:cNvPr id="20" name="Rectangle 19">
+            <a:extLst>
+              <a:ext uri="{FF2B5EF4-FFF2-40B4-BE49-F238E27FC236}">
+                <a16:creationId xmlns:a16="http://schemas.microsoft.com/office/drawing/2014/main" id="{13BCCAE5-A35B-4B66-A4A7-E23C34A403A4}"/>
+              </a:ext>
+              <a:ext uri="{C183D7F6-B498-43B3-948B-1728B52AA6E4}">
+                <adec:decorative xmlns:adec="http://schemas.microsoft.com/office/drawing/2017/decorative" val="1"/>
+              </a:ext>
+            </a:extLst>
+          </p:cNvPr>
+          <p:cNvSpPr>
+            <a:spLocks noGrp="1" noRot="1" noChangeAspect="1" noMove="1" noResize="1" noEditPoints="1" noAdjustHandles="1" noChangeArrowheads="1" noChangeShapeType="1" noTextEdit="1"/>
+          </p:cNvSpPr>
+          <p:nvPr>
+            <p:extLst>
+              <p:ext uri="{386F3935-93C4-4BCD-93E2-E3B085C9AB24}">
+                <p16:designElem xmlns:p16="http://schemas.microsoft.com/office/powerpoint/2015/main" val="1"/>
+              </p:ext>
+            </p:extLst>
+          </p:nvPr>
+        </p:nvSpPr>
+        <p:spPr>
+          <a:xfrm>
+            <a:off x="0" y="0"/>
+            <a:ext cx="12192000" cy="6858000"/>
+          </a:xfrm>
+          <a:prstGeom prst="rect">
+            <a:avLst/>
+          </a:prstGeom>
+          <a:ln>
+            <a:noFill/>
+          </a:ln>
+        </p:spPr>
+        <p:style>
+          <a:lnRef idx="2">
+            <a:schemeClr val="accent1">
+              <a:shade val="50000"/>
+            </a:schemeClr>
+          </a:lnRef>
+          <a:fillRef idx="1">
+            <a:schemeClr val="accent1"/>
+          </a:fillRef>
+          <a:effectRef idx="0">
+            <a:schemeClr val="accent1"/>
+          </a:effectRef>
+          <a:fontRef idx="minor">
+            <a:schemeClr val="lt1"/>
+          </a:fontRef>
+        </p:style>
+        <p:txBody>
+          <a:bodyPr rtlCol="0" anchor="ctr"/>
+          <a:lstStyle/>
+          <a:p>
+            <a:pPr algn="ctr"/>
+            <a:endParaRPr lang="en-US"/>
+          </a:p>
+        </p:txBody>
+      </p:sp>
+      <p:sp>
+        <p:nvSpPr>
+          <p:cNvPr id="2" name="Title 1">
+            <a:extLst>
+              <a:ext uri="{FF2B5EF4-FFF2-40B4-BE49-F238E27FC236}">
+                <a16:creationId xmlns:a16="http://schemas.microsoft.com/office/drawing/2014/main" id="{66A47F5C-50EC-416A-AE8C-6F6BB4225673}"/>
+              </a:ext>
+            </a:extLst>
+          </p:cNvPr>
+          <p:cNvSpPr>
+            <a:spLocks noGrp="1"/>
+          </p:cNvSpPr>
+          <p:nvPr>
+            <p:ph type="title"/>
+          </p:nvPr>
+        </p:nvSpPr>
+        <p:spPr>
+          <a:xfrm>
+            <a:off x="1097280" y="286603"/>
+            <a:ext cx="10058400" cy="1450757"/>
+          </a:xfrm>
+        </p:spPr>
+        <p:txBody>
+          <a:bodyPr>
+            <a:normAutofit/>
+          </a:bodyPr>
+          <a:lstStyle/>
+          <a:p>
+            <a:r>
+              <a:rPr lang="en-US" sz="4400" b="1" dirty="0"/>
+              <a:t>Deep Learning models</a:t>
+            </a:r>
+          </a:p>
+        </p:txBody>
+      </p:sp>
+      <p:cxnSp>
+        <p:nvCxnSpPr>
+          <p:cNvPr id="22" name="Straight Connector 21">
+            <a:extLst>
+              <a:ext uri="{FF2B5EF4-FFF2-40B4-BE49-F238E27FC236}">
+                <a16:creationId xmlns:a16="http://schemas.microsoft.com/office/drawing/2014/main" id="{6987BDFB-DE64-4B56-B44F-45FAE19FA94E}"/>
+              </a:ext>
+              <a:ext uri="{C183D7F6-B498-43B3-948B-1728B52AA6E4}">
+                <adec:decorative xmlns:adec="http://schemas.microsoft.com/office/drawing/2017/decorative" val="1"/>
+              </a:ext>
+            </a:extLst>
+          </p:cNvPr>
+          <p:cNvCxnSpPr>
+            <a:cxnSpLocks noGrp="1" noRot="1" noChangeAspect="1" noMove="1" noResize="1" noEditPoints="1" noAdjustHandles="1" noChangeArrowheads="1" noChangeShapeType="1"/>
+          </p:cNvCxnSpPr>
+          <p:nvPr>
+            <p:extLst>
+              <p:ext uri="{386F3935-93C4-4BCD-93E2-E3B085C9AB24}">
+                <p16:designElem xmlns:p16="http://schemas.microsoft.com/office/powerpoint/2015/main" val="1"/>
+              </p:ext>
+            </p:extLst>
+          </p:nvPr>
+        </p:nvCxnSpPr>
+        <p:spPr>
+          <a:xfrm>
+            <a:off x="1193532" y="1895846"/>
+            <a:ext cx="9966960" cy="0"/>
+          </a:xfrm>
+          <a:prstGeom prst="line">
+            <a:avLst/>
+          </a:prstGeom>
+          <a:ln w="12700">
+            <a:solidFill>
+              <a:schemeClr val="tx1">
+                <a:lumMod val="75000"/>
+                <a:lumOff val="25000"/>
+              </a:schemeClr>
+            </a:solidFill>
+          </a:ln>
+        </p:spPr>
+        <p:style>
+          <a:lnRef idx="1">
+            <a:schemeClr val="accent1"/>
+          </a:lnRef>
+          <a:fillRef idx="0">
+            <a:schemeClr val="accent1"/>
+          </a:fillRef>
+          <a:effectRef idx="0">
+            <a:schemeClr val="accent1"/>
+          </a:effectRef>
+          <a:fontRef idx="minor">
+            <a:schemeClr val="tx1"/>
+          </a:fontRef>
+        </p:style>
+      </p:cxnSp>
+      <p:graphicFrame>
+        <p:nvGraphicFramePr>
+          <p:cNvPr id="6" name="Table 6">
+            <a:extLst>
+              <a:ext uri="{FF2B5EF4-FFF2-40B4-BE49-F238E27FC236}">
+                <a16:creationId xmlns:a16="http://schemas.microsoft.com/office/drawing/2014/main" id="{9049F100-43D5-44A2-B9F8-C9DAFBB985F9}"/>
+              </a:ext>
+            </a:extLst>
+          </p:cNvPr>
+          <p:cNvGraphicFramePr>
+            <a:graphicFrameLocks noGrp="1"/>
+          </p:cNvGraphicFramePr>
+          <p:nvPr>
+            <p:ph idx="1"/>
+            <p:extLst>
+              <p:ext uri="{D42A27DB-BD31-4B8C-83A1-F6EECF244321}">
+                <p14:modId xmlns:p14="http://schemas.microsoft.com/office/powerpoint/2010/main" val="3223112305"/>
+              </p:ext>
+            </p:extLst>
+          </p:nvPr>
+        </p:nvGraphicFramePr>
+        <p:xfrm>
+          <a:off x="1096962" y="2108198"/>
+          <a:ext cx="10280283" cy="4134109"/>
+        </p:xfrm>
+        <a:graphic>
+          <a:graphicData uri="http://schemas.openxmlformats.org/drawingml/2006/table">
+            <a:tbl>
+              <a:tblPr firstRow="1" bandRow="1">
+                <a:tableStyleId>{5940675A-B579-460E-94D1-54222C63F5DA}</a:tableStyleId>
+              </a:tblPr>
+              <a:tblGrid>
+                <a:gridCol w="2355230">
+                  <a:extLst>
+                    <a:ext uri="{9D8B030D-6E8A-4147-A177-3AD203B41FA5}">
+                      <a16:colId xmlns:a16="http://schemas.microsoft.com/office/drawing/2014/main" val="2850099436"/>
+                    </a:ext>
+                  </a:extLst>
+                </a:gridCol>
+                <a:gridCol w="1971097">
+                  <a:extLst>
+                    <a:ext uri="{9D8B030D-6E8A-4147-A177-3AD203B41FA5}">
+                      <a16:colId xmlns:a16="http://schemas.microsoft.com/office/drawing/2014/main" val="2335639406"/>
+                    </a:ext>
+                  </a:extLst>
+                </a:gridCol>
+                <a:gridCol w="1964065">
+                  <a:extLst>
+                    <a:ext uri="{9D8B030D-6E8A-4147-A177-3AD203B41FA5}">
+                      <a16:colId xmlns:a16="http://schemas.microsoft.com/office/drawing/2014/main" val="4169965812"/>
+                    </a:ext>
+                  </a:extLst>
+                </a:gridCol>
+                <a:gridCol w="1939359">
+                  <a:extLst>
+                    <a:ext uri="{9D8B030D-6E8A-4147-A177-3AD203B41FA5}">
+                      <a16:colId xmlns:a16="http://schemas.microsoft.com/office/drawing/2014/main" val="556915451"/>
+                    </a:ext>
+                  </a:extLst>
+                </a:gridCol>
+                <a:gridCol w="2050532">
+                  <a:extLst>
+                    <a:ext uri="{9D8B030D-6E8A-4147-A177-3AD203B41FA5}">
+                      <a16:colId xmlns:a16="http://schemas.microsoft.com/office/drawing/2014/main" val="1703804736"/>
+                    </a:ext>
+                  </a:extLst>
+                </a:gridCol>
+              </a:tblGrid>
+              <a:tr h="488127">
+                <a:tc>
+                  <a:txBody>
+                    <a:bodyPr/>
+                    <a:lstStyle/>
+                    <a:p>
+                      <a:pPr algn="ctr"/>
+                      <a:endParaRPr lang="en-US" sz="1600" dirty="0"/>
+                    </a:p>
+                  </a:txBody>
+                  <a:tcPr anchor="ctr">
+                    <a:solidFill>
+                      <a:schemeClr val="accent4">
+                        <a:lumMod val="75000"/>
+                      </a:schemeClr>
+                    </a:solidFill>
+                  </a:tcPr>
+                </a:tc>
+                <a:tc gridSpan="2">
+                  <a:txBody>
+                    <a:bodyPr/>
+                    <a:lstStyle/>
+                    <a:p>
+                      <a:pPr algn="ctr"/>
+                      <a:r>
+                        <a:rPr lang="en-US" sz="1600" b="1" dirty="0">
+                          <a:solidFill>
+                            <a:schemeClr val="bg1"/>
+                          </a:solidFill>
+                        </a:rPr>
+                        <a:t>Accuracy</a:t>
+                      </a:r>
+                    </a:p>
+                  </a:txBody>
+                  <a:tcPr anchor="ctr">
+                    <a:solidFill>
+                      <a:schemeClr val="accent4">
+                        <a:lumMod val="75000"/>
+                      </a:schemeClr>
+                    </a:solidFill>
+                  </a:tcPr>
+                </a:tc>
+                <a:tc hMerge="1">
+                  <a:txBody>
+                    <a:bodyPr/>
+                    <a:lstStyle/>
+                    <a:p>
+                      <a:endParaRPr lang="en-US" dirty="0"/>
+                    </a:p>
+                  </a:txBody>
+                  <a:tcPr/>
+                </a:tc>
+                <a:tc gridSpan="2">
+                  <a:txBody>
+                    <a:bodyPr/>
+                    <a:lstStyle/>
+                    <a:p>
+                      <a:pPr algn="ctr"/>
+                      <a:r>
+                        <a:rPr lang="en-US" sz="1600" b="1" dirty="0">
+                          <a:solidFill>
+                            <a:schemeClr val="bg1"/>
+                          </a:solidFill>
+                        </a:rPr>
+                        <a:t>Precision</a:t>
+                      </a:r>
+                    </a:p>
+                  </a:txBody>
+                  <a:tcPr anchor="ctr">
+                    <a:solidFill>
+                      <a:schemeClr val="accent4">
+                        <a:lumMod val="75000"/>
+                      </a:schemeClr>
+                    </a:solidFill>
+                  </a:tcPr>
+                </a:tc>
+                <a:tc hMerge="1">
+                  <a:txBody>
+                    <a:bodyPr/>
+                    <a:lstStyle/>
+                    <a:p>
+                      <a:endParaRPr lang="en-US" dirty="0"/>
+                    </a:p>
+                  </a:txBody>
+                  <a:tcPr/>
+                </a:tc>
+                <a:extLst>
+                  <a:ext uri="{0D108BD9-81ED-4DB2-BD59-A6C34878D82A}">
+                    <a16:rowId xmlns:a16="http://schemas.microsoft.com/office/drawing/2014/main" val="3560635304"/>
+                  </a:ext>
+                </a:extLst>
+              </a:tr>
+              <a:tr h="500548">
+                <a:tc>
+                  <a:txBody>
+                    <a:bodyPr/>
+                    <a:lstStyle/>
+                    <a:p>
+                      <a:pPr algn="ctr"/>
+                      <a:endParaRPr lang="en-US" sz="1600" dirty="0"/>
+                    </a:p>
+                  </a:txBody>
+                  <a:tcPr anchor="ctr"/>
+                </a:tc>
+                <a:tc>
+                  <a:txBody>
+                    <a:bodyPr/>
+                    <a:lstStyle/>
+                    <a:p>
+                      <a:pPr algn="ctr"/>
+                      <a:r>
+                        <a:rPr lang="en-US" sz="1600" b="1" dirty="0"/>
+                        <a:t>Train</a:t>
+                      </a:r>
+                    </a:p>
+                  </a:txBody>
+                  <a:tcPr anchor="ctr"/>
+                </a:tc>
+                <a:tc>
+                  <a:txBody>
+                    <a:bodyPr/>
+                    <a:lstStyle/>
+                    <a:p>
+                      <a:pPr algn="ctr"/>
+                      <a:r>
+                        <a:rPr lang="en-US" sz="1600" b="1" dirty="0"/>
+                        <a:t>Test</a:t>
+                      </a:r>
+                    </a:p>
+                  </a:txBody>
+                  <a:tcPr anchor="ctr"/>
+                </a:tc>
+                <a:tc>
+                  <a:txBody>
+                    <a:bodyPr/>
+                    <a:lstStyle/>
+                    <a:p>
+                      <a:pPr algn="ctr"/>
+                      <a:r>
+                        <a:rPr lang="en-US" sz="1600" b="1" dirty="0"/>
+                        <a:t>Train</a:t>
+                      </a:r>
+                    </a:p>
+                  </a:txBody>
+                  <a:tcPr anchor="ctr"/>
+                </a:tc>
+                <a:tc>
+                  <a:txBody>
+                    <a:bodyPr/>
+                    <a:lstStyle/>
+                    <a:p>
+                      <a:pPr algn="ctr"/>
+                      <a:r>
+                        <a:rPr lang="en-US" sz="1600" b="1" dirty="0"/>
+                        <a:t>Test</a:t>
+                      </a:r>
+                    </a:p>
+                  </a:txBody>
+                  <a:tcPr anchor="ctr"/>
+                </a:tc>
+                <a:extLst>
+                  <a:ext uri="{0D108BD9-81ED-4DB2-BD59-A6C34878D82A}">
+                    <a16:rowId xmlns:a16="http://schemas.microsoft.com/office/drawing/2014/main" val="1797386385"/>
+                  </a:ext>
+                </a:extLst>
+              </a:tr>
+              <a:tr h="571621">
+                <a:tc>
+                  <a:txBody>
+                    <a:bodyPr/>
+                    <a:lstStyle/>
+                    <a:p>
+                      <a:pPr algn="ctr"/>
+                      <a:r>
+                        <a:rPr lang="en-US" sz="1600" b="1" dirty="0"/>
+                        <a:t>Neural Network</a:t>
+                      </a:r>
+                    </a:p>
+                  </a:txBody>
+                  <a:tcPr anchor="ctr"/>
+                </a:tc>
+                <a:tc>
+                  <a:txBody>
+                    <a:bodyPr/>
+                    <a:lstStyle/>
+                    <a:p>
+                      <a:pPr algn="ctr"/>
+                      <a:r>
+                        <a:rPr lang="en-US" sz="1600" dirty="0"/>
+                        <a:t>67%</a:t>
+                      </a:r>
+                    </a:p>
+                  </a:txBody>
+                  <a:tcPr anchor="ctr"/>
+                </a:tc>
+                <a:tc>
+                  <a:txBody>
+                    <a:bodyPr/>
+                    <a:lstStyle/>
+                    <a:p>
+                      <a:pPr algn="ctr"/>
+                      <a:r>
+                        <a:rPr lang="en-US" sz="1600" dirty="0"/>
+                        <a:t>55%</a:t>
+                      </a:r>
+                    </a:p>
+                  </a:txBody>
+                  <a:tcPr anchor="ctr"/>
+                </a:tc>
+                <a:tc>
+                  <a:txBody>
+                    <a:bodyPr/>
+                    <a:lstStyle/>
+                    <a:p>
+                      <a:pPr algn="ctr"/>
+                      <a:r>
+                        <a:rPr lang="en-US" sz="1600" dirty="0"/>
+                        <a:t>67%</a:t>
+                      </a:r>
+                    </a:p>
+                  </a:txBody>
+                  <a:tcPr anchor="ctr"/>
+                </a:tc>
+                <a:tc>
+                  <a:txBody>
+                    <a:bodyPr/>
+                    <a:lstStyle/>
+                    <a:p>
+                      <a:pPr algn="ctr"/>
+                      <a:r>
+                        <a:rPr lang="en-US" sz="1600" dirty="0"/>
+                        <a:t>55%</a:t>
+                      </a:r>
+                    </a:p>
+                  </a:txBody>
+                  <a:tcPr anchor="ctr"/>
+                </a:tc>
+                <a:extLst>
+                  <a:ext uri="{0D108BD9-81ED-4DB2-BD59-A6C34878D82A}">
+                    <a16:rowId xmlns:a16="http://schemas.microsoft.com/office/drawing/2014/main" val="1866706773"/>
+                  </a:ext>
+                </a:extLst>
+              </a:tr>
+              <a:tr h="571621">
+                <a:tc>
+                  <a:txBody>
+                    <a:bodyPr/>
+                    <a:lstStyle/>
+                    <a:p>
+                      <a:pPr marL="0" marR="0" lvl="0" indent="0" algn="ctr" defTabSz="914400" rtl="0" eaLnBrk="1" fontAlgn="auto" latinLnBrk="0" hangingPunct="1">
+                        <a:lnSpc>
+                          <a:spcPct val="100000"/>
+                        </a:lnSpc>
+                        <a:spcBef>
+                          <a:spcPts val="0"/>
+                        </a:spcBef>
+                        <a:spcAft>
+                          <a:spcPts val="0"/>
+                        </a:spcAft>
+                        <a:buClrTx/>
+                        <a:buSzTx/>
+                        <a:buFontTx/>
+                        <a:buNone/>
+                        <a:tabLst/>
+                        <a:defRPr/>
+                      </a:pPr>
+                      <a:r>
+                        <a:rPr lang="en-US" sz="1600" b="1" dirty="0"/>
+                        <a:t>CNN</a:t>
+                      </a:r>
+                    </a:p>
+                  </a:txBody>
+                  <a:tcPr anchor="ctr">
+                    <a:solidFill>
+                      <a:schemeClr val="bg1"/>
+                    </a:solidFill>
+                  </a:tcPr>
+                </a:tc>
+                <a:tc>
+                  <a:txBody>
+                    <a:bodyPr/>
+                    <a:lstStyle/>
+                    <a:p>
+                      <a:pPr algn="ctr"/>
+                      <a:r>
+                        <a:rPr lang="en-US" sz="1600" dirty="0"/>
+                        <a:t>78%</a:t>
+                      </a:r>
+                    </a:p>
+                  </a:txBody>
+                  <a:tcPr anchor="ctr">
+                    <a:solidFill>
+                      <a:schemeClr val="bg1"/>
+                    </a:solidFill>
+                  </a:tcPr>
+                </a:tc>
+                <a:tc>
+                  <a:txBody>
+                    <a:bodyPr/>
+                    <a:lstStyle/>
+                    <a:p>
+                      <a:pPr algn="ctr"/>
+                      <a:r>
+                        <a:rPr lang="en-US" sz="1600" dirty="0"/>
+                        <a:t>67%</a:t>
+                      </a:r>
+                    </a:p>
+                  </a:txBody>
+                  <a:tcPr anchor="ctr">
+                    <a:solidFill>
+                      <a:schemeClr val="bg1"/>
+                    </a:solidFill>
+                  </a:tcPr>
+                </a:tc>
+                <a:tc>
+                  <a:txBody>
+                    <a:bodyPr/>
+                    <a:lstStyle/>
+                    <a:p>
+                      <a:pPr algn="ctr"/>
+                      <a:r>
+                        <a:rPr lang="en-US" sz="1600" dirty="0"/>
+                        <a:t>78%</a:t>
+                      </a:r>
+                    </a:p>
+                  </a:txBody>
+                  <a:tcPr anchor="ctr">
+                    <a:solidFill>
+                      <a:schemeClr val="bg1"/>
+                    </a:solidFill>
+                  </a:tcPr>
+                </a:tc>
+                <a:tc>
+                  <a:txBody>
+                    <a:bodyPr/>
+                    <a:lstStyle/>
+                    <a:p>
+                      <a:pPr algn="ctr"/>
+                      <a:r>
+                        <a:rPr lang="en-US" sz="1600" dirty="0"/>
+                        <a:t>67%</a:t>
+                      </a:r>
+                    </a:p>
+                  </a:txBody>
+                  <a:tcPr anchor="ctr">
+                    <a:solidFill>
+                      <a:schemeClr val="bg1"/>
+                    </a:solidFill>
+                  </a:tcPr>
+                </a:tc>
+                <a:extLst>
+                  <a:ext uri="{0D108BD9-81ED-4DB2-BD59-A6C34878D82A}">
+                    <a16:rowId xmlns:a16="http://schemas.microsoft.com/office/drawing/2014/main" val="806043475"/>
+                  </a:ext>
+                </a:extLst>
+              </a:tr>
+              <a:tr h="500548">
+                <a:tc>
+                  <a:txBody>
+                    <a:bodyPr/>
+                    <a:lstStyle/>
+                    <a:p>
+                      <a:pPr algn="ctr"/>
+                      <a:r>
+                        <a:rPr lang="en-US" sz="1600" b="1" dirty="0" err="1"/>
+                        <a:t>AlexNet</a:t>
+                      </a:r>
+                      <a:endParaRPr lang="en-US" sz="1600" b="1" dirty="0"/>
+                    </a:p>
+                  </a:txBody>
+                  <a:tcPr anchor="ctr">
+                    <a:solidFill>
+                      <a:schemeClr val="bg1"/>
+                    </a:solidFill>
+                  </a:tcPr>
+                </a:tc>
+                <a:tc>
+                  <a:txBody>
+                    <a:bodyPr/>
+                    <a:lstStyle/>
+                    <a:p>
+                      <a:pPr algn="ctr"/>
+                      <a:r>
+                        <a:rPr lang="en-US" sz="1600" dirty="0"/>
+                        <a:t>89%</a:t>
+                      </a:r>
+                    </a:p>
+                  </a:txBody>
+                  <a:tcPr anchor="ctr">
+                    <a:solidFill>
+                      <a:schemeClr val="bg1"/>
+                    </a:solidFill>
+                  </a:tcPr>
+                </a:tc>
+                <a:tc>
+                  <a:txBody>
+                    <a:bodyPr/>
+                    <a:lstStyle/>
+                    <a:p>
+                      <a:pPr algn="ctr"/>
+                      <a:r>
+                        <a:rPr lang="en-US" sz="1600" dirty="0"/>
+                        <a:t>84%</a:t>
+                      </a:r>
+                    </a:p>
+                  </a:txBody>
+                  <a:tcPr anchor="ctr">
+                    <a:solidFill>
+                      <a:schemeClr val="bg1"/>
+                    </a:solidFill>
+                  </a:tcPr>
+                </a:tc>
+                <a:tc>
+                  <a:txBody>
+                    <a:bodyPr/>
+                    <a:lstStyle/>
+                    <a:p>
+                      <a:pPr algn="ctr"/>
+                      <a:r>
+                        <a:rPr lang="en-US" sz="1600" dirty="0"/>
+                        <a:t>90%</a:t>
+                      </a:r>
+                    </a:p>
+                  </a:txBody>
+                  <a:tcPr anchor="ctr">
+                    <a:solidFill>
+                      <a:schemeClr val="bg1"/>
+                    </a:solidFill>
+                  </a:tcPr>
+                </a:tc>
+                <a:tc>
+                  <a:txBody>
+                    <a:bodyPr/>
+                    <a:lstStyle/>
+                    <a:p>
+                      <a:pPr algn="ctr"/>
+                      <a:r>
+                        <a:rPr lang="en-US" sz="1600" dirty="0"/>
+                        <a:t>85%</a:t>
+                      </a:r>
+                    </a:p>
+                  </a:txBody>
+                  <a:tcPr anchor="ctr">
+                    <a:solidFill>
+                      <a:schemeClr val="bg1"/>
+                    </a:solidFill>
+                  </a:tcPr>
+                </a:tc>
+                <a:extLst>
+                  <a:ext uri="{0D108BD9-81ED-4DB2-BD59-A6C34878D82A}">
+                    <a16:rowId xmlns:a16="http://schemas.microsoft.com/office/drawing/2014/main" val="2188792740"/>
+                  </a:ext>
+                </a:extLst>
+              </a:tr>
+              <a:tr h="500548">
+                <a:tc>
+                  <a:txBody>
+                    <a:bodyPr/>
+                    <a:lstStyle/>
+                    <a:p>
+                      <a:pPr marL="0" algn="ctr" defTabSz="914400" rtl="0" eaLnBrk="1" latinLnBrk="0" hangingPunct="1"/>
+                      <a:r>
+                        <a:rPr lang="en-US" sz="1600" b="1" kern="1200" dirty="0">
+                          <a:solidFill>
+                            <a:schemeClr val="tx1"/>
+                          </a:solidFill>
+                          <a:latin typeface="+mn-lt"/>
+                          <a:ea typeface="+mn-ea"/>
+                          <a:cs typeface="+mn-cs"/>
+                        </a:rPr>
+                        <a:t>VGG-16</a:t>
+                      </a:r>
+                    </a:p>
+                  </a:txBody>
+                  <a:tcPr anchor="ctr">
+                    <a:solidFill>
+                      <a:schemeClr val="accent4">
+                        <a:lumMod val="40000"/>
+                        <a:lumOff val="60000"/>
+                      </a:schemeClr>
+                    </a:solidFill>
+                  </a:tcPr>
+                </a:tc>
+                <a:tc>
+                  <a:txBody>
+                    <a:bodyPr/>
+                    <a:lstStyle/>
+                    <a:p>
+                      <a:pPr algn="ctr"/>
+                      <a:r>
+                        <a:rPr lang="en-US" sz="1600" dirty="0"/>
+                        <a:t>89%</a:t>
+                      </a:r>
+                    </a:p>
+                  </a:txBody>
+                  <a:tcPr anchor="ctr">
+                    <a:solidFill>
+                      <a:schemeClr val="accent4">
+                        <a:lumMod val="40000"/>
+                        <a:lumOff val="60000"/>
+                      </a:schemeClr>
+                    </a:solidFill>
+                  </a:tcPr>
+                </a:tc>
+                <a:tc>
+                  <a:txBody>
+                    <a:bodyPr/>
+                    <a:lstStyle/>
+                    <a:p>
+                      <a:pPr algn="ctr"/>
+                      <a:r>
+                        <a:rPr lang="en-US" sz="1600" dirty="0"/>
+                        <a:t>85%</a:t>
+                      </a:r>
+                    </a:p>
+                  </a:txBody>
+                  <a:tcPr anchor="ctr">
+                    <a:solidFill>
+                      <a:schemeClr val="accent4">
+                        <a:lumMod val="40000"/>
+                        <a:lumOff val="60000"/>
+                      </a:schemeClr>
+                    </a:solidFill>
+                  </a:tcPr>
+                </a:tc>
+                <a:tc>
+                  <a:txBody>
+                    <a:bodyPr/>
+                    <a:lstStyle/>
+                    <a:p>
+                      <a:pPr algn="ctr"/>
+                      <a:r>
+                        <a:rPr lang="en-US" sz="1600" dirty="0"/>
+                        <a:t>89%</a:t>
+                      </a:r>
+                    </a:p>
+                  </a:txBody>
+                  <a:tcPr anchor="ctr">
+                    <a:solidFill>
+                      <a:schemeClr val="accent4">
+                        <a:lumMod val="40000"/>
+                        <a:lumOff val="60000"/>
+                      </a:schemeClr>
+                    </a:solidFill>
+                  </a:tcPr>
+                </a:tc>
+                <a:tc>
+                  <a:txBody>
+                    <a:bodyPr/>
+                    <a:lstStyle/>
+                    <a:p>
+                      <a:pPr algn="ctr"/>
+                      <a:r>
+                        <a:rPr lang="en-US" sz="1600" dirty="0"/>
+                        <a:t>85%</a:t>
+                      </a:r>
+                    </a:p>
+                  </a:txBody>
+                  <a:tcPr anchor="ctr">
+                    <a:solidFill>
+                      <a:schemeClr val="accent4">
+                        <a:lumMod val="40000"/>
+                        <a:lumOff val="60000"/>
+                      </a:schemeClr>
+                    </a:solidFill>
+                  </a:tcPr>
+                </a:tc>
+                <a:extLst>
+                  <a:ext uri="{0D108BD9-81ED-4DB2-BD59-A6C34878D82A}">
+                    <a16:rowId xmlns:a16="http://schemas.microsoft.com/office/drawing/2014/main" val="3287998982"/>
+                  </a:ext>
+                </a:extLst>
+              </a:tr>
+              <a:tr h="500548">
+                <a:tc>
+                  <a:txBody>
+                    <a:bodyPr/>
+                    <a:lstStyle/>
+                    <a:p>
+                      <a:pPr marL="0" algn="ctr" defTabSz="914400" rtl="0" eaLnBrk="1" latinLnBrk="0" hangingPunct="1"/>
+                      <a:r>
+                        <a:rPr lang="en-US" sz="1600" b="1" kern="1200" dirty="0">
+                          <a:solidFill>
+                            <a:schemeClr val="tx1"/>
+                          </a:solidFill>
+                          <a:latin typeface="+mn-lt"/>
+                          <a:ea typeface="+mn-ea"/>
+                          <a:cs typeface="+mn-cs"/>
+                        </a:rPr>
+                        <a:t>Inception v1</a:t>
+                      </a:r>
+                    </a:p>
+                  </a:txBody>
+                  <a:tcPr anchor="ctr"/>
+                </a:tc>
+                <a:tc>
+                  <a:txBody>
+                    <a:bodyPr/>
+                    <a:lstStyle/>
+                    <a:p>
+                      <a:pPr algn="ctr"/>
+                      <a:r>
+                        <a:rPr lang="en-US" sz="1600" dirty="0"/>
+                        <a:t>84%</a:t>
+                      </a:r>
+                    </a:p>
+                  </a:txBody>
+                  <a:tcPr anchor="ctr"/>
+                </a:tc>
+                <a:tc>
+                  <a:txBody>
+                    <a:bodyPr/>
+                    <a:lstStyle/>
+                    <a:p>
+                      <a:pPr algn="ctr"/>
+                      <a:r>
+                        <a:rPr lang="en-US" sz="1600" dirty="0"/>
+                        <a:t>81%</a:t>
+                      </a:r>
+                    </a:p>
+                  </a:txBody>
+                  <a:tcPr anchor="ctr"/>
+                </a:tc>
+                <a:tc>
+                  <a:txBody>
+                    <a:bodyPr/>
+                    <a:lstStyle/>
+                    <a:p>
+                      <a:pPr algn="ctr"/>
+                      <a:r>
+                        <a:rPr lang="en-US" sz="1600" dirty="0"/>
+                        <a:t>84%</a:t>
+                      </a:r>
+                    </a:p>
+                  </a:txBody>
+                  <a:tcPr anchor="ctr"/>
+                </a:tc>
+                <a:tc>
+                  <a:txBody>
+                    <a:bodyPr/>
+                    <a:lstStyle/>
+                    <a:p>
+                      <a:pPr algn="ctr"/>
+                      <a:r>
+                        <a:rPr lang="en-US" sz="1600" dirty="0"/>
+                        <a:t>82%</a:t>
+                      </a:r>
+                    </a:p>
+                  </a:txBody>
+                  <a:tcPr anchor="ctr"/>
+                </a:tc>
+                <a:extLst>
+                  <a:ext uri="{0D108BD9-81ED-4DB2-BD59-A6C34878D82A}">
+                    <a16:rowId xmlns:a16="http://schemas.microsoft.com/office/drawing/2014/main" val="955559293"/>
+                  </a:ext>
+                </a:extLst>
+              </a:tr>
+              <a:tr h="500548">
+                <a:tc>
+                  <a:txBody>
+                    <a:bodyPr/>
+                    <a:lstStyle/>
+                    <a:p>
+                      <a:pPr marL="0" algn="ctr" defTabSz="914400" rtl="0" eaLnBrk="1" latinLnBrk="0" hangingPunct="1"/>
+                      <a:r>
+                        <a:rPr lang="en-US" sz="1600" b="1" kern="1200" dirty="0">
+                          <a:solidFill>
+                            <a:schemeClr val="tx1"/>
+                          </a:solidFill>
+                          <a:latin typeface="+mn-lt"/>
+                          <a:ea typeface="+mn-ea"/>
+                          <a:cs typeface="+mn-cs"/>
+                        </a:rPr>
+                        <a:t>ResNet-50</a:t>
+                      </a:r>
+                    </a:p>
+                  </a:txBody>
+                  <a:tcPr anchor="ctr"/>
+                </a:tc>
+                <a:tc>
+                  <a:txBody>
+                    <a:bodyPr/>
+                    <a:lstStyle/>
+                    <a:p>
+                      <a:pPr algn="ctr"/>
+                      <a:r>
+                        <a:rPr lang="en-US" sz="1600" dirty="0"/>
+                        <a:t>90%</a:t>
+                      </a:r>
+                    </a:p>
+                  </a:txBody>
+                  <a:tcPr anchor="ctr"/>
+                </a:tc>
+                <a:tc>
+                  <a:txBody>
+                    <a:bodyPr/>
+                    <a:lstStyle/>
+                    <a:p>
+                      <a:pPr algn="ctr"/>
+                      <a:r>
+                        <a:rPr lang="en-US" sz="1600" dirty="0"/>
+                        <a:t>85%</a:t>
+                      </a:r>
+                    </a:p>
+                  </a:txBody>
+                  <a:tcPr anchor="ctr"/>
+                </a:tc>
+                <a:tc>
+                  <a:txBody>
+                    <a:bodyPr/>
+                    <a:lstStyle/>
+                    <a:p>
+                      <a:pPr algn="ctr"/>
+                      <a:r>
+                        <a:rPr lang="en-US" sz="1600" dirty="0"/>
+                        <a:t>90%</a:t>
+                      </a:r>
+                    </a:p>
+                  </a:txBody>
+                  <a:tcPr anchor="ctr"/>
+                </a:tc>
+                <a:tc>
+                  <a:txBody>
+                    <a:bodyPr/>
+                    <a:lstStyle/>
+                    <a:p>
+                      <a:pPr algn="ctr"/>
+                      <a:r>
+                        <a:rPr lang="en-US" sz="1600" dirty="0"/>
+                        <a:t>85%</a:t>
+                      </a:r>
+                    </a:p>
+                  </a:txBody>
+                  <a:tcPr anchor="ctr"/>
+                </a:tc>
+                <a:extLst>
+                  <a:ext uri="{0D108BD9-81ED-4DB2-BD59-A6C34878D82A}">
+                    <a16:rowId xmlns:a16="http://schemas.microsoft.com/office/drawing/2014/main" val="1868727615"/>
+                  </a:ext>
+                </a:extLst>
+              </a:tr>
+            </a:tbl>
+          </a:graphicData>
+        </a:graphic>
+      </p:graphicFrame>
+      <p:sp>
+        <p:nvSpPr>
+          <p:cNvPr id="24" name="Rectangle 23">
+            <a:extLst>
+              <a:ext uri="{FF2B5EF4-FFF2-40B4-BE49-F238E27FC236}">
+                <a16:creationId xmlns:a16="http://schemas.microsoft.com/office/drawing/2014/main" id="{CB06839E-D8C3-4A74-BA2B-3B97E7B2CDB5}"/>
+              </a:ext>
+              <a:ext uri="{C183D7F6-B498-43B3-948B-1728B52AA6E4}">
+                <adec:decorative xmlns:adec="http://schemas.microsoft.com/office/drawing/2017/decorative" val="1"/>
+              </a:ext>
+            </a:extLst>
+          </p:cNvPr>
+          <p:cNvSpPr>
+            <a:spLocks noGrp="1" noRot="1" noChangeAspect="1" noMove="1" noResize="1" noEditPoints="1" noAdjustHandles="1" noChangeArrowheads="1" noChangeShapeType="1" noTextEdit="1"/>
+          </p:cNvSpPr>
+          <p:nvPr>
+            <p:extLst>
+              <p:ext uri="{386F3935-93C4-4BCD-93E2-E3B085C9AB24}">
+                <p16:designElem xmlns:p16="http://schemas.microsoft.com/office/powerpoint/2015/main" val="1"/>
+              </p:ext>
+            </p:extLst>
+          </p:nvPr>
+        </p:nvSpPr>
+        <p:spPr>
+          <a:xfrm>
+            <a:off x="0" y="6400800"/>
+            <a:ext cx="12192000" cy="457200"/>
+          </a:xfrm>
+          <a:prstGeom prst="rect">
+            <a:avLst/>
+          </a:prstGeom>
+          <a:solidFill>
+            <a:srgbClr val="262626"/>
+          </a:solidFill>
+          <a:ln>
+            <a:noFill/>
+          </a:ln>
+        </p:spPr>
+        <p:style>
+          <a:lnRef idx="2">
+            <a:schemeClr val="accent1">
+              <a:shade val="50000"/>
+            </a:schemeClr>
+          </a:lnRef>
+          <a:fillRef idx="1">
+            <a:schemeClr val="accent1"/>
+          </a:fillRef>
+          <a:effectRef idx="0">
+            <a:schemeClr val="accent1"/>
+          </a:effectRef>
+          <a:fontRef idx="minor">
+            <a:schemeClr val="lt1"/>
+          </a:fontRef>
+        </p:style>
+      </p:sp>
+      <p:sp>
+        <p:nvSpPr>
+          <p:cNvPr id="3" name="Slide Number Placeholder 2">
+            <a:extLst>
+              <a:ext uri="{FF2B5EF4-FFF2-40B4-BE49-F238E27FC236}">
+                <a16:creationId xmlns:a16="http://schemas.microsoft.com/office/drawing/2014/main" id="{1CA2F287-50CE-458A-9441-96E48DE47F01}"/>
+              </a:ext>
+            </a:extLst>
+          </p:cNvPr>
+          <p:cNvSpPr>
+            <a:spLocks noGrp="1"/>
+          </p:cNvSpPr>
+          <p:nvPr>
+            <p:ph type="sldNum" sz="quarter" idx="12"/>
+          </p:nvPr>
+        </p:nvSpPr>
+        <p:spPr/>
+        <p:txBody>
+          <a:bodyPr/>
+          <a:lstStyle/>
+          <a:p>
+            <a:fld id="{3A98EE3D-8CD1-4C3F-BD1C-C98C9596463C}" type="slidenum">
+              <a:rPr lang="en-US" smtClean="0"/>
+              <a:t>28</a:t>
+            </a:fld>
+            <a:endParaRPr lang="en-US" dirty="0"/>
+          </a:p>
+        </p:txBody>
+      </p:sp>
+      <p:sp>
+        <p:nvSpPr>
+          <p:cNvPr id="5" name="Footer Placeholder 4">
+            <a:extLst>
+              <a:ext uri="{FF2B5EF4-FFF2-40B4-BE49-F238E27FC236}">
+                <a16:creationId xmlns:a16="http://schemas.microsoft.com/office/drawing/2014/main" id="{1439A401-9E11-45E1-9C6E-464865B40886}"/>
+              </a:ext>
+            </a:extLst>
+          </p:cNvPr>
+          <p:cNvSpPr>
+            <a:spLocks noGrp="1"/>
+          </p:cNvSpPr>
+          <p:nvPr>
+            <p:ph type="ftr" sz="quarter" idx="11"/>
+          </p:nvPr>
+        </p:nvSpPr>
+        <p:spPr/>
+        <p:txBody>
+          <a:bodyPr/>
+          <a:lstStyle/>
+          <a:p>
+            <a:r>
+              <a:rPr lang="en-US"/>
+              <a:t>Lampros Lountzis</a:t>
+            </a:r>
+            <a:endParaRPr lang="en-US" dirty="0"/>
+          </a:p>
+        </p:txBody>
+      </p:sp>
+    </p:spTree>
+    <p:extLst>
+      <p:ext uri="{BB962C8B-B14F-4D97-AF65-F5344CB8AC3E}">
+        <p14:creationId xmlns:p14="http://schemas.microsoft.com/office/powerpoint/2010/main" val="3313701572"/>
+      </p:ext>
+    </p:extLst>
+  </p:cSld>
+  <p:clrMapOvr>
+    <a:masterClrMapping/>
+  </p:clrMapOvr>
+</p:sld>
+</file>
+
+<file path=ppt/slides/slide29.xml><?xml version="1.0" encoding="utf-8"?>
+<p:sld xmlns:a="http://schemas.openxmlformats.org/drawingml/2006/main" xmlns:r="http://schemas.openxmlformats.org/officeDocument/2006/relationships" xmlns:p="http://schemas.openxmlformats.org/presentationml/2006/main">
+  <p:cSld>
+    <p:bg>
+      <p:bgPr>
+        <a:solidFill>
+          <a:schemeClr val="bg1"/>
+        </a:solidFill>
+        <a:effectLst/>
+      </p:bgPr>
+    </p:bg>
+    <p:spTree>
+      <p:nvGrpSpPr>
+        <p:cNvPr id="1" name=""/>
+        <p:cNvGrpSpPr/>
+        <p:nvPr/>
+      </p:nvGrpSpPr>
+      <p:grpSpPr>
+        <a:xfrm>
+          <a:off x="0" y="0"/>
+          <a:ext cx="0" cy="0"/>
+          <a:chOff x="0" y="0"/>
+          <a:chExt cx="0" cy="0"/>
+        </a:xfrm>
+      </p:grpSpPr>
       <p:sp>
         <p:nvSpPr>
           <p:cNvPr id="54" name="Rectangle 53">
@@ -16175,7 +18959,7 @@
                   </a:schemeClr>
                 </a:solidFill>
               </a:rPr>
-              <a:t>DEMO</a:t>
+              <a:t>RESULTS</a:t>
             </a:r>
           </a:p>
         </p:txBody>
@@ -16313,7 +19097,7 @@
           <a:p>
             <a:fld id="{3A98EE3D-8CD1-4C3F-BD1C-C98C9596463C}" type="slidenum">
               <a:rPr lang="en-US" smtClean="0"/>
-              <a:t>25</a:t>
+              <a:t>29</a:t>
             </a:fld>
             <a:endParaRPr lang="en-US" dirty="0"/>
           </a:p>
@@ -16351,7 +19135,7 @@
     </p:spTree>
     <p:extLst>
       <p:ext uri="{BB962C8B-B14F-4D97-AF65-F5344CB8AC3E}">
-        <p14:creationId xmlns:p14="http://schemas.microsoft.com/office/powerpoint/2010/main" val="3172607338"/>
+        <p14:creationId xmlns:p14="http://schemas.microsoft.com/office/powerpoint/2010/main" val="2250266801"/>
       </p:ext>
     </p:extLst>
   </p:cSld>
@@ -16640,11 +19424,34 @@
               </a:rPr>
               <a:t>Model architecture</a:t>
             </a:r>
-            <a:endParaRPr lang="en-US" sz="1800" dirty="0">
-              <a:solidFill>
-                <a:schemeClr val="tx1"/>
-              </a:solidFill>
-            </a:endParaRPr>
+          </a:p>
+          <a:p>
+            <a:pPr marL="726948" lvl="2" indent="-342900">
+              <a:buFont typeface="+mj-lt"/>
+              <a:buAutoNum type="arabicPeriod"/>
+            </a:pPr>
+            <a:r>
+              <a:rPr lang="en-US" dirty="0">
+                <a:solidFill>
+                  <a:schemeClr val="tx1"/>
+                </a:solidFill>
+              </a:rPr>
+              <a:t>Visual embeddings</a:t>
+            </a:r>
+          </a:p>
+          <a:p>
+            <a:pPr marL="726948" lvl="2" indent="-342900">
+              <a:buFont typeface="+mj-lt"/>
+              <a:buAutoNum type="arabicPeriod"/>
+            </a:pPr>
+            <a:r>
+              <a:rPr lang="en-US" dirty="0">
+                <a:solidFill>
+                  <a:schemeClr val="tx1"/>
+                </a:solidFill>
+              </a:rPr>
+              <a:t>Deep Learning models</a:t>
+            </a:r>
           </a:p>
           <a:p>
             <a:pPr marL="544068" lvl="1" indent="-342900">
@@ -16766,6 +19573,425 @@
     <p:extLst>
       <p:ext uri="{BB962C8B-B14F-4D97-AF65-F5344CB8AC3E}">
         <p14:creationId xmlns:p14="http://schemas.microsoft.com/office/powerpoint/2010/main" val="2573719861"/>
+      </p:ext>
+    </p:extLst>
+  </p:cSld>
+  <p:clrMapOvr>
+    <a:masterClrMapping/>
+  </p:clrMapOvr>
+</p:sld>
+</file>
+
+<file path=ppt/slides/slide30.xml><?xml version="1.0" encoding="utf-8"?>
+<p:sld xmlns:a="http://schemas.openxmlformats.org/drawingml/2006/main" xmlns:r="http://schemas.openxmlformats.org/officeDocument/2006/relationships" xmlns:p="http://schemas.openxmlformats.org/presentationml/2006/main">
+  <p:cSld>
+    <p:bg>
+      <p:bgPr>
+        <a:solidFill>
+          <a:schemeClr val="bg1"/>
+        </a:solidFill>
+        <a:effectLst/>
+      </p:bgPr>
+    </p:bg>
+    <p:spTree>
+      <p:nvGrpSpPr>
+        <p:cNvPr id="1" name=""/>
+        <p:cNvGrpSpPr/>
+        <p:nvPr/>
+      </p:nvGrpSpPr>
+      <p:grpSpPr>
+        <a:xfrm>
+          <a:off x="0" y="0"/>
+          <a:ext cx="0" cy="0"/>
+          <a:chOff x="0" y="0"/>
+          <a:chExt cx="0" cy="0"/>
+        </a:xfrm>
+      </p:grpSpPr>
+      <p:sp>
+        <p:nvSpPr>
+          <p:cNvPr id="54" name="Rectangle 53">
+            <a:extLst>
+              <a:ext uri="{FF2B5EF4-FFF2-40B4-BE49-F238E27FC236}">
+                <a16:creationId xmlns:a16="http://schemas.microsoft.com/office/drawing/2014/main" id="{39E3965E-AC41-4711-9D10-E25ABB132D86}"/>
+              </a:ext>
+              <a:ext uri="{C183D7F6-B498-43B3-948B-1728B52AA6E4}">
+                <adec:decorative xmlns:adec="http://schemas.microsoft.com/office/drawing/2017/decorative" val="1"/>
+              </a:ext>
+            </a:extLst>
+          </p:cNvPr>
+          <p:cNvSpPr>
+            <a:spLocks noGrp="1" noRot="1" noChangeAspect="1" noMove="1" noResize="1" noEditPoints="1" noAdjustHandles="1" noChangeArrowheads="1" noChangeShapeType="1" noTextEdit="1"/>
+          </p:cNvSpPr>
+          <p:nvPr>
+            <p:extLst>
+              <p:ext uri="{386F3935-93C4-4BCD-93E2-E3B085C9AB24}">
+                <p16:designElem xmlns:p16="http://schemas.microsoft.com/office/powerpoint/2015/main" val="1"/>
+              </p:ext>
+            </p:extLst>
+          </p:nvPr>
+        </p:nvSpPr>
+        <p:spPr>
+          <a:xfrm>
+            <a:off x="3175" y="6400800"/>
+            <a:ext cx="12188825" cy="457200"/>
+          </a:xfrm>
+          <a:prstGeom prst="rect">
+            <a:avLst/>
+          </a:prstGeom>
+          <a:solidFill>
+            <a:srgbClr val="262626"/>
+          </a:solidFill>
+          <a:ln>
+            <a:noFill/>
+          </a:ln>
+        </p:spPr>
+        <p:style>
+          <a:lnRef idx="2">
+            <a:schemeClr val="accent1">
+              <a:shade val="50000"/>
+            </a:schemeClr>
+          </a:lnRef>
+          <a:fillRef idx="1">
+            <a:schemeClr val="accent1"/>
+          </a:fillRef>
+          <a:effectRef idx="0">
+            <a:schemeClr val="accent1"/>
+          </a:effectRef>
+          <a:fontRef idx="minor">
+            <a:schemeClr val="lt1"/>
+          </a:fontRef>
+        </p:style>
+      </p:sp>
+      <p:cxnSp>
+        <p:nvCxnSpPr>
+          <p:cNvPr id="56" name="Straight Connector 55">
+            <a:extLst>
+              <a:ext uri="{FF2B5EF4-FFF2-40B4-BE49-F238E27FC236}">
+                <a16:creationId xmlns:a16="http://schemas.microsoft.com/office/drawing/2014/main" id="{1F5DC8C3-BA5F-4EED-BB9A-A14272BD82A1}"/>
+              </a:ext>
+              <a:ext uri="{C183D7F6-B498-43B3-948B-1728B52AA6E4}">
+                <adec:decorative xmlns:adec="http://schemas.microsoft.com/office/drawing/2017/decorative" val="1"/>
+              </a:ext>
+            </a:extLst>
+          </p:cNvPr>
+          <p:cNvCxnSpPr>
+            <a:cxnSpLocks noGrp="1" noRot="1" noChangeAspect="1" noMove="1" noResize="1" noEditPoints="1" noAdjustHandles="1" noChangeArrowheads="1" noChangeShapeType="1"/>
+          </p:cNvCxnSpPr>
+          <p:nvPr>
+            <p:extLst>
+              <p:ext uri="{386F3935-93C4-4BCD-93E2-E3B085C9AB24}">
+                <p16:designElem xmlns:p16="http://schemas.microsoft.com/office/powerpoint/2015/main" val="1"/>
+              </p:ext>
+            </p:extLst>
+          </p:nvPr>
+        </p:nvCxnSpPr>
+        <p:spPr>
+          <a:xfrm>
+            <a:off x="1207658" y="4474741"/>
+            <a:ext cx="9875520" cy="0"/>
+          </a:xfrm>
+          <a:prstGeom prst="line">
+            <a:avLst/>
+          </a:prstGeom>
+          <a:ln w="12700">
+            <a:solidFill>
+              <a:schemeClr val="tx1">
+                <a:lumMod val="75000"/>
+                <a:lumOff val="25000"/>
+              </a:schemeClr>
+            </a:solidFill>
+          </a:ln>
+        </p:spPr>
+        <p:style>
+          <a:lnRef idx="1">
+            <a:schemeClr val="accent1"/>
+          </a:lnRef>
+          <a:fillRef idx="0">
+            <a:schemeClr val="accent1"/>
+          </a:fillRef>
+          <a:effectRef idx="0">
+            <a:schemeClr val="accent1"/>
+          </a:effectRef>
+          <a:fontRef idx="minor">
+            <a:schemeClr val="tx1"/>
+          </a:fontRef>
+        </p:style>
+      </p:cxnSp>
+      <p:sp useBgFill="1">
+        <p:nvSpPr>
+          <p:cNvPr id="58" name="Rectangle 57">
+            <a:extLst>
+              <a:ext uri="{FF2B5EF4-FFF2-40B4-BE49-F238E27FC236}">
+                <a16:creationId xmlns:a16="http://schemas.microsoft.com/office/drawing/2014/main" id="{8C6E698C-8155-4B8B-BDC9-B7299772B509}"/>
+              </a:ext>
+              <a:ext uri="{C183D7F6-B498-43B3-948B-1728B52AA6E4}">
+                <adec:decorative xmlns:adec="http://schemas.microsoft.com/office/drawing/2017/decorative" val="1"/>
+              </a:ext>
+            </a:extLst>
+          </p:cNvPr>
+          <p:cNvSpPr>
+            <a:spLocks noGrp="1" noRot="1" noChangeAspect="1" noMove="1" noResize="1" noEditPoints="1" noAdjustHandles="1" noChangeArrowheads="1" noChangeShapeType="1" noTextEdit="1"/>
+          </p:cNvSpPr>
+          <p:nvPr>
+            <p:extLst>
+              <p:ext uri="{386F3935-93C4-4BCD-93E2-E3B085C9AB24}">
+                <p16:designElem xmlns:p16="http://schemas.microsoft.com/office/powerpoint/2015/main" val="1"/>
+              </p:ext>
+            </p:extLst>
+          </p:nvPr>
+        </p:nvSpPr>
+        <p:spPr>
+          <a:xfrm>
+            <a:off x="0" y="0"/>
+            <a:ext cx="12188952" cy="6858000"/>
+          </a:xfrm>
+          <a:prstGeom prst="rect">
+            <a:avLst/>
+          </a:prstGeom>
+          <a:ln>
+            <a:noFill/>
+          </a:ln>
+        </p:spPr>
+        <p:style>
+          <a:lnRef idx="2">
+            <a:schemeClr val="accent1">
+              <a:shade val="50000"/>
+            </a:schemeClr>
+          </a:lnRef>
+          <a:fillRef idx="1">
+            <a:schemeClr val="accent1"/>
+          </a:fillRef>
+          <a:effectRef idx="0">
+            <a:schemeClr val="accent1"/>
+          </a:effectRef>
+          <a:fontRef idx="minor">
+            <a:schemeClr val="lt1"/>
+          </a:fontRef>
+        </p:style>
+        <p:txBody>
+          <a:bodyPr rtlCol="0" anchor="ctr"/>
+          <a:lstStyle/>
+          <a:p>
+            <a:pPr algn="ctr"/>
+            <a:endParaRPr lang="en-US"/>
+          </a:p>
+        </p:txBody>
+      </p:sp>
+      <p:sp>
+        <p:nvSpPr>
+          <p:cNvPr id="2" name="Title 1">
+            <a:extLst>
+              <a:ext uri="{FF2B5EF4-FFF2-40B4-BE49-F238E27FC236}">
+                <a16:creationId xmlns:a16="http://schemas.microsoft.com/office/drawing/2014/main" id="{66A47F5C-50EC-416A-AE8C-6F6BB4225673}"/>
+              </a:ext>
+            </a:extLst>
+          </p:cNvPr>
+          <p:cNvSpPr>
+            <a:spLocks noGrp="1"/>
+          </p:cNvSpPr>
+          <p:nvPr>
+            <p:ph type="title"/>
+          </p:nvPr>
+        </p:nvSpPr>
+        <p:spPr>
+          <a:xfrm>
+            <a:off x="965201" y="772731"/>
+            <a:ext cx="6255026" cy="5054008"/>
+          </a:xfrm>
+        </p:spPr>
+        <p:txBody>
+          <a:bodyPr vert="horz" lIns="91440" tIns="45720" rIns="91440" bIns="45720" rtlCol="0" anchor="ctr">
+            <a:normAutofit/>
+          </a:bodyPr>
+          <a:lstStyle/>
+          <a:p>
+            <a:pPr algn="r"/>
+            <a:r>
+              <a:rPr lang="en-US" sz="6000" dirty="0">
+                <a:solidFill>
+                  <a:schemeClr val="tx1">
+                    <a:lumMod val="85000"/>
+                    <a:lumOff val="15000"/>
+                  </a:schemeClr>
+                </a:solidFill>
+              </a:rPr>
+              <a:t>DEMO</a:t>
+            </a:r>
+          </a:p>
+        </p:txBody>
+      </p:sp>
+      <p:cxnSp>
+        <p:nvCxnSpPr>
+          <p:cNvPr id="60" name="Straight Connector 59">
+            <a:extLst>
+              <a:ext uri="{FF2B5EF4-FFF2-40B4-BE49-F238E27FC236}">
+                <a16:creationId xmlns:a16="http://schemas.microsoft.com/office/drawing/2014/main" id="{09525C9A-1972-4836-BA7A-706C946EF4DA}"/>
+              </a:ext>
+              <a:ext uri="{C183D7F6-B498-43B3-948B-1728B52AA6E4}">
+                <adec:decorative xmlns:adec="http://schemas.microsoft.com/office/drawing/2017/decorative" val="1"/>
+              </a:ext>
+            </a:extLst>
+          </p:cNvPr>
+          <p:cNvCxnSpPr>
+            <a:cxnSpLocks noGrp="1" noRot="1" noChangeAspect="1" noMove="1" noResize="1" noEditPoints="1" noAdjustHandles="1" noChangeArrowheads="1" noChangeShapeType="1"/>
+          </p:cNvCxnSpPr>
+          <p:nvPr>
+            <p:extLst>
+              <p:ext uri="{386F3935-93C4-4BCD-93E2-E3B085C9AB24}">
+                <p16:designElem xmlns:p16="http://schemas.microsoft.com/office/powerpoint/2015/main" val="1"/>
+              </p:ext>
+            </p:extLst>
+          </p:nvPr>
+        </p:nvCxnSpPr>
+        <p:spPr>
+          <a:xfrm>
+            <a:off x="7534656" y="1520631"/>
+            <a:ext cx="0" cy="3558208"/>
+          </a:xfrm>
+          <a:prstGeom prst="line">
+            <a:avLst/>
+          </a:prstGeom>
+          <a:ln>
+            <a:solidFill>
+              <a:schemeClr val="tx1">
+                <a:lumMod val="75000"/>
+                <a:lumOff val="25000"/>
+              </a:schemeClr>
+            </a:solidFill>
+          </a:ln>
+        </p:spPr>
+        <p:style>
+          <a:lnRef idx="1">
+            <a:schemeClr val="accent1"/>
+          </a:lnRef>
+          <a:fillRef idx="0">
+            <a:schemeClr val="accent1"/>
+          </a:fillRef>
+          <a:effectRef idx="0">
+            <a:schemeClr val="accent1"/>
+          </a:effectRef>
+          <a:fontRef idx="minor">
+            <a:schemeClr val="tx1"/>
+          </a:fontRef>
+        </p:style>
+      </p:cxnSp>
+      <p:sp>
+        <p:nvSpPr>
+          <p:cNvPr id="62" name="Rectangle 61">
+            <a:extLst>
+              <a:ext uri="{FF2B5EF4-FFF2-40B4-BE49-F238E27FC236}">
+                <a16:creationId xmlns:a16="http://schemas.microsoft.com/office/drawing/2014/main" id="{8D60EC1B-554F-47EF-839A-BAAD858F6666}"/>
+              </a:ext>
+              <a:ext uri="{C183D7F6-B498-43B3-948B-1728B52AA6E4}">
+                <adec:decorative xmlns:adec="http://schemas.microsoft.com/office/drawing/2017/decorative" val="1"/>
+              </a:ext>
+            </a:extLst>
+          </p:cNvPr>
+          <p:cNvSpPr>
+            <a:spLocks noGrp="1" noRot="1" noChangeAspect="1" noMove="1" noResize="1" noEditPoints="1" noAdjustHandles="1" noChangeArrowheads="1" noChangeShapeType="1" noTextEdit="1"/>
+          </p:cNvSpPr>
+          <p:nvPr>
+            <p:extLst>
+              <p:ext uri="{386F3935-93C4-4BCD-93E2-E3B085C9AB24}">
+                <p16:designElem xmlns:p16="http://schemas.microsoft.com/office/powerpoint/2015/main" val="1"/>
+              </p:ext>
+            </p:extLst>
+          </p:nvPr>
+        </p:nvSpPr>
+        <p:spPr>
+          <a:xfrm>
+            <a:off x="0" y="6400800"/>
+            <a:ext cx="12192000" cy="457200"/>
+          </a:xfrm>
+          <a:prstGeom prst="rect">
+            <a:avLst/>
+          </a:prstGeom>
+          <a:solidFill>
+            <a:srgbClr val="262626"/>
+          </a:solidFill>
+          <a:ln>
+            <a:noFill/>
+          </a:ln>
+        </p:spPr>
+        <p:style>
+          <a:lnRef idx="2">
+            <a:schemeClr val="accent1">
+              <a:shade val="50000"/>
+            </a:schemeClr>
+          </a:lnRef>
+          <a:fillRef idx="1">
+            <a:schemeClr val="accent1"/>
+          </a:fillRef>
+          <a:effectRef idx="0">
+            <a:schemeClr val="accent1"/>
+          </a:effectRef>
+          <a:fontRef idx="minor">
+            <a:schemeClr val="lt1"/>
+          </a:fontRef>
+        </p:style>
+      </p:sp>
+      <p:sp>
+        <p:nvSpPr>
+          <p:cNvPr id="3" name="Slide Number Placeholder 2">
+            <a:extLst>
+              <a:ext uri="{FF2B5EF4-FFF2-40B4-BE49-F238E27FC236}">
+                <a16:creationId xmlns:a16="http://schemas.microsoft.com/office/drawing/2014/main" id="{D5318DF9-6CD7-4F76-9F67-1A91D459F5FD}"/>
+              </a:ext>
+            </a:extLst>
+          </p:cNvPr>
+          <p:cNvSpPr>
+            <a:spLocks noGrp="1"/>
+          </p:cNvSpPr>
+          <p:nvPr>
+            <p:ph type="sldNum" sz="quarter" idx="12"/>
+          </p:nvPr>
+        </p:nvSpPr>
+        <p:spPr/>
+        <p:txBody>
+          <a:bodyPr/>
+          <a:lstStyle/>
+          <a:p>
+            <a:fld id="{3A98EE3D-8CD1-4C3F-BD1C-C98C9596463C}" type="slidenum">
+              <a:rPr lang="en-US" smtClean="0"/>
+              <a:t>30</a:t>
+            </a:fld>
+            <a:endParaRPr lang="en-US" dirty="0"/>
+          </a:p>
+        </p:txBody>
+      </p:sp>
+      <p:sp>
+        <p:nvSpPr>
+          <p:cNvPr id="4" name="Footer Placeholder 3">
+            <a:extLst>
+              <a:ext uri="{FF2B5EF4-FFF2-40B4-BE49-F238E27FC236}">
+                <a16:creationId xmlns:a16="http://schemas.microsoft.com/office/drawing/2014/main" id="{DDA22EAD-E2F0-45B9-951B-756FF177C4EC}"/>
+              </a:ext>
+            </a:extLst>
+          </p:cNvPr>
+          <p:cNvSpPr>
+            <a:spLocks noGrp="1"/>
+          </p:cNvSpPr>
+          <p:nvPr>
+            <p:ph type="ftr" sz="quarter" idx="11"/>
+          </p:nvPr>
+        </p:nvSpPr>
+        <p:spPr/>
+        <p:txBody>
+          <a:bodyPr/>
+          <a:lstStyle/>
+          <a:p>
+            <a:r>
+              <a:rPr lang="en-US"/>
+              <a:t>Lampros Lountzis</a:t>
+            </a:r>
+            <a:endParaRPr lang="en-US" dirty="0"/>
+          </a:p>
+        </p:txBody>
+      </p:sp>
+    </p:spTree>
+    <p:extLst>
+      <p:ext uri="{BB962C8B-B14F-4D97-AF65-F5344CB8AC3E}">
+        <p14:creationId xmlns:p14="http://schemas.microsoft.com/office/powerpoint/2010/main" val="3172607338"/>
       </p:ext>
     </p:extLst>
   </p:cSld>
@@ -22449,7 +25675,222 @@
 </a:themeOverride>
 </file>
 
+<file path=ppt/theme/themeOverride26.xml><?xml version="1.0" encoding="utf-8"?>
+<a:themeOverride xmlns:a="http://schemas.openxmlformats.org/drawingml/2006/main">
+  <a:clrScheme name="Custom 40">
+    <a:dk1>
+      <a:sysClr val="windowText" lastClr="000000"/>
+    </a:dk1>
+    <a:lt1>
+      <a:sysClr val="window" lastClr="FFFFFF"/>
+    </a:lt1>
+    <a:dk2>
+      <a:srgbClr val="545D57"/>
+    </a:dk2>
+    <a:lt2>
+      <a:srgbClr val="EBEBE8"/>
+    </a:lt2>
+    <a:accent1>
+      <a:srgbClr val="579858"/>
+    </a:accent1>
+    <a:accent2>
+      <a:srgbClr val="ED583E"/>
+    </a:accent2>
+    <a:accent3>
+      <a:srgbClr val="D3BA59"/>
+    </a:accent3>
+    <a:accent4>
+      <a:srgbClr val="4C94AC"/>
+    </a:accent4>
+    <a:accent5>
+      <a:srgbClr val="A09E84"/>
+    </a:accent5>
+    <a:accent6>
+      <a:srgbClr val="FC7D4A"/>
+    </a:accent6>
+    <a:hlink>
+      <a:srgbClr val="04A2DA"/>
+    </a:hlink>
+    <a:folHlink>
+      <a:srgbClr val="808080"/>
+    </a:folHlink>
+  </a:clrScheme>
+</a:themeOverride>
+</file>
+
+<file path=ppt/theme/themeOverride27.xml><?xml version="1.0" encoding="utf-8"?>
+<a:themeOverride xmlns:a="http://schemas.openxmlformats.org/drawingml/2006/main">
+  <a:clrScheme name="Custom 40">
+    <a:dk1>
+      <a:sysClr val="windowText" lastClr="000000"/>
+    </a:dk1>
+    <a:lt1>
+      <a:sysClr val="window" lastClr="FFFFFF"/>
+    </a:lt1>
+    <a:dk2>
+      <a:srgbClr val="545D57"/>
+    </a:dk2>
+    <a:lt2>
+      <a:srgbClr val="EBEBE8"/>
+    </a:lt2>
+    <a:accent1>
+      <a:srgbClr val="579858"/>
+    </a:accent1>
+    <a:accent2>
+      <a:srgbClr val="ED583E"/>
+    </a:accent2>
+    <a:accent3>
+      <a:srgbClr val="D3BA59"/>
+    </a:accent3>
+    <a:accent4>
+      <a:srgbClr val="4C94AC"/>
+    </a:accent4>
+    <a:accent5>
+      <a:srgbClr val="A09E84"/>
+    </a:accent5>
+    <a:accent6>
+      <a:srgbClr val="FC7D4A"/>
+    </a:accent6>
+    <a:hlink>
+      <a:srgbClr val="04A2DA"/>
+    </a:hlink>
+    <a:folHlink>
+      <a:srgbClr val="808080"/>
+    </a:folHlink>
+  </a:clrScheme>
+</a:themeOverride>
+</file>
+
+<file path=ppt/theme/themeOverride28.xml><?xml version="1.0" encoding="utf-8"?>
+<a:themeOverride xmlns:a="http://schemas.openxmlformats.org/drawingml/2006/main">
+  <a:clrScheme name="Custom 40">
+    <a:dk1>
+      <a:sysClr val="windowText" lastClr="000000"/>
+    </a:dk1>
+    <a:lt1>
+      <a:sysClr val="window" lastClr="FFFFFF"/>
+    </a:lt1>
+    <a:dk2>
+      <a:srgbClr val="545D57"/>
+    </a:dk2>
+    <a:lt2>
+      <a:srgbClr val="EBEBE8"/>
+    </a:lt2>
+    <a:accent1>
+      <a:srgbClr val="579858"/>
+    </a:accent1>
+    <a:accent2>
+      <a:srgbClr val="ED583E"/>
+    </a:accent2>
+    <a:accent3>
+      <a:srgbClr val="D3BA59"/>
+    </a:accent3>
+    <a:accent4>
+      <a:srgbClr val="4C94AC"/>
+    </a:accent4>
+    <a:accent5>
+      <a:srgbClr val="A09E84"/>
+    </a:accent5>
+    <a:accent6>
+      <a:srgbClr val="FC7D4A"/>
+    </a:accent6>
+    <a:hlink>
+      <a:srgbClr val="04A2DA"/>
+    </a:hlink>
+    <a:folHlink>
+      <a:srgbClr val="808080"/>
+    </a:folHlink>
+  </a:clrScheme>
+</a:themeOverride>
+</file>
+
+<file path=ppt/theme/themeOverride29.xml><?xml version="1.0" encoding="utf-8"?>
+<a:themeOverride xmlns:a="http://schemas.openxmlformats.org/drawingml/2006/main">
+  <a:clrScheme name="Custom 40">
+    <a:dk1>
+      <a:sysClr val="windowText" lastClr="000000"/>
+    </a:dk1>
+    <a:lt1>
+      <a:sysClr val="window" lastClr="FFFFFF"/>
+    </a:lt1>
+    <a:dk2>
+      <a:srgbClr val="545D57"/>
+    </a:dk2>
+    <a:lt2>
+      <a:srgbClr val="EBEBE8"/>
+    </a:lt2>
+    <a:accent1>
+      <a:srgbClr val="579858"/>
+    </a:accent1>
+    <a:accent2>
+      <a:srgbClr val="ED583E"/>
+    </a:accent2>
+    <a:accent3>
+      <a:srgbClr val="D3BA59"/>
+    </a:accent3>
+    <a:accent4>
+      <a:srgbClr val="4C94AC"/>
+    </a:accent4>
+    <a:accent5>
+      <a:srgbClr val="A09E84"/>
+    </a:accent5>
+    <a:accent6>
+      <a:srgbClr val="FC7D4A"/>
+    </a:accent6>
+    <a:hlink>
+      <a:srgbClr val="04A2DA"/>
+    </a:hlink>
+    <a:folHlink>
+      <a:srgbClr val="808080"/>
+    </a:folHlink>
+  </a:clrScheme>
+</a:themeOverride>
+</file>
+
 <file path=ppt/theme/themeOverride3.xml><?xml version="1.0" encoding="utf-8"?>
+<a:themeOverride xmlns:a="http://schemas.openxmlformats.org/drawingml/2006/main">
+  <a:clrScheme name="Custom 40">
+    <a:dk1>
+      <a:sysClr val="windowText" lastClr="000000"/>
+    </a:dk1>
+    <a:lt1>
+      <a:sysClr val="window" lastClr="FFFFFF"/>
+    </a:lt1>
+    <a:dk2>
+      <a:srgbClr val="545D57"/>
+    </a:dk2>
+    <a:lt2>
+      <a:srgbClr val="EBEBE8"/>
+    </a:lt2>
+    <a:accent1>
+      <a:srgbClr val="579858"/>
+    </a:accent1>
+    <a:accent2>
+      <a:srgbClr val="ED583E"/>
+    </a:accent2>
+    <a:accent3>
+      <a:srgbClr val="D3BA59"/>
+    </a:accent3>
+    <a:accent4>
+      <a:srgbClr val="4C94AC"/>
+    </a:accent4>
+    <a:accent5>
+      <a:srgbClr val="A09E84"/>
+    </a:accent5>
+    <a:accent6>
+      <a:srgbClr val="FC7D4A"/>
+    </a:accent6>
+    <a:hlink>
+      <a:srgbClr val="04A2DA"/>
+    </a:hlink>
+    <a:folHlink>
+      <a:srgbClr val="808080"/>
+    </a:folHlink>
+  </a:clrScheme>
+</a:themeOverride>
+</file>
+
+<file path=ppt/theme/themeOverride30.xml><?xml version="1.0" encoding="utf-8"?>
 <a:themeOverride xmlns:a="http://schemas.openxmlformats.org/drawingml/2006/main">
   <a:clrScheme name="Custom 40">
     <a:dk1>

</xml_diff>

<commit_message>
added results to report
</commit_message>
<xml_diff>
--- a/report/report.pptx
+++ b/report/report.pptx
@@ -37,7 +37,12 @@
     <p:sldId id="292" r:id="rId31"/>
     <p:sldId id="290" r:id="rId32"/>
     <p:sldId id="286" r:id="rId33"/>
-    <p:sldId id="287" r:id="rId34"/>
+    <p:sldId id="293" r:id="rId34"/>
+    <p:sldId id="299" r:id="rId35"/>
+    <p:sldId id="302" r:id="rId36"/>
+    <p:sldId id="303" r:id="rId37"/>
+    <p:sldId id="287" r:id="rId38"/>
+    <p:sldId id="297" r:id="rId39"/>
   </p:sldIdLst>
   <p:sldSz cx="12192000" cy="6858000"/>
   <p:notesSz cx="6858000" cy="9144000"/>
@@ -293,7 +298,7 @@
           <a:p>
             <a:fld id="{3C2B07E4-CDF9-4C88-A2F3-04620E58224D}" type="datetimeFigureOut">
               <a:rPr lang="en-US" smtClean="0"/>
-              <a:t>11/16/2021</a:t>
+              <a:t>11/17/2021</a:t>
             </a:fld>
             <a:endParaRPr lang="en-US"/>
           </a:p>
@@ -583,7 +588,7 @@
           <a:p>
             <a:fld id="{3C2B07E4-CDF9-4C88-A2F3-04620E58224D}" type="datetimeFigureOut">
               <a:rPr lang="en-US" smtClean="0"/>
-              <a:t>11/16/2021</a:t>
+              <a:t>11/17/2021</a:t>
             </a:fld>
             <a:endParaRPr lang="en-US"/>
           </a:p>
@@ -835,7 +840,7 @@
           <a:p>
             <a:fld id="{3C2B07E4-CDF9-4C88-A2F3-04620E58224D}" type="datetimeFigureOut">
               <a:rPr lang="en-US" smtClean="0"/>
-              <a:t>11/16/2021</a:t>
+              <a:t>11/17/2021</a:t>
             </a:fld>
             <a:endParaRPr lang="en-US"/>
           </a:p>
@@ -1023,7 +1028,7 @@
           <a:p>
             <a:fld id="{AA302EFC-ED59-4B4D-993E-400BC651A785}" type="datetime1">
               <a:rPr lang="en-US" smtClean="0"/>
-              <a:t>11/16/2021</a:t>
+              <a:t>11/17/2021</a:t>
             </a:fld>
             <a:endParaRPr lang="en-US" dirty="0"/>
           </a:p>
@@ -1215,7 +1220,7 @@
           <a:p>
             <a:fld id="{1067E7C5-37BF-4B94-8AB4-87E727052233}" type="datetime1">
               <a:rPr lang="en-US" smtClean="0"/>
-              <a:t>11/16/2021</a:t>
+              <a:t>11/17/2021</a:t>
             </a:fld>
             <a:endParaRPr lang="en-US" dirty="0"/>
           </a:p>
@@ -1407,7 +1412,7 @@
           <a:p>
             <a:fld id="{7B3F78A3-FD76-4F63-AF81-1396C1841E9C}" type="datetime1">
               <a:rPr lang="en-US" smtClean="0"/>
-              <a:t>11/16/2021</a:t>
+              <a:t>11/17/2021</a:t>
             </a:fld>
             <a:endParaRPr lang="en-US" dirty="0"/>
           </a:p>
@@ -1663,7 +1668,7 @@
           <a:p>
             <a:fld id="{3C2B07E4-CDF9-4C88-A2F3-04620E58224D}" type="datetimeFigureOut">
               <a:rPr lang="en-US" smtClean="0"/>
-              <a:t>11/16/2021</a:t>
+              <a:t>11/17/2021</a:t>
             </a:fld>
             <a:endParaRPr lang="en-US"/>
           </a:p>
@@ -1992,7 +1997,7 @@
           <a:p>
             <a:fld id="{3C2B07E4-CDF9-4C88-A2F3-04620E58224D}" type="datetimeFigureOut">
               <a:rPr lang="en-US" smtClean="0"/>
-              <a:t>11/16/2021</a:t>
+              <a:t>11/17/2021</a:t>
             </a:fld>
             <a:endParaRPr lang="en-US"/>
           </a:p>
@@ -2342,7 +2347,7 @@
           <a:p>
             <a:fld id="{3C2B07E4-CDF9-4C88-A2F3-04620E58224D}" type="datetimeFigureOut">
               <a:rPr lang="en-US" smtClean="0"/>
-              <a:t>11/16/2021</a:t>
+              <a:t>11/17/2021</a:t>
             </a:fld>
             <a:endParaRPr lang="en-US"/>
           </a:p>
@@ -2854,7 +2859,7 @@
           <a:p>
             <a:fld id="{3C2B07E4-CDF9-4C88-A2F3-04620E58224D}" type="datetimeFigureOut">
               <a:rPr lang="en-US" smtClean="0"/>
-              <a:t>11/16/2021</a:t>
+              <a:t>11/17/2021</a:t>
             </a:fld>
             <a:endParaRPr lang="en-US"/>
           </a:p>
@@ -3182,7 +3187,7 @@
           <a:p>
             <a:fld id="{3C2B07E4-CDF9-4C88-A2F3-04620E58224D}" type="datetimeFigureOut">
               <a:rPr lang="en-US" smtClean="0"/>
-              <a:t>11/16/2021</a:t>
+              <a:t>11/17/2021</a:t>
             </a:fld>
             <a:endParaRPr lang="en-US"/>
           </a:p>
@@ -3295,7 +3300,7 @@
           <a:p>
             <a:fld id="{3C2B07E4-CDF9-4C88-A2F3-04620E58224D}" type="datetimeFigureOut">
               <a:rPr lang="en-US" smtClean="0"/>
-              <a:t>11/16/2021</a:t>
+              <a:t>11/17/2021</a:t>
             </a:fld>
             <a:endParaRPr lang="en-US"/>
           </a:p>
@@ -3636,7 +3641,7 @@
           <a:p>
             <a:fld id="{3C2B07E4-CDF9-4C88-A2F3-04620E58224D}" type="datetimeFigureOut">
               <a:rPr lang="en-US" smtClean="0"/>
-              <a:t>11/16/2021</a:t>
+              <a:t>11/17/2021</a:t>
             </a:fld>
             <a:endParaRPr lang="en-US"/>
           </a:p>
@@ -3936,7 +3941,7 @@
           <a:p>
             <a:fld id="{3C2B07E4-CDF9-4C88-A2F3-04620E58224D}" type="datetimeFigureOut">
               <a:rPr lang="en-US" smtClean="0"/>
-              <a:t>11/16/2021</a:t>
+              <a:t>11/17/2021</a:t>
             </a:fld>
             <a:endParaRPr lang="en-US"/>
           </a:p>
@@ -4176,7 +4181,7 @@
             <a:fld id="{3C2B07E4-CDF9-4C88-A2F3-04620E58224D}" type="datetimeFigureOut">
               <a:rPr lang="en-US" smtClean="0"/>
               <a:pPr/>
-              <a:t>11/16/2021</a:t>
+              <a:t>11/17/2021</a:t>
             </a:fld>
             <a:endParaRPr lang="en-US" dirty="0"/>
           </a:p>
@@ -4775,7 +4780,7 @@
           <a:p>
             <a:fld id="{30B9AB43-16D5-496C-92E2-DD88A4837C90}" type="datetime1">
               <a:rPr lang="en-US" smtClean="0"/>
-              <a:t>11/16/2021</a:t>
+              <a:t>11/17/2021</a:t>
             </a:fld>
             <a:endParaRPr lang="en-US" dirty="0"/>
           </a:p>
@@ -5469,7 +5474,7 @@
           <a:p>
             <a:fld id="{2983D189-BC30-430F-BBBC-47FE85CCFEB3}" type="datetime1">
               <a:rPr lang="en-US" smtClean="0"/>
-              <a:t>11/16/2021</a:t>
+              <a:t>11/17/2021</a:t>
             </a:fld>
             <a:endParaRPr lang="en-US" dirty="0"/>
           </a:p>
@@ -6163,7 +6168,7 @@
           <a:p>
             <a:fld id="{E5E1D892-C2A9-4E2A-B7C0-5932B657ED52}" type="datetime1">
               <a:rPr lang="en-US" smtClean="0"/>
-              <a:t>11/16/2021</a:t>
+              <a:t>11/17/2021</a:t>
             </a:fld>
             <a:endParaRPr lang="en-US" dirty="0"/>
           </a:p>
@@ -11575,7 +11580,7 @@
             </a:r>
             <a:r>
               <a:rPr lang="en-US" sz="1600" b="1" dirty="0"/>
-              <a:t>Logistic Regression is the top model </a:t>
+              <a:t>Logistic Regression utilizing HOG and SIFT features is the top model </a:t>
             </a:r>
             <a:r>
               <a:rPr lang="en-US" sz="1600" dirty="0"/>
@@ -17803,13 +17808,13 @@
             <p:ph idx="1"/>
             <p:extLst>
               <p:ext uri="{D42A27DB-BD31-4B8C-83A1-F6EECF244321}">
-                <p14:modId xmlns:p14="http://schemas.microsoft.com/office/powerpoint/2010/main" val="3223112305"/>
+                <p14:modId xmlns:p14="http://schemas.microsoft.com/office/powerpoint/2010/main" val="3010512451"/>
               </p:ext>
             </p:extLst>
           </p:nvPr>
         </p:nvGraphicFramePr>
         <p:xfrm>
-          <a:off x="1096962" y="2108198"/>
+          <a:off x="1103304" y="2081269"/>
           <a:ext cx="10280283" cy="4134109"/>
         </p:xfrm>
         <a:graphic>
@@ -19496,6 +19501,20 @@
             </a:r>
           </a:p>
           <a:p>
+            <a:pPr marL="726948" lvl="2" indent="-342900">
+              <a:buFont typeface="+mj-lt"/>
+              <a:buAutoNum type="arabicPeriod"/>
+            </a:pPr>
+            <a:r>
+              <a:rPr lang="en-US" dirty="0">
+                <a:solidFill>
+                  <a:schemeClr val="tx1"/>
+                </a:solidFill>
+              </a:rPr>
+              <a:t>Ideas and further discussion</a:t>
+            </a:r>
+          </a:p>
+          <a:p>
             <a:pPr marL="544068" lvl="1" indent="-342900">
               <a:buFont typeface="+mj-lt"/>
               <a:buAutoNum type="arabicPeriod" startAt="4"/>
@@ -19607,6 +19626,2262 @@
           <a:chExt cx="0" cy="0"/>
         </a:xfrm>
       </p:grpSpPr>
+      <p:sp useBgFill="1">
+        <p:nvSpPr>
+          <p:cNvPr id="20" name="Rectangle 19">
+            <a:extLst>
+              <a:ext uri="{FF2B5EF4-FFF2-40B4-BE49-F238E27FC236}">
+                <a16:creationId xmlns:a16="http://schemas.microsoft.com/office/drawing/2014/main" id="{13BCCAE5-A35B-4B66-A4A7-E23C34A403A4}"/>
+              </a:ext>
+              <a:ext uri="{C183D7F6-B498-43B3-948B-1728B52AA6E4}">
+                <adec:decorative xmlns:adec="http://schemas.microsoft.com/office/drawing/2017/decorative" val="1"/>
+              </a:ext>
+            </a:extLst>
+          </p:cNvPr>
+          <p:cNvSpPr>
+            <a:spLocks noGrp="1" noRot="1" noChangeAspect="1" noMove="1" noResize="1" noEditPoints="1" noAdjustHandles="1" noChangeArrowheads="1" noChangeShapeType="1" noTextEdit="1"/>
+          </p:cNvSpPr>
+          <p:nvPr>
+            <p:extLst>
+              <p:ext uri="{386F3935-93C4-4BCD-93E2-E3B085C9AB24}">
+                <p16:designElem xmlns:p16="http://schemas.microsoft.com/office/powerpoint/2015/main" val="1"/>
+              </p:ext>
+            </p:extLst>
+          </p:nvPr>
+        </p:nvSpPr>
+        <p:spPr>
+          <a:xfrm>
+            <a:off x="0" y="0"/>
+            <a:ext cx="12192000" cy="6858000"/>
+          </a:xfrm>
+          <a:prstGeom prst="rect">
+            <a:avLst/>
+          </a:prstGeom>
+          <a:ln>
+            <a:noFill/>
+          </a:ln>
+        </p:spPr>
+        <p:style>
+          <a:lnRef idx="2">
+            <a:schemeClr val="accent1">
+              <a:shade val="50000"/>
+            </a:schemeClr>
+          </a:lnRef>
+          <a:fillRef idx="1">
+            <a:schemeClr val="accent1"/>
+          </a:fillRef>
+          <a:effectRef idx="0">
+            <a:schemeClr val="accent1"/>
+          </a:effectRef>
+          <a:fontRef idx="minor">
+            <a:schemeClr val="lt1"/>
+          </a:fontRef>
+        </p:style>
+        <p:txBody>
+          <a:bodyPr rtlCol="0" anchor="ctr"/>
+          <a:lstStyle/>
+          <a:p>
+            <a:pPr algn="ctr"/>
+            <a:endParaRPr lang="en-US"/>
+          </a:p>
+        </p:txBody>
+      </p:sp>
+      <p:sp>
+        <p:nvSpPr>
+          <p:cNvPr id="2" name="Title 1">
+            <a:extLst>
+              <a:ext uri="{FF2B5EF4-FFF2-40B4-BE49-F238E27FC236}">
+                <a16:creationId xmlns:a16="http://schemas.microsoft.com/office/drawing/2014/main" id="{66A47F5C-50EC-416A-AE8C-6F6BB4225673}"/>
+              </a:ext>
+            </a:extLst>
+          </p:cNvPr>
+          <p:cNvSpPr>
+            <a:spLocks noGrp="1"/>
+          </p:cNvSpPr>
+          <p:nvPr>
+            <p:ph type="title"/>
+          </p:nvPr>
+        </p:nvSpPr>
+        <p:spPr>
+          <a:xfrm>
+            <a:off x="1097280" y="286603"/>
+            <a:ext cx="10058400" cy="1450757"/>
+          </a:xfrm>
+        </p:spPr>
+        <p:txBody>
+          <a:bodyPr>
+            <a:normAutofit/>
+          </a:bodyPr>
+          <a:lstStyle/>
+          <a:p>
+            <a:r>
+              <a:rPr lang="en-US" sz="4400" b="1" dirty="0"/>
+              <a:t>Results</a:t>
+            </a:r>
+          </a:p>
+        </p:txBody>
+      </p:sp>
+      <p:cxnSp>
+        <p:nvCxnSpPr>
+          <p:cNvPr id="22" name="Straight Connector 21">
+            <a:extLst>
+              <a:ext uri="{FF2B5EF4-FFF2-40B4-BE49-F238E27FC236}">
+                <a16:creationId xmlns:a16="http://schemas.microsoft.com/office/drawing/2014/main" id="{6987BDFB-DE64-4B56-B44F-45FAE19FA94E}"/>
+              </a:ext>
+              <a:ext uri="{C183D7F6-B498-43B3-948B-1728B52AA6E4}">
+                <adec:decorative xmlns:adec="http://schemas.microsoft.com/office/drawing/2017/decorative" val="1"/>
+              </a:ext>
+            </a:extLst>
+          </p:cNvPr>
+          <p:cNvCxnSpPr>
+            <a:cxnSpLocks noGrp="1" noRot="1" noChangeAspect="1" noMove="1" noResize="1" noEditPoints="1" noAdjustHandles="1" noChangeArrowheads="1" noChangeShapeType="1"/>
+          </p:cNvCxnSpPr>
+          <p:nvPr>
+            <p:extLst>
+              <p:ext uri="{386F3935-93C4-4BCD-93E2-E3B085C9AB24}">
+                <p16:designElem xmlns:p16="http://schemas.microsoft.com/office/powerpoint/2015/main" val="1"/>
+              </p:ext>
+            </p:extLst>
+          </p:nvPr>
+        </p:nvCxnSpPr>
+        <p:spPr>
+          <a:xfrm>
+            <a:off x="1193532" y="1895846"/>
+            <a:ext cx="9966960" cy="0"/>
+          </a:xfrm>
+          <a:prstGeom prst="line">
+            <a:avLst/>
+          </a:prstGeom>
+          <a:ln w="12700">
+            <a:solidFill>
+              <a:schemeClr val="tx1">
+                <a:lumMod val="75000"/>
+                <a:lumOff val="25000"/>
+              </a:schemeClr>
+            </a:solidFill>
+          </a:ln>
+        </p:spPr>
+        <p:style>
+          <a:lnRef idx="1">
+            <a:schemeClr val="accent1"/>
+          </a:lnRef>
+          <a:fillRef idx="0">
+            <a:schemeClr val="accent1"/>
+          </a:fillRef>
+          <a:effectRef idx="0">
+            <a:schemeClr val="accent1"/>
+          </a:effectRef>
+          <a:fontRef idx="minor">
+            <a:schemeClr val="tx1"/>
+          </a:fontRef>
+        </p:style>
+      </p:cxnSp>
+      <p:sp>
+        <p:nvSpPr>
+          <p:cNvPr id="24" name="Rectangle 23">
+            <a:extLst>
+              <a:ext uri="{FF2B5EF4-FFF2-40B4-BE49-F238E27FC236}">
+                <a16:creationId xmlns:a16="http://schemas.microsoft.com/office/drawing/2014/main" id="{CB06839E-D8C3-4A74-BA2B-3B97E7B2CDB5}"/>
+              </a:ext>
+              <a:ext uri="{C183D7F6-B498-43B3-948B-1728B52AA6E4}">
+                <adec:decorative xmlns:adec="http://schemas.microsoft.com/office/drawing/2017/decorative" val="1"/>
+              </a:ext>
+            </a:extLst>
+          </p:cNvPr>
+          <p:cNvSpPr>
+            <a:spLocks noGrp="1" noRot="1" noChangeAspect="1" noMove="1" noResize="1" noEditPoints="1" noAdjustHandles="1" noChangeArrowheads="1" noChangeShapeType="1" noTextEdit="1"/>
+          </p:cNvSpPr>
+          <p:nvPr>
+            <p:extLst>
+              <p:ext uri="{386F3935-93C4-4BCD-93E2-E3B085C9AB24}">
+                <p16:designElem xmlns:p16="http://schemas.microsoft.com/office/powerpoint/2015/main" val="1"/>
+              </p:ext>
+            </p:extLst>
+          </p:nvPr>
+        </p:nvSpPr>
+        <p:spPr>
+          <a:xfrm>
+            <a:off x="0" y="6400800"/>
+            <a:ext cx="12192000" cy="457200"/>
+          </a:xfrm>
+          <a:prstGeom prst="rect">
+            <a:avLst/>
+          </a:prstGeom>
+          <a:solidFill>
+            <a:srgbClr val="262626"/>
+          </a:solidFill>
+          <a:ln>
+            <a:noFill/>
+          </a:ln>
+        </p:spPr>
+        <p:style>
+          <a:lnRef idx="2">
+            <a:schemeClr val="accent1">
+              <a:shade val="50000"/>
+            </a:schemeClr>
+          </a:lnRef>
+          <a:fillRef idx="1">
+            <a:schemeClr val="accent1"/>
+          </a:fillRef>
+          <a:effectRef idx="0">
+            <a:schemeClr val="accent1"/>
+          </a:effectRef>
+          <a:fontRef idx="minor">
+            <a:schemeClr val="lt1"/>
+          </a:fontRef>
+        </p:style>
+      </p:sp>
+      <p:sp>
+        <p:nvSpPr>
+          <p:cNvPr id="3" name="Slide Number Placeholder 2">
+            <a:extLst>
+              <a:ext uri="{FF2B5EF4-FFF2-40B4-BE49-F238E27FC236}">
+                <a16:creationId xmlns:a16="http://schemas.microsoft.com/office/drawing/2014/main" id="{62888FFB-7856-4FD3-904D-31C04443AFCE}"/>
+              </a:ext>
+            </a:extLst>
+          </p:cNvPr>
+          <p:cNvSpPr>
+            <a:spLocks noGrp="1"/>
+          </p:cNvSpPr>
+          <p:nvPr>
+            <p:ph type="sldNum" sz="quarter" idx="12"/>
+          </p:nvPr>
+        </p:nvSpPr>
+        <p:spPr/>
+        <p:txBody>
+          <a:bodyPr/>
+          <a:lstStyle/>
+          <a:p>
+            <a:fld id="{3A98EE3D-8CD1-4C3F-BD1C-C98C9596463C}" type="slidenum">
+              <a:rPr lang="en-US" smtClean="0"/>
+              <a:t>30</a:t>
+            </a:fld>
+            <a:endParaRPr lang="en-US" dirty="0"/>
+          </a:p>
+        </p:txBody>
+      </p:sp>
+      <p:sp>
+        <p:nvSpPr>
+          <p:cNvPr id="4" name="Footer Placeholder 3">
+            <a:extLst>
+              <a:ext uri="{FF2B5EF4-FFF2-40B4-BE49-F238E27FC236}">
+                <a16:creationId xmlns:a16="http://schemas.microsoft.com/office/drawing/2014/main" id="{21335309-C5B7-46CB-95D3-F06A76937F01}"/>
+              </a:ext>
+            </a:extLst>
+          </p:cNvPr>
+          <p:cNvSpPr>
+            <a:spLocks noGrp="1"/>
+          </p:cNvSpPr>
+          <p:nvPr>
+            <p:ph type="ftr" sz="quarter" idx="11"/>
+          </p:nvPr>
+        </p:nvSpPr>
+        <p:spPr/>
+        <p:txBody>
+          <a:bodyPr/>
+          <a:lstStyle/>
+          <a:p>
+            <a:r>
+              <a:rPr lang="en-US"/>
+              <a:t>Lampros Lountzis</a:t>
+            </a:r>
+            <a:endParaRPr lang="en-US" dirty="0"/>
+          </a:p>
+        </p:txBody>
+      </p:sp>
+      <p:graphicFrame>
+        <p:nvGraphicFramePr>
+          <p:cNvPr id="11" name="Table 6">
+            <a:extLst>
+              <a:ext uri="{FF2B5EF4-FFF2-40B4-BE49-F238E27FC236}">
+                <a16:creationId xmlns:a16="http://schemas.microsoft.com/office/drawing/2014/main" id="{B03480C4-57E8-4229-A5B8-9D5A6BFF4B08}"/>
+              </a:ext>
+            </a:extLst>
+          </p:cNvPr>
+          <p:cNvGraphicFramePr>
+            <a:graphicFrameLocks/>
+          </p:cNvGraphicFramePr>
+          <p:nvPr>
+            <p:extLst>
+              <p:ext uri="{D42A27DB-BD31-4B8C-83A1-F6EECF244321}">
+                <p14:modId xmlns:p14="http://schemas.microsoft.com/office/powerpoint/2010/main" val="3254420828"/>
+              </p:ext>
+            </p:extLst>
+          </p:nvPr>
+        </p:nvGraphicFramePr>
+        <p:xfrm>
+          <a:off x="1103304" y="2081269"/>
+          <a:ext cx="10280283" cy="2131917"/>
+        </p:xfrm>
+        <a:graphic>
+          <a:graphicData uri="http://schemas.openxmlformats.org/drawingml/2006/table">
+            <a:tbl>
+              <a:tblPr firstRow="1" bandRow="1">
+                <a:tableStyleId>{5940675A-B579-460E-94D1-54222C63F5DA}</a:tableStyleId>
+              </a:tblPr>
+              <a:tblGrid>
+                <a:gridCol w="2355230">
+                  <a:extLst>
+                    <a:ext uri="{9D8B030D-6E8A-4147-A177-3AD203B41FA5}">
+                      <a16:colId xmlns:a16="http://schemas.microsoft.com/office/drawing/2014/main" val="2850099436"/>
+                    </a:ext>
+                  </a:extLst>
+                </a:gridCol>
+                <a:gridCol w="1971097">
+                  <a:extLst>
+                    <a:ext uri="{9D8B030D-6E8A-4147-A177-3AD203B41FA5}">
+                      <a16:colId xmlns:a16="http://schemas.microsoft.com/office/drawing/2014/main" val="2335639406"/>
+                    </a:ext>
+                  </a:extLst>
+                </a:gridCol>
+                <a:gridCol w="1964065">
+                  <a:extLst>
+                    <a:ext uri="{9D8B030D-6E8A-4147-A177-3AD203B41FA5}">
+                      <a16:colId xmlns:a16="http://schemas.microsoft.com/office/drawing/2014/main" val="4169965812"/>
+                    </a:ext>
+                  </a:extLst>
+                </a:gridCol>
+                <a:gridCol w="1939359">
+                  <a:extLst>
+                    <a:ext uri="{9D8B030D-6E8A-4147-A177-3AD203B41FA5}">
+                      <a16:colId xmlns:a16="http://schemas.microsoft.com/office/drawing/2014/main" val="556915451"/>
+                    </a:ext>
+                  </a:extLst>
+                </a:gridCol>
+                <a:gridCol w="2050532">
+                  <a:extLst>
+                    <a:ext uri="{9D8B030D-6E8A-4147-A177-3AD203B41FA5}">
+                      <a16:colId xmlns:a16="http://schemas.microsoft.com/office/drawing/2014/main" val="1703804736"/>
+                    </a:ext>
+                  </a:extLst>
+                </a:gridCol>
+              </a:tblGrid>
+              <a:tr h="488127">
+                <a:tc>
+                  <a:txBody>
+                    <a:bodyPr/>
+                    <a:lstStyle/>
+                    <a:p>
+                      <a:pPr algn="ctr"/>
+                      <a:endParaRPr lang="en-US" sz="1600" dirty="0"/>
+                    </a:p>
+                  </a:txBody>
+                  <a:tcPr anchor="ctr">
+                    <a:solidFill>
+                      <a:schemeClr val="accent4">
+                        <a:lumMod val="75000"/>
+                      </a:schemeClr>
+                    </a:solidFill>
+                  </a:tcPr>
+                </a:tc>
+                <a:tc gridSpan="2">
+                  <a:txBody>
+                    <a:bodyPr/>
+                    <a:lstStyle/>
+                    <a:p>
+                      <a:pPr algn="ctr"/>
+                      <a:r>
+                        <a:rPr lang="en-US" sz="1600" b="1" dirty="0">
+                          <a:solidFill>
+                            <a:schemeClr val="bg1"/>
+                          </a:solidFill>
+                        </a:rPr>
+                        <a:t>Accuracy</a:t>
+                      </a:r>
+                    </a:p>
+                  </a:txBody>
+                  <a:tcPr anchor="ctr">
+                    <a:solidFill>
+                      <a:schemeClr val="accent4">
+                        <a:lumMod val="75000"/>
+                      </a:schemeClr>
+                    </a:solidFill>
+                  </a:tcPr>
+                </a:tc>
+                <a:tc hMerge="1">
+                  <a:txBody>
+                    <a:bodyPr/>
+                    <a:lstStyle/>
+                    <a:p>
+                      <a:endParaRPr lang="en-US" dirty="0"/>
+                    </a:p>
+                  </a:txBody>
+                  <a:tcPr/>
+                </a:tc>
+                <a:tc gridSpan="2">
+                  <a:txBody>
+                    <a:bodyPr/>
+                    <a:lstStyle/>
+                    <a:p>
+                      <a:pPr algn="ctr"/>
+                      <a:r>
+                        <a:rPr lang="en-US" sz="1600" b="1" dirty="0">
+                          <a:solidFill>
+                            <a:schemeClr val="bg1"/>
+                          </a:solidFill>
+                        </a:rPr>
+                        <a:t>Precision</a:t>
+                      </a:r>
+                    </a:p>
+                  </a:txBody>
+                  <a:tcPr anchor="ctr">
+                    <a:solidFill>
+                      <a:schemeClr val="accent4">
+                        <a:lumMod val="75000"/>
+                      </a:schemeClr>
+                    </a:solidFill>
+                  </a:tcPr>
+                </a:tc>
+                <a:tc hMerge="1">
+                  <a:txBody>
+                    <a:bodyPr/>
+                    <a:lstStyle/>
+                    <a:p>
+                      <a:endParaRPr lang="en-US" dirty="0"/>
+                    </a:p>
+                  </a:txBody>
+                  <a:tcPr/>
+                </a:tc>
+                <a:extLst>
+                  <a:ext uri="{0D108BD9-81ED-4DB2-BD59-A6C34878D82A}">
+                    <a16:rowId xmlns:a16="http://schemas.microsoft.com/office/drawing/2014/main" val="3560635304"/>
+                  </a:ext>
+                </a:extLst>
+              </a:tr>
+              <a:tr h="500548">
+                <a:tc>
+                  <a:txBody>
+                    <a:bodyPr/>
+                    <a:lstStyle/>
+                    <a:p>
+                      <a:pPr algn="ctr"/>
+                      <a:endParaRPr lang="en-US" sz="1600" dirty="0"/>
+                    </a:p>
+                  </a:txBody>
+                  <a:tcPr anchor="ctr"/>
+                </a:tc>
+                <a:tc>
+                  <a:txBody>
+                    <a:bodyPr/>
+                    <a:lstStyle/>
+                    <a:p>
+                      <a:pPr algn="ctr"/>
+                      <a:r>
+                        <a:rPr lang="en-US" sz="1600" b="1" dirty="0"/>
+                        <a:t>Train</a:t>
+                      </a:r>
+                    </a:p>
+                  </a:txBody>
+                  <a:tcPr anchor="ctr"/>
+                </a:tc>
+                <a:tc>
+                  <a:txBody>
+                    <a:bodyPr/>
+                    <a:lstStyle/>
+                    <a:p>
+                      <a:pPr algn="ctr"/>
+                      <a:r>
+                        <a:rPr lang="en-US" sz="1600" b="1" dirty="0"/>
+                        <a:t>Test</a:t>
+                      </a:r>
+                    </a:p>
+                  </a:txBody>
+                  <a:tcPr anchor="ctr"/>
+                </a:tc>
+                <a:tc>
+                  <a:txBody>
+                    <a:bodyPr/>
+                    <a:lstStyle/>
+                    <a:p>
+                      <a:pPr algn="ctr"/>
+                      <a:r>
+                        <a:rPr lang="en-US" sz="1600" b="1" dirty="0"/>
+                        <a:t>Train</a:t>
+                      </a:r>
+                    </a:p>
+                  </a:txBody>
+                  <a:tcPr anchor="ctr"/>
+                </a:tc>
+                <a:tc>
+                  <a:txBody>
+                    <a:bodyPr/>
+                    <a:lstStyle/>
+                    <a:p>
+                      <a:pPr algn="ctr"/>
+                      <a:r>
+                        <a:rPr lang="en-US" sz="1600" b="1" dirty="0"/>
+                        <a:t>Test</a:t>
+                      </a:r>
+                    </a:p>
+                  </a:txBody>
+                  <a:tcPr anchor="ctr"/>
+                </a:tc>
+                <a:extLst>
+                  <a:ext uri="{0D108BD9-81ED-4DB2-BD59-A6C34878D82A}">
+                    <a16:rowId xmlns:a16="http://schemas.microsoft.com/office/drawing/2014/main" val="1797386385"/>
+                  </a:ext>
+                </a:extLst>
+              </a:tr>
+              <a:tr h="571621">
+                <a:tc>
+                  <a:txBody>
+                    <a:bodyPr/>
+                    <a:lstStyle/>
+                    <a:p>
+                      <a:pPr marL="0" marR="0" lvl="0" indent="0" algn="ctr" defTabSz="914400" rtl="0" eaLnBrk="1" fontAlgn="auto" latinLnBrk="0" hangingPunct="1">
+                        <a:lnSpc>
+                          <a:spcPct val="100000"/>
+                        </a:lnSpc>
+                        <a:spcBef>
+                          <a:spcPts val="0"/>
+                        </a:spcBef>
+                        <a:spcAft>
+                          <a:spcPts val="0"/>
+                        </a:spcAft>
+                        <a:buClrTx/>
+                        <a:buSzTx/>
+                        <a:buFontTx/>
+                        <a:buNone/>
+                        <a:tabLst/>
+                        <a:defRPr/>
+                      </a:pPr>
+                      <a:r>
+                        <a:rPr lang="en-US" sz="1600" b="1" dirty="0"/>
+                        <a:t>BOVW</a:t>
+                      </a:r>
+                    </a:p>
+                  </a:txBody>
+                  <a:tcPr anchor="ctr"/>
+                </a:tc>
+                <a:tc>
+                  <a:txBody>
+                    <a:bodyPr/>
+                    <a:lstStyle/>
+                    <a:p>
+                      <a:pPr algn="ctr"/>
+                      <a:r>
+                        <a:rPr lang="en-US" sz="1600" dirty="0"/>
+                        <a:t>60%</a:t>
+                      </a:r>
+                    </a:p>
+                  </a:txBody>
+                  <a:tcPr anchor="ctr"/>
+                </a:tc>
+                <a:tc>
+                  <a:txBody>
+                    <a:bodyPr/>
+                    <a:lstStyle/>
+                    <a:p>
+                      <a:pPr algn="ctr"/>
+                      <a:r>
+                        <a:rPr lang="en-US" sz="1600" dirty="0"/>
+                        <a:t>56%</a:t>
+                      </a:r>
+                    </a:p>
+                  </a:txBody>
+                  <a:tcPr anchor="ctr"/>
+                </a:tc>
+                <a:tc>
+                  <a:txBody>
+                    <a:bodyPr/>
+                    <a:lstStyle/>
+                    <a:p>
+                      <a:pPr algn="ctr"/>
+                      <a:r>
+                        <a:rPr lang="en-US" sz="1600" dirty="0"/>
+                        <a:t>59%</a:t>
+                      </a:r>
+                    </a:p>
+                  </a:txBody>
+                  <a:tcPr anchor="ctr"/>
+                </a:tc>
+                <a:tc>
+                  <a:txBody>
+                    <a:bodyPr/>
+                    <a:lstStyle/>
+                    <a:p>
+                      <a:pPr algn="ctr"/>
+                      <a:r>
+                        <a:rPr lang="en-US" sz="1600" dirty="0"/>
+                        <a:t>56%</a:t>
+                      </a:r>
+                    </a:p>
+                  </a:txBody>
+                  <a:tcPr anchor="ctr"/>
+                </a:tc>
+                <a:extLst>
+                  <a:ext uri="{0D108BD9-81ED-4DB2-BD59-A6C34878D82A}">
+                    <a16:rowId xmlns:a16="http://schemas.microsoft.com/office/drawing/2014/main" val="1866706773"/>
+                  </a:ext>
+                </a:extLst>
+              </a:tr>
+              <a:tr h="571621">
+                <a:tc>
+                  <a:txBody>
+                    <a:bodyPr/>
+                    <a:lstStyle/>
+                    <a:p>
+                      <a:pPr marL="0" algn="ctr" defTabSz="914400" rtl="0" eaLnBrk="1" latinLnBrk="0" hangingPunct="1"/>
+                      <a:r>
+                        <a:rPr lang="en-US" sz="1600" b="1" kern="1200" dirty="0">
+                          <a:solidFill>
+                            <a:schemeClr val="tx1"/>
+                          </a:solidFill>
+                          <a:latin typeface="+mn-lt"/>
+                          <a:ea typeface="+mn-ea"/>
+                          <a:cs typeface="+mn-cs"/>
+                        </a:rPr>
+                        <a:t>VGG-16</a:t>
+                      </a:r>
+                    </a:p>
+                  </a:txBody>
+                  <a:tcPr anchor="ctr">
+                    <a:solidFill>
+                      <a:schemeClr val="accent4">
+                        <a:lumMod val="40000"/>
+                        <a:lumOff val="60000"/>
+                      </a:schemeClr>
+                    </a:solidFill>
+                  </a:tcPr>
+                </a:tc>
+                <a:tc>
+                  <a:txBody>
+                    <a:bodyPr/>
+                    <a:lstStyle/>
+                    <a:p>
+                      <a:pPr algn="ctr"/>
+                      <a:r>
+                        <a:rPr lang="en-US" sz="1600" dirty="0"/>
+                        <a:t>89%</a:t>
+                      </a:r>
+                    </a:p>
+                  </a:txBody>
+                  <a:tcPr anchor="ctr">
+                    <a:solidFill>
+                      <a:schemeClr val="accent4">
+                        <a:lumMod val="40000"/>
+                        <a:lumOff val="60000"/>
+                      </a:schemeClr>
+                    </a:solidFill>
+                  </a:tcPr>
+                </a:tc>
+                <a:tc>
+                  <a:txBody>
+                    <a:bodyPr/>
+                    <a:lstStyle/>
+                    <a:p>
+                      <a:pPr algn="ctr"/>
+                      <a:r>
+                        <a:rPr lang="en-US" sz="1600" dirty="0"/>
+                        <a:t>85%</a:t>
+                      </a:r>
+                    </a:p>
+                  </a:txBody>
+                  <a:tcPr anchor="ctr">
+                    <a:solidFill>
+                      <a:schemeClr val="accent4">
+                        <a:lumMod val="40000"/>
+                        <a:lumOff val="60000"/>
+                      </a:schemeClr>
+                    </a:solidFill>
+                  </a:tcPr>
+                </a:tc>
+                <a:tc>
+                  <a:txBody>
+                    <a:bodyPr/>
+                    <a:lstStyle/>
+                    <a:p>
+                      <a:pPr algn="ctr"/>
+                      <a:r>
+                        <a:rPr lang="en-US" sz="1600" dirty="0"/>
+                        <a:t>89%</a:t>
+                      </a:r>
+                    </a:p>
+                  </a:txBody>
+                  <a:tcPr anchor="ctr">
+                    <a:solidFill>
+                      <a:schemeClr val="accent4">
+                        <a:lumMod val="40000"/>
+                        <a:lumOff val="60000"/>
+                      </a:schemeClr>
+                    </a:solidFill>
+                  </a:tcPr>
+                </a:tc>
+                <a:tc>
+                  <a:txBody>
+                    <a:bodyPr/>
+                    <a:lstStyle/>
+                    <a:p>
+                      <a:pPr algn="ctr"/>
+                      <a:r>
+                        <a:rPr lang="en-US" sz="1600" dirty="0"/>
+                        <a:t>85%</a:t>
+                      </a:r>
+                    </a:p>
+                  </a:txBody>
+                  <a:tcPr anchor="ctr">
+                    <a:solidFill>
+                      <a:schemeClr val="accent4">
+                        <a:lumMod val="40000"/>
+                        <a:lumOff val="60000"/>
+                      </a:schemeClr>
+                    </a:solidFill>
+                  </a:tcPr>
+                </a:tc>
+                <a:extLst>
+                  <a:ext uri="{0D108BD9-81ED-4DB2-BD59-A6C34878D82A}">
+                    <a16:rowId xmlns:a16="http://schemas.microsoft.com/office/drawing/2014/main" val="806043475"/>
+                  </a:ext>
+                </a:extLst>
+              </a:tr>
+            </a:tbl>
+          </a:graphicData>
+        </a:graphic>
+      </p:graphicFrame>
+      <p:graphicFrame>
+        <p:nvGraphicFramePr>
+          <p:cNvPr id="12" name="Table 6">
+            <a:extLst>
+              <a:ext uri="{FF2B5EF4-FFF2-40B4-BE49-F238E27FC236}">
+                <a16:creationId xmlns:a16="http://schemas.microsoft.com/office/drawing/2014/main" id="{D2EB11C7-E36B-4432-BA03-8A67842F63CF}"/>
+              </a:ext>
+            </a:extLst>
+          </p:cNvPr>
+          <p:cNvGraphicFramePr>
+            <a:graphicFrameLocks/>
+          </p:cNvGraphicFramePr>
+          <p:nvPr>
+            <p:extLst>
+              <p:ext uri="{D42A27DB-BD31-4B8C-83A1-F6EECF244321}">
+                <p14:modId xmlns:p14="http://schemas.microsoft.com/office/powerpoint/2010/main" val="4207951198"/>
+              </p:ext>
+            </p:extLst>
+          </p:nvPr>
+        </p:nvGraphicFramePr>
+        <p:xfrm>
+          <a:off x="2950752" y="4503658"/>
+          <a:ext cx="6585385" cy="1631369"/>
+        </p:xfrm>
+        <a:graphic>
+          <a:graphicData uri="http://schemas.openxmlformats.org/drawingml/2006/table">
+            <a:tbl>
+              <a:tblPr firstRow="1" bandRow="1">
+                <a:tableStyleId>{5940675A-B579-460E-94D1-54222C63F5DA}</a:tableStyleId>
+              </a:tblPr>
+              <a:tblGrid>
+                <a:gridCol w="2305359">
+                  <a:extLst>
+                    <a:ext uri="{9D8B030D-6E8A-4147-A177-3AD203B41FA5}">
+                      <a16:colId xmlns:a16="http://schemas.microsoft.com/office/drawing/2014/main" val="2850099436"/>
+                    </a:ext>
+                  </a:extLst>
+                </a:gridCol>
+                <a:gridCol w="4280026">
+                  <a:extLst>
+                    <a:ext uri="{9D8B030D-6E8A-4147-A177-3AD203B41FA5}">
+                      <a16:colId xmlns:a16="http://schemas.microsoft.com/office/drawing/2014/main" val="2335639406"/>
+                    </a:ext>
+                  </a:extLst>
+                </a:gridCol>
+              </a:tblGrid>
+              <a:tr h="488127">
+                <a:tc>
+                  <a:txBody>
+                    <a:bodyPr/>
+                    <a:lstStyle/>
+                    <a:p>
+                      <a:pPr algn="ctr"/>
+                      <a:endParaRPr lang="en-US" sz="1600" dirty="0"/>
+                    </a:p>
+                  </a:txBody>
+                  <a:tcPr anchor="ctr">
+                    <a:solidFill>
+                      <a:schemeClr val="accent4">
+                        <a:lumMod val="75000"/>
+                      </a:schemeClr>
+                    </a:solidFill>
+                  </a:tcPr>
+                </a:tc>
+                <a:tc>
+                  <a:txBody>
+                    <a:bodyPr/>
+                    <a:lstStyle/>
+                    <a:p>
+                      <a:pPr algn="ctr"/>
+                      <a:r>
+                        <a:rPr lang="en-US" sz="1600" b="1" dirty="0">
+                          <a:solidFill>
+                            <a:schemeClr val="bg1"/>
+                          </a:solidFill>
+                        </a:rPr>
+                        <a:t>Mean Average Precision (MAP) @ 100</a:t>
+                      </a:r>
+                    </a:p>
+                  </a:txBody>
+                  <a:tcPr anchor="ctr">
+                    <a:solidFill>
+                      <a:schemeClr val="accent4">
+                        <a:lumMod val="75000"/>
+                      </a:schemeClr>
+                    </a:solidFill>
+                  </a:tcPr>
+                </a:tc>
+                <a:extLst>
+                  <a:ext uri="{0D108BD9-81ED-4DB2-BD59-A6C34878D82A}">
+                    <a16:rowId xmlns:a16="http://schemas.microsoft.com/office/drawing/2014/main" val="3560635304"/>
+                  </a:ext>
+                </a:extLst>
+              </a:tr>
+              <a:tr h="571621">
+                <a:tc>
+                  <a:txBody>
+                    <a:bodyPr/>
+                    <a:lstStyle/>
+                    <a:p>
+                      <a:pPr algn="ctr"/>
+                      <a:r>
+                        <a:rPr lang="en-US" sz="1600" b="1" dirty="0"/>
+                        <a:t>BOVW</a:t>
+                      </a:r>
+                    </a:p>
+                  </a:txBody>
+                  <a:tcPr anchor="ctr"/>
+                </a:tc>
+                <a:tc>
+                  <a:txBody>
+                    <a:bodyPr/>
+                    <a:lstStyle/>
+                    <a:p>
+                      <a:pPr algn="ctr"/>
+                      <a:r>
+                        <a:rPr lang="en-US" sz="1600" dirty="0"/>
+                        <a:t>0.0019</a:t>
+                      </a:r>
+                    </a:p>
+                  </a:txBody>
+                  <a:tcPr anchor="ctr"/>
+                </a:tc>
+                <a:extLst>
+                  <a:ext uri="{0D108BD9-81ED-4DB2-BD59-A6C34878D82A}">
+                    <a16:rowId xmlns:a16="http://schemas.microsoft.com/office/drawing/2014/main" val="1866706773"/>
+                  </a:ext>
+                </a:extLst>
+              </a:tr>
+              <a:tr h="571621">
+                <a:tc>
+                  <a:txBody>
+                    <a:bodyPr/>
+                    <a:lstStyle/>
+                    <a:p>
+                      <a:pPr marL="0" marR="0" lvl="0" indent="0" algn="ctr" defTabSz="914400" rtl="0" eaLnBrk="1" fontAlgn="auto" latinLnBrk="0" hangingPunct="1">
+                        <a:lnSpc>
+                          <a:spcPct val="100000"/>
+                        </a:lnSpc>
+                        <a:spcBef>
+                          <a:spcPts val="0"/>
+                        </a:spcBef>
+                        <a:spcAft>
+                          <a:spcPts val="0"/>
+                        </a:spcAft>
+                        <a:buClrTx/>
+                        <a:buSzTx/>
+                        <a:buFontTx/>
+                        <a:buNone/>
+                        <a:tabLst/>
+                        <a:defRPr/>
+                      </a:pPr>
+                      <a:r>
+                        <a:rPr lang="en-US" sz="1600" b="1" dirty="0"/>
+                        <a:t>VGG-16</a:t>
+                      </a:r>
+                    </a:p>
+                  </a:txBody>
+                  <a:tcPr anchor="ctr">
+                    <a:solidFill>
+                      <a:schemeClr val="accent4">
+                        <a:lumMod val="40000"/>
+                        <a:lumOff val="60000"/>
+                      </a:schemeClr>
+                    </a:solidFill>
+                  </a:tcPr>
+                </a:tc>
+                <a:tc>
+                  <a:txBody>
+                    <a:bodyPr/>
+                    <a:lstStyle/>
+                    <a:p>
+                      <a:pPr algn="ctr"/>
+                      <a:r>
+                        <a:rPr lang="en-US" sz="1600" dirty="0"/>
+                        <a:t>0.0088</a:t>
+                      </a:r>
+                    </a:p>
+                  </a:txBody>
+                  <a:tcPr anchor="ctr">
+                    <a:solidFill>
+                      <a:schemeClr val="accent4">
+                        <a:lumMod val="40000"/>
+                        <a:lumOff val="60000"/>
+                      </a:schemeClr>
+                    </a:solidFill>
+                  </a:tcPr>
+                </a:tc>
+                <a:extLst>
+                  <a:ext uri="{0D108BD9-81ED-4DB2-BD59-A6C34878D82A}">
+                    <a16:rowId xmlns:a16="http://schemas.microsoft.com/office/drawing/2014/main" val="806043475"/>
+                  </a:ext>
+                </a:extLst>
+              </a:tr>
+            </a:tbl>
+          </a:graphicData>
+        </a:graphic>
+      </p:graphicFrame>
+    </p:spTree>
+    <p:extLst>
+      <p:ext uri="{BB962C8B-B14F-4D97-AF65-F5344CB8AC3E}">
+        <p14:creationId xmlns:p14="http://schemas.microsoft.com/office/powerpoint/2010/main" val="2056433642"/>
+      </p:ext>
+    </p:extLst>
+  </p:cSld>
+  <p:clrMapOvr>
+    <a:masterClrMapping/>
+  </p:clrMapOvr>
+</p:sld>
+</file>
+
+<file path=ppt/slides/slide31.xml><?xml version="1.0" encoding="utf-8"?>
+<p:sld xmlns:a="http://schemas.openxmlformats.org/drawingml/2006/main" xmlns:r="http://schemas.openxmlformats.org/officeDocument/2006/relationships" xmlns:p="http://schemas.openxmlformats.org/presentationml/2006/main">
+  <p:cSld>
+    <p:bg>
+      <p:bgPr>
+        <a:solidFill>
+          <a:schemeClr val="bg1"/>
+        </a:solidFill>
+        <a:effectLst/>
+      </p:bgPr>
+    </p:bg>
+    <p:spTree>
+      <p:nvGrpSpPr>
+        <p:cNvPr id="1" name=""/>
+        <p:cNvGrpSpPr/>
+        <p:nvPr/>
+      </p:nvGrpSpPr>
+      <p:grpSpPr>
+        <a:xfrm>
+          <a:off x="0" y="0"/>
+          <a:ext cx="0" cy="0"/>
+          <a:chOff x="0" y="0"/>
+          <a:chExt cx="0" cy="0"/>
+        </a:xfrm>
+      </p:grpSpPr>
+      <p:sp useBgFill="1">
+        <p:nvSpPr>
+          <p:cNvPr id="20" name="Rectangle 19">
+            <a:extLst>
+              <a:ext uri="{FF2B5EF4-FFF2-40B4-BE49-F238E27FC236}">
+                <a16:creationId xmlns:a16="http://schemas.microsoft.com/office/drawing/2014/main" id="{13BCCAE5-A35B-4B66-A4A7-E23C34A403A4}"/>
+              </a:ext>
+              <a:ext uri="{C183D7F6-B498-43B3-948B-1728B52AA6E4}">
+                <adec:decorative xmlns:adec="http://schemas.microsoft.com/office/drawing/2017/decorative" val="1"/>
+              </a:ext>
+            </a:extLst>
+          </p:cNvPr>
+          <p:cNvSpPr>
+            <a:spLocks noGrp="1" noRot="1" noChangeAspect="1" noMove="1" noResize="1" noEditPoints="1" noAdjustHandles="1" noChangeArrowheads="1" noChangeShapeType="1" noTextEdit="1"/>
+          </p:cNvSpPr>
+          <p:nvPr>
+            <p:extLst>
+              <p:ext uri="{386F3935-93C4-4BCD-93E2-E3B085C9AB24}">
+                <p16:designElem xmlns:p16="http://schemas.microsoft.com/office/powerpoint/2015/main" val="1"/>
+              </p:ext>
+            </p:extLst>
+          </p:nvPr>
+        </p:nvSpPr>
+        <p:spPr>
+          <a:xfrm>
+            <a:off x="0" y="0"/>
+            <a:ext cx="12192000" cy="6858000"/>
+          </a:xfrm>
+          <a:prstGeom prst="rect">
+            <a:avLst/>
+          </a:prstGeom>
+          <a:ln>
+            <a:noFill/>
+          </a:ln>
+        </p:spPr>
+        <p:style>
+          <a:lnRef idx="2">
+            <a:schemeClr val="accent1">
+              <a:shade val="50000"/>
+            </a:schemeClr>
+          </a:lnRef>
+          <a:fillRef idx="1">
+            <a:schemeClr val="accent1"/>
+          </a:fillRef>
+          <a:effectRef idx="0">
+            <a:schemeClr val="accent1"/>
+          </a:effectRef>
+          <a:fontRef idx="minor">
+            <a:schemeClr val="lt1"/>
+          </a:fontRef>
+        </p:style>
+        <p:txBody>
+          <a:bodyPr rtlCol="0" anchor="ctr"/>
+          <a:lstStyle/>
+          <a:p>
+            <a:pPr algn="ctr"/>
+            <a:endParaRPr lang="en-US"/>
+          </a:p>
+        </p:txBody>
+      </p:sp>
+      <p:sp>
+        <p:nvSpPr>
+          <p:cNvPr id="2" name="Title 1">
+            <a:extLst>
+              <a:ext uri="{FF2B5EF4-FFF2-40B4-BE49-F238E27FC236}">
+                <a16:creationId xmlns:a16="http://schemas.microsoft.com/office/drawing/2014/main" id="{66A47F5C-50EC-416A-AE8C-6F6BB4225673}"/>
+              </a:ext>
+            </a:extLst>
+          </p:cNvPr>
+          <p:cNvSpPr>
+            <a:spLocks noGrp="1"/>
+          </p:cNvSpPr>
+          <p:nvPr>
+            <p:ph type="title"/>
+          </p:nvPr>
+        </p:nvSpPr>
+        <p:spPr>
+          <a:xfrm>
+            <a:off x="1097280" y="286603"/>
+            <a:ext cx="10058400" cy="1450757"/>
+          </a:xfrm>
+        </p:spPr>
+        <p:txBody>
+          <a:bodyPr>
+            <a:normAutofit/>
+          </a:bodyPr>
+          <a:lstStyle/>
+          <a:p>
+            <a:r>
+              <a:rPr lang="en-US" sz="4400" b="1" dirty="0"/>
+              <a:t>Discussion</a:t>
+            </a:r>
+          </a:p>
+        </p:txBody>
+      </p:sp>
+      <p:cxnSp>
+        <p:nvCxnSpPr>
+          <p:cNvPr id="22" name="Straight Connector 21">
+            <a:extLst>
+              <a:ext uri="{FF2B5EF4-FFF2-40B4-BE49-F238E27FC236}">
+                <a16:creationId xmlns:a16="http://schemas.microsoft.com/office/drawing/2014/main" id="{6987BDFB-DE64-4B56-B44F-45FAE19FA94E}"/>
+              </a:ext>
+              <a:ext uri="{C183D7F6-B498-43B3-948B-1728B52AA6E4}">
+                <adec:decorative xmlns:adec="http://schemas.microsoft.com/office/drawing/2017/decorative" val="1"/>
+              </a:ext>
+            </a:extLst>
+          </p:cNvPr>
+          <p:cNvCxnSpPr>
+            <a:cxnSpLocks noGrp="1" noRot="1" noChangeAspect="1" noMove="1" noResize="1" noEditPoints="1" noAdjustHandles="1" noChangeArrowheads="1" noChangeShapeType="1"/>
+          </p:cNvCxnSpPr>
+          <p:nvPr>
+            <p:extLst>
+              <p:ext uri="{386F3935-93C4-4BCD-93E2-E3B085C9AB24}">
+                <p16:designElem xmlns:p16="http://schemas.microsoft.com/office/powerpoint/2015/main" val="1"/>
+              </p:ext>
+            </p:extLst>
+          </p:nvPr>
+        </p:nvCxnSpPr>
+        <p:spPr>
+          <a:xfrm>
+            <a:off x="1193532" y="1895846"/>
+            <a:ext cx="9966960" cy="0"/>
+          </a:xfrm>
+          <a:prstGeom prst="line">
+            <a:avLst/>
+          </a:prstGeom>
+          <a:ln w="12700">
+            <a:solidFill>
+              <a:schemeClr val="tx1">
+                <a:lumMod val="75000"/>
+                <a:lumOff val="25000"/>
+              </a:schemeClr>
+            </a:solidFill>
+          </a:ln>
+        </p:spPr>
+        <p:style>
+          <a:lnRef idx="1">
+            <a:schemeClr val="accent1"/>
+          </a:lnRef>
+          <a:fillRef idx="0">
+            <a:schemeClr val="accent1"/>
+          </a:fillRef>
+          <a:effectRef idx="0">
+            <a:schemeClr val="accent1"/>
+          </a:effectRef>
+          <a:fontRef idx="minor">
+            <a:schemeClr val="tx1"/>
+          </a:fontRef>
+        </p:style>
+      </p:cxnSp>
+      <p:sp>
+        <p:nvSpPr>
+          <p:cNvPr id="4" name="Content Placeholder 3">
+            <a:extLst>
+              <a:ext uri="{FF2B5EF4-FFF2-40B4-BE49-F238E27FC236}">
+                <a16:creationId xmlns:a16="http://schemas.microsoft.com/office/drawing/2014/main" id="{092F726A-2FB9-4103-87F4-2B00BFC07CCB}"/>
+              </a:ext>
+            </a:extLst>
+          </p:cNvPr>
+          <p:cNvSpPr>
+            <a:spLocks noGrp="1"/>
+          </p:cNvSpPr>
+          <p:nvPr>
+            <p:ph idx="1"/>
+          </p:nvPr>
+        </p:nvSpPr>
+        <p:spPr>
+          <a:xfrm>
+            <a:off x="826477" y="2056996"/>
+            <a:ext cx="10796953" cy="4199836"/>
+          </a:xfrm>
+        </p:spPr>
+        <p:txBody>
+          <a:bodyPr>
+            <a:noAutofit/>
+          </a:bodyPr>
+          <a:lstStyle/>
+          <a:p>
+            <a:pPr marL="201168" lvl="1" indent="0">
+              <a:buNone/>
+            </a:pPr>
+            <a:r>
+              <a:rPr lang="en-US" sz="1600" b="1" u="sng" dirty="0"/>
+              <a:t>Machine Learning vs Deep Learning</a:t>
+            </a:r>
+          </a:p>
+          <a:p>
+            <a:pPr marL="201168" lvl="1" indent="0">
+              <a:buNone/>
+            </a:pPr>
+            <a:r>
+              <a:rPr lang="en-US" sz="1600" dirty="0"/>
+              <a:t>As expected, </a:t>
+            </a:r>
+            <a:r>
+              <a:rPr lang="en-US" sz="1600" b="1" dirty="0"/>
+              <a:t>the VGG-16 model has surpassed the Bag of Visual Words model</a:t>
+            </a:r>
+            <a:r>
+              <a:rPr lang="en-US" sz="1600" dirty="0"/>
+              <a:t>. 🏆</a:t>
+            </a:r>
+          </a:p>
+          <a:p>
+            <a:pPr marL="201168" lvl="1" indent="0">
+              <a:buNone/>
+            </a:pPr>
+            <a:r>
+              <a:rPr lang="en-US" sz="1600" dirty="0"/>
+              <a:t>This is because the VGG-16 model (pretrained on ImageNet and fine-tuned on CIFAR-10) has learned </a:t>
+            </a:r>
+            <a:r>
+              <a:rPr lang="en-US" sz="1600" b="1" dirty="0"/>
+              <a:t>complex features </a:t>
+            </a:r>
+            <a:r>
+              <a:rPr lang="en-US" sz="1600" dirty="0"/>
+              <a:t>that are representative of the data and thus it can distinguish better the CIFAR-10 classes and classify more accurately the images. </a:t>
+            </a:r>
+          </a:p>
+          <a:p>
+            <a:pPr marL="201168" lvl="1" indent="0">
+              <a:buNone/>
+            </a:pPr>
+            <a:r>
+              <a:rPr lang="en-US" sz="1600" dirty="0"/>
+              <a:t>In contrast, </a:t>
+            </a:r>
+            <a:r>
+              <a:rPr lang="en-US" sz="1600" b="1" dirty="0"/>
+              <a:t>the BOVW model is dependent on feature engineering· the better the handcrafted features are the more predictive power the machine learning model will have. </a:t>
+            </a:r>
+            <a:r>
+              <a:rPr lang="en-US" sz="1600" dirty="0"/>
+              <a:t>Some of the produced features in the BOVW model are </a:t>
+            </a:r>
+            <a:r>
+              <a:rPr lang="en-US" sz="1600" b="1" dirty="0"/>
+              <a:t>local features</a:t>
+            </a:r>
+            <a:r>
+              <a:rPr lang="en-US" sz="1600" dirty="0"/>
+              <a:t>, meaning that they contain specific information about the images they were extracted from. Because of that, only a small proportion of extracted features is representative of the data and thus our machine learning model cannot generalize.</a:t>
+            </a:r>
+          </a:p>
+          <a:p>
+            <a:pPr marL="201168" lvl="1" indent="0">
+              <a:buNone/>
+            </a:pPr>
+            <a:endParaRPr lang="en-US" sz="1600" dirty="0"/>
+          </a:p>
+          <a:p>
+            <a:pPr marL="201168" lvl="1" indent="0">
+              <a:buNone/>
+            </a:pPr>
+            <a:r>
+              <a:rPr lang="en-US" sz="1600" b="1" u="sng" dirty="0"/>
+              <a:t>Search engine:</a:t>
+            </a:r>
+          </a:p>
+          <a:p>
+            <a:pPr marL="201168" lvl="1" indent="0">
+              <a:buNone/>
+            </a:pPr>
+            <a:r>
+              <a:rPr lang="en-US" sz="1600" dirty="0"/>
+              <a:t>Similarly as before, </a:t>
+            </a:r>
+            <a:r>
+              <a:rPr lang="en-US" sz="1600" b="1" dirty="0"/>
+              <a:t>the IR system dependent on VGG-16 gives the best map@100 results</a:t>
+            </a:r>
+            <a:r>
+              <a:rPr lang="en-US" sz="1600" dirty="0"/>
+              <a:t>. 🏆</a:t>
+            </a:r>
+          </a:p>
+          <a:p>
+            <a:pPr marL="201168" lvl="1" indent="0">
+              <a:buNone/>
+            </a:pPr>
+            <a:r>
+              <a:rPr lang="en-US" sz="1600" dirty="0"/>
+              <a:t>Since VGG-16 can distinguish better the CIFAR-10 classes, our IR system will be more accurate (higher precision). So, during retrieval there are </a:t>
+            </a:r>
+            <a:r>
+              <a:rPr lang="en-US" sz="1600" b="1" dirty="0"/>
+              <a:t>more true positives </a:t>
+            </a:r>
+            <a:r>
+              <a:rPr lang="en-US" sz="1600" dirty="0"/>
+              <a:t>(relevant images with respect to the query) leading the set of retrieved documents. One could say that the sorting by the similarity function (cosine in our case) is better.</a:t>
+            </a:r>
+          </a:p>
+        </p:txBody>
+      </p:sp>
+      <p:sp>
+        <p:nvSpPr>
+          <p:cNvPr id="24" name="Rectangle 23">
+            <a:extLst>
+              <a:ext uri="{FF2B5EF4-FFF2-40B4-BE49-F238E27FC236}">
+                <a16:creationId xmlns:a16="http://schemas.microsoft.com/office/drawing/2014/main" id="{CB06839E-D8C3-4A74-BA2B-3B97E7B2CDB5}"/>
+              </a:ext>
+              <a:ext uri="{C183D7F6-B498-43B3-948B-1728B52AA6E4}">
+                <adec:decorative xmlns:adec="http://schemas.microsoft.com/office/drawing/2017/decorative" val="1"/>
+              </a:ext>
+            </a:extLst>
+          </p:cNvPr>
+          <p:cNvSpPr>
+            <a:spLocks noGrp="1" noRot="1" noChangeAspect="1" noMove="1" noResize="1" noEditPoints="1" noAdjustHandles="1" noChangeArrowheads="1" noChangeShapeType="1" noTextEdit="1"/>
+          </p:cNvSpPr>
+          <p:nvPr>
+            <p:extLst>
+              <p:ext uri="{386F3935-93C4-4BCD-93E2-E3B085C9AB24}">
+                <p16:designElem xmlns:p16="http://schemas.microsoft.com/office/powerpoint/2015/main" val="1"/>
+              </p:ext>
+            </p:extLst>
+          </p:nvPr>
+        </p:nvSpPr>
+        <p:spPr>
+          <a:xfrm>
+            <a:off x="0" y="6400800"/>
+            <a:ext cx="12192000" cy="457200"/>
+          </a:xfrm>
+          <a:prstGeom prst="rect">
+            <a:avLst/>
+          </a:prstGeom>
+          <a:solidFill>
+            <a:srgbClr val="262626"/>
+          </a:solidFill>
+          <a:ln>
+            <a:noFill/>
+          </a:ln>
+        </p:spPr>
+        <p:style>
+          <a:lnRef idx="2">
+            <a:schemeClr val="accent1">
+              <a:shade val="50000"/>
+            </a:schemeClr>
+          </a:lnRef>
+          <a:fillRef idx="1">
+            <a:schemeClr val="accent1"/>
+          </a:fillRef>
+          <a:effectRef idx="0">
+            <a:schemeClr val="accent1"/>
+          </a:effectRef>
+          <a:fontRef idx="minor">
+            <a:schemeClr val="lt1"/>
+          </a:fontRef>
+        </p:style>
+      </p:sp>
+      <p:sp>
+        <p:nvSpPr>
+          <p:cNvPr id="3" name="Slide Number Placeholder 2">
+            <a:extLst>
+              <a:ext uri="{FF2B5EF4-FFF2-40B4-BE49-F238E27FC236}">
+                <a16:creationId xmlns:a16="http://schemas.microsoft.com/office/drawing/2014/main" id="{1CA2F287-50CE-458A-9441-96E48DE47F01}"/>
+              </a:ext>
+            </a:extLst>
+          </p:cNvPr>
+          <p:cNvSpPr>
+            <a:spLocks noGrp="1"/>
+          </p:cNvSpPr>
+          <p:nvPr>
+            <p:ph type="sldNum" sz="quarter" idx="12"/>
+          </p:nvPr>
+        </p:nvSpPr>
+        <p:spPr/>
+        <p:txBody>
+          <a:bodyPr/>
+          <a:lstStyle/>
+          <a:p>
+            <a:fld id="{3A98EE3D-8CD1-4C3F-BD1C-C98C9596463C}" type="slidenum">
+              <a:rPr lang="en-US" smtClean="0"/>
+              <a:t>31</a:t>
+            </a:fld>
+            <a:endParaRPr lang="en-US" dirty="0"/>
+          </a:p>
+        </p:txBody>
+      </p:sp>
+      <p:sp>
+        <p:nvSpPr>
+          <p:cNvPr id="5" name="Footer Placeholder 4">
+            <a:extLst>
+              <a:ext uri="{FF2B5EF4-FFF2-40B4-BE49-F238E27FC236}">
+                <a16:creationId xmlns:a16="http://schemas.microsoft.com/office/drawing/2014/main" id="{1439A401-9E11-45E1-9C6E-464865B40886}"/>
+              </a:ext>
+            </a:extLst>
+          </p:cNvPr>
+          <p:cNvSpPr>
+            <a:spLocks noGrp="1"/>
+          </p:cNvSpPr>
+          <p:nvPr>
+            <p:ph type="ftr" sz="quarter" idx="11"/>
+          </p:nvPr>
+        </p:nvSpPr>
+        <p:spPr/>
+        <p:txBody>
+          <a:bodyPr/>
+          <a:lstStyle/>
+          <a:p>
+            <a:r>
+              <a:rPr lang="en-US"/>
+              <a:t>Lampros Lountzis</a:t>
+            </a:r>
+            <a:endParaRPr lang="en-US" dirty="0"/>
+          </a:p>
+        </p:txBody>
+      </p:sp>
+    </p:spTree>
+    <p:extLst>
+      <p:ext uri="{BB962C8B-B14F-4D97-AF65-F5344CB8AC3E}">
+        <p14:creationId xmlns:p14="http://schemas.microsoft.com/office/powerpoint/2010/main" val="246522877"/>
+      </p:ext>
+    </p:extLst>
+  </p:cSld>
+  <p:clrMapOvr>
+    <a:masterClrMapping/>
+  </p:clrMapOvr>
+</p:sld>
+</file>
+
+<file path=ppt/slides/slide32.xml><?xml version="1.0" encoding="utf-8"?>
+<p:sld xmlns:a="http://schemas.openxmlformats.org/drawingml/2006/main" xmlns:r="http://schemas.openxmlformats.org/officeDocument/2006/relationships" xmlns:p="http://schemas.openxmlformats.org/presentationml/2006/main">
+  <p:cSld>
+    <p:bg>
+      <p:bgPr>
+        <a:solidFill>
+          <a:schemeClr val="bg1"/>
+        </a:solidFill>
+        <a:effectLst/>
+      </p:bgPr>
+    </p:bg>
+    <p:spTree>
+      <p:nvGrpSpPr>
+        <p:cNvPr id="1" name=""/>
+        <p:cNvGrpSpPr/>
+        <p:nvPr/>
+      </p:nvGrpSpPr>
+      <p:grpSpPr>
+        <a:xfrm>
+          <a:off x="0" y="0"/>
+          <a:ext cx="0" cy="0"/>
+          <a:chOff x="0" y="0"/>
+          <a:chExt cx="0" cy="0"/>
+        </a:xfrm>
+      </p:grpSpPr>
+      <p:sp useBgFill="1">
+        <p:nvSpPr>
+          <p:cNvPr id="20" name="Rectangle 19">
+            <a:extLst>
+              <a:ext uri="{FF2B5EF4-FFF2-40B4-BE49-F238E27FC236}">
+                <a16:creationId xmlns:a16="http://schemas.microsoft.com/office/drawing/2014/main" id="{13BCCAE5-A35B-4B66-A4A7-E23C34A403A4}"/>
+              </a:ext>
+              <a:ext uri="{C183D7F6-B498-43B3-948B-1728B52AA6E4}">
+                <adec:decorative xmlns:adec="http://schemas.microsoft.com/office/drawing/2017/decorative" val="1"/>
+              </a:ext>
+            </a:extLst>
+          </p:cNvPr>
+          <p:cNvSpPr>
+            <a:spLocks noGrp="1" noRot="1" noChangeAspect="1" noMove="1" noResize="1" noEditPoints="1" noAdjustHandles="1" noChangeArrowheads="1" noChangeShapeType="1" noTextEdit="1"/>
+          </p:cNvSpPr>
+          <p:nvPr>
+            <p:extLst>
+              <p:ext uri="{386F3935-93C4-4BCD-93E2-E3B085C9AB24}">
+                <p16:designElem xmlns:p16="http://schemas.microsoft.com/office/powerpoint/2015/main" val="1"/>
+              </p:ext>
+            </p:extLst>
+          </p:nvPr>
+        </p:nvSpPr>
+        <p:spPr>
+          <a:xfrm>
+            <a:off x="0" y="0"/>
+            <a:ext cx="12192000" cy="6858000"/>
+          </a:xfrm>
+          <a:prstGeom prst="rect">
+            <a:avLst/>
+          </a:prstGeom>
+          <a:ln>
+            <a:noFill/>
+          </a:ln>
+        </p:spPr>
+        <p:style>
+          <a:lnRef idx="2">
+            <a:schemeClr val="accent1">
+              <a:shade val="50000"/>
+            </a:schemeClr>
+          </a:lnRef>
+          <a:fillRef idx="1">
+            <a:schemeClr val="accent1"/>
+          </a:fillRef>
+          <a:effectRef idx="0">
+            <a:schemeClr val="accent1"/>
+          </a:effectRef>
+          <a:fontRef idx="minor">
+            <a:schemeClr val="lt1"/>
+          </a:fontRef>
+        </p:style>
+        <p:txBody>
+          <a:bodyPr rtlCol="0" anchor="ctr"/>
+          <a:lstStyle/>
+          <a:p>
+            <a:pPr algn="ctr"/>
+            <a:endParaRPr lang="en-US"/>
+          </a:p>
+        </p:txBody>
+      </p:sp>
+      <p:sp>
+        <p:nvSpPr>
+          <p:cNvPr id="2" name="Title 1">
+            <a:extLst>
+              <a:ext uri="{FF2B5EF4-FFF2-40B4-BE49-F238E27FC236}">
+                <a16:creationId xmlns:a16="http://schemas.microsoft.com/office/drawing/2014/main" id="{66A47F5C-50EC-416A-AE8C-6F6BB4225673}"/>
+              </a:ext>
+            </a:extLst>
+          </p:cNvPr>
+          <p:cNvSpPr>
+            <a:spLocks noGrp="1"/>
+          </p:cNvSpPr>
+          <p:nvPr>
+            <p:ph type="title"/>
+          </p:nvPr>
+        </p:nvSpPr>
+        <p:spPr>
+          <a:xfrm>
+            <a:off x="1097280" y="286603"/>
+            <a:ext cx="10058400" cy="1450757"/>
+          </a:xfrm>
+        </p:spPr>
+        <p:txBody>
+          <a:bodyPr>
+            <a:normAutofit/>
+          </a:bodyPr>
+          <a:lstStyle/>
+          <a:p>
+            <a:r>
+              <a:rPr lang="en-US" sz="4400" b="1" dirty="0"/>
+              <a:t>Ideas and further discussion</a:t>
+            </a:r>
+          </a:p>
+        </p:txBody>
+      </p:sp>
+      <p:cxnSp>
+        <p:nvCxnSpPr>
+          <p:cNvPr id="22" name="Straight Connector 21">
+            <a:extLst>
+              <a:ext uri="{FF2B5EF4-FFF2-40B4-BE49-F238E27FC236}">
+                <a16:creationId xmlns:a16="http://schemas.microsoft.com/office/drawing/2014/main" id="{6987BDFB-DE64-4B56-B44F-45FAE19FA94E}"/>
+              </a:ext>
+              <a:ext uri="{C183D7F6-B498-43B3-948B-1728B52AA6E4}">
+                <adec:decorative xmlns:adec="http://schemas.microsoft.com/office/drawing/2017/decorative" val="1"/>
+              </a:ext>
+            </a:extLst>
+          </p:cNvPr>
+          <p:cNvCxnSpPr>
+            <a:cxnSpLocks noGrp="1" noRot="1" noChangeAspect="1" noMove="1" noResize="1" noEditPoints="1" noAdjustHandles="1" noChangeArrowheads="1" noChangeShapeType="1"/>
+          </p:cNvCxnSpPr>
+          <p:nvPr>
+            <p:extLst>
+              <p:ext uri="{386F3935-93C4-4BCD-93E2-E3B085C9AB24}">
+                <p16:designElem xmlns:p16="http://schemas.microsoft.com/office/powerpoint/2015/main" val="1"/>
+              </p:ext>
+            </p:extLst>
+          </p:nvPr>
+        </p:nvCxnSpPr>
+        <p:spPr>
+          <a:xfrm>
+            <a:off x="1193532" y="1895846"/>
+            <a:ext cx="9966960" cy="0"/>
+          </a:xfrm>
+          <a:prstGeom prst="line">
+            <a:avLst/>
+          </a:prstGeom>
+          <a:ln w="12700">
+            <a:solidFill>
+              <a:schemeClr val="tx1">
+                <a:lumMod val="75000"/>
+                <a:lumOff val="25000"/>
+              </a:schemeClr>
+            </a:solidFill>
+          </a:ln>
+        </p:spPr>
+        <p:style>
+          <a:lnRef idx="1">
+            <a:schemeClr val="accent1"/>
+          </a:lnRef>
+          <a:fillRef idx="0">
+            <a:schemeClr val="accent1"/>
+          </a:fillRef>
+          <a:effectRef idx="0">
+            <a:schemeClr val="accent1"/>
+          </a:effectRef>
+          <a:fontRef idx="minor">
+            <a:schemeClr val="tx1"/>
+          </a:fontRef>
+        </p:style>
+      </p:cxnSp>
+      <p:sp>
+        <p:nvSpPr>
+          <p:cNvPr id="4" name="Content Placeholder 3">
+            <a:extLst>
+              <a:ext uri="{FF2B5EF4-FFF2-40B4-BE49-F238E27FC236}">
+                <a16:creationId xmlns:a16="http://schemas.microsoft.com/office/drawing/2014/main" id="{092F726A-2FB9-4103-87F4-2B00BFC07CCB}"/>
+              </a:ext>
+            </a:extLst>
+          </p:cNvPr>
+          <p:cNvSpPr>
+            <a:spLocks noGrp="1"/>
+          </p:cNvSpPr>
+          <p:nvPr>
+            <p:ph idx="1"/>
+          </p:nvPr>
+        </p:nvSpPr>
+        <p:spPr>
+          <a:xfrm>
+            <a:off x="1188720" y="2056996"/>
+            <a:ext cx="9966960" cy="4199836"/>
+          </a:xfrm>
+        </p:spPr>
+        <p:txBody>
+          <a:bodyPr>
+            <a:noAutofit/>
+          </a:bodyPr>
+          <a:lstStyle/>
+          <a:p>
+            <a:pPr marL="201168" lvl="1" indent="0">
+              <a:buNone/>
+            </a:pPr>
+            <a:r>
+              <a:rPr lang="en-US" sz="1600" dirty="0"/>
+              <a:t>As stated before, due to lack of computational resources, we were unable to replace the classification layers in the pretrained CNNs with our own and fine-tune the model. If we had in our disposal a virtual machine with more CPU/GPU cores to fine-tune the models, then we would have achieved better results.</a:t>
+            </a:r>
+          </a:p>
+          <a:p>
+            <a:pPr marL="201168" lvl="1" indent="0">
+              <a:buNone/>
+            </a:pPr>
+            <a:endParaRPr lang="en-US" sz="1600" dirty="0"/>
+          </a:p>
+          <a:p>
+            <a:pPr marL="201168" lvl="1" indent="0">
+              <a:buNone/>
+            </a:pPr>
+            <a:r>
+              <a:rPr lang="en-US" sz="1600" dirty="0"/>
+              <a:t>What’s more, we believe that </a:t>
+            </a:r>
+            <a:r>
+              <a:rPr lang="en-US" sz="1600" b="1" dirty="0"/>
+              <a:t>the choice of training the models in the classification setting has prevented us from gaining the best results</a:t>
+            </a:r>
+            <a:r>
+              <a:rPr lang="en-US" sz="1600" dirty="0"/>
+              <a:t>. The aim of the cross-entropy loss is to categorize features into predefined classes and thus the performance of such a network is poor when compared to losses incorporating similarity (and dissimilarity) constrains in the embedding space during training.</a:t>
+            </a:r>
+          </a:p>
+          <a:p>
+            <a:pPr marL="201168" lvl="1" indent="0">
+              <a:buNone/>
+            </a:pPr>
+            <a:endParaRPr lang="en-US" sz="1600" dirty="0"/>
+          </a:p>
+          <a:p>
+            <a:pPr marL="201168" lvl="1" indent="0">
+              <a:buNone/>
+            </a:pPr>
+            <a:r>
+              <a:rPr lang="en-US" sz="1600" dirty="0"/>
+              <a:t>A better alternative would be to use:</a:t>
+            </a:r>
+          </a:p>
+          <a:p>
+            <a:pPr lvl="2">
+              <a:buFont typeface="Arial" panose="020B0604020202020204" pitchFamily="34" charset="0"/>
+              <a:buChar char="•"/>
+            </a:pPr>
+            <a:r>
+              <a:rPr lang="en-US" b="1" dirty="0"/>
+              <a:t>contrastive loss</a:t>
+            </a:r>
+            <a:r>
+              <a:rPr lang="en-US" dirty="0"/>
+              <a:t>, which optimizes the training objective by encouraging all similar class instances to come infinitesimally closer to each other, while forcing instances from other classes to move far apart in the output embedding space.</a:t>
+            </a:r>
+          </a:p>
+          <a:p>
+            <a:pPr lvl="2">
+              <a:buFont typeface="Arial" panose="020B0604020202020204" pitchFamily="34" charset="0"/>
+              <a:buChar char="•"/>
+            </a:pPr>
+            <a:r>
+              <a:rPr lang="en-US" b="1" dirty="0"/>
+              <a:t>triplet loss</a:t>
+            </a:r>
+            <a:r>
+              <a:rPr lang="en-US" dirty="0"/>
+              <a:t>, which forces data points from the same class to be closer to each other than they are to a data point from another class, by considering both positive and negative pair distances at the same point</a:t>
+            </a:r>
+            <a:endParaRPr lang="en-US" b="1" dirty="0"/>
+          </a:p>
+        </p:txBody>
+      </p:sp>
+      <p:sp>
+        <p:nvSpPr>
+          <p:cNvPr id="24" name="Rectangle 23">
+            <a:extLst>
+              <a:ext uri="{FF2B5EF4-FFF2-40B4-BE49-F238E27FC236}">
+                <a16:creationId xmlns:a16="http://schemas.microsoft.com/office/drawing/2014/main" id="{CB06839E-D8C3-4A74-BA2B-3B97E7B2CDB5}"/>
+              </a:ext>
+              <a:ext uri="{C183D7F6-B498-43B3-948B-1728B52AA6E4}">
+                <adec:decorative xmlns:adec="http://schemas.microsoft.com/office/drawing/2017/decorative" val="1"/>
+              </a:ext>
+            </a:extLst>
+          </p:cNvPr>
+          <p:cNvSpPr>
+            <a:spLocks noGrp="1" noRot="1" noChangeAspect="1" noMove="1" noResize="1" noEditPoints="1" noAdjustHandles="1" noChangeArrowheads="1" noChangeShapeType="1" noTextEdit="1"/>
+          </p:cNvSpPr>
+          <p:nvPr>
+            <p:extLst>
+              <p:ext uri="{386F3935-93C4-4BCD-93E2-E3B085C9AB24}">
+                <p16:designElem xmlns:p16="http://schemas.microsoft.com/office/powerpoint/2015/main" val="1"/>
+              </p:ext>
+            </p:extLst>
+          </p:nvPr>
+        </p:nvSpPr>
+        <p:spPr>
+          <a:xfrm>
+            <a:off x="0" y="6400800"/>
+            <a:ext cx="12192000" cy="457200"/>
+          </a:xfrm>
+          <a:prstGeom prst="rect">
+            <a:avLst/>
+          </a:prstGeom>
+          <a:solidFill>
+            <a:srgbClr val="262626"/>
+          </a:solidFill>
+          <a:ln>
+            <a:noFill/>
+          </a:ln>
+        </p:spPr>
+        <p:style>
+          <a:lnRef idx="2">
+            <a:schemeClr val="accent1">
+              <a:shade val="50000"/>
+            </a:schemeClr>
+          </a:lnRef>
+          <a:fillRef idx="1">
+            <a:schemeClr val="accent1"/>
+          </a:fillRef>
+          <a:effectRef idx="0">
+            <a:schemeClr val="accent1"/>
+          </a:effectRef>
+          <a:fontRef idx="minor">
+            <a:schemeClr val="lt1"/>
+          </a:fontRef>
+        </p:style>
+      </p:sp>
+      <p:sp>
+        <p:nvSpPr>
+          <p:cNvPr id="3" name="Slide Number Placeholder 2">
+            <a:extLst>
+              <a:ext uri="{FF2B5EF4-FFF2-40B4-BE49-F238E27FC236}">
+                <a16:creationId xmlns:a16="http://schemas.microsoft.com/office/drawing/2014/main" id="{1CA2F287-50CE-458A-9441-96E48DE47F01}"/>
+              </a:ext>
+            </a:extLst>
+          </p:cNvPr>
+          <p:cNvSpPr>
+            <a:spLocks noGrp="1"/>
+          </p:cNvSpPr>
+          <p:nvPr>
+            <p:ph type="sldNum" sz="quarter" idx="12"/>
+          </p:nvPr>
+        </p:nvSpPr>
+        <p:spPr/>
+        <p:txBody>
+          <a:bodyPr/>
+          <a:lstStyle/>
+          <a:p>
+            <a:fld id="{3A98EE3D-8CD1-4C3F-BD1C-C98C9596463C}" type="slidenum">
+              <a:rPr lang="en-US" smtClean="0"/>
+              <a:t>32</a:t>
+            </a:fld>
+            <a:endParaRPr lang="en-US" dirty="0"/>
+          </a:p>
+        </p:txBody>
+      </p:sp>
+      <p:sp>
+        <p:nvSpPr>
+          <p:cNvPr id="5" name="Footer Placeholder 4">
+            <a:extLst>
+              <a:ext uri="{FF2B5EF4-FFF2-40B4-BE49-F238E27FC236}">
+                <a16:creationId xmlns:a16="http://schemas.microsoft.com/office/drawing/2014/main" id="{1439A401-9E11-45E1-9C6E-464865B40886}"/>
+              </a:ext>
+            </a:extLst>
+          </p:cNvPr>
+          <p:cNvSpPr>
+            <a:spLocks noGrp="1"/>
+          </p:cNvSpPr>
+          <p:nvPr>
+            <p:ph type="ftr" sz="quarter" idx="11"/>
+          </p:nvPr>
+        </p:nvSpPr>
+        <p:spPr/>
+        <p:txBody>
+          <a:bodyPr/>
+          <a:lstStyle/>
+          <a:p>
+            <a:r>
+              <a:rPr lang="en-US"/>
+              <a:t>Lampros Lountzis</a:t>
+            </a:r>
+            <a:endParaRPr lang="en-US" dirty="0"/>
+          </a:p>
+        </p:txBody>
+      </p:sp>
+    </p:spTree>
+    <p:extLst>
+      <p:ext uri="{BB962C8B-B14F-4D97-AF65-F5344CB8AC3E}">
+        <p14:creationId xmlns:p14="http://schemas.microsoft.com/office/powerpoint/2010/main" val="298489919"/>
+      </p:ext>
+    </p:extLst>
+  </p:cSld>
+  <p:clrMapOvr>
+    <a:masterClrMapping/>
+  </p:clrMapOvr>
+</p:sld>
+</file>
+
+<file path=ppt/slides/slide33.xml><?xml version="1.0" encoding="utf-8"?>
+<p:sld xmlns:a="http://schemas.openxmlformats.org/drawingml/2006/main" xmlns:r="http://schemas.openxmlformats.org/officeDocument/2006/relationships" xmlns:p="http://schemas.openxmlformats.org/presentationml/2006/main">
+  <p:cSld>
+    <p:bg>
+      <p:bgPr>
+        <a:solidFill>
+          <a:schemeClr val="bg1"/>
+        </a:solidFill>
+        <a:effectLst/>
+      </p:bgPr>
+    </p:bg>
+    <p:spTree>
+      <p:nvGrpSpPr>
+        <p:cNvPr id="1" name=""/>
+        <p:cNvGrpSpPr/>
+        <p:nvPr/>
+      </p:nvGrpSpPr>
+      <p:grpSpPr>
+        <a:xfrm>
+          <a:off x="0" y="0"/>
+          <a:ext cx="0" cy="0"/>
+          <a:chOff x="0" y="0"/>
+          <a:chExt cx="0" cy="0"/>
+        </a:xfrm>
+      </p:grpSpPr>
+      <p:sp useBgFill="1">
+        <p:nvSpPr>
+          <p:cNvPr id="20" name="Rectangle 19">
+            <a:extLst>
+              <a:ext uri="{FF2B5EF4-FFF2-40B4-BE49-F238E27FC236}">
+                <a16:creationId xmlns:a16="http://schemas.microsoft.com/office/drawing/2014/main" id="{13BCCAE5-A35B-4B66-A4A7-E23C34A403A4}"/>
+              </a:ext>
+              <a:ext uri="{C183D7F6-B498-43B3-948B-1728B52AA6E4}">
+                <adec:decorative xmlns:adec="http://schemas.microsoft.com/office/drawing/2017/decorative" val="1"/>
+              </a:ext>
+            </a:extLst>
+          </p:cNvPr>
+          <p:cNvSpPr>
+            <a:spLocks noGrp="1" noRot="1" noChangeAspect="1" noMove="1" noResize="1" noEditPoints="1" noAdjustHandles="1" noChangeArrowheads="1" noChangeShapeType="1" noTextEdit="1"/>
+          </p:cNvSpPr>
+          <p:nvPr>
+            <p:extLst>
+              <p:ext uri="{386F3935-93C4-4BCD-93E2-E3B085C9AB24}">
+                <p16:designElem xmlns:p16="http://schemas.microsoft.com/office/powerpoint/2015/main" val="1"/>
+              </p:ext>
+            </p:extLst>
+          </p:nvPr>
+        </p:nvSpPr>
+        <p:spPr>
+          <a:xfrm>
+            <a:off x="0" y="0"/>
+            <a:ext cx="12192000" cy="6858000"/>
+          </a:xfrm>
+          <a:prstGeom prst="rect">
+            <a:avLst/>
+          </a:prstGeom>
+          <a:ln>
+            <a:noFill/>
+          </a:ln>
+        </p:spPr>
+        <p:style>
+          <a:lnRef idx="2">
+            <a:schemeClr val="accent1">
+              <a:shade val="50000"/>
+            </a:schemeClr>
+          </a:lnRef>
+          <a:fillRef idx="1">
+            <a:schemeClr val="accent1"/>
+          </a:fillRef>
+          <a:effectRef idx="0">
+            <a:schemeClr val="accent1"/>
+          </a:effectRef>
+          <a:fontRef idx="minor">
+            <a:schemeClr val="lt1"/>
+          </a:fontRef>
+        </p:style>
+        <p:txBody>
+          <a:bodyPr rtlCol="0" anchor="ctr"/>
+          <a:lstStyle/>
+          <a:p>
+            <a:pPr algn="ctr"/>
+            <a:endParaRPr lang="en-US"/>
+          </a:p>
+        </p:txBody>
+      </p:sp>
+      <p:sp>
+        <p:nvSpPr>
+          <p:cNvPr id="2" name="Title 1">
+            <a:extLst>
+              <a:ext uri="{FF2B5EF4-FFF2-40B4-BE49-F238E27FC236}">
+                <a16:creationId xmlns:a16="http://schemas.microsoft.com/office/drawing/2014/main" id="{66A47F5C-50EC-416A-AE8C-6F6BB4225673}"/>
+              </a:ext>
+            </a:extLst>
+          </p:cNvPr>
+          <p:cNvSpPr>
+            <a:spLocks noGrp="1"/>
+          </p:cNvSpPr>
+          <p:nvPr>
+            <p:ph type="title"/>
+          </p:nvPr>
+        </p:nvSpPr>
+        <p:spPr>
+          <a:xfrm>
+            <a:off x="1097280" y="286603"/>
+            <a:ext cx="10058400" cy="1450757"/>
+          </a:xfrm>
+        </p:spPr>
+        <p:txBody>
+          <a:bodyPr>
+            <a:normAutofit/>
+          </a:bodyPr>
+          <a:lstStyle/>
+          <a:p>
+            <a:r>
+              <a:rPr lang="en-US" sz="4400" b="1" dirty="0"/>
+              <a:t>Ideas and further discussion</a:t>
+            </a:r>
+          </a:p>
+        </p:txBody>
+      </p:sp>
+      <p:cxnSp>
+        <p:nvCxnSpPr>
+          <p:cNvPr id="22" name="Straight Connector 21">
+            <a:extLst>
+              <a:ext uri="{FF2B5EF4-FFF2-40B4-BE49-F238E27FC236}">
+                <a16:creationId xmlns:a16="http://schemas.microsoft.com/office/drawing/2014/main" id="{6987BDFB-DE64-4B56-B44F-45FAE19FA94E}"/>
+              </a:ext>
+              <a:ext uri="{C183D7F6-B498-43B3-948B-1728B52AA6E4}">
+                <adec:decorative xmlns:adec="http://schemas.microsoft.com/office/drawing/2017/decorative" val="1"/>
+              </a:ext>
+            </a:extLst>
+          </p:cNvPr>
+          <p:cNvCxnSpPr>
+            <a:cxnSpLocks noGrp="1" noRot="1" noChangeAspect="1" noMove="1" noResize="1" noEditPoints="1" noAdjustHandles="1" noChangeArrowheads="1" noChangeShapeType="1"/>
+          </p:cNvCxnSpPr>
+          <p:nvPr>
+            <p:extLst>
+              <p:ext uri="{386F3935-93C4-4BCD-93E2-E3B085C9AB24}">
+                <p16:designElem xmlns:p16="http://schemas.microsoft.com/office/powerpoint/2015/main" val="1"/>
+              </p:ext>
+            </p:extLst>
+          </p:nvPr>
+        </p:nvCxnSpPr>
+        <p:spPr>
+          <a:xfrm>
+            <a:off x="1193532" y="1895846"/>
+            <a:ext cx="9966960" cy="0"/>
+          </a:xfrm>
+          <a:prstGeom prst="line">
+            <a:avLst/>
+          </a:prstGeom>
+          <a:ln w="12700">
+            <a:solidFill>
+              <a:schemeClr val="tx1">
+                <a:lumMod val="75000"/>
+                <a:lumOff val="25000"/>
+              </a:schemeClr>
+            </a:solidFill>
+          </a:ln>
+        </p:spPr>
+        <p:style>
+          <a:lnRef idx="1">
+            <a:schemeClr val="accent1"/>
+          </a:lnRef>
+          <a:fillRef idx="0">
+            <a:schemeClr val="accent1"/>
+          </a:fillRef>
+          <a:effectRef idx="0">
+            <a:schemeClr val="accent1"/>
+          </a:effectRef>
+          <a:fontRef idx="minor">
+            <a:schemeClr val="tx1"/>
+          </a:fontRef>
+        </p:style>
+      </p:cxnSp>
+      <p:sp>
+        <p:nvSpPr>
+          <p:cNvPr id="4" name="Content Placeholder 3">
+            <a:extLst>
+              <a:ext uri="{FF2B5EF4-FFF2-40B4-BE49-F238E27FC236}">
+                <a16:creationId xmlns:a16="http://schemas.microsoft.com/office/drawing/2014/main" id="{092F726A-2FB9-4103-87F4-2B00BFC07CCB}"/>
+              </a:ext>
+            </a:extLst>
+          </p:cNvPr>
+          <p:cNvSpPr>
+            <a:spLocks noGrp="1"/>
+          </p:cNvSpPr>
+          <p:nvPr>
+            <p:ph idx="1"/>
+          </p:nvPr>
+        </p:nvSpPr>
+        <p:spPr>
+          <a:xfrm>
+            <a:off x="1188720" y="2056996"/>
+            <a:ext cx="9966960" cy="4199836"/>
+          </a:xfrm>
+        </p:spPr>
+        <p:txBody>
+          <a:bodyPr>
+            <a:noAutofit/>
+          </a:bodyPr>
+          <a:lstStyle/>
+          <a:p>
+            <a:pPr marL="201168" lvl="1" indent="0">
+              <a:buNone/>
+            </a:pPr>
+            <a:r>
+              <a:rPr lang="en-US" sz="1600" dirty="0"/>
+              <a:t>If we were to choose </a:t>
+            </a:r>
+            <a:r>
+              <a:rPr lang="en-US" sz="1600" b="1" dirty="0"/>
+              <a:t>triplet loss </a:t>
+            </a:r>
+            <a:r>
+              <a:rPr lang="en-US" sz="1600" dirty="0"/>
+              <a:t>as our loss function, the we should also consider an appropriate method for </a:t>
+            </a:r>
+            <a:r>
+              <a:rPr lang="en-US" sz="1600" b="1" dirty="0"/>
+              <a:t>mining informative points </a:t>
+            </a:r>
+            <a:r>
+              <a:rPr lang="en-US" sz="1600" dirty="0"/>
+              <a:t>in order to improve training convergence and computational complexity.</a:t>
+            </a:r>
+          </a:p>
+          <a:p>
+            <a:pPr marL="201168" lvl="1" indent="0">
+              <a:buNone/>
+            </a:pPr>
+            <a:endParaRPr lang="en-US" sz="800" dirty="0"/>
+          </a:p>
+          <a:p>
+            <a:pPr marL="201168" lvl="1" indent="0">
+              <a:buNone/>
+            </a:pPr>
+            <a:r>
+              <a:rPr lang="en-US" sz="1600" dirty="0"/>
+              <a:t>Popular sampling approaches are:</a:t>
+            </a:r>
+          </a:p>
+          <a:p>
+            <a:pPr lvl="2">
+              <a:buFont typeface="Arial" panose="020B0604020202020204" pitchFamily="34" charset="0"/>
+              <a:buChar char="•"/>
+            </a:pPr>
+            <a:r>
+              <a:rPr lang="en-US" sz="1600" b="1" dirty="0"/>
+              <a:t>Batch all (BA): </a:t>
+            </a:r>
+            <a:r>
+              <a:rPr lang="en-US" sz="1600" dirty="0"/>
+              <a:t>uses all positive and valid triplets; that is, we’re not performing any ranking or selection of triplets (all samples are equally important). </a:t>
+            </a:r>
+          </a:p>
+          <a:p>
+            <a:pPr lvl="3">
+              <a:buFont typeface="Arial" panose="020B0604020202020204" pitchFamily="34" charset="0"/>
+              <a:buChar char="•"/>
+            </a:pPr>
+            <a:r>
+              <a:rPr lang="en-US" dirty="0"/>
+              <a:t>Can potentially lead to information averaging out since many valid triplets are trivial, and only few are informative.</a:t>
+            </a:r>
+          </a:p>
+          <a:p>
+            <a:pPr lvl="2">
+              <a:buFont typeface="Arial" panose="020B0604020202020204" pitchFamily="34" charset="0"/>
+              <a:buChar char="•"/>
+            </a:pPr>
+            <a:r>
+              <a:rPr lang="en-US" sz="1600" b="1" dirty="0"/>
+              <a:t>Batch hard (BH): </a:t>
+            </a:r>
+            <a:r>
+              <a:rPr lang="en-US" sz="1600" dirty="0"/>
+              <a:t>considers only the hardest data for an anchor. For each possible anchor in a batch, it computes the loss with exactly one hardest positive item and one hardest negative item.</a:t>
+            </a:r>
+          </a:p>
+          <a:p>
+            <a:pPr lvl="3">
+              <a:buFont typeface="Arial" panose="020B0604020202020204" pitchFamily="34" charset="0"/>
+              <a:buChar char="•"/>
+            </a:pPr>
+            <a:r>
+              <a:rPr lang="en-US" dirty="0"/>
+              <a:t>BH is robust to information averaging out, because trivial (easier) samples are ignored.</a:t>
+            </a:r>
+          </a:p>
+          <a:p>
+            <a:pPr lvl="3">
+              <a:buFont typeface="Arial" panose="020B0604020202020204" pitchFamily="34" charset="0"/>
+              <a:buChar char="•"/>
+            </a:pPr>
+            <a:r>
+              <a:rPr lang="en-US" dirty="0"/>
+              <a:t>BH is difficult to use with outliers.</a:t>
+            </a:r>
+          </a:p>
+          <a:p>
+            <a:pPr lvl="2">
+              <a:buFont typeface="Arial" panose="020B0604020202020204" pitchFamily="34" charset="0"/>
+              <a:buChar char="•"/>
+            </a:pPr>
+            <a:r>
+              <a:rPr lang="en-US" sz="1600" b="1" dirty="0"/>
+              <a:t>Batch weighted (BW): </a:t>
+            </a:r>
+            <a:r>
+              <a:rPr lang="en-US" sz="1600" dirty="0"/>
+              <a:t>a sample is weighted based on its distance from the corresponding anchor, thereby giving more importance to informative (harder) samples than trivial samples</a:t>
+            </a:r>
+          </a:p>
+          <a:p>
+            <a:pPr lvl="2">
+              <a:buFont typeface="Arial" panose="020B0604020202020204" pitchFamily="34" charset="0"/>
+              <a:buChar char="•"/>
+            </a:pPr>
+            <a:r>
+              <a:rPr lang="en-US" sz="1600" b="1" dirty="0"/>
+              <a:t>Batch sample (BS): </a:t>
+            </a:r>
+            <a:r>
+              <a:rPr lang="en-US" sz="1600" dirty="0"/>
+              <a:t>uses the distribution of anchor-to-sample distances to mine positive and negative data for an anchor.</a:t>
+            </a:r>
+          </a:p>
+        </p:txBody>
+      </p:sp>
+      <p:sp>
+        <p:nvSpPr>
+          <p:cNvPr id="24" name="Rectangle 23">
+            <a:extLst>
+              <a:ext uri="{FF2B5EF4-FFF2-40B4-BE49-F238E27FC236}">
+                <a16:creationId xmlns:a16="http://schemas.microsoft.com/office/drawing/2014/main" id="{CB06839E-D8C3-4A74-BA2B-3B97E7B2CDB5}"/>
+              </a:ext>
+              <a:ext uri="{C183D7F6-B498-43B3-948B-1728B52AA6E4}">
+                <adec:decorative xmlns:adec="http://schemas.microsoft.com/office/drawing/2017/decorative" val="1"/>
+              </a:ext>
+            </a:extLst>
+          </p:cNvPr>
+          <p:cNvSpPr>
+            <a:spLocks noGrp="1" noRot="1" noChangeAspect="1" noMove="1" noResize="1" noEditPoints="1" noAdjustHandles="1" noChangeArrowheads="1" noChangeShapeType="1" noTextEdit="1"/>
+          </p:cNvSpPr>
+          <p:nvPr>
+            <p:extLst>
+              <p:ext uri="{386F3935-93C4-4BCD-93E2-E3B085C9AB24}">
+                <p16:designElem xmlns:p16="http://schemas.microsoft.com/office/powerpoint/2015/main" val="1"/>
+              </p:ext>
+            </p:extLst>
+          </p:nvPr>
+        </p:nvSpPr>
+        <p:spPr>
+          <a:xfrm>
+            <a:off x="0" y="6400800"/>
+            <a:ext cx="12192000" cy="457200"/>
+          </a:xfrm>
+          <a:prstGeom prst="rect">
+            <a:avLst/>
+          </a:prstGeom>
+          <a:solidFill>
+            <a:srgbClr val="262626"/>
+          </a:solidFill>
+          <a:ln>
+            <a:noFill/>
+          </a:ln>
+        </p:spPr>
+        <p:style>
+          <a:lnRef idx="2">
+            <a:schemeClr val="accent1">
+              <a:shade val="50000"/>
+            </a:schemeClr>
+          </a:lnRef>
+          <a:fillRef idx="1">
+            <a:schemeClr val="accent1"/>
+          </a:fillRef>
+          <a:effectRef idx="0">
+            <a:schemeClr val="accent1"/>
+          </a:effectRef>
+          <a:fontRef idx="minor">
+            <a:schemeClr val="lt1"/>
+          </a:fontRef>
+        </p:style>
+      </p:sp>
+      <p:sp>
+        <p:nvSpPr>
+          <p:cNvPr id="3" name="Slide Number Placeholder 2">
+            <a:extLst>
+              <a:ext uri="{FF2B5EF4-FFF2-40B4-BE49-F238E27FC236}">
+                <a16:creationId xmlns:a16="http://schemas.microsoft.com/office/drawing/2014/main" id="{1CA2F287-50CE-458A-9441-96E48DE47F01}"/>
+              </a:ext>
+            </a:extLst>
+          </p:cNvPr>
+          <p:cNvSpPr>
+            <a:spLocks noGrp="1"/>
+          </p:cNvSpPr>
+          <p:nvPr>
+            <p:ph type="sldNum" sz="quarter" idx="12"/>
+          </p:nvPr>
+        </p:nvSpPr>
+        <p:spPr/>
+        <p:txBody>
+          <a:bodyPr/>
+          <a:lstStyle/>
+          <a:p>
+            <a:fld id="{3A98EE3D-8CD1-4C3F-BD1C-C98C9596463C}" type="slidenum">
+              <a:rPr lang="en-US" smtClean="0"/>
+              <a:t>33</a:t>
+            </a:fld>
+            <a:endParaRPr lang="en-US" dirty="0"/>
+          </a:p>
+        </p:txBody>
+      </p:sp>
+      <p:sp>
+        <p:nvSpPr>
+          <p:cNvPr id="5" name="Footer Placeholder 4">
+            <a:extLst>
+              <a:ext uri="{FF2B5EF4-FFF2-40B4-BE49-F238E27FC236}">
+                <a16:creationId xmlns:a16="http://schemas.microsoft.com/office/drawing/2014/main" id="{1439A401-9E11-45E1-9C6E-464865B40886}"/>
+              </a:ext>
+            </a:extLst>
+          </p:cNvPr>
+          <p:cNvSpPr>
+            <a:spLocks noGrp="1"/>
+          </p:cNvSpPr>
+          <p:nvPr>
+            <p:ph type="ftr" sz="quarter" idx="11"/>
+          </p:nvPr>
+        </p:nvSpPr>
+        <p:spPr/>
+        <p:txBody>
+          <a:bodyPr/>
+          <a:lstStyle/>
+          <a:p>
+            <a:r>
+              <a:rPr lang="en-US" dirty="0"/>
+              <a:t>Lampros Lountzis</a:t>
+            </a:r>
+          </a:p>
+        </p:txBody>
+      </p:sp>
+    </p:spTree>
+    <p:extLst>
+      <p:ext uri="{BB962C8B-B14F-4D97-AF65-F5344CB8AC3E}">
+        <p14:creationId xmlns:p14="http://schemas.microsoft.com/office/powerpoint/2010/main" val="128961681"/>
+      </p:ext>
+    </p:extLst>
+  </p:cSld>
+  <p:clrMapOvr>
+    <a:masterClrMapping/>
+  </p:clrMapOvr>
+</p:sld>
+</file>
+
+<file path=ppt/slides/slide34.xml><?xml version="1.0" encoding="utf-8"?>
+<p:sld xmlns:a="http://schemas.openxmlformats.org/drawingml/2006/main" xmlns:r="http://schemas.openxmlformats.org/officeDocument/2006/relationships" xmlns:p="http://schemas.openxmlformats.org/presentationml/2006/main">
+  <p:cSld>
+    <p:bg>
+      <p:bgPr>
+        <a:solidFill>
+          <a:schemeClr val="bg1"/>
+        </a:solidFill>
+        <a:effectLst/>
+      </p:bgPr>
+    </p:bg>
+    <p:spTree>
+      <p:nvGrpSpPr>
+        <p:cNvPr id="1" name=""/>
+        <p:cNvGrpSpPr/>
+        <p:nvPr/>
+      </p:nvGrpSpPr>
+      <p:grpSpPr>
+        <a:xfrm>
+          <a:off x="0" y="0"/>
+          <a:ext cx="0" cy="0"/>
+          <a:chOff x="0" y="0"/>
+          <a:chExt cx="0" cy="0"/>
+        </a:xfrm>
+      </p:grpSpPr>
       <p:sp>
         <p:nvSpPr>
           <p:cNvPr id="54" name="Rectangle 53">
@@ -19953,7 +22228,7 @@
           <a:p>
             <a:fld id="{3A98EE3D-8CD1-4C3F-BD1C-C98C9596463C}" type="slidenum">
               <a:rPr lang="en-US" smtClean="0"/>
-              <a:t>30</a:t>
+              <a:t>34</a:t>
             </a:fld>
             <a:endParaRPr lang="en-US" dirty="0"/>
           </a:p>
@@ -19992,6 +22267,362 @@
     <p:extLst>
       <p:ext uri="{BB962C8B-B14F-4D97-AF65-F5344CB8AC3E}">
         <p14:creationId xmlns:p14="http://schemas.microsoft.com/office/powerpoint/2010/main" val="3172607338"/>
+      </p:ext>
+    </p:extLst>
+  </p:cSld>
+  <p:clrMapOvr>
+    <a:masterClrMapping/>
+  </p:clrMapOvr>
+</p:sld>
+</file>
+
+<file path=ppt/slides/slide35.xml><?xml version="1.0" encoding="utf-8"?>
+<p:sld xmlns:a="http://schemas.openxmlformats.org/drawingml/2006/main" xmlns:r="http://schemas.openxmlformats.org/officeDocument/2006/relationships" xmlns:p="http://schemas.openxmlformats.org/presentationml/2006/main">
+  <p:cSld>
+    <p:bg>
+      <p:bgPr>
+        <a:solidFill>
+          <a:schemeClr val="bg1"/>
+        </a:solidFill>
+        <a:effectLst/>
+      </p:bgPr>
+    </p:bg>
+    <p:spTree>
+      <p:nvGrpSpPr>
+        <p:cNvPr id="1" name=""/>
+        <p:cNvGrpSpPr/>
+        <p:nvPr/>
+      </p:nvGrpSpPr>
+      <p:grpSpPr>
+        <a:xfrm>
+          <a:off x="0" y="0"/>
+          <a:ext cx="0" cy="0"/>
+          <a:chOff x="0" y="0"/>
+          <a:chExt cx="0" cy="0"/>
+        </a:xfrm>
+      </p:grpSpPr>
+      <p:sp>
+        <p:nvSpPr>
+          <p:cNvPr id="54" name="Rectangle 53">
+            <a:extLst>
+              <a:ext uri="{FF2B5EF4-FFF2-40B4-BE49-F238E27FC236}">
+                <a16:creationId xmlns:a16="http://schemas.microsoft.com/office/drawing/2014/main" id="{39E3965E-AC41-4711-9D10-E25ABB132D86}"/>
+              </a:ext>
+              <a:ext uri="{C183D7F6-B498-43B3-948B-1728B52AA6E4}">
+                <adec:decorative xmlns:adec="http://schemas.microsoft.com/office/drawing/2017/decorative" val="1"/>
+              </a:ext>
+            </a:extLst>
+          </p:cNvPr>
+          <p:cNvSpPr>
+            <a:spLocks noGrp="1" noRot="1" noChangeAspect="1" noMove="1" noResize="1" noEditPoints="1" noAdjustHandles="1" noChangeArrowheads="1" noChangeShapeType="1" noTextEdit="1"/>
+          </p:cNvSpPr>
+          <p:nvPr>
+            <p:extLst>
+              <p:ext uri="{386F3935-93C4-4BCD-93E2-E3B085C9AB24}">
+                <p16:designElem xmlns:p16="http://schemas.microsoft.com/office/powerpoint/2015/main" val="1"/>
+              </p:ext>
+            </p:extLst>
+          </p:nvPr>
+        </p:nvSpPr>
+        <p:spPr>
+          <a:xfrm>
+            <a:off x="3175" y="6400800"/>
+            <a:ext cx="12188825" cy="457200"/>
+          </a:xfrm>
+          <a:prstGeom prst="rect">
+            <a:avLst/>
+          </a:prstGeom>
+          <a:solidFill>
+            <a:srgbClr val="262626"/>
+          </a:solidFill>
+          <a:ln>
+            <a:noFill/>
+          </a:ln>
+        </p:spPr>
+        <p:style>
+          <a:lnRef idx="2">
+            <a:schemeClr val="accent1">
+              <a:shade val="50000"/>
+            </a:schemeClr>
+          </a:lnRef>
+          <a:fillRef idx="1">
+            <a:schemeClr val="accent1"/>
+          </a:fillRef>
+          <a:effectRef idx="0">
+            <a:schemeClr val="accent1"/>
+          </a:effectRef>
+          <a:fontRef idx="minor">
+            <a:schemeClr val="lt1"/>
+          </a:fontRef>
+        </p:style>
+      </p:sp>
+      <p:cxnSp>
+        <p:nvCxnSpPr>
+          <p:cNvPr id="56" name="Straight Connector 55">
+            <a:extLst>
+              <a:ext uri="{FF2B5EF4-FFF2-40B4-BE49-F238E27FC236}">
+                <a16:creationId xmlns:a16="http://schemas.microsoft.com/office/drawing/2014/main" id="{1F5DC8C3-BA5F-4EED-BB9A-A14272BD82A1}"/>
+              </a:ext>
+              <a:ext uri="{C183D7F6-B498-43B3-948B-1728B52AA6E4}">
+                <adec:decorative xmlns:adec="http://schemas.microsoft.com/office/drawing/2017/decorative" val="1"/>
+              </a:ext>
+            </a:extLst>
+          </p:cNvPr>
+          <p:cNvCxnSpPr>
+            <a:cxnSpLocks noGrp="1" noRot="1" noChangeAspect="1" noMove="1" noResize="1" noEditPoints="1" noAdjustHandles="1" noChangeArrowheads="1" noChangeShapeType="1"/>
+          </p:cNvCxnSpPr>
+          <p:nvPr>
+            <p:extLst>
+              <p:ext uri="{386F3935-93C4-4BCD-93E2-E3B085C9AB24}">
+                <p16:designElem xmlns:p16="http://schemas.microsoft.com/office/powerpoint/2015/main" val="1"/>
+              </p:ext>
+            </p:extLst>
+          </p:nvPr>
+        </p:nvCxnSpPr>
+        <p:spPr>
+          <a:xfrm>
+            <a:off x="1207658" y="4474741"/>
+            <a:ext cx="9875520" cy="0"/>
+          </a:xfrm>
+          <a:prstGeom prst="line">
+            <a:avLst/>
+          </a:prstGeom>
+          <a:ln w="12700">
+            <a:solidFill>
+              <a:schemeClr val="tx1">
+                <a:lumMod val="75000"/>
+                <a:lumOff val="25000"/>
+              </a:schemeClr>
+            </a:solidFill>
+          </a:ln>
+        </p:spPr>
+        <p:style>
+          <a:lnRef idx="1">
+            <a:schemeClr val="accent1"/>
+          </a:lnRef>
+          <a:fillRef idx="0">
+            <a:schemeClr val="accent1"/>
+          </a:fillRef>
+          <a:effectRef idx="0">
+            <a:schemeClr val="accent1"/>
+          </a:effectRef>
+          <a:fontRef idx="minor">
+            <a:schemeClr val="tx1"/>
+          </a:fontRef>
+        </p:style>
+      </p:cxnSp>
+      <p:sp useBgFill="1">
+        <p:nvSpPr>
+          <p:cNvPr id="58" name="Rectangle 57">
+            <a:extLst>
+              <a:ext uri="{FF2B5EF4-FFF2-40B4-BE49-F238E27FC236}">
+                <a16:creationId xmlns:a16="http://schemas.microsoft.com/office/drawing/2014/main" id="{8C6E698C-8155-4B8B-BDC9-B7299772B509}"/>
+              </a:ext>
+              <a:ext uri="{C183D7F6-B498-43B3-948B-1728B52AA6E4}">
+                <adec:decorative xmlns:adec="http://schemas.microsoft.com/office/drawing/2017/decorative" val="1"/>
+              </a:ext>
+            </a:extLst>
+          </p:cNvPr>
+          <p:cNvSpPr>
+            <a:spLocks noGrp="1" noRot="1" noChangeAspect="1" noMove="1" noResize="1" noEditPoints="1" noAdjustHandles="1" noChangeArrowheads="1" noChangeShapeType="1" noTextEdit="1"/>
+          </p:cNvSpPr>
+          <p:nvPr>
+            <p:extLst>
+              <p:ext uri="{386F3935-93C4-4BCD-93E2-E3B085C9AB24}">
+                <p16:designElem xmlns:p16="http://schemas.microsoft.com/office/powerpoint/2015/main" val="1"/>
+              </p:ext>
+            </p:extLst>
+          </p:nvPr>
+        </p:nvSpPr>
+        <p:spPr>
+          <a:xfrm>
+            <a:off x="0" y="0"/>
+            <a:ext cx="12188952" cy="6858000"/>
+          </a:xfrm>
+          <a:prstGeom prst="rect">
+            <a:avLst/>
+          </a:prstGeom>
+          <a:ln>
+            <a:noFill/>
+          </a:ln>
+        </p:spPr>
+        <p:style>
+          <a:lnRef idx="2">
+            <a:schemeClr val="accent1">
+              <a:shade val="50000"/>
+            </a:schemeClr>
+          </a:lnRef>
+          <a:fillRef idx="1">
+            <a:schemeClr val="accent1"/>
+          </a:fillRef>
+          <a:effectRef idx="0">
+            <a:schemeClr val="accent1"/>
+          </a:effectRef>
+          <a:fontRef idx="minor">
+            <a:schemeClr val="lt1"/>
+          </a:fontRef>
+        </p:style>
+        <p:txBody>
+          <a:bodyPr rtlCol="0" anchor="ctr"/>
+          <a:lstStyle/>
+          <a:p>
+            <a:pPr algn="ctr"/>
+            <a:endParaRPr lang="en-US"/>
+          </a:p>
+        </p:txBody>
+      </p:sp>
+      <p:sp>
+        <p:nvSpPr>
+          <p:cNvPr id="2" name="Title 1">
+            <a:extLst>
+              <a:ext uri="{FF2B5EF4-FFF2-40B4-BE49-F238E27FC236}">
+                <a16:creationId xmlns:a16="http://schemas.microsoft.com/office/drawing/2014/main" id="{66A47F5C-50EC-416A-AE8C-6F6BB4225673}"/>
+              </a:ext>
+            </a:extLst>
+          </p:cNvPr>
+          <p:cNvSpPr>
+            <a:spLocks noGrp="1"/>
+          </p:cNvSpPr>
+          <p:nvPr>
+            <p:ph type="title"/>
+          </p:nvPr>
+        </p:nvSpPr>
+        <p:spPr>
+          <a:xfrm>
+            <a:off x="965201" y="772731"/>
+            <a:ext cx="6255026" cy="5054008"/>
+          </a:xfrm>
+        </p:spPr>
+        <p:txBody>
+          <a:bodyPr vert="horz" lIns="91440" tIns="45720" rIns="91440" bIns="45720" rtlCol="0" anchor="ctr">
+            <a:normAutofit/>
+          </a:bodyPr>
+          <a:lstStyle/>
+          <a:p>
+            <a:pPr marL="201168" lvl="1" indent="0" algn="ctr">
+              <a:buNone/>
+            </a:pPr>
+            <a:r>
+              <a:rPr lang="en-US" sz="3600" dirty="0"/>
+              <a:t>Thank you 😃</a:t>
+            </a:r>
+          </a:p>
+        </p:txBody>
+      </p:sp>
+      <p:cxnSp>
+        <p:nvCxnSpPr>
+          <p:cNvPr id="60" name="Straight Connector 59">
+            <a:extLst>
+              <a:ext uri="{FF2B5EF4-FFF2-40B4-BE49-F238E27FC236}">
+                <a16:creationId xmlns:a16="http://schemas.microsoft.com/office/drawing/2014/main" id="{09525C9A-1972-4836-BA7A-706C946EF4DA}"/>
+              </a:ext>
+              <a:ext uri="{C183D7F6-B498-43B3-948B-1728B52AA6E4}">
+                <adec:decorative xmlns:adec="http://schemas.microsoft.com/office/drawing/2017/decorative" val="1"/>
+              </a:ext>
+            </a:extLst>
+          </p:cNvPr>
+          <p:cNvCxnSpPr>
+            <a:cxnSpLocks noGrp="1" noRot="1" noChangeAspect="1" noMove="1" noResize="1" noEditPoints="1" noAdjustHandles="1" noChangeArrowheads="1" noChangeShapeType="1"/>
+          </p:cNvCxnSpPr>
+          <p:nvPr>
+            <p:extLst>
+              <p:ext uri="{386F3935-93C4-4BCD-93E2-E3B085C9AB24}">
+                <p16:designElem xmlns:p16="http://schemas.microsoft.com/office/powerpoint/2015/main" val="1"/>
+              </p:ext>
+            </p:extLst>
+          </p:nvPr>
+        </p:nvCxnSpPr>
+        <p:spPr>
+          <a:xfrm>
+            <a:off x="7534656" y="1520631"/>
+            <a:ext cx="0" cy="3558208"/>
+          </a:xfrm>
+          <a:prstGeom prst="line">
+            <a:avLst/>
+          </a:prstGeom>
+          <a:ln>
+            <a:solidFill>
+              <a:schemeClr val="tx1">
+                <a:lumMod val="75000"/>
+                <a:lumOff val="25000"/>
+              </a:schemeClr>
+            </a:solidFill>
+          </a:ln>
+        </p:spPr>
+        <p:style>
+          <a:lnRef idx="1">
+            <a:schemeClr val="accent1"/>
+          </a:lnRef>
+          <a:fillRef idx="0">
+            <a:schemeClr val="accent1"/>
+          </a:fillRef>
+          <a:effectRef idx="0">
+            <a:schemeClr val="accent1"/>
+          </a:effectRef>
+          <a:fontRef idx="minor">
+            <a:schemeClr val="tx1"/>
+          </a:fontRef>
+        </p:style>
+      </p:cxnSp>
+      <p:sp>
+        <p:nvSpPr>
+          <p:cNvPr id="62" name="Rectangle 61">
+            <a:extLst>
+              <a:ext uri="{FF2B5EF4-FFF2-40B4-BE49-F238E27FC236}">
+                <a16:creationId xmlns:a16="http://schemas.microsoft.com/office/drawing/2014/main" id="{8D60EC1B-554F-47EF-839A-BAAD858F6666}"/>
+              </a:ext>
+              <a:ext uri="{C183D7F6-B498-43B3-948B-1728B52AA6E4}">
+                <adec:decorative xmlns:adec="http://schemas.microsoft.com/office/drawing/2017/decorative" val="1"/>
+              </a:ext>
+            </a:extLst>
+          </p:cNvPr>
+          <p:cNvSpPr>
+            <a:spLocks noGrp="1" noRot="1" noChangeAspect="1" noMove="1" noResize="1" noEditPoints="1" noAdjustHandles="1" noChangeArrowheads="1" noChangeShapeType="1" noTextEdit="1"/>
+          </p:cNvSpPr>
+          <p:nvPr>
+            <p:extLst>
+              <p:ext uri="{386F3935-93C4-4BCD-93E2-E3B085C9AB24}">
+                <p16:designElem xmlns:p16="http://schemas.microsoft.com/office/powerpoint/2015/main" val="1"/>
+              </p:ext>
+            </p:extLst>
+          </p:nvPr>
+        </p:nvSpPr>
+        <p:spPr>
+          <a:xfrm>
+            <a:off x="0" y="6400800"/>
+            <a:ext cx="12192000" cy="457200"/>
+          </a:xfrm>
+          <a:prstGeom prst="rect">
+            <a:avLst/>
+          </a:prstGeom>
+          <a:solidFill>
+            <a:srgbClr val="262626"/>
+          </a:solidFill>
+          <a:ln>
+            <a:noFill/>
+          </a:ln>
+        </p:spPr>
+        <p:style>
+          <a:lnRef idx="2">
+            <a:schemeClr val="accent1">
+              <a:shade val="50000"/>
+            </a:schemeClr>
+          </a:lnRef>
+          <a:fillRef idx="1">
+            <a:schemeClr val="accent1"/>
+          </a:fillRef>
+          <a:effectRef idx="0">
+            <a:schemeClr val="accent1"/>
+          </a:effectRef>
+          <a:fontRef idx="minor">
+            <a:schemeClr val="lt1"/>
+          </a:fontRef>
+        </p:style>
+      </p:sp>
+    </p:spTree>
+    <p:extLst>
+      <p:ext uri="{BB962C8B-B14F-4D97-AF65-F5344CB8AC3E}">
+        <p14:creationId xmlns:p14="http://schemas.microsoft.com/office/powerpoint/2010/main" val="590188031"/>
       </p:ext>
     </p:extLst>
   </p:cSld>
@@ -25933,6 +28564,221 @@
 </a:themeOverride>
 </file>
 
+<file path=ppt/theme/themeOverride31.xml><?xml version="1.0" encoding="utf-8"?>
+<a:themeOverride xmlns:a="http://schemas.openxmlformats.org/drawingml/2006/main">
+  <a:clrScheme name="Custom 40">
+    <a:dk1>
+      <a:sysClr val="windowText" lastClr="000000"/>
+    </a:dk1>
+    <a:lt1>
+      <a:sysClr val="window" lastClr="FFFFFF"/>
+    </a:lt1>
+    <a:dk2>
+      <a:srgbClr val="545D57"/>
+    </a:dk2>
+    <a:lt2>
+      <a:srgbClr val="EBEBE8"/>
+    </a:lt2>
+    <a:accent1>
+      <a:srgbClr val="579858"/>
+    </a:accent1>
+    <a:accent2>
+      <a:srgbClr val="ED583E"/>
+    </a:accent2>
+    <a:accent3>
+      <a:srgbClr val="D3BA59"/>
+    </a:accent3>
+    <a:accent4>
+      <a:srgbClr val="4C94AC"/>
+    </a:accent4>
+    <a:accent5>
+      <a:srgbClr val="A09E84"/>
+    </a:accent5>
+    <a:accent6>
+      <a:srgbClr val="FC7D4A"/>
+    </a:accent6>
+    <a:hlink>
+      <a:srgbClr val="04A2DA"/>
+    </a:hlink>
+    <a:folHlink>
+      <a:srgbClr val="808080"/>
+    </a:folHlink>
+  </a:clrScheme>
+</a:themeOverride>
+</file>
+
+<file path=ppt/theme/themeOverride32.xml><?xml version="1.0" encoding="utf-8"?>
+<a:themeOverride xmlns:a="http://schemas.openxmlformats.org/drawingml/2006/main">
+  <a:clrScheme name="Custom 40">
+    <a:dk1>
+      <a:sysClr val="windowText" lastClr="000000"/>
+    </a:dk1>
+    <a:lt1>
+      <a:sysClr val="window" lastClr="FFFFFF"/>
+    </a:lt1>
+    <a:dk2>
+      <a:srgbClr val="545D57"/>
+    </a:dk2>
+    <a:lt2>
+      <a:srgbClr val="EBEBE8"/>
+    </a:lt2>
+    <a:accent1>
+      <a:srgbClr val="579858"/>
+    </a:accent1>
+    <a:accent2>
+      <a:srgbClr val="ED583E"/>
+    </a:accent2>
+    <a:accent3>
+      <a:srgbClr val="D3BA59"/>
+    </a:accent3>
+    <a:accent4>
+      <a:srgbClr val="4C94AC"/>
+    </a:accent4>
+    <a:accent5>
+      <a:srgbClr val="A09E84"/>
+    </a:accent5>
+    <a:accent6>
+      <a:srgbClr val="FC7D4A"/>
+    </a:accent6>
+    <a:hlink>
+      <a:srgbClr val="04A2DA"/>
+    </a:hlink>
+    <a:folHlink>
+      <a:srgbClr val="808080"/>
+    </a:folHlink>
+  </a:clrScheme>
+</a:themeOverride>
+</file>
+
+<file path=ppt/theme/themeOverride33.xml><?xml version="1.0" encoding="utf-8"?>
+<a:themeOverride xmlns:a="http://schemas.openxmlformats.org/drawingml/2006/main">
+  <a:clrScheme name="Custom 40">
+    <a:dk1>
+      <a:sysClr val="windowText" lastClr="000000"/>
+    </a:dk1>
+    <a:lt1>
+      <a:sysClr val="window" lastClr="FFFFFF"/>
+    </a:lt1>
+    <a:dk2>
+      <a:srgbClr val="545D57"/>
+    </a:dk2>
+    <a:lt2>
+      <a:srgbClr val="EBEBE8"/>
+    </a:lt2>
+    <a:accent1>
+      <a:srgbClr val="579858"/>
+    </a:accent1>
+    <a:accent2>
+      <a:srgbClr val="ED583E"/>
+    </a:accent2>
+    <a:accent3>
+      <a:srgbClr val="D3BA59"/>
+    </a:accent3>
+    <a:accent4>
+      <a:srgbClr val="4C94AC"/>
+    </a:accent4>
+    <a:accent5>
+      <a:srgbClr val="A09E84"/>
+    </a:accent5>
+    <a:accent6>
+      <a:srgbClr val="FC7D4A"/>
+    </a:accent6>
+    <a:hlink>
+      <a:srgbClr val="04A2DA"/>
+    </a:hlink>
+    <a:folHlink>
+      <a:srgbClr val="808080"/>
+    </a:folHlink>
+  </a:clrScheme>
+</a:themeOverride>
+</file>
+
+<file path=ppt/theme/themeOverride34.xml><?xml version="1.0" encoding="utf-8"?>
+<a:themeOverride xmlns:a="http://schemas.openxmlformats.org/drawingml/2006/main">
+  <a:clrScheme name="Custom 40">
+    <a:dk1>
+      <a:sysClr val="windowText" lastClr="000000"/>
+    </a:dk1>
+    <a:lt1>
+      <a:sysClr val="window" lastClr="FFFFFF"/>
+    </a:lt1>
+    <a:dk2>
+      <a:srgbClr val="545D57"/>
+    </a:dk2>
+    <a:lt2>
+      <a:srgbClr val="EBEBE8"/>
+    </a:lt2>
+    <a:accent1>
+      <a:srgbClr val="579858"/>
+    </a:accent1>
+    <a:accent2>
+      <a:srgbClr val="ED583E"/>
+    </a:accent2>
+    <a:accent3>
+      <a:srgbClr val="D3BA59"/>
+    </a:accent3>
+    <a:accent4>
+      <a:srgbClr val="4C94AC"/>
+    </a:accent4>
+    <a:accent5>
+      <a:srgbClr val="A09E84"/>
+    </a:accent5>
+    <a:accent6>
+      <a:srgbClr val="FC7D4A"/>
+    </a:accent6>
+    <a:hlink>
+      <a:srgbClr val="04A2DA"/>
+    </a:hlink>
+    <a:folHlink>
+      <a:srgbClr val="808080"/>
+    </a:folHlink>
+  </a:clrScheme>
+</a:themeOverride>
+</file>
+
+<file path=ppt/theme/themeOverride35.xml><?xml version="1.0" encoding="utf-8"?>
+<a:themeOverride xmlns:a="http://schemas.openxmlformats.org/drawingml/2006/main">
+  <a:clrScheme name="Custom 40">
+    <a:dk1>
+      <a:sysClr val="windowText" lastClr="000000"/>
+    </a:dk1>
+    <a:lt1>
+      <a:sysClr val="window" lastClr="FFFFFF"/>
+    </a:lt1>
+    <a:dk2>
+      <a:srgbClr val="545D57"/>
+    </a:dk2>
+    <a:lt2>
+      <a:srgbClr val="EBEBE8"/>
+    </a:lt2>
+    <a:accent1>
+      <a:srgbClr val="579858"/>
+    </a:accent1>
+    <a:accent2>
+      <a:srgbClr val="ED583E"/>
+    </a:accent2>
+    <a:accent3>
+      <a:srgbClr val="D3BA59"/>
+    </a:accent3>
+    <a:accent4>
+      <a:srgbClr val="4C94AC"/>
+    </a:accent4>
+    <a:accent5>
+      <a:srgbClr val="A09E84"/>
+    </a:accent5>
+    <a:accent6>
+      <a:srgbClr val="FC7D4A"/>
+    </a:accent6>
+    <a:hlink>
+      <a:srgbClr val="04A2DA"/>
+    </a:hlink>
+    <a:folHlink>
+      <a:srgbClr val="808080"/>
+    </a:folHlink>
+  </a:clrScheme>
+</a:themeOverride>
+</file>
+
 <file path=ppt/theme/themeOverride4.xml><?xml version="1.0" encoding="utf-8"?>
 <a:themeOverride xmlns:a="http://schemas.openxmlformats.org/drawingml/2006/main">
   <a:clrScheme name="Custom 40">

</xml_diff>

<commit_message>
added demo in report
</commit_message>
<xml_diff>
--- a/report/report.pptx
+++ b/report/report.pptx
@@ -42,7 +42,10 @@
     <p:sldId id="302" r:id="rId36"/>
     <p:sldId id="303" r:id="rId37"/>
     <p:sldId id="287" r:id="rId38"/>
-    <p:sldId id="297" r:id="rId39"/>
+    <p:sldId id="306" r:id="rId39"/>
+    <p:sldId id="304" r:id="rId40"/>
+    <p:sldId id="305" r:id="rId41"/>
+    <p:sldId id="297" r:id="rId42"/>
   </p:sldIdLst>
   <p:sldSz cx="12192000" cy="6858000"/>
   <p:notesSz cx="6858000" cy="9144000"/>
@@ -298,7 +301,7 @@
           <a:p>
             <a:fld id="{3C2B07E4-CDF9-4C88-A2F3-04620E58224D}" type="datetimeFigureOut">
               <a:rPr lang="en-US" smtClean="0"/>
-              <a:t>11/17/2021</a:t>
+              <a:t>11/18/2021</a:t>
             </a:fld>
             <a:endParaRPr lang="en-US"/>
           </a:p>
@@ -588,7 +591,7 @@
           <a:p>
             <a:fld id="{3C2B07E4-CDF9-4C88-A2F3-04620E58224D}" type="datetimeFigureOut">
               <a:rPr lang="en-US" smtClean="0"/>
-              <a:t>11/17/2021</a:t>
+              <a:t>11/18/2021</a:t>
             </a:fld>
             <a:endParaRPr lang="en-US"/>
           </a:p>
@@ -840,7 +843,7 @@
           <a:p>
             <a:fld id="{3C2B07E4-CDF9-4C88-A2F3-04620E58224D}" type="datetimeFigureOut">
               <a:rPr lang="en-US" smtClean="0"/>
-              <a:t>11/17/2021</a:t>
+              <a:t>11/18/2021</a:t>
             </a:fld>
             <a:endParaRPr lang="en-US"/>
           </a:p>
@@ -1028,7 +1031,7 @@
           <a:p>
             <a:fld id="{AA302EFC-ED59-4B4D-993E-400BC651A785}" type="datetime1">
               <a:rPr lang="en-US" smtClean="0"/>
-              <a:t>11/17/2021</a:t>
+              <a:t>11/18/2021</a:t>
             </a:fld>
             <a:endParaRPr lang="en-US" dirty="0"/>
           </a:p>
@@ -1220,7 +1223,7 @@
           <a:p>
             <a:fld id="{1067E7C5-37BF-4B94-8AB4-87E727052233}" type="datetime1">
               <a:rPr lang="en-US" smtClean="0"/>
-              <a:t>11/17/2021</a:t>
+              <a:t>11/18/2021</a:t>
             </a:fld>
             <a:endParaRPr lang="en-US" dirty="0"/>
           </a:p>
@@ -1412,7 +1415,7 @@
           <a:p>
             <a:fld id="{7B3F78A3-FD76-4F63-AF81-1396C1841E9C}" type="datetime1">
               <a:rPr lang="en-US" smtClean="0"/>
-              <a:t>11/17/2021</a:t>
+              <a:t>11/18/2021</a:t>
             </a:fld>
             <a:endParaRPr lang="en-US" dirty="0"/>
           </a:p>
@@ -1668,7 +1671,7 @@
           <a:p>
             <a:fld id="{3C2B07E4-CDF9-4C88-A2F3-04620E58224D}" type="datetimeFigureOut">
               <a:rPr lang="en-US" smtClean="0"/>
-              <a:t>11/17/2021</a:t>
+              <a:t>11/18/2021</a:t>
             </a:fld>
             <a:endParaRPr lang="en-US"/>
           </a:p>
@@ -1997,7 +2000,7 @@
           <a:p>
             <a:fld id="{3C2B07E4-CDF9-4C88-A2F3-04620E58224D}" type="datetimeFigureOut">
               <a:rPr lang="en-US" smtClean="0"/>
-              <a:t>11/17/2021</a:t>
+              <a:t>11/18/2021</a:t>
             </a:fld>
             <a:endParaRPr lang="en-US"/>
           </a:p>
@@ -2347,7 +2350,7 @@
           <a:p>
             <a:fld id="{3C2B07E4-CDF9-4C88-A2F3-04620E58224D}" type="datetimeFigureOut">
               <a:rPr lang="en-US" smtClean="0"/>
-              <a:t>11/17/2021</a:t>
+              <a:t>11/18/2021</a:t>
             </a:fld>
             <a:endParaRPr lang="en-US"/>
           </a:p>
@@ -2859,7 +2862,7 @@
           <a:p>
             <a:fld id="{3C2B07E4-CDF9-4C88-A2F3-04620E58224D}" type="datetimeFigureOut">
               <a:rPr lang="en-US" smtClean="0"/>
-              <a:t>11/17/2021</a:t>
+              <a:t>11/18/2021</a:t>
             </a:fld>
             <a:endParaRPr lang="en-US"/>
           </a:p>
@@ -3187,7 +3190,7 @@
           <a:p>
             <a:fld id="{3C2B07E4-CDF9-4C88-A2F3-04620E58224D}" type="datetimeFigureOut">
               <a:rPr lang="en-US" smtClean="0"/>
-              <a:t>11/17/2021</a:t>
+              <a:t>11/18/2021</a:t>
             </a:fld>
             <a:endParaRPr lang="en-US"/>
           </a:p>
@@ -3300,7 +3303,7 @@
           <a:p>
             <a:fld id="{3C2B07E4-CDF9-4C88-A2F3-04620E58224D}" type="datetimeFigureOut">
               <a:rPr lang="en-US" smtClean="0"/>
-              <a:t>11/17/2021</a:t>
+              <a:t>11/18/2021</a:t>
             </a:fld>
             <a:endParaRPr lang="en-US"/>
           </a:p>
@@ -3641,7 +3644,7 @@
           <a:p>
             <a:fld id="{3C2B07E4-CDF9-4C88-A2F3-04620E58224D}" type="datetimeFigureOut">
               <a:rPr lang="en-US" smtClean="0"/>
-              <a:t>11/17/2021</a:t>
+              <a:t>11/18/2021</a:t>
             </a:fld>
             <a:endParaRPr lang="en-US"/>
           </a:p>
@@ -3941,7 +3944,7 @@
           <a:p>
             <a:fld id="{3C2B07E4-CDF9-4C88-A2F3-04620E58224D}" type="datetimeFigureOut">
               <a:rPr lang="en-US" smtClean="0"/>
-              <a:t>11/17/2021</a:t>
+              <a:t>11/18/2021</a:t>
             </a:fld>
             <a:endParaRPr lang="en-US"/>
           </a:p>
@@ -4181,7 +4184,7 @@
             <a:fld id="{3C2B07E4-CDF9-4C88-A2F3-04620E58224D}" type="datetimeFigureOut">
               <a:rPr lang="en-US" smtClean="0"/>
               <a:pPr/>
-              <a:t>11/17/2021</a:t>
+              <a:t>11/18/2021</a:t>
             </a:fld>
             <a:endParaRPr lang="en-US" dirty="0"/>
           </a:p>
@@ -4780,7 +4783,7 @@
           <a:p>
             <a:fld id="{30B9AB43-16D5-496C-92E2-DD88A4837C90}" type="datetime1">
               <a:rPr lang="en-US" smtClean="0"/>
-              <a:t>11/17/2021</a:t>
+              <a:t>11/18/2021</a:t>
             </a:fld>
             <a:endParaRPr lang="en-US" dirty="0"/>
           </a:p>
@@ -5474,7 +5477,7 @@
           <a:p>
             <a:fld id="{2983D189-BC30-430F-BBBC-47FE85CCFEB3}" type="datetime1">
               <a:rPr lang="en-US" smtClean="0"/>
-              <a:t>11/17/2021</a:t>
+              <a:t>11/18/2021</a:t>
             </a:fld>
             <a:endParaRPr lang="en-US" dirty="0"/>
           </a:p>
@@ -6168,7 +6171,7 @@
           <a:p>
             <a:fld id="{E5E1D892-C2A9-4E2A-B7C0-5932B657ED52}" type="datetime1">
               <a:rPr lang="en-US" smtClean="0"/>
-              <a:t>11/17/2021</a:t>
+              <a:t>11/18/2021</a:t>
             </a:fld>
             <a:endParaRPr lang="en-US" dirty="0"/>
           </a:p>
@@ -22277,6 +22280,1227 @@
 </file>
 
 <file path=ppt/slides/slide35.xml><?xml version="1.0" encoding="utf-8"?>
+<p:sld xmlns:a="http://schemas.openxmlformats.org/drawingml/2006/main" xmlns:r="http://schemas.openxmlformats.org/officeDocument/2006/relationships" xmlns:p="http://schemas.openxmlformats.org/presentationml/2006/main">
+  <p:cSld>
+    <p:bg>
+      <p:bgPr>
+        <a:solidFill>
+          <a:schemeClr val="bg1"/>
+        </a:solidFill>
+        <a:effectLst/>
+      </p:bgPr>
+    </p:bg>
+    <p:spTree>
+      <p:nvGrpSpPr>
+        <p:cNvPr id="1" name=""/>
+        <p:cNvGrpSpPr/>
+        <p:nvPr/>
+      </p:nvGrpSpPr>
+      <p:grpSpPr>
+        <a:xfrm>
+          <a:off x="0" y="0"/>
+          <a:ext cx="0" cy="0"/>
+          <a:chOff x="0" y="0"/>
+          <a:chExt cx="0" cy="0"/>
+        </a:xfrm>
+      </p:grpSpPr>
+      <p:sp>
+        <p:nvSpPr>
+          <p:cNvPr id="30" name="Rectangle 29">
+            <a:extLst>
+              <a:ext uri="{FF2B5EF4-FFF2-40B4-BE49-F238E27FC236}">
+                <a16:creationId xmlns:a16="http://schemas.microsoft.com/office/drawing/2014/main" id="{A8E9C91B-7EAD-4562-AB0E-DFB9663AECE3}"/>
+              </a:ext>
+              <a:ext uri="{C183D7F6-B498-43B3-948B-1728B52AA6E4}">
+                <adec:decorative xmlns:adec="http://schemas.microsoft.com/office/drawing/2017/decorative" val="1"/>
+              </a:ext>
+            </a:extLst>
+          </p:cNvPr>
+          <p:cNvSpPr>
+            <a:spLocks noGrp="1" noRot="1" noChangeAspect="1" noMove="1" noResize="1" noEditPoints="1" noAdjustHandles="1" noChangeArrowheads="1" noChangeShapeType="1" noTextEdit="1"/>
+          </p:cNvSpPr>
+          <p:nvPr>
+            <p:extLst>
+              <p:ext uri="{386F3935-93C4-4BCD-93E2-E3B085C9AB24}">
+                <p16:designElem xmlns:p16="http://schemas.microsoft.com/office/powerpoint/2015/main" val="1"/>
+              </p:ext>
+            </p:extLst>
+          </p:nvPr>
+        </p:nvSpPr>
+        <p:spPr>
+          <a:xfrm>
+            <a:off x="3175" y="6400800"/>
+            <a:ext cx="12188825" cy="457200"/>
+          </a:xfrm>
+          <a:prstGeom prst="rect">
+            <a:avLst/>
+          </a:prstGeom>
+          <a:solidFill>
+            <a:srgbClr val="262626"/>
+          </a:solidFill>
+          <a:ln>
+            <a:noFill/>
+          </a:ln>
+        </p:spPr>
+        <p:style>
+          <a:lnRef idx="2">
+            <a:schemeClr val="accent1">
+              <a:shade val="50000"/>
+            </a:schemeClr>
+          </a:lnRef>
+          <a:fillRef idx="1">
+            <a:schemeClr val="accent1"/>
+          </a:fillRef>
+          <a:effectRef idx="0">
+            <a:schemeClr val="accent1"/>
+          </a:effectRef>
+          <a:fontRef idx="minor">
+            <a:schemeClr val="lt1"/>
+          </a:fontRef>
+        </p:style>
+      </p:sp>
+      <p:sp>
+        <p:nvSpPr>
+          <p:cNvPr id="32" name="Rectangle 31">
+            <a:extLst>
+              <a:ext uri="{FF2B5EF4-FFF2-40B4-BE49-F238E27FC236}">
+                <a16:creationId xmlns:a16="http://schemas.microsoft.com/office/drawing/2014/main" id="{41497DE5-0939-4D1D-9350-0C5E1B209C68}"/>
+              </a:ext>
+              <a:ext uri="{C183D7F6-B498-43B3-948B-1728B52AA6E4}">
+                <adec:decorative xmlns:adec="http://schemas.microsoft.com/office/drawing/2017/decorative" val="1"/>
+              </a:ext>
+            </a:extLst>
+          </p:cNvPr>
+          <p:cNvSpPr>
+            <a:spLocks noGrp="1" noRot="1" noChangeAspect="1" noMove="1" noResize="1" noEditPoints="1" noAdjustHandles="1" noChangeArrowheads="1" noChangeShapeType="1" noTextEdit="1"/>
+          </p:cNvSpPr>
+          <p:nvPr>
+            <p:extLst>
+              <p:ext uri="{386F3935-93C4-4BCD-93E2-E3B085C9AB24}">
+                <p16:designElem xmlns:p16="http://schemas.microsoft.com/office/powerpoint/2015/main" val="1"/>
+              </p:ext>
+            </p:extLst>
+          </p:nvPr>
+        </p:nvSpPr>
+        <p:spPr>
+          <a:xfrm>
+            <a:off x="0" y="0"/>
+            <a:ext cx="12192000" cy="6858000"/>
+          </a:xfrm>
+          <a:prstGeom prst="rect">
+            <a:avLst/>
+          </a:prstGeom>
+          <a:solidFill>
+            <a:srgbClr val="262626"/>
+          </a:solidFill>
+          <a:ln>
+            <a:noFill/>
+          </a:ln>
+        </p:spPr>
+        <p:style>
+          <a:lnRef idx="2">
+            <a:schemeClr val="accent1">
+              <a:shade val="50000"/>
+            </a:schemeClr>
+          </a:lnRef>
+          <a:fillRef idx="1">
+            <a:schemeClr val="accent1"/>
+          </a:fillRef>
+          <a:effectRef idx="0">
+            <a:schemeClr val="accent1"/>
+          </a:effectRef>
+          <a:fontRef idx="minor">
+            <a:schemeClr val="lt1"/>
+          </a:fontRef>
+        </p:style>
+        <p:txBody>
+          <a:bodyPr rtlCol="0" anchor="ctr"/>
+          <a:lstStyle/>
+          <a:p>
+            <a:pPr algn="ctr"/>
+            <a:endParaRPr lang="en-US"/>
+          </a:p>
+        </p:txBody>
+      </p:sp>
+      <p:sp>
+        <p:nvSpPr>
+          <p:cNvPr id="34" name="Rectangle 33">
+            <a:extLst>
+              <a:ext uri="{FF2B5EF4-FFF2-40B4-BE49-F238E27FC236}">
+                <a16:creationId xmlns:a16="http://schemas.microsoft.com/office/drawing/2014/main" id="{5CCC70ED-6C63-4537-B7EB-51990D6C0A6F}"/>
+              </a:ext>
+              <a:ext uri="{C183D7F6-B498-43B3-948B-1728B52AA6E4}">
+                <adec:decorative xmlns:adec="http://schemas.microsoft.com/office/drawing/2017/decorative" val="1"/>
+              </a:ext>
+            </a:extLst>
+          </p:cNvPr>
+          <p:cNvSpPr>
+            <a:spLocks noGrp="1" noRot="1" noChangeAspect="1" noMove="1" noResize="1" noEditPoints="1" noAdjustHandles="1" noChangeArrowheads="1" noChangeShapeType="1" noTextEdit="1"/>
+          </p:cNvSpPr>
+          <p:nvPr>
+            <p:extLst>
+              <p:ext uri="{386F3935-93C4-4BCD-93E2-E3B085C9AB24}">
+                <p16:designElem xmlns:p16="http://schemas.microsoft.com/office/powerpoint/2015/main" val="1"/>
+              </p:ext>
+            </p:extLst>
+          </p:nvPr>
+        </p:nvSpPr>
+        <p:spPr>
+          <a:xfrm>
+            <a:off x="458724" y="457200"/>
+            <a:ext cx="11274552" cy="5943600"/>
+          </a:xfrm>
+          <a:prstGeom prst="rect">
+            <a:avLst/>
+          </a:prstGeom>
+          <a:ln>
+            <a:noFill/>
+          </a:ln>
+        </p:spPr>
+        <p:style>
+          <a:lnRef idx="2">
+            <a:schemeClr val="accent1">
+              <a:shade val="50000"/>
+            </a:schemeClr>
+          </a:lnRef>
+          <a:fillRef idx="1">
+            <a:schemeClr val="accent1"/>
+          </a:fillRef>
+          <a:effectRef idx="0">
+            <a:schemeClr val="accent1"/>
+          </a:effectRef>
+          <a:fontRef idx="minor">
+            <a:schemeClr val="lt1"/>
+          </a:fontRef>
+        </p:style>
+        <p:txBody>
+          <a:bodyPr rtlCol="0" anchor="ctr"/>
+          <a:lstStyle/>
+          <a:p>
+            <a:pPr algn="ctr"/>
+            <a:endParaRPr lang="en-US"/>
+          </a:p>
+        </p:txBody>
+      </p:sp>
+      <p:sp>
+        <p:nvSpPr>
+          <p:cNvPr id="36" name="Rectangle 35">
+            <a:extLst>
+              <a:ext uri="{FF2B5EF4-FFF2-40B4-BE49-F238E27FC236}">
+                <a16:creationId xmlns:a16="http://schemas.microsoft.com/office/drawing/2014/main" id="{B76E24C1-2968-40DC-A36E-F6B85F0F0752}"/>
+              </a:ext>
+              <a:ext uri="{C183D7F6-B498-43B3-948B-1728B52AA6E4}">
+                <adec:decorative xmlns:adec="http://schemas.microsoft.com/office/drawing/2017/decorative" val="1"/>
+              </a:ext>
+            </a:extLst>
+          </p:cNvPr>
+          <p:cNvSpPr>
+            <a:spLocks noGrp="1" noRot="1" noChangeAspect="1" noMove="1" noResize="1" noEditPoints="1" noAdjustHandles="1" noChangeArrowheads="1" noChangeShapeType="1" noTextEdit="1"/>
+          </p:cNvSpPr>
+          <p:nvPr>
+            <p:extLst>
+              <p:ext uri="{386F3935-93C4-4BCD-93E2-E3B085C9AB24}">
+                <p16:designElem xmlns:p16="http://schemas.microsoft.com/office/powerpoint/2015/main" val="1"/>
+              </p:ext>
+            </p:extLst>
+          </p:nvPr>
+        </p:nvSpPr>
+        <p:spPr>
+          <a:xfrm>
+            <a:off x="522732" y="521208"/>
+            <a:ext cx="11146536" cy="5815584"/>
+          </a:xfrm>
+          <a:prstGeom prst="rect">
+            <a:avLst/>
+          </a:prstGeom>
+          <a:solidFill>
+            <a:srgbClr val="FFFFFF"/>
+          </a:solidFill>
+          <a:ln>
+            <a:noFill/>
+          </a:ln>
+        </p:spPr>
+        <p:style>
+          <a:lnRef idx="2">
+            <a:schemeClr val="accent1">
+              <a:shade val="50000"/>
+            </a:schemeClr>
+          </a:lnRef>
+          <a:fillRef idx="1">
+            <a:schemeClr val="accent1"/>
+          </a:fillRef>
+          <a:effectRef idx="0">
+            <a:schemeClr val="accent1"/>
+          </a:effectRef>
+          <a:fontRef idx="minor">
+            <a:schemeClr val="lt1"/>
+          </a:fontRef>
+        </p:style>
+        <p:txBody>
+          <a:bodyPr rtlCol="0" anchor="ctr"/>
+          <a:lstStyle/>
+          <a:p>
+            <a:pPr algn="ctr"/>
+            <a:endParaRPr lang="en-US"/>
+          </a:p>
+        </p:txBody>
+      </p:sp>
+      <p:sp>
+        <p:nvSpPr>
+          <p:cNvPr id="4" name="Footer Placeholder 3">
+            <a:extLst>
+              <a:ext uri="{FF2B5EF4-FFF2-40B4-BE49-F238E27FC236}">
+                <a16:creationId xmlns:a16="http://schemas.microsoft.com/office/drawing/2014/main" id="{52F68A55-D323-48BD-A00A-E14A5B4B0B02}"/>
+              </a:ext>
+            </a:extLst>
+          </p:cNvPr>
+          <p:cNvSpPr>
+            <a:spLocks noGrp="1"/>
+          </p:cNvSpPr>
+          <p:nvPr>
+            <p:ph type="ftr" sz="quarter" idx="11"/>
+          </p:nvPr>
+        </p:nvSpPr>
+        <p:spPr>
+          <a:xfrm>
+            <a:off x="1097279" y="6446838"/>
+            <a:ext cx="6818262" cy="365125"/>
+          </a:xfrm>
+        </p:spPr>
+        <p:txBody>
+          <a:bodyPr vert="horz" lIns="91440" tIns="45720" rIns="91440" bIns="45720" rtlCol="0" anchor="ctr">
+            <a:normAutofit/>
+          </a:bodyPr>
+          <a:lstStyle/>
+          <a:p>
+            <a:pPr>
+              <a:spcAft>
+                <a:spcPts val="600"/>
+              </a:spcAft>
+            </a:pPr>
+            <a:r>
+              <a:rPr lang="en-US" kern="1200" cap="all" baseline="0">
+                <a:solidFill>
+                  <a:srgbClr val="FFFFFF"/>
+                </a:solidFill>
+                <a:latin typeface="+mn-lt"/>
+                <a:ea typeface="+mn-ea"/>
+                <a:cs typeface="+mn-cs"/>
+              </a:rPr>
+              <a:t>Lampros Lountzis</a:t>
+            </a:r>
+          </a:p>
+        </p:txBody>
+      </p:sp>
+      <p:sp>
+        <p:nvSpPr>
+          <p:cNvPr id="5" name="Slide Number Placeholder 4">
+            <a:extLst>
+              <a:ext uri="{FF2B5EF4-FFF2-40B4-BE49-F238E27FC236}">
+                <a16:creationId xmlns:a16="http://schemas.microsoft.com/office/drawing/2014/main" id="{4301D32C-98D4-4085-A9AF-AF0B5DAFC439}"/>
+              </a:ext>
+            </a:extLst>
+          </p:cNvPr>
+          <p:cNvSpPr>
+            <a:spLocks noGrp="1"/>
+          </p:cNvSpPr>
+          <p:nvPr>
+            <p:ph type="sldNum" sz="quarter" idx="12"/>
+          </p:nvPr>
+        </p:nvSpPr>
+        <p:spPr>
+          <a:xfrm>
+            <a:off x="10993582" y="6446838"/>
+            <a:ext cx="780010" cy="365125"/>
+          </a:xfrm>
+        </p:spPr>
+        <p:txBody>
+          <a:bodyPr vert="horz" lIns="91440" tIns="45720" rIns="91440" bIns="45720" rtlCol="0" anchor="ctr">
+            <a:normAutofit/>
+          </a:bodyPr>
+          <a:lstStyle/>
+          <a:p>
+            <a:pPr>
+              <a:spcAft>
+                <a:spcPts val="600"/>
+              </a:spcAft>
+            </a:pPr>
+            <a:fld id="{3A98EE3D-8CD1-4C3F-BD1C-C98C9596463C}" type="slidenum">
+              <a:rPr lang="en-US" sz="1050"/>
+              <a:pPr>
+                <a:spcAft>
+                  <a:spcPts val="600"/>
+                </a:spcAft>
+              </a:pPr>
+              <a:t>35</a:t>
+            </a:fld>
+            <a:endParaRPr lang="en-US" sz="1050"/>
+          </a:p>
+        </p:txBody>
+      </p:sp>
+      <p:pic>
+        <p:nvPicPr>
+          <p:cNvPr id="16" name="Content Placeholder 15" descr="A screenshot of a computer&#10;&#10;Description automatically generated with medium confidence">
+            <a:extLst>
+              <a:ext uri="{FF2B5EF4-FFF2-40B4-BE49-F238E27FC236}">
+                <a16:creationId xmlns:a16="http://schemas.microsoft.com/office/drawing/2014/main" id="{7CC22FB1-0FF3-4BA3-93C1-250B80C1AE90}"/>
+              </a:ext>
+            </a:extLst>
+          </p:cNvPr>
+          <p:cNvPicPr>
+            <a:picLocks noGrp="1" noChangeAspect="1"/>
+          </p:cNvPicPr>
+          <p:nvPr>
+            <p:ph idx="1"/>
+          </p:nvPr>
+        </p:nvPicPr>
+        <p:blipFill>
+          <a:blip r:embed="rId2">
+            <a:extLst>
+              <a:ext uri="{28A0092B-C50C-407E-A947-70E740481C1C}">
+                <a14:useLocalDpi xmlns:a14="http://schemas.microsoft.com/office/drawing/2010/main" val="0"/>
+              </a:ext>
+            </a:extLst>
+          </a:blip>
+          <a:stretch>
+            <a:fillRect/>
+          </a:stretch>
+        </p:blipFill>
+        <p:spPr>
+          <a:xfrm>
+            <a:off x="458723" y="457200"/>
+            <a:ext cx="11277023" cy="5943600"/>
+          </a:xfrm>
+        </p:spPr>
+      </p:pic>
+    </p:spTree>
+    <p:extLst>
+      <p:ext uri="{BB962C8B-B14F-4D97-AF65-F5344CB8AC3E}">
+        <p14:creationId xmlns:p14="http://schemas.microsoft.com/office/powerpoint/2010/main" val="2769454547"/>
+      </p:ext>
+    </p:extLst>
+  </p:cSld>
+  <p:clrMapOvr>
+    <a:masterClrMapping/>
+  </p:clrMapOvr>
+</p:sld>
+</file>
+
+<file path=ppt/slides/slide36.xml><?xml version="1.0" encoding="utf-8"?>
+<p:sld xmlns:a="http://schemas.openxmlformats.org/drawingml/2006/main" xmlns:r="http://schemas.openxmlformats.org/officeDocument/2006/relationships" xmlns:p="http://schemas.openxmlformats.org/presentationml/2006/main">
+  <p:cSld>
+    <p:bg>
+      <p:bgPr>
+        <a:solidFill>
+          <a:schemeClr val="bg1"/>
+        </a:solidFill>
+        <a:effectLst/>
+      </p:bgPr>
+    </p:bg>
+    <p:spTree>
+      <p:nvGrpSpPr>
+        <p:cNvPr id="1" name=""/>
+        <p:cNvGrpSpPr/>
+        <p:nvPr/>
+      </p:nvGrpSpPr>
+      <p:grpSpPr>
+        <a:xfrm>
+          <a:off x="0" y="0"/>
+          <a:ext cx="0" cy="0"/>
+          <a:chOff x="0" y="0"/>
+          <a:chExt cx="0" cy="0"/>
+        </a:xfrm>
+      </p:grpSpPr>
+      <p:sp>
+        <p:nvSpPr>
+          <p:cNvPr id="30" name="Rectangle 29">
+            <a:extLst>
+              <a:ext uri="{FF2B5EF4-FFF2-40B4-BE49-F238E27FC236}">
+                <a16:creationId xmlns:a16="http://schemas.microsoft.com/office/drawing/2014/main" id="{A8E9C91B-7EAD-4562-AB0E-DFB9663AECE3}"/>
+              </a:ext>
+              <a:ext uri="{C183D7F6-B498-43B3-948B-1728B52AA6E4}">
+                <adec:decorative xmlns:adec="http://schemas.microsoft.com/office/drawing/2017/decorative" val="1"/>
+              </a:ext>
+            </a:extLst>
+          </p:cNvPr>
+          <p:cNvSpPr>
+            <a:spLocks noGrp="1" noRot="1" noChangeAspect="1" noMove="1" noResize="1" noEditPoints="1" noAdjustHandles="1" noChangeArrowheads="1" noChangeShapeType="1" noTextEdit="1"/>
+          </p:cNvSpPr>
+          <p:nvPr>
+            <p:extLst>
+              <p:ext uri="{386F3935-93C4-4BCD-93E2-E3B085C9AB24}">
+                <p16:designElem xmlns:p16="http://schemas.microsoft.com/office/powerpoint/2015/main" val="1"/>
+              </p:ext>
+            </p:extLst>
+          </p:nvPr>
+        </p:nvSpPr>
+        <p:spPr>
+          <a:xfrm>
+            <a:off x="3175" y="6400800"/>
+            <a:ext cx="12188825" cy="457200"/>
+          </a:xfrm>
+          <a:prstGeom prst="rect">
+            <a:avLst/>
+          </a:prstGeom>
+          <a:solidFill>
+            <a:srgbClr val="262626"/>
+          </a:solidFill>
+          <a:ln>
+            <a:noFill/>
+          </a:ln>
+        </p:spPr>
+        <p:style>
+          <a:lnRef idx="2">
+            <a:schemeClr val="accent1">
+              <a:shade val="50000"/>
+            </a:schemeClr>
+          </a:lnRef>
+          <a:fillRef idx="1">
+            <a:schemeClr val="accent1"/>
+          </a:fillRef>
+          <a:effectRef idx="0">
+            <a:schemeClr val="accent1"/>
+          </a:effectRef>
+          <a:fontRef idx="minor">
+            <a:schemeClr val="lt1"/>
+          </a:fontRef>
+        </p:style>
+      </p:sp>
+      <p:sp>
+        <p:nvSpPr>
+          <p:cNvPr id="32" name="Rectangle 31">
+            <a:extLst>
+              <a:ext uri="{FF2B5EF4-FFF2-40B4-BE49-F238E27FC236}">
+                <a16:creationId xmlns:a16="http://schemas.microsoft.com/office/drawing/2014/main" id="{41497DE5-0939-4D1D-9350-0C5E1B209C68}"/>
+              </a:ext>
+              <a:ext uri="{C183D7F6-B498-43B3-948B-1728B52AA6E4}">
+                <adec:decorative xmlns:adec="http://schemas.microsoft.com/office/drawing/2017/decorative" val="1"/>
+              </a:ext>
+            </a:extLst>
+          </p:cNvPr>
+          <p:cNvSpPr>
+            <a:spLocks noGrp="1" noRot="1" noChangeAspect="1" noMove="1" noResize="1" noEditPoints="1" noAdjustHandles="1" noChangeArrowheads="1" noChangeShapeType="1" noTextEdit="1"/>
+          </p:cNvSpPr>
+          <p:nvPr>
+            <p:extLst>
+              <p:ext uri="{386F3935-93C4-4BCD-93E2-E3B085C9AB24}">
+                <p16:designElem xmlns:p16="http://schemas.microsoft.com/office/powerpoint/2015/main" val="1"/>
+              </p:ext>
+            </p:extLst>
+          </p:nvPr>
+        </p:nvSpPr>
+        <p:spPr>
+          <a:xfrm>
+            <a:off x="0" y="0"/>
+            <a:ext cx="12192000" cy="6858000"/>
+          </a:xfrm>
+          <a:prstGeom prst="rect">
+            <a:avLst/>
+          </a:prstGeom>
+          <a:solidFill>
+            <a:srgbClr val="262626"/>
+          </a:solidFill>
+          <a:ln>
+            <a:noFill/>
+          </a:ln>
+        </p:spPr>
+        <p:style>
+          <a:lnRef idx="2">
+            <a:schemeClr val="accent1">
+              <a:shade val="50000"/>
+            </a:schemeClr>
+          </a:lnRef>
+          <a:fillRef idx="1">
+            <a:schemeClr val="accent1"/>
+          </a:fillRef>
+          <a:effectRef idx="0">
+            <a:schemeClr val="accent1"/>
+          </a:effectRef>
+          <a:fontRef idx="minor">
+            <a:schemeClr val="lt1"/>
+          </a:fontRef>
+        </p:style>
+        <p:txBody>
+          <a:bodyPr rtlCol="0" anchor="ctr"/>
+          <a:lstStyle/>
+          <a:p>
+            <a:pPr algn="ctr"/>
+            <a:endParaRPr lang="en-US"/>
+          </a:p>
+        </p:txBody>
+      </p:sp>
+      <p:sp>
+        <p:nvSpPr>
+          <p:cNvPr id="34" name="Rectangle 33">
+            <a:extLst>
+              <a:ext uri="{FF2B5EF4-FFF2-40B4-BE49-F238E27FC236}">
+                <a16:creationId xmlns:a16="http://schemas.microsoft.com/office/drawing/2014/main" id="{5CCC70ED-6C63-4537-B7EB-51990D6C0A6F}"/>
+              </a:ext>
+              <a:ext uri="{C183D7F6-B498-43B3-948B-1728B52AA6E4}">
+                <adec:decorative xmlns:adec="http://schemas.microsoft.com/office/drawing/2017/decorative" val="1"/>
+              </a:ext>
+            </a:extLst>
+          </p:cNvPr>
+          <p:cNvSpPr>
+            <a:spLocks noGrp="1" noRot="1" noChangeAspect="1" noMove="1" noResize="1" noEditPoints="1" noAdjustHandles="1" noChangeArrowheads="1" noChangeShapeType="1" noTextEdit="1"/>
+          </p:cNvSpPr>
+          <p:nvPr>
+            <p:extLst>
+              <p:ext uri="{386F3935-93C4-4BCD-93E2-E3B085C9AB24}">
+                <p16:designElem xmlns:p16="http://schemas.microsoft.com/office/powerpoint/2015/main" val="1"/>
+              </p:ext>
+            </p:extLst>
+          </p:nvPr>
+        </p:nvSpPr>
+        <p:spPr>
+          <a:xfrm>
+            <a:off x="458724" y="457200"/>
+            <a:ext cx="11274552" cy="5943600"/>
+          </a:xfrm>
+          <a:prstGeom prst="rect">
+            <a:avLst/>
+          </a:prstGeom>
+          <a:ln>
+            <a:noFill/>
+          </a:ln>
+        </p:spPr>
+        <p:style>
+          <a:lnRef idx="2">
+            <a:schemeClr val="accent1">
+              <a:shade val="50000"/>
+            </a:schemeClr>
+          </a:lnRef>
+          <a:fillRef idx="1">
+            <a:schemeClr val="accent1"/>
+          </a:fillRef>
+          <a:effectRef idx="0">
+            <a:schemeClr val="accent1"/>
+          </a:effectRef>
+          <a:fontRef idx="minor">
+            <a:schemeClr val="lt1"/>
+          </a:fontRef>
+        </p:style>
+        <p:txBody>
+          <a:bodyPr rtlCol="0" anchor="ctr"/>
+          <a:lstStyle/>
+          <a:p>
+            <a:pPr algn="ctr"/>
+            <a:endParaRPr lang="en-US"/>
+          </a:p>
+        </p:txBody>
+      </p:sp>
+      <p:sp>
+        <p:nvSpPr>
+          <p:cNvPr id="36" name="Rectangle 35">
+            <a:extLst>
+              <a:ext uri="{FF2B5EF4-FFF2-40B4-BE49-F238E27FC236}">
+                <a16:creationId xmlns:a16="http://schemas.microsoft.com/office/drawing/2014/main" id="{B76E24C1-2968-40DC-A36E-F6B85F0F0752}"/>
+              </a:ext>
+              <a:ext uri="{C183D7F6-B498-43B3-948B-1728B52AA6E4}">
+                <adec:decorative xmlns:adec="http://schemas.microsoft.com/office/drawing/2017/decorative" val="1"/>
+              </a:ext>
+            </a:extLst>
+          </p:cNvPr>
+          <p:cNvSpPr>
+            <a:spLocks noGrp="1" noRot="1" noChangeAspect="1" noMove="1" noResize="1" noEditPoints="1" noAdjustHandles="1" noChangeArrowheads="1" noChangeShapeType="1" noTextEdit="1"/>
+          </p:cNvSpPr>
+          <p:nvPr>
+            <p:extLst>
+              <p:ext uri="{386F3935-93C4-4BCD-93E2-E3B085C9AB24}">
+                <p16:designElem xmlns:p16="http://schemas.microsoft.com/office/powerpoint/2015/main" val="1"/>
+              </p:ext>
+            </p:extLst>
+          </p:nvPr>
+        </p:nvSpPr>
+        <p:spPr>
+          <a:xfrm>
+            <a:off x="522732" y="521208"/>
+            <a:ext cx="11146536" cy="5815584"/>
+          </a:xfrm>
+          <a:prstGeom prst="rect">
+            <a:avLst/>
+          </a:prstGeom>
+          <a:solidFill>
+            <a:srgbClr val="FFFFFF"/>
+          </a:solidFill>
+          <a:ln>
+            <a:noFill/>
+          </a:ln>
+        </p:spPr>
+        <p:style>
+          <a:lnRef idx="2">
+            <a:schemeClr val="accent1">
+              <a:shade val="50000"/>
+            </a:schemeClr>
+          </a:lnRef>
+          <a:fillRef idx="1">
+            <a:schemeClr val="accent1"/>
+          </a:fillRef>
+          <a:effectRef idx="0">
+            <a:schemeClr val="accent1"/>
+          </a:effectRef>
+          <a:fontRef idx="minor">
+            <a:schemeClr val="lt1"/>
+          </a:fontRef>
+        </p:style>
+        <p:txBody>
+          <a:bodyPr rtlCol="0" anchor="ctr"/>
+          <a:lstStyle/>
+          <a:p>
+            <a:pPr algn="ctr"/>
+            <a:endParaRPr lang="en-US"/>
+          </a:p>
+        </p:txBody>
+      </p:sp>
+      <p:sp>
+        <p:nvSpPr>
+          <p:cNvPr id="4" name="Footer Placeholder 3">
+            <a:extLst>
+              <a:ext uri="{FF2B5EF4-FFF2-40B4-BE49-F238E27FC236}">
+                <a16:creationId xmlns:a16="http://schemas.microsoft.com/office/drawing/2014/main" id="{52F68A55-D323-48BD-A00A-E14A5B4B0B02}"/>
+              </a:ext>
+            </a:extLst>
+          </p:cNvPr>
+          <p:cNvSpPr>
+            <a:spLocks noGrp="1"/>
+          </p:cNvSpPr>
+          <p:nvPr>
+            <p:ph type="ftr" sz="quarter" idx="11"/>
+          </p:nvPr>
+        </p:nvSpPr>
+        <p:spPr>
+          <a:xfrm>
+            <a:off x="1097279" y="6446838"/>
+            <a:ext cx="6818262" cy="365125"/>
+          </a:xfrm>
+        </p:spPr>
+        <p:txBody>
+          <a:bodyPr vert="horz" lIns="91440" tIns="45720" rIns="91440" bIns="45720" rtlCol="0" anchor="ctr">
+            <a:normAutofit/>
+          </a:bodyPr>
+          <a:lstStyle/>
+          <a:p>
+            <a:pPr>
+              <a:spcAft>
+                <a:spcPts val="600"/>
+              </a:spcAft>
+            </a:pPr>
+            <a:r>
+              <a:rPr lang="en-US" kern="1200" cap="all" baseline="0">
+                <a:solidFill>
+                  <a:srgbClr val="FFFFFF"/>
+                </a:solidFill>
+                <a:latin typeface="+mn-lt"/>
+                <a:ea typeface="+mn-ea"/>
+                <a:cs typeface="+mn-cs"/>
+              </a:rPr>
+              <a:t>Lampros Lountzis</a:t>
+            </a:r>
+          </a:p>
+        </p:txBody>
+      </p:sp>
+      <p:sp>
+        <p:nvSpPr>
+          <p:cNvPr id="5" name="Slide Number Placeholder 4">
+            <a:extLst>
+              <a:ext uri="{FF2B5EF4-FFF2-40B4-BE49-F238E27FC236}">
+                <a16:creationId xmlns:a16="http://schemas.microsoft.com/office/drawing/2014/main" id="{4301D32C-98D4-4085-A9AF-AF0B5DAFC439}"/>
+              </a:ext>
+            </a:extLst>
+          </p:cNvPr>
+          <p:cNvSpPr>
+            <a:spLocks noGrp="1"/>
+          </p:cNvSpPr>
+          <p:nvPr>
+            <p:ph type="sldNum" sz="quarter" idx="12"/>
+          </p:nvPr>
+        </p:nvSpPr>
+        <p:spPr>
+          <a:xfrm>
+            <a:off x="10993582" y="6446838"/>
+            <a:ext cx="780010" cy="365125"/>
+          </a:xfrm>
+        </p:spPr>
+        <p:txBody>
+          <a:bodyPr vert="horz" lIns="91440" tIns="45720" rIns="91440" bIns="45720" rtlCol="0" anchor="ctr">
+            <a:normAutofit/>
+          </a:bodyPr>
+          <a:lstStyle/>
+          <a:p>
+            <a:pPr>
+              <a:spcAft>
+                <a:spcPts val="600"/>
+              </a:spcAft>
+            </a:pPr>
+            <a:fld id="{3A98EE3D-8CD1-4C3F-BD1C-C98C9596463C}" type="slidenum">
+              <a:rPr lang="en-US" sz="1050"/>
+              <a:pPr>
+                <a:spcAft>
+                  <a:spcPts val="600"/>
+                </a:spcAft>
+              </a:pPr>
+              <a:t>36</a:t>
+            </a:fld>
+            <a:endParaRPr lang="en-US" sz="1050"/>
+          </a:p>
+        </p:txBody>
+      </p:sp>
+      <p:pic>
+        <p:nvPicPr>
+          <p:cNvPr id="7" name="Content Placeholder 6" descr="A picture containing text, businesscard&#10;&#10;Description automatically generated">
+            <a:extLst>
+              <a:ext uri="{FF2B5EF4-FFF2-40B4-BE49-F238E27FC236}">
+                <a16:creationId xmlns:a16="http://schemas.microsoft.com/office/drawing/2014/main" id="{1883D710-2AB7-4EC7-8635-7CB67289DBB2}"/>
+              </a:ext>
+            </a:extLst>
+          </p:cNvPr>
+          <p:cNvPicPr>
+            <a:picLocks noGrp="1" noChangeAspect="1"/>
+          </p:cNvPicPr>
+          <p:nvPr>
+            <p:ph idx="1"/>
+          </p:nvPr>
+        </p:nvPicPr>
+        <p:blipFill>
+          <a:blip r:embed="rId2">
+            <a:extLst>
+              <a:ext uri="{28A0092B-C50C-407E-A947-70E740481C1C}">
+                <a14:useLocalDpi xmlns:a14="http://schemas.microsoft.com/office/drawing/2010/main" val="0"/>
+              </a:ext>
+            </a:extLst>
+          </a:blip>
+          <a:stretch>
+            <a:fillRect/>
+          </a:stretch>
+        </p:blipFill>
+        <p:spPr>
+          <a:xfrm>
+            <a:off x="458724" y="457200"/>
+            <a:ext cx="11284213" cy="5943601"/>
+          </a:xfrm>
+        </p:spPr>
+      </p:pic>
+    </p:spTree>
+    <p:extLst>
+      <p:ext uri="{BB962C8B-B14F-4D97-AF65-F5344CB8AC3E}">
+        <p14:creationId xmlns:p14="http://schemas.microsoft.com/office/powerpoint/2010/main" val="3399706800"/>
+      </p:ext>
+    </p:extLst>
+  </p:cSld>
+  <p:clrMapOvr>
+    <a:masterClrMapping/>
+  </p:clrMapOvr>
+</p:sld>
+</file>
+
+<file path=ppt/slides/slide37.xml><?xml version="1.0" encoding="utf-8"?>
+<p:sld xmlns:a="http://schemas.openxmlformats.org/drawingml/2006/main" xmlns:r="http://schemas.openxmlformats.org/officeDocument/2006/relationships" xmlns:p="http://schemas.openxmlformats.org/presentationml/2006/main">
+  <p:cSld>
+    <p:bg>
+      <p:bgPr>
+        <a:solidFill>
+          <a:schemeClr val="bg1"/>
+        </a:solidFill>
+        <a:effectLst/>
+      </p:bgPr>
+    </p:bg>
+    <p:spTree>
+      <p:nvGrpSpPr>
+        <p:cNvPr id="1" name=""/>
+        <p:cNvGrpSpPr/>
+        <p:nvPr/>
+      </p:nvGrpSpPr>
+      <p:grpSpPr>
+        <a:xfrm>
+          <a:off x="0" y="0"/>
+          <a:ext cx="0" cy="0"/>
+          <a:chOff x="0" y="0"/>
+          <a:chExt cx="0" cy="0"/>
+        </a:xfrm>
+      </p:grpSpPr>
+      <p:sp>
+        <p:nvSpPr>
+          <p:cNvPr id="30" name="Rectangle 29">
+            <a:extLst>
+              <a:ext uri="{FF2B5EF4-FFF2-40B4-BE49-F238E27FC236}">
+                <a16:creationId xmlns:a16="http://schemas.microsoft.com/office/drawing/2014/main" id="{A8E9C91B-7EAD-4562-AB0E-DFB9663AECE3}"/>
+              </a:ext>
+              <a:ext uri="{C183D7F6-B498-43B3-948B-1728B52AA6E4}">
+                <adec:decorative xmlns:adec="http://schemas.microsoft.com/office/drawing/2017/decorative" val="1"/>
+              </a:ext>
+            </a:extLst>
+          </p:cNvPr>
+          <p:cNvSpPr>
+            <a:spLocks noGrp="1" noRot="1" noChangeAspect="1" noMove="1" noResize="1" noEditPoints="1" noAdjustHandles="1" noChangeArrowheads="1" noChangeShapeType="1" noTextEdit="1"/>
+          </p:cNvSpPr>
+          <p:nvPr>
+            <p:extLst>
+              <p:ext uri="{386F3935-93C4-4BCD-93E2-E3B085C9AB24}">
+                <p16:designElem xmlns:p16="http://schemas.microsoft.com/office/powerpoint/2015/main" val="1"/>
+              </p:ext>
+            </p:extLst>
+          </p:nvPr>
+        </p:nvSpPr>
+        <p:spPr>
+          <a:xfrm>
+            <a:off x="3175" y="6400800"/>
+            <a:ext cx="12188825" cy="457200"/>
+          </a:xfrm>
+          <a:prstGeom prst="rect">
+            <a:avLst/>
+          </a:prstGeom>
+          <a:solidFill>
+            <a:srgbClr val="262626"/>
+          </a:solidFill>
+          <a:ln>
+            <a:noFill/>
+          </a:ln>
+        </p:spPr>
+        <p:style>
+          <a:lnRef idx="2">
+            <a:schemeClr val="accent1">
+              <a:shade val="50000"/>
+            </a:schemeClr>
+          </a:lnRef>
+          <a:fillRef idx="1">
+            <a:schemeClr val="accent1"/>
+          </a:fillRef>
+          <a:effectRef idx="0">
+            <a:schemeClr val="accent1"/>
+          </a:effectRef>
+          <a:fontRef idx="minor">
+            <a:schemeClr val="lt1"/>
+          </a:fontRef>
+        </p:style>
+      </p:sp>
+      <p:sp>
+        <p:nvSpPr>
+          <p:cNvPr id="32" name="Rectangle 31">
+            <a:extLst>
+              <a:ext uri="{FF2B5EF4-FFF2-40B4-BE49-F238E27FC236}">
+                <a16:creationId xmlns:a16="http://schemas.microsoft.com/office/drawing/2014/main" id="{41497DE5-0939-4D1D-9350-0C5E1B209C68}"/>
+              </a:ext>
+              <a:ext uri="{C183D7F6-B498-43B3-948B-1728B52AA6E4}">
+                <adec:decorative xmlns:adec="http://schemas.microsoft.com/office/drawing/2017/decorative" val="1"/>
+              </a:ext>
+            </a:extLst>
+          </p:cNvPr>
+          <p:cNvSpPr>
+            <a:spLocks noGrp="1" noRot="1" noChangeAspect="1" noMove="1" noResize="1" noEditPoints="1" noAdjustHandles="1" noChangeArrowheads="1" noChangeShapeType="1" noTextEdit="1"/>
+          </p:cNvSpPr>
+          <p:nvPr>
+            <p:extLst>
+              <p:ext uri="{386F3935-93C4-4BCD-93E2-E3B085C9AB24}">
+                <p16:designElem xmlns:p16="http://schemas.microsoft.com/office/powerpoint/2015/main" val="1"/>
+              </p:ext>
+            </p:extLst>
+          </p:nvPr>
+        </p:nvSpPr>
+        <p:spPr>
+          <a:xfrm>
+            <a:off x="0" y="0"/>
+            <a:ext cx="12192000" cy="6858000"/>
+          </a:xfrm>
+          <a:prstGeom prst="rect">
+            <a:avLst/>
+          </a:prstGeom>
+          <a:solidFill>
+            <a:srgbClr val="262626"/>
+          </a:solidFill>
+          <a:ln>
+            <a:noFill/>
+          </a:ln>
+        </p:spPr>
+        <p:style>
+          <a:lnRef idx="2">
+            <a:schemeClr val="accent1">
+              <a:shade val="50000"/>
+            </a:schemeClr>
+          </a:lnRef>
+          <a:fillRef idx="1">
+            <a:schemeClr val="accent1"/>
+          </a:fillRef>
+          <a:effectRef idx="0">
+            <a:schemeClr val="accent1"/>
+          </a:effectRef>
+          <a:fontRef idx="minor">
+            <a:schemeClr val="lt1"/>
+          </a:fontRef>
+        </p:style>
+        <p:txBody>
+          <a:bodyPr rtlCol="0" anchor="ctr"/>
+          <a:lstStyle/>
+          <a:p>
+            <a:pPr algn="ctr"/>
+            <a:endParaRPr lang="en-US"/>
+          </a:p>
+        </p:txBody>
+      </p:sp>
+      <p:sp>
+        <p:nvSpPr>
+          <p:cNvPr id="34" name="Rectangle 33">
+            <a:extLst>
+              <a:ext uri="{FF2B5EF4-FFF2-40B4-BE49-F238E27FC236}">
+                <a16:creationId xmlns:a16="http://schemas.microsoft.com/office/drawing/2014/main" id="{5CCC70ED-6C63-4537-B7EB-51990D6C0A6F}"/>
+              </a:ext>
+              <a:ext uri="{C183D7F6-B498-43B3-948B-1728B52AA6E4}">
+                <adec:decorative xmlns:adec="http://schemas.microsoft.com/office/drawing/2017/decorative" val="1"/>
+              </a:ext>
+            </a:extLst>
+          </p:cNvPr>
+          <p:cNvSpPr>
+            <a:spLocks noGrp="1" noRot="1" noChangeAspect="1" noMove="1" noResize="1" noEditPoints="1" noAdjustHandles="1" noChangeArrowheads="1" noChangeShapeType="1" noTextEdit="1"/>
+          </p:cNvSpPr>
+          <p:nvPr>
+            <p:extLst>
+              <p:ext uri="{386F3935-93C4-4BCD-93E2-E3B085C9AB24}">
+                <p16:designElem xmlns:p16="http://schemas.microsoft.com/office/powerpoint/2015/main" val="1"/>
+              </p:ext>
+            </p:extLst>
+          </p:nvPr>
+        </p:nvSpPr>
+        <p:spPr>
+          <a:xfrm>
+            <a:off x="458724" y="457200"/>
+            <a:ext cx="11274552" cy="5943600"/>
+          </a:xfrm>
+          <a:prstGeom prst="rect">
+            <a:avLst/>
+          </a:prstGeom>
+          <a:ln>
+            <a:noFill/>
+          </a:ln>
+        </p:spPr>
+        <p:style>
+          <a:lnRef idx="2">
+            <a:schemeClr val="accent1">
+              <a:shade val="50000"/>
+            </a:schemeClr>
+          </a:lnRef>
+          <a:fillRef idx="1">
+            <a:schemeClr val="accent1"/>
+          </a:fillRef>
+          <a:effectRef idx="0">
+            <a:schemeClr val="accent1"/>
+          </a:effectRef>
+          <a:fontRef idx="minor">
+            <a:schemeClr val="lt1"/>
+          </a:fontRef>
+        </p:style>
+        <p:txBody>
+          <a:bodyPr rtlCol="0" anchor="ctr"/>
+          <a:lstStyle/>
+          <a:p>
+            <a:pPr algn="ctr"/>
+            <a:endParaRPr lang="en-US"/>
+          </a:p>
+        </p:txBody>
+      </p:sp>
+      <p:sp>
+        <p:nvSpPr>
+          <p:cNvPr id="36" name="Rectangle 35">
+            <a:extLst>
+              <a:ext uri="{FF2B5EF4-FFF2-40B4-BE49-F238E27FC236}">
+                <a16:creationId xmlns:a16="http://schemas.microsoft.com/office/drawing/2014/main" id="{B76E24C1-2968-40DC-A36E-F6B85F0F0752}"/>
+              </a:ext>
+              <a:ext uri="{C183D7F6-B498-43B3-948B-1728B52AA6E4}">
+                <adec:decorative xmlns:adec="http://schemas.microsoft.com/office/drawing/2017/decorative" val="1"/>
+              </a:ext>
+            </a:extLst>
+          </p:cNvPr>
+          <p:cNvSpPr>
+            <a:spLocks noGrp="1" noRot="1" noChangeAspect="1" noMove="1" noResize="1" noEditPoints="1" noAdjustHandles="1" noChangeArrowheads="1" noChangeShapeType="1" noTextEdit="1"/>
+          </p:cNvSpPr>
+          <p:nvPr>
+            <p:extLst>
+              <p:ext uri="{386F3935-93C4-4BCD-93E2-E3B085C9AB24}">
+                <p16:designElem xmlns:p16="http://schemas.microsoft.com/office/powerpoint/2015/main" val="1"/>
+              </p:ext>
+            </p:extLst>
+          </p:nvPr>
+        </p:nvSpPr>
+        <p:spPr>
+          <a:xfrm>
+            <a:off x="522732" y="521208"/>
+            <a:ext cx="11146536" cy="5815584"/>
+          </a:xfrm>
+          <a:prstGeom prst="rect">
+            <a:avLst/>
+          </a:prstGeom>
+          <a:solidFill>
+            <a:srgbClr val="FFFFFF"/>
+          </a:solidFill>
+          <a:ln>
+            <a:noFill/>
+          </a:ln>
+        </p:spPr>
+        <p:style>
+          <a:lnRef idx="2">
+            <a:schemeClr val="accent1">
+              <a:shade val="50000"/>
+            </a:schemeClr>
+          </a:lnRef>
+          <a:fillRef idx="1">
+            <a:schemeClr val="accent1"/>
+          </a:fillRef>
+          <a:effectRef idx="0">
+            <a:schemeClr val="accent1"/>
+          </a:effectRef>
+          <a:fontRef idx="minor">
+            <a:schemeClr val="lt1"/>
+          </a:fontRef>
+        </p:style>
+        <p:txBody>
+          <a:bodyPr rtlCol="0" anchor="ctr"/>
+          <a:lstStyle/>
+          <a:p>
+            <a:pPr algn="ctr"/>
+            <a:endParaRPr lang="en-US"/>
+          </a:p>
+        </p:txBody>
+      </p:sp>
+      <p:sp>
+        <p:nvSpPr>
+          <p:cNvPr id="4" name="Footer Placeholder 3">
+            <a:extLst>
+              <a:ext uri="{FF2B5EF4-FFF2-40B4-BE49-F238E27FC236}">
+                <a16:creationId xmlns:a16="http://schemas.microsoft.com/office/drawing/2014/main" id="{52F68A55-D323-48BD-A00A-E14A5B4B0B02}"/>
+              </a:ext>
+            </a:extLst>
+          </p:cNvPr>
+          <p:cNvSpPr>
+            <a:spLocks noGrp="1"/>
+          </p:cNvSpPr>
+          <p:nvPr>
+            <p:ph type="ftr" sz="quarter" idx="11"/>
+          </p:nvPr>
+        </p:nvSpPr>
+        <p:spPr>
+          <a:xfrm>
+            <a:off x="1097279" y="6446838"/>
+            <a:ext cx="6818262" cy="365125"/>
+          </a:xfrm>
+        </p:spPr>
+        <p:txBody>
+          <a:bodyPr vert="horz" lIns="91440" tIns="45720" rIns="91440" bIns="45720" rtlCol="0" anchor="ctr">
+            <a:normAutofit/>
+          </a:bodyPr>
+          <a:lstStyle/>
+          <a:p>
+            <a:pPr>
+              <a:spcAft>
+                <a:spcPts val="600"/>
+              </a:spcAft>
+            </a:pPr>
+            <a:r>
+              <a:rPr lang="en-US" kern="1200" cap="all" baseline="0">
+                <a:solidFill>
+                  <a:srgbClr val="FFFFFF"/>
+                </a:solidFill>
+                <a:latin typeface="+mn-lt"/>
+                <a:ea typeface="+mn-ea"/>
+                <a:cs typeface="+mn-cs"/>
+              </a:rPr>
+              <a:t>Lampros Lountzis</a:t>
+            </a:r>
+          </a:p>
+        </p:txBody>
+      </p:sp>
+      <p:sp>
+        <p:nvSpPr>
+          <p:cNvPr id="5" name="Slide Number Placeholder 4">
+            <a:extLst>
+              <a:ext uri="{FF2B5EF4-FFF2-40B4-BE49-F238E27FC236}">
+                <a16:creationId xmlns:a16="http://schemas.microsoft.com/office/drawing/2014/main" id="{4301D32C-98D4-4085-A9AF-AF0B5DAFC439}"/>
+              </a:ext>
+            </a:extLst>
+          </p:cNvPr>
+          <p:cNvSpPr>
+            <a:spLocks noGrp="1"/>
+          </p:cNvSpPr>
+          <p:nvPr>
+            <p:ph type="sldNum" sz="quarter" idx="12"/>
+          </p:nvPr>
+        </p:nvSpPr>
+        <p:spPr>
+          <a:xfrm>
+            <a:off x="10993582" y="6446838"/>
+            <a:ext cx="780010" cy="365125"/>
+          </a:xfrm>
+        </p:spPr>
+        <p:txBody>
+          <a:bodyPr vert="horz" lIns="91440" tIns="45720" rIns="91440" bIns="45720" rtlCol="0" anchor="ctr">
+            <a:normAutofit/>
+          </a:bodyPr>
+          <a:lstStyle/>
+          <a:p>
+            <a:pPr>
+              <a:spcAft>
+                <a:spcPts val="600"/>
+              </a:spcAft>
+            </a:pPr>
+            <a:fld id="{3A98EE3D-8CD1-4C3F-BD1C-C98C9596463C}" type="slidenum">
+              <a:rPr lang="en-US" sz="1050"/>
+              <a:pPr>
+                <a:spcAft>
+                  <a:spcPts val="600"/>
+                </a:spcAft>
+              </a:pPr>
+              <a:t>37</a:t>
+            </a:fld>
+            <a:endParaRPr lang="en-US" sz="1050"/>
+          </a:p>
+        </p:txBody>
+      </p:sp>
+      <p:pic>
+        <p:nvPicPr>
+          <p:cNvPr id="8" name="Content Placeholder 7" descr="Graphical user interface, application&#10;&#10;Description automatically generated">
+            <a:extLst>
+              <a:ext uri="{FF2B5EF4-FFF2-40B4-BE49-F238E27FC236}">
+                <a16:creationId xmlns:a16="http://schemas.microsoft.com/office/drawing/2014/main" id="{26474835-ABD8-4E96-AAA9-D2AAF4C533A6}"/>
+              </a:ext>
+            </a:extLst>
+          </p:cNvPr>
+          <p:cNvPicPr>
+            <a:picLocks noGrp="1" noChangeAspect="1"/>
+          </p:cNvPicPr>
+          <p:nvPr>
+            <p:ph idx="1"/>
+          </p:nvPr>
+        </p:nvPicPr>
+        <p:blipFill>
+          <a:blip r:embed="rId2">
+            <a:extLst>
+              <a:ext uri="{28A0092B-C50C-407E-A947-70E740481C1C}">
+                <a14:useLocalDpi xmlns:a14="http://schemas.microsoft.com/office/drawing/2010/main" val="0"/>
+              </a:ext>
+            </a:extLst>
+          </a:blip>
+          <a:stretch>
+            <a:fillRect/>
+          </a:stretch>
+        </p:blipFill>
+        <p:spPr>
+          <a:xfrm>
+            <a:off x="458724" y="457200"/>
+            <a:ext cx="11271729" cy="5943600"/>
+          </a:xfrm>
+        </p:spPr>
+      </p:pic>
+    </p:spTree>
+    <p:extLst>
+      <p:ext uri="{BB962C8B-B14F-4D97-AF65-F5344CB8AC3E}">
+        <p14:creationId xmlns:p14="http://schemas.microsoft.com/office/powerpoint/2010/main" val="2278725975"/>
+      </p:ext>
+    </p:extLst>
+  </p:cSld>
+  <p:clrMapOvr>
+    <a:masterClrMapping/>
+  </p:clrMapOvr>
+</p:sld>
+</file>
+
+<file path=ppt/slides/slide38.xml><?xml version="1.0" encoding="utf-8"?>
 <p:sld xmlns:a="http://schemas.openxmlformats.org/drawingml/2006/main" xmlns:r="http://schemas.openxmlformats.org/officeDocument/2006/relationships" xmlns:p="http://schemas.openxmlformats.org/presentationml/2006/main">
   <p:cSld>
     <p:bg>

</xml_diff>